<commit_message>
[C U] : index css file add, index html fix, ppt fix
</commit_message>
<xml_diff>
--- a/bookmark.pptx
+++ b/bookmark.pptx
@@ -6,8 +6,8 @@
   </p:sldMasterIdLst>
   <p:sldIdLst>
     <p:sldId id="256" r:id="rId2"/>
-    <p:sldId id="257" r:id="rId3"/>
-    <p:sldId id="258" r:id="rId4"/>
+    <p:sldId id="260" r:id="rId3"/>
+    <p:sldId id="259" r:id="rId4"/>
   </p:sldIdLst>
   <p:sldSz cx="12192000" cy="6858000"/>
   <p:notesSz cx="6858000" cy="9144000"/>
@@ -106,7 +106,24 @@
       </a:defRPr>
     </a:lvl9pPr>
   </p:defaultTextStyle>
+  <p:extLst>
+    <p:ext uri="{EFAFB233-063F-42B5-8137-9DF3F51BA10A}">
+      <p15:sldGuideLst xmlns:p15="http://schemas.microsoft.com/office/powerpoint/2012/main"/>
+    </p:ext>
+  </p:extLst>
 </p:presentation>
+</file>
+
+<file path=ppt/commentAuthors.xml><?xml version="1.0" encoding="utf-8"?>
+<p:cmAuthorLst xmlns:a="http://schemas.openxmlformats.org/drawingml/2006/main" xmlns:r="http://schemas.openxmlformats.org/officeDocument/2006/relationships" xmlns:p="http://schemas.openxmlformats.org/presentationml/2006/main">
+  <p:cmAuthor id="1" name="김운지" initials="김" lastIdx="1" clrIdx="0">
+    <p:extLst>
+      <p:ext uri="{19B8F6BF-5375-455C-9EA6-DF929625EA0E}">
+        <p15:presenceInfo xmlns:p15="http://schemas.microsoft.com/office/powerpoint/2012/main" userId="김운지" providerId="None"/>
+      </p:ext>
+    </p:extLst>
+  </p:cmAuthor>
+</p:cmAuthorLst>
 </file>
 
 <file path=ppt/slideLayouts/slideLayout1.xml><?xml version="1.0" encoding="utf-8"?>
@@ -240,7 +257,7 @@
           <a:p>
             <a:fld id="{9A0CBB99-4DF1-49E3-ACA0-C007A6485E48}" type="datetimeFigureOut">
               <a:rPr lang="ko-KR" altLang="en-US" smtClean="0"/>
-              <a:t>2024-04-04</a:t>
+              <a:t>2024-04-05</a:t>
             </a:fld>
             <a:endParaRPr lang="ko-KR" altLang="en-US"/>
           </a:p>
@@ -410,7 +427,7 @@
           <a:p>
             <a:fld id="{9A0CBB99-4DF1-49E3-ACA0-C007A6485E48}" type="datetimeFigureOut">
               <a:rPr lang="ko-KR" altLang="en-US" smtClean="0"/>
-              <a:t>2024-04-04</a:t>
+              <a:t>2024-04-05</a:t>
             </a:fld>
             <a:endParaRPr lang="ko-KR" altLang="en-US"/>
           </a:p>
@@ -590,7 +607,7 @@
           <a:p>
             <a:fld id="{9A0CBB99-4DF1-49E3-ACA0-C007A6485E48}" type="datetimeFigureOut">
               <a:rPr lang="ko-KR" altLang="en-US" smtClean="0"/>
-              <a:t>2024-04-04</a:t>
+              <a:t>2024-04-05</a:t>
             </a:fld>
             <a:endParaRPr lang="ko-KR" altLang="en-US"/>
           </a:p>
@@ -760,7 +777,7 @@
           <a:p>
             <a:fld id="{9A0CBB99-4DF1-49E3-ACA0-C007A6485E48}" type="datetimeFigureOut">
               <a:rPr lang="ko-KR" altLang="en-US" smtClean="0"/>
-              <a:t>2024-04-04</a:t>
+              <a:t>2024-04-05</a:t>
             </a:fld>
             <a:endParaRPr lang="ko-KR" altLang="en-US"/>
           </a:p>
@@ -1006,7 +1023,7 @@
           <a:p>
             <a:fld id="{9A0CBB99-4DF1-49E3-ACA0-C007A6485E48}" type="datetimeFigureOut">
               <a:rPr lang="ko-KR" altLang="en-US" smtClean="0"/>
-              <a:t>2024-04-04</a:t>
+              <a:t>2024-04-05</a:t>
             </a:fld>
             <a:endParaRPr lang="ko-KR" altLang="en-US"/>
           </a:p>
@@ -1238,7 +1255,7 @@
           <a:p>
             <a:fld id="{9A0CBB99-4DF1-49E3-ACA0-C007A6485E48}" type="datetimeFigureOut">
               <a:rPr lang="ko-KR" altLang="en-US" smtClean="0"/>
-              <a:t>2024-04-04</a:t>
+              <a:t>2024-04-05</a:t>
             </a:fld>
             <a:endParaRPr lang="ko-KR" altLang="en-US"/>
           </a:p>
@@ -1605,7 +1622,7 @@
           <a:p>
             <a:fld id="{9A0CBB99-4DF1-49E3-ACA0-C007A6485E48}" type="datetimeFigureOut">
               <a:rPr lang="ko-KR" altLang="en-US" smtClean="0"/>
-              <a:t>2024-04-04</a:t>
+              <a:t>2024-04-05</a:t>
             </a:fld>
             <a:endParaRPr lang="ko-KR" altLang="en-US"/>
           </a:p>
@@ -1723,7 +1740,7 @@
           <a:p>
             <a:fld id="{9A0CBB99-4DF1-49E3-ACA0-C007A6485E48}" type="datetimeFigureOut">
               <a:rPr lang="ko-KR" altLang="en-US" smtClean="0"/>
-              <a:t>2024-04-04</a:t>
+              <a:t>2024-04-05</a:t>
             </a:fld>
             <a:endParaRPr lang="ko-KR" altLang="en-US"/>
           </a:p>
@@ -1818,7 +1835,7 @@
           <a:p>
             <a:fld id="{9A0CBB99-4DF1-49E3-ACA0-C007A6485E48}" type="datetimeFigureOut">
               <a:rPr lang="ko-KR" altLang="en-US" smtClean="0"/>
-              <a:t>2024-04-04</a:t>
+              <a:t>2024-04-05</a:t>
             </a:fld>
             <a:endParaRPr lang="ko-KR" altLang="en-US"/>
           </a:p>
@@ -2095,7 +2112,7 @@
           <a:p>
             <a:fld id="{9A0CBB99-4DF1-49E3-ACA0-C007A6485E48}" type="datetimeFigureOut">
               <a:rPr lang="ko-KR" altLang="en-US" smtClean="0"/>
-              <a:t>2024-04-04</a:t>
+              <a:t>2024-04-05</a:t>
             </a:fld>
             <a:endParaRPr lang="ko-KR" altLang="en-US"/>
           </a:p>
@@ -2348,7 +2365,7 @@
           <a:p>
             <a:fld id="{9A0CBB99-4DF1-49E3-ACA0-C007A6485E48}" type="datetimeFigureOut">
               <a:rPr lang="ko-KR" altLang="en-US" smtClean="0"/>
-              <a:t>2024-04-04</a:t>
+              <a:t>2024-04-05</a:t>
             </a:fld>
             <a:endParaRPr lang="ko-KR" altLang="en-US"/>
           </a:p>
@@ -2561,7 +2578,7 @@
           <a:p>
             <a:fld id="{9A0CBB99-4DF1-49E3-ACA0-C007A6485E48}" type="datetimeFigureOut">
               <a:rPr lang="ko-KR" altLang="en-US" smtClean="0"/>
-              <a:t>2024-04-04</a:t>
+              <a:t>2024-04-05</a:t>
             </a:fld>
             <a:endParaRPr lang="ko-KR" altLang="en-US"/>
           </a:p>
@@ -3023,1454 +3040,532 @@
           <a:chExt cx="0" cy="0"/>
         </a:xfrm>
       </p:grpSpPr>
+      <p:grpSp>
+        <p:nvGrpSpPr>
+          <p:cNvPr id="4" name="그룹 3"/>
+          <p:cNvGrpSpPr/>
+          <p:nvPr/>
+        </p:nvGrpSpPr>
+        <p:grpSpPr>
+          <a:xfrm>
+            <a:off x="53440" y="47501"/>
+            <a:ext cx="2820390" cy="469076"/>
+            <a:chOff x="53440" y="47501"/>
+            <a:chExt cx="2820390" cy="469076"/>
+          </a:xfrm>
+        </p:grpSpPr>
+        <p:sp>
+          <p:nvSpPr>
+            <p:cNvPr id="5" name="직사각형 4"/>
+            <p:cNvSpPr/>
+            <p:nvPr/>
+          </p:nvSpPr>
+          <p:spPr>
+            <a:xfrm>
+              <a:off x="53440" y="47501"/>
+              <a:ext cx="2820390" cy="469076"/>
+            </a:xfrm>
+            <a:prstGeom prst="rect">
+              <a:avLst/>
+            </a:prstGeom>
+            <a:noFill/>
+            <a:ln>
+              <a:noFill/>
+            </a:ln>
+          </p:spPr>
+          <p:style>
+            <a:lnRef idx="2">
+              <a:schemeClr val="accent1">
+                <a:shade val="50000"/>
+              </a:schemeClr>
+            </a:lnRef>
+            <a:fillRef idx="1">
+              <a:schemeClr val="accent1"/>
+            </a:fillRef>
+            <a:effectRef idx="0">
+              <a:schemeClr val="accent1"/>
+            </a:effectRef>
+            <a:fontRef idx="minor">
+              <a:schemeClr val="lt1"/>
+            </a:fontRef>
+          </p:style>
+          <p:txBody>
+            <a:bodyPr rtlCol="0" anchor="ctr"/>
+            <a:lstStyle/>
+            <a:p>
+              <a:pPr algn="ctr"/>
+              <a:r>
+                <a:rPr lang="ko-KR" altLang="en-US" sz="2000" b="1" dirty="0" smtClean="0">
+                  <a:solidFill>
+                    <a:schemeClr val="tx1"/>
+                  </a:solidFill>
+                </a:rPr>
+                <a:t>구조 설계</a:t>
+              </a:r>
+              <a:endParaRPr lang="en-US" altLang="ko-KR" sz="2000" b="1" dirty="0" smtClean="0">
+                <a:solidFill>
+                  <a:schemeClr val="tx1"/>
+                </a:solidFill>
+              </a:endParaRPr>
+            </a:p>
+          </p:txBody>
+        </p:sp>
+        <p:cxnSp>
+          <p:nvCxnSpPr>
+            <p:cNvPr id="6" name="직선 연결선 5"/>
+            <p:cNvCxnSpPr/>
+            <p:nvPr/>
+          </p:nvCxnSpPr>
+          <p:spPr>
+            <a:xfrm>
+              <a:off x="53440" y="516577"/>
+              <a:ext cx="2820390" cy="0"/>
+            </a:xfrm>
+            <a:prstGeom prst="line">
+              <a:avLst/>
+            </a:prstGeom>
+            <a:ln w="28575"/>
+          </p:spPr>
+          <p:style>
+            <a:lnRef idx="1">
+              <a:schemeClr val="accent1"/>
+            </a:lnRef>
+            <a:fillRef idx="0">
+              <a:schemeClr val="accent1"/>
+            </a:fillRef>
+            <a:effectRef idx="0">
+              <a:schemeClr val="accent1"/>
+            </a:effectRef>
+            <a:fontRef idx="minor">
+              <a:schemeClr val="tx1"/>
+            </a:fontRef>
+          </p:style>
+        </p:cxnSp>
+      </p:grpSp>
       <p:graphicFrame>
         <p:nvGraphicFramePr>
-          <p:cNvPr id="4" name="표 3"/>
+          <p:cNvPr id="8" name="표 7"/>
           <p:cNvGraphicFramePr>
             <a:graphicFrameLocks noGrp="1"/>
           </p:cNvGraphicFramePr>
           <p:nvPr>
             <p:extLst>
               <p:ext uri="{D42A27DB-BD31-4B8C-83A1-F6EECF244321}">
-                <p14:modId xmlns:p14="http://schemas.microsoft.com/office/powerpoint/2010/main" val="2040139220"/>
+                <p14:modId xmlns:p14="http://schemas.microsoft.com/office/powerpoint/2010/main" val="2148121199"/>
               </p:ext>
             </p:extLst>
           </p:nvPr>
         </p:nvGraphicFramePr>
         <p:xfrm>
-          <a:off x="611578" y="125900"/>
-          <a:ext cx="8259292" cy="6100845"/>
+          <a:off x="406400" y="821266"/>
+          <a:ext cx="11341101" cy="5770032"/>
         </p:xfrm>
         <a:graphic>
           <a:graphicData uri="http://schemas.openxmlformats.org/drawingml/2006/table">
             <a:tbl>
               <a:tblPr firstRow="1" bandRow="1">
-                <a:tableStyleId>{5C22544A-7EE6-4342-B048-85BDC9FD1C3A}</a:tableStyleId>
+                <a:tableStyleId>{8799B23B-EC83-4686-B30A-512413B5E67A}</a:tableStyleId>
               </a:tblPr>
               <a:tblGrid>
-                <a:gridCol w="1574780">
+                <a:gridCol w="3780367">
                   <a:extLst>
                     <a:ext uri="{9D8B030D-6E8A-4147-A177-3AD203B41FA5}">
-                      <a16:colId xmlns:a16="http://schemas.microsoft.com/office/drawing/2014/main" val="2190880643"/>
+                      <a16:colId xmlns:a16="http://schemas.microsoft.com/office/drawing/2014/main" val="3579738536"/>
                     </a:ext>
                   </a:extLst>
                 </a:gridCol>
-                <a:gridCol w="785017">
+                <a:gridCol w="3780367">
                   <a:extLst>
                     <a:ext uri="{9D8B030D-6E8A-4147-A177-3AD203B41FA5}">
-                      <a16:colId xmlns:a16="http://schemas.microsoft.com/office/drawing/2014/main" val="2317262109"/>
+                      <a16:colId xmlns:a16="http://schemas.microsoft.com/office/drawing/2014/main" val="1239821743"/>
                     </a:ext>
                   </a:extLst>
                 </a:gridCol>
-                <a:gridCol w="1179899">
+                <a:gridCol w="3780367">
                   <a:extLst>
                     <a:ext uri="{9D8B030D-6E8A-4147-A177-3AD203B41FA5}">
-                      <a16:colId xmlns:a16="http://schemas.microsoft.com/office/drawing/2014/main" val="3368254642"/>
-                    </a:ext>
-                  </a:extLst>
-                </a:gridCol>
-                <a:gridCol w="1179899">
-                  <a:extLst>
-                    <a:ext uri="{9D8B030D-6E8A-4147-A177-3AD203B41FA5}">
-                      <a16:colId xmlns:a16="http://schemas.microsoft.com/office/drawing/2014/main" val="2119835725"/>
-                    </a:ext>
-                  </a:extLst>
-                </a:gridCol>
-                <a:gridCol w="1179899">
-                  <a:extLst>
-                    <a:ext uri="{9D8B030D-6E8A-4147-A177-3AD203B41FA5}">
-                      <a16:colId xmlns:a16="http://schemas.microsoft.com/office/drawing/2014/main" val="2734628270"/>
-                    </a:ext>
-                  </a:extLst>
-                </a:gridCol>
-                <a:gridCol w="1179899">
-                  <a:extLst>
-                    <a:ext uri="{9D8B030D-6E8A-4147-A177-3AD203B41FA5}">
-                      <a16:colId xmlns:a16="http://schemas.microsoft.com/office/drawing/2014/main" val="4114946472"/>
-                    </a:ext>
-                  </a:extLst>
-                </a:gridCol>
-                <a:gridCol w="1179899">
-                  <a:extLst>
-                    <a:ext uri="{9D8B030D-6E8A-4147-A177-3AD203B41FA5}">
-                      <a16:colId xmlns:a16="http://schemas.microsoft.com/office/drawing/2014/main" val="1999834475"/>
+                      <a16:colId xmlns:a16="http://schemas.microsoft.com/office/drawing/2014/main" val="1167617678"/>
                     </a:ext>
                   </a:extLst>
                 </a:gridCol>
               </a:tblGrid>
-              <a:tr h="614445">
+              <a:tr h="721254">
                 <a:tc>
                   <a:txBody>
                     <a:bodyPr/>
                     <a:lstStyle/>
                     <a:p>
-                      <a:pPr latinLnBrk="1"/>
+                      <a:pPr algn="ctr" latinLnBrk="1"/>
                       <a:r>
                         <a:rPr lang="ko-KR" altLang="en-US" dirty="0" smtClean="0"/>
-                        <a:t>기능 정의서</a:t>
+                        <a:t>구분</a:t>
                       </a:r>
                       <a:endParaRPr lang="ko-KR" altLang="en-US" dirty="0"/>
                     </a:p>
                   </a:txBody>
-                  <a:tcPr/>
+                  <a:tcPr anchor="ctr"/>
                 </a:tc>
                 <a:tc>
                   <a:txBody>
                     <a:bodyPr/>
                     <a:lstStyle/>
                     <a:p>
-                      <a:pPr latinLnBrk="1"/>
-                      <a:endParaRPr lang="ko-KR" altLang="en-US"/>
+                      <a:pPr algn="ctr" latinLnBrk="1"/>
+                      <a:r>
+                        <a:rPr lang="en-US" altLang="ko-KR" dirty="0" smtClean="0"/>
+                        <a:t>PC</a:t>
+                      </a:r>
+                      <a:endParaRPr lang="ko-KR" altLang="en-US" dirty="0"/>
                     </a:p>
                   </a:txBody>
-                  <a:tcPr/>
+                  <a:tcPr anchor="ctr"/>
                 </a:tc>
                 <a:tc>
                   <a:txBody>
                     <a:bodyPr/>
                     <a:lstStyle/>
                     <a:p>
-                      <a:pPr latinLnBrk="1"/>
-                      <a:endParaRPr lang="ko-KR" altLang="en-US"/>
+                      <a:pPr algn="ctr" latinLnBrk="1"/>
+                      <a:r>
+                        <a:rPr lang="en-US" altLang="ko-KR" dirty="0" smtClean="0"/>
+                        <a:t>Mobile</a:t>
+                      </a:r>
+                      <a:endParaRPr lang="ko-KR" altLang="en-US" dirty="0"/>
                     </a:p>
                   </a:txBody>
-                  <a:tcPr/>
+                  <a:tcPr anchor="ctr"/>
+                </a:tc>
+                <a:extLst>
+                  <a:ext uri="{0D108BD9-81ED-4DB2-BD59-A6C34878D82A}">
+                    <a16:rowId xmlns:a16="http://schemas.microsoft.com/office/drawing/2014/main" val="306733217"/>
+                  </a:ext>
+                </a:extLst>
+              </a:tr>
+              <a:tr h="721254">
+                <a:tc>
+                  <a:txBody>
+                    <a:bodyPr/>
+                    <a:lstStyle/>
+                    <a:p>
+                      <a:pPr algn="ctr" latinLnBrk="1"/>
+                      <a:r>
+                        <a:rPr lang="ko-KR" altLang="en-US" dirty="0" smtClean="0"/>
+                        <a:t>최대 너비</a:t>
+                      </a:r>
+                      <a:endParaRPr lang="ko-KR" altLang="en-US" dirty="0"/>
+                    </a:p>
+                  </a:txBody>
+                  <a:tcPr anchor="ctr"/>
                 </a:tc>
                 <a:tc>
                   <a:txBody>
                     <a:bodyPr/>
                     <a:lstStyle/>
                     <a:p>
-                      <a:pPr latinLnBrk="1"/>
-                      <a:endParaRPr lang="ko-KR" altLang="en-US"/>
+                      <a:pPr algn="ctr" latinLnBrk="1"/>
+                      <a:r>
+                        <a:rPr lang="en-US" altLang="ko-KR" dirty="0" smtClean="0"/>
+                        <a:t>1200(80%)</a:t>
+                      </a:r>
+                      <a:endParaRPr lang="ko-KR" altLang="en-US" dirty="0"/>
                     </a:p>
                   </a:txBody>
-                  <a:tcPr/>
+                  <a:tcPr anchor="ctr"/>
                 </a:tc>
                 <a:tc>
                   <a:txBody>
                     <a:bodyPr/>
                     <a:lstStyle/>
                     <a:p>
-                      <a:pPr latinLnBrk="1"/>
-                      <a:endParaRPr lang="ko-KR" altLang="en-US"/>
+                      <a:pPr algn="ctr" latinLnBrk="1"/>
+                      <a:endParaRPr lang="ko-KR" altLang="en-US" dirty="0"/>
                     </a:p>
                   </a:txBody>
-                  <a:tcPr/>
+                  <a:tcPr anchor="ctr"/>
+                </a:tc>
+                <a:extLst>
+                  <a:ext uri="{0D108BD9-81ED-4DB2-BD59-A6C34878D82A}">
+                    <a16:rowId xmlns:a16="http://schemas.microsoft.com/office/drawing/2014/main" val="2988401279"/>
+                  </a:ext>
+                </a:extLst>
+              </a:tr>
+              <a:tr h="721254">
+                <a:tc>
+                  <a:txBody>
+                    <a:bodyPr/>
+                    <a:lstStyle/>
+                    <a:p>
+                      <a:pPr algn="ctr" latinLnBrk="1"/>
+                      <a:r>
+                        <a:rPr lang="ko-KR" altLang="en-US" dirty="0" smtClean="0"/>
+                        <a:t>최대 높이</a:t>
+                      </a:r>
+                      <a:endParaRPr lang="ko-KR" altLang="en-US" dirty="0"/>
+                    </a:p>
+                  </a:txBody>
+                  <a:tcPr anchor="ctr"/>
                 </a:tc>
                 <a:tc>
                   <a:txBody>
                     <a:bodyPr/>
                     <a:lstStyle/>
                     <a:p>
-                      <a:pPr latinLnBrk="1"/>
-                      <a:endParaRPr lang="ko-KR" altLang="en-US"/>
+                      <a:pPr algn="ctr" latinLnBrk="1"/>
+                      <a:endParaRPr lang="ko-KR" altLang="en-US" dirty="0"/>
                     </a:p>
                   </a:txBody>
-                  <a:tcPr/>
+                  <a:tcPr anchor="ctr"/>
                 </a:tc>
                 <a:tc>
                   <a:txBody>
                     <a:bodyPr/>
                     <a:lstStyle/>
                     <a:p>
-                      <a:pPr latinLnBrk="1"/>
+                      <a:pPr algn="ctr" latinLnBrk="1"/>
                       <a:endParaRPr lang="ko-KR" altLang="en-US"/>
                     </a:p>
                   </a:txBody>
-                  <a:tcPr/>
+                  <a:tcPr anchor="ctr"/>
                 </a:tc>
                 <a:extLst>
                   <a:ext uri="{0D108BD9-81ED-4DB2-BD59-A6C34878D82A}">
-                    <a16:rowId xmlns:a16="http://schemas.microsoft.com/office/drawing/2014/main" val="3948671194"/>
+                    <a16:rowId xmlns:a16="http://schemas.microsoft.com/office/drawing/2014/main" val="2791919305"/>
                   </a:ext>
                 </a:extLst>
               </a:tr>
-              <a:tr h="355988">
+              <a:tr h="721254">
                 <a:tc>
                   <a:txBody>
                     <a:bodyPr/>
                     <a:lstStyle/>
                     <a:p>
-                      <a:pPr latinLnBrk="1"/>
+                      <a:pPr algn="ctr" latinLnBrk="1"/>
                       <a:r>
                         <a:rPr lang="ko-KR" altLang="en-US" dirty="0" smtClean="0"/>
-                        <a:t>회원</a:t>
+                        <a:t>폰트</a:t>
                       </a:r>
                       <a:endParaRPr lang="ko-KR" altLang="en-US" dirty="0"/>
                     </a:p>
                   </a:txBody>
-                  <a:tcPr/>
+                  <a:tcPr anchor="ctr"/>
                 </a:tc>
                 <a:tc>
                   <a:txBody>
                     <a:bodyPr/>
                     <a:lstStyle/>
                     <a:p>
-                      <a:pPr latinLnBrk="1"/>
+                      <a:pPr algn="ctr" latinLnBrk="1"/>
                       <a:endParaRPr lang="ko-KR" altLang="en-US"/>
                     </a:p>
                   </a:txBody>
-                  <a:tcPr/>
+                  <a:tcPr anchor="ctr"/>
                 </a:tc>
                 <a:tc>
                   <a:txBody>
                     <a:bodyPr/>
                     <a:lstStyle/>
                     <a:p>
-                      <a:pPr latinLnBrk="1"/>
+                      <a:pPr algn="ctr" latinLnBrk="1"/>
                       <a:endParaRPr lang="ko-KR" altLang="en-US"/>
                     </a:p>
                   </a:txBody>
-                  <a:tcPr/>
+                  <a:tcPr anchor="ctr"/>
+                </a:tc>
+                <a:extLst>
+                  <a:ext uri="{0D108BD9-81ED-4DB2-BD59-A6C34878D82A}">
+                    <a16:rowId xmlns:a16="http://schemas.microsoft.com/office/drawing/2014/main" val="2604796411"/>
+                  </a:ext>
+                </a:extLst>
+              </a:tr>
+              <a:tr h="721254">
+                <a:tc>
+                  <a:txBody>
+                    <a:bodyPr/>
+                    <a:lstStyle/>
+                    <a:p>
+                      <a:pPr algn="ctr" latinLnBrk="1"/>
+                      <a:r>
+                        <a:rPr lang="ko-KR" altLang="en-US" dirty="0" smtClean="0"/>
+                        <a:t>등</a:t>
+                      </a:r>
+                      <a:r>
+                        <a:rPr lang="en-US" altLang="ko-KR" dirty="0" smtClean="0"/>
+                        <a:t>…</a:t>
+                      </a:r>
+                      <a:endParaRPr lang="ko-KR" altLang="en-US" dirty="0"/>
+                    </a:p>
+                  </a:txBody>
+                  <a:tcPr anchor="ctr"/>
                 </a:tc>
                 <a:tc>
                   <a:txBody>
                     <a:bodyPr/>
                     <a:lstStyle/>
                     <a:p>
-                      <a:pPr latinLnBrk="1"/>
+                      <a:pPr algn="ctr" latinLnBrk="1"/>
                       <a:endParaRPr lang="ko-KR" altLang="en-US"/>
                     </a:p>
                   </a:txBody>
-                  <a:tcPr/>
+                  <a:tcPr anchor="ctr"/>
                 </a:tc>
                 <a:tc>
                   <a:txBody>
                     <a:bodyPr/>
                     <a:lstStyle/>
                     <a:p>
-                      <a:pPr latinLnBrk="1"/>
+                      <a:pPr algn="ctr" latinLnBrk="1"/>
                       <a:endParaRPr lang="ko-KR" altLang="en-US"/>
                     </a:p>
                   </a:txBody>
-                  <a:tcPr/>
+                  <a:tcPr anchor="ctr"/>
+                </a:tc>
+                <a:extLst>
+                  <a:ext uri="{0D108BD9-81ED-4DB2-BD59-A6C34878D82A}">
+                    <a16:rowId xmlns:a16="http://schemas.microsoft.com/office/drawing/2014/main" val="4216772878"/>
+                  </a:ext>
+                </a:extLst>
+              </a:tr>
+              <a:tr h="721254">
+                <a:tc>
+                  <a:txBody>
+                    <a:bodyPr/>
+                    <a:lstStyle/>
+                    <a:p>
+                      <a:pPr algn="ctr" latinLnBrk="1"/>
+                      <a:r>
+                        <a:rPr lang="en-US" altLang="ko-KR" dirty="0" smtClean="0"/>
+                        <a:t>Hover</a:t>
+                      </a:r>
+                      <a:r>
+                        <a:rPr lang="en-US" altLang="ko-KR" baseline="0" dirty="0" smtClean="0"/>
+                        <a:t> </a:t>
+                      </a:r>
+                      <a:r>
+                        <a:rPr lang="ko-KR" altLang="en-US" baseline="0" dirty="0" smtClean="0"/>
+                        <a:t>기능</a:t>
+                      </a:r>
+                      <a:endParaRPr lang="ko-KR" altLang="en-US" dirty="0"/>
+                    </a:p>
+                  </a:txBody>
+                  <a:tcPr anchor="ctr"/>
                 </a:tc>
                 <a:tc>
                   <a:txBody>
                     <a:bodyPr/>
                     <a:lstStyle/>
                     <a:p>
-                      <a:pPr latinLnBrk="1"/>
-                      <a:endParaRPr lang="ko-KR" altLang="en-US"/>
+                      <a:pPr algn="ctr" latinLnBrk="1"/>
+                      <a:r>
+                        <a:rPr lang="ko-KR" altLang="en-US" dirty="0" smtClean="0"/>
+                        <a:t>유지</a:t>
+                      </a:r>
+                      <a:endParaRPr lang="ko-KR" altLang="en-US" dirty="0"/>
                     </a:p>
                   </a:txBody>
-                  <a:tcPr/>
+                  <a:tcPr anchor="ctr"/>
                 </a:tc>
                 <a:tc>
                   <a:txBody>
                     <a:bodyPr/>
                     <a:lstStyle/>
                     <a:p>
-                      <a:pPr latinLnBrk="1"/>
-                      <a:endParaRPr lang="ko-KR" altLang="en-US"/>
+                      <a:pPr algn="ctr" latinLnBrk="1"/>
+                      <a:r>
+                        <a:rPr lang="ko-KR" altLang="en-US" dirty="0" err="1" smtClean="0"/>
+                        <a:t>온클릭으로</a:t>
+                      </a:r>
+                      <a:r>
+                        <a:rPr lang="ko-KR" altLang="en-US" dirty="0" smtClean="0"/>
+                        <a:t> 변경</a:t>
+                      </a:r>
+                      <a:endParaRPr lang="ko-KR" altLang="en-US" dirty="0"/>
                     </a:p>
                   </a:txBody>
-                  <a:tcPr/>
+                  <a:tcPr anchor="ctr"/>
                 </a:tc>
                 <a:extLst>
                   <a:ext uri="{0D108BD9-81ED-4DB2-BD59-A6C34878D82A}">
-                    <a16:rowId xmlns:a16="http://schemas.microsoft.com/office/drawing/2014/main" val="4202028672"/>
+                    <a16:rowId xmlns:a16="http://schemas.microsoft.com/office/drawing/2014/main" val="1325700994"/>
                   </a:ext>
                 </a:extLst>
               </a:tr>
-              <a:tr h="355988">
+              <a:tr h="721254">
                 <a:tc>
                   <a:txBody>
                     <a:bodyPr/>
                     <a:lstStyle/>
                     <a:p>
-                      <a:pPr latinLnBrk="1"/>
-                      <a:r>
-                        <a:rPr lang="ko-KR" altLang="en-US" dirty="0" smtClean="0"/>
-                        <a:t>사이트</a:t>
-                      </a:r>
-                      <a:endParaRPr lang="ko-KR" altLang="en-US" dirty="0"/>
+                      <a:pPr algn="ctr" latinLnBrk="1"/>
+                      <a:endParaRPr lang="ko-KR" altLang="en-US"/>
                     </a:p>
                   </a:txBody>
-                  <a:tcPr/>
+                  <a:tcPr anchor="ctr"/>
                 </a:tc>
                 <a:tc>
                   <a:txBody>
                     <a:bodyPr/>
                     <a:lstStyle/>
                     <a:p>
-                      <a:pPr latinLnBrk="1"/>
+                      <a:pPr algn="ctr" latinLnBrk="1"/>
                       <a:endParaRPr lang="ko-KR" altLang="en-US"/>
                     </a:p>
                   </a:txBody>
-                  <a:tcPr/>
+                  <a:tcPr anchor="ctr"/>
                 </a:tc>
                 <a:tc>
                   <a:txBody>
                     <a:bodyPr/>
                     <a:lstStyle/>
                     <a:p>
-                      <a:pPr latinLnBrk="1"/>
+                      <a:pPr algn="ctr" latinLnBrk="1"/>
                       <a:endParaRPr lang="ko-KR" altLang="en-US"/>
                     </a:p>
                   </a:txBody>
-                  <a:tcPr/>
+                  <a:tcPr anchor="ctr"/>
+                </a:tc>
+                <a:extLst>
+                  <a:ext uri="{0D108BD9-81ED-4DB2-BD59-A6C34878D82A}">
+                    <a16:rowId xmlns:a16="http://schemas.microsoft.com/office/drawing/2014/main" val="3670713686"/>
+                  </a:ext>
+                </a:extLst>
+              </a:tr>
+              <a:tr h="721254">
+                <a:tc>
+                  <a:txBody>
+                    <a:bodyPr/>
+                    <a:lstStyle/>
+                    <a:p>
+                      <a:pPr algn="ctr" latinLnBrk="1"/>
+                      <a:endParaRPr lang="ko-KR" altLang="en-US"/>
+                    </a:p>
+                  </a:txBody>
+                  <a:tcPr anchor="ctr"/>
                 </a:tc>
                 <a:tc>
                   <a:txBody>
                     <a:bodyPr/>
                     <a:lstStyle/>
                     <a:p>
-                      <a:pPr latinLnBrk="1"/>
+                      <a:pPr algn="ctr" latinLnBrk="1"/>
                       <a:endParaRPr lang="ko-KR" altLang="en-US"/>
                     </a:p>
                   </a:txBody>
-                  <a:tcPr/>
+                  <a:tcPr anchor="ctr"/>
                 </a:tc>
                 <a:tc>
                   <a:txBody>
                     <a:bodyPr/>
                     <a:lstStyle/>
                     <a:p>
-                      <a:pPr latinLnBrk="1"/>
-                      <a:endParaRPr lang="ko-KR" altLang="en-US"/>
+                      <a:pPr algn="ctr" latinLnBrk="1"/>
+                      <a:endParaRPr lang="ko-KR" altLang="en-US" dirty="0"/>
                     </a:p>
                   </a:txBody>
-                  <a:tcPr/>
-                </a:tc>
-                <a:tc>
-                  <a:txBody>
-                    <a:bodyPr/>
-                    <a:lstStyle/>
-                    <a:p>
-                      <a:pPr latinLnBrk="1"/>
-                      <a:endParaRPr lang="ko-KR" altLang="en-US"/>
-                    </a:p>
-                  </a:txBody>
-                  <a:tcPr/>
-                </a:tc>
-                <a:tc>
-                  <a:txBody>
-                    <a:bodyPr/>
-                    <a:lstStyle/>
-                    <a:p>
-                      <a:pPr latinLnBrk="1"/>
-                      <a:endParaRPr lang="ko-KR" altLang="en-US"/>
-                    </a:p>
-                  </a:txBody>
-                  <a:tcPr/>
+                  <a:tcPr anchor="ctr"/>
                 </a:tc>
                 <a:extLst>
                   <a:ext uri="{0D108BD9-81ED-4DB2-BD59-A6C34878D82A}">
-                    <a16:rowId xmlns:a16="http://schemas.microsoft.com/office/drawing/2014/main" val="1794232051"/>
-                  </a:ext>
-                </a:extLst>
-              </a:tr>
-              <a:tr h="355988">
-                <a:tc>
-                  <a:txBody>
-                    <a:bodyPr/>
-                    <a:lstStyle/>
-                    <a:p>
-                      <a:pPr latinLnBrk="1"/>
-                      <a:r>
-                        <a:rPr lang="ko-KR" altLang="en-US" dirty="0" smtClean="0"/>
-                        <a:t>카테고리</a:t>
-                      </a:r>
-                      <a:endParaRPr lang="ko-KR" altLang="en-US" dirty="0"/>
-                    </a:p>
-                  </a:txBody>
-                  <a:tcPr/>
-                </a:tc>
-                <a:tc>
-                  <a:txBody>
-                    <a:bodyPr/>
-                    <a:lstStyle/>
-                    <a:p>
-                      <a:pPr latinLnBrk="1"/>
-                      <a:endParaRPr lang="ko-KR" altLang="en-US"/>
-                    </a:p>
-                  </a:txBody>
-                  <a:tcPr/>
-                </a:tc>
-                <a:tc>
-                  <a:txBody>
-                    <a:bodyPr/>
-                    <a:lstStyle/>
-                    <a:p>
-                      <a:pPr latinLnBrk="1"/>
-                      <a:endParaRPr lang="ko-KR" altLang="en-US"/>
-                    </a:p>
-                  </a:txBody>
-                  <a:tcPr/>
-                </a:tc>
-                <a:tc>
-                  <a:txBody>
-                    <a:bodyPr/>
-                    <a:lstStyle/>
-                    <a:p>
-                      <a:pPr latinLnBrk="1"/>
-                      <a:endParaRPr lang="ko-KR" altLang="en-US"/>
-                    </a:p>
-                  </a:txBody>
-                  <a:tcPr/>
-                </a:tc>
-                <a:tc>
-                  <a:txBody>
-                    <a:bodyPr/>
-                    <a:lstStyle/>
-                    <a:p>
-                      <a:pPr latinLnBrk="1"/>
-                      <a:endParaRPr lang="ko-KR" altLang="en-US"/>
-                    </a:p>
-                  </a:txBody>
-                  <a:tcPr/>
-                </a:tc>
-                <a:tc>
-                  <a:txBody>
-                    <a:bodyPr/>
-                    <a:lstStyle/>
-                    <a:p>
-                      <a:pPr latinLnBrk="1"/>
-                      <a:endParaRPr lang="ko-KR" altLang="en-US"/>
-                    </a:p>
-                  </a:txBody>
-                  <a:tcPr/>
-                </a:tc>
-                <a:tc>
-                  <a:txBody>
-                    <a:bodyPr/>
-                    <a:lstStyle/>
-                    <a:p>
-                      <a:pPr latinLnBrk="1"/>
-                      <a:endParaRPr lang="ko-KR" altLang="en-US"/>
-                    </a:p>
-                  </a:txBody>
-                  <a:tcPr/>
-                </a:tc>
-                <a:extLst>
-                  <a:ext uri="{0D108BD9-81ED-4DB2-BD59-A6C34878D82A}">
-                    <a16:rowId xmlns:a16="http://schemas.microsoft.com/office/drawing/2014/main" val="2024813836"/>
-                  </a:ext>
-                </a:extLst>
-              </a:tr>
-              <a:tr h="355988">
-                <a:tc>
-                  <a:txBody>
-                    <a:bodyPr/>
-                    <a:lstStyle/>
-                    <a:p>
-                      <a:pPr latinLnBrk="1"/>
-                      <a:r>
-                        <a:rPr lang="ko-KR" altLang="en-US" dirty="0" smtClean="0"/>
-                        <a:t>광고</a:t>
-                      </a:r>
-                      <a:endParaRPr lang="ko-KR" altLang="en-US" dirty="0"/>
-                    </a:p>
-                  </a:txBody>
-                  <a:tcPr/>
-                </a:tc>
-                <a:tc>
-                  <a:txBody>
-                    <a:bodyPr/>
-                    <a:lstStyle/>
-                    <a:p>
-                      <a:pPr latinLnBrk="1"/>
-                      <a:endParaRPr lang="ko-KR" altLang="en-US"/>
-                    </a:p>
-                  </a:txBody>
-                  <a:tcPr/>
-                </a:tc>
-                <a:tc>
-                  <a:txBody>
-                    <a:bodyPr/>
-                    <a:lstStyle/>
-                    <a:p>
-                      <a:pPr latinLnBrk="1"/>
-                      <a:endParaRPr lang="ko-KR" altLang="en-US" dirty="0"/>
-                    </a:p>
-                  </a:txBody>
-                  <a:tcPr/>
-                </a:tc>
-                <a:tc>
-                  <a:txBody>
-                    <a:bodyPr/>
-                    <a:lstStyle/>
-                    <a:p>
-                      <a:pPr latinLnBrk="1"/>
-                      <a:endParaRPr lang="ko-KR" altLang="en-US"/>
-                    </a:p>
-                  </a:txBody>
-                  <a:tcPr/>
-                </a:tc>
-                <a:tc>
-                  <a:txBody>
-                    <a:bodyPr/>
-                    <a:lstStyle/>
-                    <a:p>
-                      <a:pPr latinLnBrk="1"/>
-                      <a:endParaRPr lang="ko-KR" altLang="en-US"/>
-                    </a:p>
-                  </a:txBody>
-                  <a:tcPr/>
-                </a:tc>
-                <a:tc>
-                  <a:txBody>
-                    <a:bodyPr/>
-                    <a:lstStyle/>
-                    <a:p>
-                      <a:pPr latinLnBrk="1"/>
-                      <a:endParaRPr lang="ko-KR" altLang="en-US"/>
-                    </a:p>
-                  </a:txBody>
-                  <a:tcPr/>
-                </a:tc>
-                <a:tc>
-                  <a:txBody>
-                    <a:bodyPr/>
-                    <a:lstStyle/>
-                    <a:p>
-                      <a:pPr latinLnBrk="1"/>
-                      <a:endParaRPr lang="ko-KR" altLang="en-US"/>
-                    </a:p>
-                  </a:txBody>
-                  <a:tcPr/>
-                </a:tc>
-                <a:extLst>
-                  <a:ext uri="{0D108BD9-81ED-4DB2-BD59-A6C34878D82A}">
-                    <a16:rowId xmlns:a16="http://schemas.microsoft.com/office/drawing/2014/main" val="4085581385"/>
-                  </a:ext>
-                </a:extLst>
-              </a:tr>
-              <a:tr h="355988">
-                <a:tc>
-                  <a:txBody>
-                    <a:bodyPr/>
-                    <a:lstStyle/>
-                    <a:p>
-                      <a:pPr latinLnBrk="1"/>
-                      <a:r>
-                        <a:rPr lang="ko-KR" altLang="en-US" b="0" dirty="0" smtClean="0"/>
-                        <a:t>추천</a:t>
-                      </a:r>
-                      <a:endParaRPr lang="ko-KR" altLang="en-US" b="0" dirty="0"/>
-                    </a:p>
-                  </a:txBody>
-                  <a:tcPr/>
-                </a:tc>
-                <a:tc>
-                  <a:txBody>
-                    <a:bodyPr/>
-                    <a:lstStyle/>
-                    <a:p>
-                      <a:pPr latinLnBrk="1"/>
-                      <a:endParaRPr lang="ko-KR" altLang="en-US"/>
-                    </a:p>
-                  </a:txBody>
-                  <a:tcPr/>
-                </a:tc>
-                <a:tc>
-                  <a:txBody>
-                    <a:bodyPr/>
-                    <a:lstStyle/>
-                    <a:p>
-                      <a:pPr latinLnBrk="1"/>
-                      <a:endParaRPr lang="ko-KR" altLang="en-US"/>
-                    </a:p>
-                  </a:txBody>
-                  <a:tcPr/>
-                </a:tc>
-                <a:tc>
-                  <a:txBody>
-                    <a:bodyPr/>
-                    <a:lstStyle/>
-                    <a:p>
-                      <a:pPr latinLnBrk="1"/>
-                      <a:endParaRPr lang="ko-KR" altLang="en-US"/>
-                    </a:p>
-                  </a:txBody>
-                  <a:tcPr/>
-                </a:tc>
-                <a:tc>
-                  <a:txBody>
-                    <a:bodyPr/>
-                    <a:lstStyle/>
-                    <a:p>
-                      <a:pPr latinLnBrk="1"/>
-                      <a:endParaRPr lang="ko-KR" altLang="en-US"/>
-                    </a:p>
-                  </a:txBody>
-                  <a:tcPr/>
-                </a:tc>
-                <a:tc>
-                  <a:txBody>
-                    <a:bodyPr/>
-                    <a:lstStyle/>
-                    <a:p>
-                      <a:pPr latinLnBrk="1"/>
-                      <a:endParaRPr lang="ko-KR" altLang="en-US"/>
-                    </a:p>
-                  </a:txBody>
-                  <a:tcPr/>
-                </a:tc>
-                <a:tc>
-                  <a:txBody>
-                    <a:bodyPr/>
-                    <a:lstStyle/>
-                    <a:p>
-                      <a:pPr latinLnBrk="1"/>
-                      <a:endParaRPr lang="ko-KR" altLang="en-US"/>
-                    </a:p>
-                  </a:txBody>
-                  <a:tcPr/>
-                </a:tc>
-                <a:extLst>
-                  <a:ext uri="{0D108BD9-81ED-4DB2-BD59-A6C34878D82A}">
-                    <a16:rowId xmlns:a16="http://schemas.microsoft.com/office/drawing/2014/main" val="3454565281"/>
-                  </a:ext>
-                </a:extLst>
-              </a:tr>
-              <a:tr h="355988">
-                <a:tc>
-                  <a:txBody>
-                    <a:bodyPr/>
-                    <a:lstStyle/>
-                    <a:p>
-                      <a:pPr latinLnBrk="1"/>
-                      <a:r>
-                        <a:rPr lang="ko-KR" altLang="en-US" dirty="0" smtClean="0"/>
-                        <a:t>관리자</a:t>
-                      </a:r>
-                      <a:endParaRPr lang="ko-KR" altLang="en-US" dirty="0"/>
-                    </a:p>
-                  </a:txBody>
-                  <a:tcPr/>
-                </a:tc>
-                <a:tc>
-                  <a:txBody>
-                    <a:bodyPr/>
-                    <a:lstStyle/>
-                    <a:p>
-                      <a:pPr latinLnBrk="1"/>
-                      <a:endParaRPr lang="ko-KR" altLang="en-US"/>
-                    </a:p>
-                  </a:txBody>
-                  <a:tcPr/>
-                </a:tc>
-                <a:tc>
-                  <a:txBody>
-                    <a:bodyPr/>
-                    <a:lstStyle/>
-                    <a:p>
-                      <a:pPr latinLnBrk="1"/>
-                      <a:endParaRPr lang="ko-KR" altLang="en-US"/>
-                    </a:p>
-                  </a:txBody>
-                  <a:tcPr/>
-                </a:tc>
-                <a:tc>
-                  <a:txBody>
-                    <a:bodyPr/>
-                    <a:lstStyle/>
-                    <a:p>
-                      <a:pPr latinLnBrk="1"/>
-                      <a:endParaRPr lang="ko-KR" altLang="en-US"/>
-                    </a:p>
-                  </a:txBody>
-                  <a:tcPr/>
-                </a:tc>
-                <a:tc>
-                  <a:txBody>
-                    <a:bodyPr/>
-                    <a:lstStyle/>
-                    <a:p>
-                      <a:pPr latinLnBrk="1"/>
-                      <a:endParaRPr lang="ko-KR" altLang="en-US"/>
-                    </a:p>
-                  </a:txBody>
-                  <a:tcPr/>
-                </a:tc>
-                <a:tc>
-                  <a:txBody>
-                    <a:bodyPr/>
-                    <a:lstStyle/>
-                    <a:p>
-                      <a:pPr latinLnBrk="1"/>
-                      <a:endParaRPr lang="ko-KR" altLang="en-US"/>
-                    </a:p>
-                  </a:txBody>
-                  <a:tcPr/>
-                </a:tc>
-                <a:tc>
-                  <a:txBody>
-                    <a:bodyPr/>
-                    <a:lstStyle/>
-                    <a:p>
-                      <a:pPr latinLnBrk="1"/>
-                      <a:endParaRPr lang="ko-KR" altLang="en-US"/>
-                    </a:p>
-                  </a:txBody>
-                  <a:tcPr/>
-                </a:tc>
-                <a:extLst>
-                  <a:ext uri="{0D108BD9-81ED-4DB2-BD59-A6C34878D82A}">
-                    <a16:rowId xmlns:a16="http://schemas.microsoft.com/office/drawing/2014/main" val="2378467848"/>
-                  </a:ext>
-                </a:extLst>
-              </a:tr>
-              <a:tr h="355988">
-                <a:tc>
-                  <a:txBody>
-                    <a:bodyPr/>
-                    <a:lstStyle/>
-                    <a:p>
-                      <a:pPr latinLnBrk="1"/>
-                      <a:r>
-                        <a:rPr lang="ko-KR" altLang="en-US" dirty="0" err="1" smtClean="0"/>
-                        <a:t>고객사</a:t>
-                      </a:r>
-                      <a:endParaRPr lang="ko-KR" altLang="en-US" dirty="0"/>
-                    </a:p>
-                  </a:txBody>
-                  <a:tcPr/>
-                </a:tc>
-                <a:tc>
-                  <a:txBody>
-                    <a:bodyPr/>
-                    <a:lstStyle/>
-                    <a:p>
-                      <a:pPr latinLnBrk="1"/>
-                      <a:endParaRPr lang="ko-KR" altLang="en-US"/>
-                    </a:p>
-                  </a:txBody>
-                  <a:tcPr/>
-                </a:tc>
-                <a:tc>
-                  <a:txBody>
-                    <a:bodyPr/>
-                    <a:lstStyle/>
-                    <a:p>
-                      <a:pPr latinLnBrk="1"/>
-                      <a:endParaRPr lang="ko-KR" altLang="en-US"/>
-                    </a:p>
-                  </a:txBody>
-                  <a:tcPr/>
-                </a:tc>
-                <a:tc>
-                  <a:txBody>
-                    <a:bodyPr/>
-                    <a:lstStyle/>
-                    <a:p>
-                      <a:pPr latinLnBrk="1"/>
-                      <a:endParaRPr lang="ko-KR" altLang="en-US"/>
-                    </a:p>
-                  </a:txBody>
-                  <a:tcPr/>
-                </a:tc>
-                <a:tc>
-                  <a:txBody>
-                    <a:bodyPr/>
-                    <a:lstStyle/>
-                    <a:p>
-                      <a:pPr latinLnBrk="1"/>
-                      <a:endParaRPr lang="ko-KR" altLang="en-US"/>
-                    </a:p>
-                  </a:txBody>
-                  <a:tcPr/>
-                </a:tc>
-                <a:tc>
-                  <a:txBody>
-                    <a:bodyPr/>
-                    <a:lstStyle/>
-                    <a:p>
-                      <a:pPr latinLnBrk="1"/>
-                      <a:endParaRPr lang="ko-KR" altLang="en-US"/>
-                    </a:p>
-                  </a:txBody>
-                  <a:tcPr/>
-                </a:tc>
-                <a:tc>
-                  <a:txBody>
-                    <a:bodyPr/>
-                    <a:lstStyle/>
-                    <a:p>
-                      <a:pPr latinLnBrk="1"/>
-                      <a:endParaRPr lang="ko-KR" altLang="en-US" dirty="0"/>
-                    </a:p>
-                  </a:txBody>
-                  <a:tcPr/>
-                </a:tc>
-                <a:extLst>
-                  <a:ext uri="{0D108BD9-81ED-4DB2-BD59-A6C34878D82A}">
-                    <a16:rowId xmlns:a16="http://schemas.microsoft.com/office/drawing/2014/main" val="2885697974"/>
-                  </a:ext>
-                </a:extLst>
-              </a:tr>
-              <a:tr h="355988">
-                <a:tc>
-                  <a:txBody>
-                    <a:bodyPr/>
-                    <a:lstStyle/>
-                    <a:p>
-                      <a:pPr latinLnBrk="1"/>
-                      <a:endParaRPr lang="ko-KR" altLang="en-US"/>
-                    </a:p>
-                  </a:txBody>
-                  <a:tcPr/>
-                </a:tc>
-                <a:tc>
-                  <a:txBody>
-                    <a:bodyPr/>
-                    <a:lstStyle/>
-                    <a:p>
-                      <a:pPr latinLnBrk="1"/>
-                      <a:endParaRPr lang="ko-KR" altLang="en-US"/>
-                    </a:p>
-                  </a:txBody>
-                  <a:tcPr/>
-                </a:tc>
-                <a:tc>
-                  <a:txBody>
-                    <a:bodyPr/>
-                    <a:lstStyle/>
-                    <a:p>
-                      <a:pPr latinLnBrk="1"/>
-                      <a:endParaRPr lang="ko-KR" altLang="en-US"/>
-                    </a:p>
-                  </a:txBody>
-                  <a:tcPr/>
-                </a:tc>
-                <a:tc>
-                  <a:txBody>
-                    <a:bodyPr/>
-                    <a:lstStyle/>
-                    <a:p>
-                      <a:pPr latinLnBrk="1"/>
-                      <a:endParaRPr lang="ko-KR" altLang="en-US"/>
-                    </a:p>
-                  </a:txBody>
-                  <a:tcPr/>
-                </a:tc>
-                <a:tc>
-                  <a:txBody>
-                    <a:bodyPr/>
-                    <a:lstStyle/>
-                    <a:p>
-                      <a:pPr latinLnBrk="1"/>
-                      <a:endParaRPr lang="ko-KR" altLang="en-US"/>
-                    </a:p>
-                  </a:txBody>
-                  <a:tcPr/>
-                </a:tc>
-                <a:tc>
-                  <a:txBody>
-                    <a:bodyPr/>
-                    <a:lstStyle/>
-                    <a:p>
-                      <a:pPr latinLnBrk="1"/>
-                      <a:endParaRPr lang="ko-KR" altLang="en-US"/>
-                    </a:p>
-                  </a:txBody>
-                  <a:tcPr/>
-                </a:tc>
-                <a:tc>
-                  <a:txBody>
-                    <a:bodyPr/>
-                    <a:lstStyle/>
-                    <a:p>
-                      <a:pPr latinLnBrk="1"/>
-                      <a:endParaRPr lang="ko-KR" altLang="en-US" dirty="0"/>
-                    </a:p>
-                  </a:txBody>
-                  <a:tcPr/>
-                </a:tc>
-                <a:extLst>
-                  <a:ext uri="{0D108BD9-81ED-4DB2-BD59-A6C34878D82A}">
-                    <a16:rowId xmlns:a16="http://schemas.microsoft.com/office/drawing/2014/main" val="1426544765"/>
-                  </a:ext>
-                </a:extLst>
-              </a:tr>
-              <a:tr h="355988">
-                <a:tc>
-                  <a:txBody>
-                    <a:bodyPr/>
-                    <a:lstStyle/>
-                    <a:p>
-                      <a:pPr latinLnBrk="1"/>
-                      <a:endParaRPr lang="ko-KR" altLang="en-US"/>
-                    </a:p>
-                  </a:txBody>
-                  <a:tcPr/>
-                </a:tc>
-                <a:tc>
-                  <a:txBody>
-                    <a:bodyPr/>
-                    <a:lstStyle/>
-                    <a:p>
-                      <a:pPr latinLnBrk="1"/>
-                      <a:endParaRPr lang="ko-KR" altLang="en-US"/>
-                    </a:p>
-                  </a:txBody>
-                  <a:tcPr/>
-                </a:tc>
-                <a:tc>
-                  <a:txBody>
-                    <a:bodyPr/>
-                    <a:lstStyle/>
-                    <a:p>
-                      <a:pPr latinLnBrk="1"/>
-                      <a:endParaRPr lang="ko-KR" altLang="en-US"/>
-                    </a:p>
-                  </a:txBody>
-                  <a:tcPr/>
-                </a:tc>
-                <a:tc>
-                  <a:txBody>
-                    <a:bodyPr/>
-                    <a:lstStyle/>
-                    <a:p>
-                      <a:pPr latinLnBrk="1"/>
-                      <a:endParaRPr lang="ko-KR" altLang="en-US"/>
-                    </a:p>
-                  </a:txBody>
-                  <a:tcPr/>
-                </a:tc>
-                <a:tc>
-                  <a:txBody>
-                    <a:bodyPr/>
-                    <a:lstStyle/>
-                    <a:p>
-                      <a:pPr latinLnBrk="1"/>
-                      <a:endParaRPr lang="ko-KR" altLang="en-US"/>
-                    </a:p>
-                  </a:txBody>
-                  <a:tcPr/>
-                </a:tc>
-                <a:tc>
-                  <a:txBody>
-                    <a:bodyPr/>
-                    <a:lstStyle/>
-                    <a:p>
-                      <a:pPr latinLnBrk="1"/>
-                      <a:endParaRPr lang="ko-KR" altLang="en-US"/>
-                    </a:p>
-                  </a:txBody>
-                  <a:tcPr/>
-                </a:tc>
-                <a:tc>
-                  <a:txBody>
-                    <a:bodyPr/>
-                    <a:lstStyle/>
-                    <a:p>
-                      <a:pPr latinLnBrk="1"/>
-                      <a:endParaRPr lang="ko-KR" altLang="en-US" dirty="0"/>
-                    </a:p>
-                  </a:txBody>
-                  <a:tcPr/>
-                </a:tc>
-                <a:extLst>
-                  <a:ext uri="{0D108BD9-81ED-4DB2-BD59-A6C34878D82A}">
-                    <a16:rowId xmlns:a16="http://schemas.microsoft.com/office/drawing/2014/main" val="1039503241"/>
-                  </a:ext>
-                </a:extLst>
-              </a:tr>
-              <a:tr h="355988">
-                <a:tc>
-                  <a:txBody>
-                    <a:bodyPr/>
-                    <a:lstStyle/>
-                    <a:p>
-                      <a:pPr latinLnBrk="1"/>
-                      <a:endParaRPr lang="ko-KR" altLang="en-US"/>
-                    </a:p>
-                  </a:txBody>
-                  <a:tcPr/>
-                </a:tc>
-                <a:tc>
-                  <a:txBody>
-                    <a:bodyPr/>
-                    <a:lstStyle/>
-                    <a:p>
-                      <a:pPr latinLnBrk="1"/>
-                      <a:endParaRPr lang="ko-KR" altLang="en-US"/>
-                    </a:p>
-                  </a:txBody>
-                  <a:tcPr/>
-                </a:tc>
-                <a:tc>
-                  <a:txBody>
-                    <a:bodyPr/>
-                    <a:lstStyle/>
-                    <a:p>
-                      <a:pPr latinLnBrk="1"/>
-                      <a:endParaRPr lang="ko-KR" altLang="en-US"/>
-                    </a:p>
-                  </a:txBody>
-                  <a:tcPr/>
-                </a:tc>
-                <a:tc>
-                  <a:txBody>
-                    <a:bodyPr/>
-                    <a:lstStyle/>
-                    <a:p>
-                      <a:pPr latinLnBrk="1"/>
-                      <a:endParaRPr lang="ko-KR" altLang="en-US"/>
-                    </a:p>
-                  </a:txBody>
-                  <a:tcPr/>
-                </a:tc>
-                <a:tc>
-                  <a:txBody>
-                    <a:bodyPr/>
-                    <a:lstStyle/>
-                    <a:p>
-                      <a:pPr latinLnBrk="1"/>
-                      <a:endParaRPr lang="ko-KR" altLang="en-US"/>
-                    </a:p>
-                  </a:txBody>
-                  <a:tcPr/>
-                </a:tc>
-                <a:tc>
-                  <a:txBody>
-                    <a:bodyPr/>
-                    <a:lstStyle/>
-                    <a:p>
-                      <a:pPr latinLnBrk="1"/>
-                      <a:endParaRPr lang="ko-KR" altLang="en-US"/>
-                    </a:p>
-                  </a:txBody>
-                  <a:tcPr/>
-                </a:tc>
-                <a:tc>
-                  <a:txBody>
-                    <a:bodyPr/>
-                    <a:lstStyle/>
-                    <a:p>
-                      <a:pPr latinLnBrk="1"/>
-                      <a:endParaRPr lang="ko-KR" altLang="en-US" dirty="0"/>
-                    </a:p>
-                  </a:txBody>
-                  <a:tcPr/>
-                </a:tc>
-                <a:extLst>
-                  <a:ext uri="{0D108BD9-81ED-4DB2-BD59-A6C34878D82A}">
-                    <a16:rowId xmlns:a16="http://schemas.microsoft.com/office/drawing/2014/main" val="2281966521"/>
-                  </a:ext>
-                </a:extLst>
-              </a:tr>
-              <a:tr h="355988">
-                <a:tc>
-                  <a:txBody>
-                    <a:bodyPr/>
-                    <a:lstStyle/>
-                    <a:p>
-                      <a:pPr latinLnBrk="1"/>
-                      <a:endParaRPr lang="ko-KR" altLang="en-US"/>
-                    </a:p>
-                  </a:txBody>
-                  <a:tcPr/>
-                </a:tc>
-                <a:tc>
-                  <a:txBody>
-                    <a:bodyPr/>
-                    <a:lstStyle/>
-                    <a:p>
-                      <a:pPr latinLnBrk="1"/>
-                      <a:endParaRPr lang="ko-KR" altLang="en-US"/>
-                    </a:p>
-                  </a:txBody>
-                  <a:tcPr/>
-                </a:tc>
-                <a:tc>
-                  <a:txBody>
-                    <a:bodyPr/>
-                    <a:lstStyle/>
-                    <a:p>
-                      <a:pPr latinLnBrk="1"/>
-                      <a:endParaRPr lang="ko-KR" altLang="en-US"/>
-                    </a:p>
-                  </a:txBody>
-                  <a:tcPr/>
-                </a:tc>
-                <a:tc>
-                  <a:txBody>
-                    <a:bodyPr/>
-                    <a:lstStyle/>
-                    <a:p>
-                      <a:pPr latinLnBrk="1"/>
-                      <a:endParaRPr lang="ko-KR" altLang="en-US"/>
-                    </a:p>
-                  </a:txBody>
-                  <a:tcPr/>
-                </a:tc>
-                <a:tc>
-                  <a:txBody>
-                    <a:bodyPr/>
-                    <a:lstStyle/>
-                    <a:p>
-                      <a:pPr latinLnBrk="1"/>
-                      <a:endParaRPr lang="ko-KR" altLang="en-US"/>
-                    </a:p>
-                  </a:txBody>
-                  <a:tcPr/>
-                </a:tc>
-                <a:tc>
-                  <a:txBody>
-                    <a:bodyPr/>
-                    <a:lstStyle/>
-                    <a:p>
-                      <a:pPr latinLnBrk="1"/>
-                      <a:endParaRPr lang="ko-KR" altLang="en-US"/>
-                    </a:p>
-                  </a:txBody>
-                  <a:tcPr/>
-                </a:tc>
-                <a:tc>
-                  <a:txBody>
-                    <a:bodyPr/>
-                    <a:lstStyle/>
-                    <a:p>
-                      <a:pPr latinLnBrk="1"/>
-                      <a:endParaRPr lang="ko-KR" altLang="en-US" dirty="0"/>
-                    </a:p>
-                  </a:txBody>
-                  <a:tcPr/>
-                </a:tc>
-                <a:extLst>
-                  <a:ext uri="{0D108BD9-81ED-4DB2-BD59-A6C34878D82A}">
-                    <a16:rowId xmlns:a16="http://schemas.microsoft.com/office/drawing/2014/main" val="2353421832"/>
-                  </a:ext>
-                </a:extLst>
-              </a:tr>
-              <a:tr h="355988">
-                <a:tc>
-                  <a:txBody>
-                    <a:bodyPr/>
-                    <a:lstStyle/>
-                    <a:p>
-                      <a:pPr latinLnBrk="1"/>
-                      <a:endParaRPr lang="ko-KR" altLang="en-US"/>
-                    </a:p>
-                  </a:txBody>
-                  <a:tcPr/>
-                </a:tc>
-                <a:tc>
-                  <a:txBody>
-                    <a:bodyPr/>
-                    <a:lstStyle/>
-                    <a:p>
-                      <a:pPr latinLnBrk="1"/>
-                      <a:endParaRPr lang="ko-KR" altLang="en-US"/>
-                    </a:p>
-                  </a:txBody>
-                  <a:tcPr/>
-                </a:tc>
-                <a:tc>
-                  <a:txBody>
-                    <a:bodyPr/>
-                    <a:lstStyle/>
-                    <a:p>
-                      <a:pPr latinLnBrk="1"/>
-                      <a:endParaRPr lang="ko-KR" altLang="en-US"/>
-                    </a:p>
-                  </a:txBody>
-                  <a:tcPr/>
-                </a:tc>
-                <a:tc>
-                  <a:txBody>
-                    <a:bodyPr/>
-                    <a:lstStyle/>
-                    <a:p>
-                      <a:pPr latinLnBrk="1"/>
-                      <a:endParaRPr lang="ko-KR" altLang="en-US"/>
-                    </a:p>
-                  </a:txBody>
-                  <a:tcPr/>
-                </a:tc>
-                <a:tc>
-                  <a:txBody>
-                    <a:bodyPr/>
-                    <a:lstStyle/>
-                    <a:p>
-                      <a:pPr latinLnBrk="1"/>
-                      <a:endParaRPr lang="ko-KR" altLang="en-US"/>
-                    </a:p>
-                  </a:txBody>
-                  <a:tcPr/>
-                </a:tc>
-                <a:tc>
-                  <a:txBody>
-                    <a:bodyPr/>
-                    <a:lstStyle/>
-                    <a:p>
-                      <a:pPr latinLnBrk="1"/>
-                      <a:endParaRPr lang="ko-KR" altLang="en-US"/>
-                    </a:p>
-                  </a:txBody>
-                  <a:tcPr/>
-                </a:tc>
-                <a:tc>
-                  <a:txBody>
-                    <a:bodyPr/>
-                    <a:lstStyle/>
-                    <a:p>
-                      <a:pPr latinLnBrk="1"/>
-                      <a:endParaRPr lang="ko-KR" altLang="en-US" dirty="0"/>
-                    </a:p>
-                  </a:txBody>
-                  <a:tcPr/>
-                </a:tc>
-                <a:extLst>
-                  <a:ext uri="{0D108BD9-81ED-4DB2-BD59-A6C34878D82A}">
-                    <a16:rowId xmlns:a16="http://schemas.microsoft.com/office/drawing/2014/main" val="1802093329"/>
-                  </a:ext>
-                </a:extLst>
-              </a:tr>
-              <a:tr h="355988">
-                <a:tc>
-                  <a:txBody>
-                    <a:bodyPr/>
-                    <a:lstStyle/>
-                    <a:p>
-                      <a:pPr latinLnBrk="1"/>
-                      <a:endParaRPr lang="ko-KR" altLang="en-US"/>
-                    </a:p>
-                  </a:txBody>
-                  <a:tcPr/>
-                </a:tc>
-                <a:tc>
-                  <a:txBody>
-                    <a:bodyPr/>
-                    <a:lstStyle/>
-                    <a:p>
-                      <a:pPr latinLnBrk="1"/>
-                      <a:endParaRPr lang="ko-KR" altLang="en-US"/>
-                    </a:p>
-                  </a:txBody>
-                  <a:tcPr/>
-                </a:tc>
-                <a:tc>
-                  <a:txBody>
-                    <a:bodyPr/>
-                    <a:lstStyle/>
-                    <a:p>
-                      <a:pPr latinLnBrk="1"/>
-                      <a:endParaRPr lang="ko-KR" altLang="en-US"/>
-                    </a:p>
-                  </a:txBody>
-                  <a:tcPr/>
-                </a:tc>
-                <a:tc>
-                  <a:txBody>
-                    <a:bodyPr/>
-                    <a:lstStyle/>
-                    <a:p>
-                      <a:pPr latinLnBrk="1"/>
-                      <a:endParaRPr lang="ko-KR" altLang="en-US"/>
-                    </a:p>
-                  </a:txBody>
-                  <a:tcPr/>
-                </a:tc>
-                <a:tc>
-                  <a:txBody>
-                    <a:bodyPr/>
-                    <a:lstStyle/>
-                    <a:p>
-                      <a:pPr latinLnBrk="1"/>
-                      <a:endParaRPr lang="ko-KR" altLang="en-US"/>
-                    </a:p>
-                  </a:txBody>
-                  <a:tcPr/>
-                </a:tc>
-                <a:tc>
-                  <a:txBody>
-                    <a:bodyPr/>
-                    <a:lstStyle/>
-                    <a:p>
-                      <a:pPr latinLnBrk="1"/>
-                      <a:endParaRPr lang="ko-KR" altLang="en-US"/>
-                    </a:p>
-                  </a:txBody>
-                  <a:tcPr/>
-                </a:tc>
-                <a:tc>
-                  <a:txBody>
-                    <a:bodyPr/>
-                    <a:lstStyle/>
-                    <a:p>
-                      <a:pPr latinLnBrk="1"/>
-                      <a:endParaRPr lang="ko-KR" altLang="en-US" dirty="0"/>
-                    </a:p>
-                  </a:txBody>
-                  <a:tcPr/>
-                </a:tc>
-                <a:extLst>
-                  <a:ext uri="{0D108BD9-81ED-4DB2-BD59-A6C34878D82A}">
-                    <a16:rowId xmlns:a16="http://schemas.microsoft.com/office/drawing/2014/main" val="3234908586"/>
-                  </a:ext>
-                </a:extLst>
-              </a:tr>
-              <a:tr h="355988">
-                <a:tc>
-                  <a:txBody>
-                    <a:bodyPr/>
-                    <a:lstStyle/>
-                    <a:p>
-                      <a:pPr latinLnBrk="1"/>
-                      <a:endParaRPr lang="ko-KR" altLang="en-US"/>
-                    </a:p>
-                  </a:txBody>
-                  <a:tcPr/>
-                </a:tc>
-                <a:tc>
-                  <a:txBody>
-                    <a:bodyPr/>
-                    <a:lstStyle/>
-                    <a:p>
-                      <a:pPr latinLnBrk="1"/>
-                      <a:endParaRPr lang="ko-KR" altLang="en-US"/>
-                    </a:p>
-                  </a:txBody>
-                  <a:tcPr/>
-                </a:tc>
-                <a:tc>
-                  <a:txBody>
-                    <a:bodyPr/>
-                    <a:lstStyle/>
-                    <a:p>
-                      <a:pPr latinLnBrk="1"/>
-                      <a:endParaRPr lang="ko-KR" altLang="en-US"/>
-                    </a:p>
-                  </a:txBody>
-                  <a:tcPr/>
-                </a:tc>
-                <a:tc>
-                  <a:txBody>
-                    <a:bodyPr/>
-                    <a:lstStyle/>
-                    <a:p>
-                      <a:pPr latinLnBrk="1"/>
-                      <a:endParaRPr lang="ko-KR" altLang="en-US"/>
-                    </a:p>
-                  </a:txBody>
-                  <a:tcPr/>
-                </a:tc>
-                <a:tc>
-                  <a:txBody>
-                    <a:bodyPr/>
-                    <a:lstStyle/>
-                    <a:p>
-                      <a:pPr latinLnBrk="1"/>
-                      <a:endParaRPr lang="ko-KR" altLang="en-US"/>
-                    </a:p>
-                  </a:txBody>
-                  <a:tcPr/>
-                </a:tc>
-                <a:tc>
-                  <a:txBody>
-                    <a:bodyPr/>
-                    <a:lstStyle/>
-                    <a:p>
-                      <a:pPr latinLnBrk="1"/>
-                      <a:endParaRPr lang="ko-KR" altLang="en-US"/>
-                    </a:p>
-                  </a:txBody>
-                  <a:tcPr/>
-                </a:tc>
-                <a:tc>
-                  <a:txBody>
-                    <a:bodyPr/>
-                    <a:lstStyle/>
-                    <a:p>
-                      <a:pPr latinLnBrk="1"/>
-                      <a:endParaRPr lang="ko-KR" altLang="en-US" dirty="0"/>
-                    </a:p>
-                  </a:txBody>
-                  <a:tcPr/>
-                </a:tc>
-                <a:extLst>
-                  <a:ext uri="{0D108BD9-81ED-4DB2-BD59-A6C34878D82A}">
-                    <a16:rowId xmlns:a16="http://schemas.microsoft.com/office/drawing/2014/main" val="3210900503"/>
-                  </a:ext>
-                </a:extLst>
-              </a:tr>
-              <a:tr h="355988">
-                <a:tc>
-                  <a:txBody>
-                    <a:bodyPr/>
-                    <a:lstStyle/>
-                    <a:p>
-                      <a:pPr latinLnBrk="1"/>
-                      <a:endParaRPr lang="ko-KR" altLang="en-US"/>
-                    </a:p>
-                  </a:txBody>
-                  <a:tcPr/>
-                </a:tc>
-                <a:tc>
-                  <a:txBody>
-                    <a:bodyPr/>
-                    <a:lstStyle/>
-                    <a:p>
-                      <a:pPr latinLnBrk="1"/>
-                      <a:endParaRPr lang="ko-KR" altLang="en-US"/>
-                    </a:p>
-                  </a:txBody>
-                  <a:tcPr/>
-                </a:tc>
-                <a:tc>
-                  <a:txBody>
-                    <a:bodyPr/>
-                    <a:lstStyle/>
-                    <a:p>
-                      <a:pPr latinLnBrk="1"/>
-                      <a:endParaRPr lang="ko-KR" altLang="en-US"/>
-                    </a:p>
-                  </a:txBody>
-                  <a:tcPr/>
-                </a:tc>
-                <a:tc>
-                  <a:txBody>
-                    <a:bodyPr/>
-                    <a:lstStyle/>
-                    <a:p>
-                      <a:pPr latinLnBrk="1"/>
-                      <a:endParaRPr lang="ko-KR" altLang="en-US"/>
-                    </a:p>
-                  </a:txBody>
-                  <a:tcPr/>
-                </a:tc>
-                <a:tc>
-                  <a:txBody>
-                    <a:bodyPr/>
-                    <a:lstStyle/>
-                    <a:p>
-                      <a:pPr latinLnBrk="1"/>
-                      <a:endParaRPr lang="ko-KR" altLang="en-US"/>
-                    </a:p>
-                  </a:txBody>
-                  <a:tcPr/>
-                </a:tc>
-                <a:tc>
-                  <a:txBody>
-                    <a:bodyPr/>
-                    <a:lstStyle/>
-                    <a:p>
-                      <a:pPr latinLnBrk="1"/>
-                      <a:endParaRPr lang="ko-KR" altLang="en-US"/>
-                    </a:p>
-                  </a:txBody>
-                  <a:tcPr/>
-                </a:tc>
-                <a:tc>
-                  <a:txBody>
-                    <a:bodyPr/>
-                    <a:lstStyle/>
-                    <a:p>
-                      <a:pPr latinLnBrk="1"/>
-                      <a:endParaRPr lang="ko-KR" altLang="en-US" dirty="0"/>
-                    </a:p>
-                  </a:txBody>
-                  <a:tcPr/>
-                </a:tc>
-                <a:extLst>
-                  <a:ext uri="{0D108BD9-81ED-4DB2-BD59-A6C34878D82A}">
-                    <a16:rowId xmlns:a16="http://schemas.microsoft.com/office/drawing/2014/main" val="1554925297"/>
+                    <a16:rowId xmlns:a16="http://schemas.microsoft.com/office/drawing/2014/main" val="3506806745"/>
                   </a:ext>
                 </a:extLst>
               </a:tr>
@@ -4481,7 +3576,7 @@
     </p:spTree>
     <p:extLst>
       <p:ext uri="{BB962C8B-B14F-4D97-AF65-F5344CB8AC3E}">
-        <p14:creationId xmlns:p14="http://schemas.microsoft.com/office/powerpoint/2010/main" val="4027877786"/>
+        <p14:creationId xmlns:p14="http://schemas.microsoft.com/office/powerpoint/2010/main" val="265410027"/>
       </p:ext>
     </p:extLst>
   </p:cSld>
@@ -4508,16 +3603,224 @@
           <a:chExt cx="0" cy="0"/>
         </a:xfrm>
       </p:grpSpPr>
-      <p:sp>
-        <p:nvSpPr>
-          <p:cNvPr id="5" name="모서리가 둥근 직사각형 4"/>
+      <p:grpSp>
+        <p:nvGrpSpPr>
+          <p:cNvPr id="16" name="그룹 15"/>
+          <p:cNvGrpSpPr/>
+          <p:nvPr/>
+        </p:nvGrpSpPr>
+        <p:grpSpPr>
+          <a:xfrm>
+            <a:off x="53440" y="47501"/>
+            <a:ext cx="2820390" cy="469076"/>
+            <a:chOff x="53440" y="47501"/>
+            <a:chExt cx="2820390" cy="469076"/>
+          </a:xfrm>
+        </p:grpSpPr>
+        <p:sp>
+          <p:nvSpPr>
+            <p:cNvPr id="5" name="직사각형 4"/>
+            <p:cNvSpPr/>
+            <p:nvPr/>
+          </p:nvSpPr>
+          <p:spPr>
+            <a:xfrm>
+              <a:off x="53440" y="47501"/>
+              <a:ext cx="2820390" cy="469076"/>
+            </a:xfrm>
+            <a:prstGeom prst="rect">
+              <a:avLst/>
+            </a:prstGeom>
+            <a:noFill/>
+            <a:ln>
+              <a:noFill/>
+            </a:ln>
+          </p:spPr>
+          <p:style>
+            <a:lnRef idx="2">
+              <a:schemeClr val="accent1">
+                <a:shade val="50000"/>
+              </a:schemeClr>
+            </a:lnRef>
+            <a:fillRef idx="1">
+              <a:schemeClr val="accent1"/>
+            </a:fillRef>
+            <a:effectRef idx="0">
+              <a:schemeClr val="accent1"/>
+            </a:effectRef>
+            <a:fontRef idx="minor">
+              <a:schemeClr val="lt1"/>
+            </a:fontRef>
+          </p:style>
+          <p:txBody>
+            <a:bodyPr rtlCol="0" anchor="ctr"/>
+            <a:lstStyle/>
+            <a:p>
+              <a:pPr algn="ctr"/>
+              <a:r>
+                <a:rPr lang="en-US" altLang="ko-KR" sz="2000" b="1" dirty="0" smtClean="0">
+                  <a:solidFill>
+                    <a:schemeClr val="tx1"/>
+                  </a:solidFill>
+                </a:rPr>
+                <a:t>Main</a:t>
+              </a:r>
+            </a:p>
+          </p:txBody>
+        </p:sp>
+        <p:cxnSp>
+          <p:nvCxnSpPr>
+            <p:cNvPr id="7" name="직선 연결선 6"/>
+            <p:cNvCxnSpPr/>
+            <p:nvPr/>
+          </p:nvCxnSpPr>
+          <p:spPr>
+            <a:xfrm>
+              <a:off x="53440" y="516577"/>
+              <a:ext cx="2820390" cy="0"/>
+            </a:xfrm>
+            <a:prstGeom prst="line">
+              <a:avLst/>
+            </a:prstGeom>
+            <a:ln w="28575"/>
+          </p:spPr>
+          <p:style>
+            <a:lnRef idx="1">
+              <a:schemeClr val="accent1"/>
+            </a:lnRef>
+            <a:fillRef idx="0">
+              <a:schemeClr val="accent1"/>
+            </a:fillRef>
+            <a:effectRef idx="0">
+              <a:schemeClr val="accent1"/>
+            </a:effectRef>
+            <a:fontRef idx="minor">
+              <a:schemeClr val="tx1"/>
+            </a:fontRef>
+          </p:style>
+        </p:cxnSp>
+      </p:grpSp>
+      <p:sp>
+        <p:nvSpPr>
+          <p:cNvPr id="8" name="직사각형 7"/>
           <p:cNvSpPr/>
           <p:nvPr/>
         </p:nvSpPr>
         <p:spPr>
           <a:xfrm>
-            <a:off x="0" y="0"/>
-            <a:ext cx="12192000" cy="708561"/>
+            <a:off x="119578" y="951756"/>
+            <a:ext cx="1920638" cy="5810994"/>
+          </a:xfrm>
+          <a:prstGeom prst="rect">
+            <a:avLst/>
+          </a:prstGeom>
+          <a:solidFill>
+            <a:schemeClr val="bg1">
+              <a:lumMod val="95000"/>
+            </a:schemeClr>
+          </a:solidFill>
+          <a:ln>
+            <a:noFill/>
+          </a:ln>
+        </p:spPr>
+        <p:style>
+          <a:lnRef idx="2">
+            <a:schemeClr val="accent1">
+              <a:shade val="50000"/>
+            </a:schemeClr>
+          </a:lnRef>
+          <a:fillRef idx="1">
+            <a:schemeClr val="accent1"/>
+          </a:fillRef>
+          <a:effectRef idx="0">
+            <a:schemeClr val="accent1"/>
+          </a:effectRef>
+          <a:fontRef idx="minor">
+            <a:schemeClr val="lt1"/>
+          </a:fontRef>
+        </p:style>
+        <p:txBody>
+          <a:bodyPr rtlCol="0" anchor="t"/>
+          <a:lstStyle/>
+          <a:p>
+            <a:r>
+              <a:rPr lang="ko-KR" altLang="en-US" sz="1400" dirty="0" smtClean="0">
+                <a:solidFill>
+                  <a:schemeClr val="tx1"/>
+                </a:solidFill>
+              </a:rPr>
+              <a:t>주요 기능 </a:t>
+            </a:r>
+            <a:r>
+              <a:rPr lang="en-US" altLang="ko-KR" sz="1400" dirty="0" smtClean="0">
+                <a:solidFill>
+                  <a:schemeClr val="tx1"/>
+                </a:solidFill>
+              </a:rPr>
+              <a:t>: </a:t>
+            </a:r>
+            <a:endParaRPr lang="ko-KR" altLang="en-US" sz="1400" dirty="0">
+              <a:solidFill>
+                <a:schemeClr val="tx1"/>
+              </a:solidFill>
+            </a:endParaRPr>
+          </a:p>
+        </p:txBody>
+      </p:sp>
+      <p:sp>
+        <p:nvSpPr>
+          <p:cNvPr id="4" name="직사각형 3"/>
+          <p:cNvSpPr>
+            <a:spLocks noChangeAspect="1"/>
+          </p:cNvSpPr>
+          <p:nvPr/>
+        </p:nvSpPr>
+        <p:spPr>
+          <a:xfrm>
+            <a:off x="2241319" y="1260742"/>
+            <a:ext cx="9950681" cy="5597258"/>
+          </a:xfrm>
+          <a:prstGeom prst="rect">
+            <a:avLst/>
+          </a:prstGeom>
+          <a:noFill/>
+          <a:ln w="19050"/>
+        </p:spPr>
+        <p:style>
+          <a:lnRef idx="2">
+            <a:schemeClr val="accent1">
+              <a:shade val="50000"/>
+            </a:schemeClr>
+          </a:lnRef>
+          <a:fillRef idx="1">
+            <a:schemeClr val="accent1"/>
+          </a:fillRef>
+          <a:effectRef idx="0">
+            <a:schemeClr val="accent1"/>
+          </a:effectRef>
+          <a:fontRef idx="minor">
+            <a:schemeClr val="lt1"/>
+          </a:fontRef>
+        </p:style>
+        <p:txBody>
+          <a:bodyPr rtlCol="0" anchor="ctr"/>
+          <a:lstStyle/>
+          <a:p>
+            <a:pPr algn="ctr"/>
+            <a:endParaRPr lang="ko-KR" altLang="en-US"/>
+          </a:p>
+        </p:txBody>
+      </p:sp>
+      <p:sp>
+        <p:nvSpPr>
+          <p:cNvPr id="9" name="모서리가 둥근 직사각형 8"/>
+          <p:cNvSpPr/>
+          <p:nvPr/>
+        </p:nvSpPr>
+        <p:spPr>
+          <a:xfrm>
+            <a:off x="2241319" y="1275048"/>
+            <a:ext cx="9950681" cy="543685"/>
           </a:xfrm>
           <a:prstGeom prst="roundRect">
             <a:avLst/>
@@ -4545,23 +3848,23 @@
           <a:p>
             <a:pPr algn="ctr"/>
             <a:r>
-              <a:rPr lang="ko-KR" altLang="en-US" dirty="0" smtClean="0"/>
+              <a:rPr lang="ko-KR" altLang="en-US" sz="1600" dirty="0" smtClean="0"/>
               <a:t>헤더</a:t>
             </a:r>
-            <a:endParaRPr lang="en-US" altLang="ko-KR" dirty="0" smtClean="0"/>
-          </a:p>
-        </p:txBody>
-      </p:sp>
-      <p:sp>
-        <p:nvSpPr>
-          <p:cNvPr id="4" name="모서리가 둥근 직사각형 3"/>
+            <a:endParaRPr lang="en-US" altLang="ko-KR" sz="1600" dirty="0" smtClean="0"/>
+          </a:p>
+        </p:txBody>
+      </p:sp>
+      <p:sp>
+        <p:nvSpPr>
+          <p:cNvPr id="10" name="모서리가 둥근 직사각형 9"/>
           <p:cNvSpPr/>
           <p:nvPr/>
         </p:nvSpPr>
         <p:spPr>
           <a:xfrm>
-            <a:off x="225630" y="146462"/>
-            <a:ext cx="1140031" cy="415636"/>
+            <a:off x="2442420" y="1399578"/>
+            <a:ext cx="930453" cy="318922"/>
           </a:xfrm>
           <a:prstGeom prst="roundRect">
             <a:avLst/>
@@ -4589,23 +3892,23 @@
           <a:p>
             <a:pPr algn="ctr"/>
             <a:r>
-              <a:rPr lang="ko-KR" altLang="en-US" smtClean="0"/>
+              <a:rPr lang="ko-KR" altLang="en-US" sz="1600" smtClean="0"/>
               <a:t>로고</a:t>
             </a:r>
-            <a:endParaRPr lang="ko-KR" altLang="en-US"/>
-          </a:p>
-        </p:txBody>
-      </p:sp>
-      <p:sp>
-        <p:nvSpPr>
-          <p:cNvPr id="6" name="모서리가 둥근 직사각형 5"/>
+            <a:endParaRPr lang="ko-KR" altLang="en-US" sz="1600"/>
+          </a:p>
+        </p:txBody>
+      </p:sp>
+      <p:sp>
+        <p:nvSpPr>
+          <p:cNvPr id="11" name="모서리가 둥근 직사각형 10"/>
           <p:cNvSpPr/>
           <p:nvPr/>
         </p:nvSpPr>
         <p:spPr>
           <a:xfrm>
-            <a:off x="116773" y="2812481"/>
-            <a:ext cx="11888190" cy="845127"/>
+            <a:off x="2241318" y="3135122"/>
+            <a:ext cx="9950682" cy="648474"/>
           </a:xfrm>
           <a:prstGeom prst="roundRect">
             <a:avLst/>
@@ -4633,47 +3936,47 @@
           <a:p>
             <a:pPr algn="ctr"/>
             <a:r>
-              <a:rPr lang="ko-KR" altLang="en-US" dirty="0" smtClean="0"/>
+              <a:rPr lang="ko-KR" altLang="en-US" sz="1600" dirty="0" smtClean="0"/>
               <a:t>네비게이션 </a:t>
             </a:r>
             <a:r>
-              <a:rPr lang="en-US" altLang="ko-KR" dirty="0" smtClean="0"/>
+              <a:rPr lang="en-US" altLang="ko-KR" sz="1600" dirty="0" smtClean="0"/>
               <a:t>(</a:t>
             </a:r>
             <a:r>
-              <a:rPr lang="ko-KR" altLang="en-US" dirty="0" smtClean="0"/>
+              <a:rPr lang="ko-KR" altLang="en-US" sz="1600" dirty="0" smtClean="0"/>
               <a:t>사이트 이동 방향</a:t>
             </a:r>
             <a:r>
-              <a:rPr lang="en-US" altLang="ko-KR" dirty="0" smtClean="0"/>
+              <a:rPr lang="en-US" altLang="ko-KR" sz="1600" dirty="0" smtClean="0"/>
               <a:t>) : </a:t>
             </a:r>
             <a:r>
-              <a:rPr lang="ko-KR" altLang="en-US" dirty="0" smtClean="0"/>
+              <a:rPr lang="ko-KR" altLang="en-US" sz="1600" dirty="0" smtClean="0"/>
               <a:t>카테고리 표시 모바일도 가능하게 왼쪽에 확장 버튼 만들어서 누르면</a:t>
             </a:r>
-            <a:endParaRPr lang="en-US" altLang="ko-KR" dirty="0" smtClean="0"/>
+            <a:endParaRPr lang="en-US" altLang="ko-KR" sz="1600" dirty="0" smtClean="0"/>
           </a:p>
           <a:p>
             <a:pPr algn="ctr"/>
             <a:r>
-              <a:rPr lang="ko-KR" altLang="en-US" dirty="0" smtClean="0"/>
+              <a:rPr lang="ko-KR" altLang="en-US" sz="1600" dirty="0" smtClean="0"/>
               <a:t>아래로 네비게이션 확장하자</a:t>
             </a:r>
-            <a:endParaRPr lang="ko-KR" altLang="en-US" dirty="0"/>
-          </a:p>
-        </p:txBody>
-      </p:sp>
-      <p:sp>
-        <p:nvSpPr>
-          <p:cNvPr id="7" name="모서리가 둥근 직사각형 6"/>
+            <a:endParaRPr lang="ko-KR" altLang="en-US" sz="1600" dirty="0"/>
+          </a:p>
+        </p:txBody>
+      </p:sp>
+      <p:sp>
+        <p:nvSpPr>
+          <p:cNvPr id="12" name="모서리가 둥근 직사각형 11"/>
           <p:cNvSpPr/>
           <p:nvPr/>
         </p:nvSpPr>
         <p:spPr>
           <a:xfrm>
-            <a:off x="8093034" y="130628"/>
-            <a:ext cx="3911930" cy="447303"/>
+            <a:off x="8487256" y="1375281"/>
+            <a:ext cx="3192779" cy="343220"/>
           </a:xfrm>
           <a:prstGeom prst="roundRect">
             <a:avLst/>
@@ -4701,23 +4004,23 @@
           <a:p>
             <a:pPr algn="ctr"/>
             <a:r>
-              <a:rPr lang="ko-KR" altLang="en-US" dirty="0" smtClean="0"/>
+              <a:rPr lang="ko-KR" altLang="en-US" sz="1600" dirty="0" smtClean="0"/>
               <a:t>로그인 및 페이지 기본 기능</a:t>
             </a:r>
-            <a:endParaRPr lang="ko-KR" altLang="en-US" dirty="0"/>
-          </a:p>
-        </p:txBody>
-      </p:sp>
-      <p:sp>
-        <p:nvSpPr>
-          <p:cNvPr id="8" name="모서리가 둥근 직사각형 7"/>
+            <a:endParaRPr lang="ko-KR" altLang="en-US" sz="1600" dirty="0"/>
+          </a:p>
+        </p:txBody>
+      </p:sp>
+      <p:sp>
+        <p:nvSpPr>
+          <p:cNvPr id="13" name="모서리가 둥근 직사각형 12"/>
           <p:cNvSpPr/>
           <p:nvPr/>
         </p:nvSpPr>
         <p:spPr>
           <a:xfrm>
-            <a:off x="116773" y="3724905"/>
-            <a:ext cx="11888190" cy="2307770"/>
+            <a:off x="2241317" y="3881668"/>
+            <a:ext cx="9950681" cy="1770775"/>
           </a:xfrm>
           <a:prstGeom prst="roundRect">
             <a:avLst/>
@@ -4745,67 +4048,107 @@
           <a:p>
             <a:pPr algn="ctr"/>
             <a:r>
-              <a:rPr lang="ko-KR" altLang="en-US" dirty="0" smtClean="0"/>
+              <a:rPr lang="ko-KR" altLang="en-US" sz="1600" dirty="0" smtClean="0"/>
               <a:t>메인 페이지</a:t>
             </a:r>
-            <a:endParaRPr lang="en-US" altLang="ko-KR" dirty="0" smtClean="0"/>
+            <a:endParaRPr lang="en-US" altLang="ko-KR" sz="1600" dirty="0" smtClean="0"/>
           </a:p>
           <a:p>
             <a:pPr algn="ctr"/>
             <a:r>
-              <a:rPr lang="ko-KR" altLang="en-US" dirty="0" smtClean="0"/>
-              <a:t>기본으로 추천 사이트 뜨고</a:t>
-            </a:r>
-            <a:endParaRPr lang="en-US" altLang="ko-KR" dirty="0" smtClean="0"/>
+              <a:rPr lang="ko-KR" altLang="en-US" sz="1600" dirty="0" smtClean="0"/>
+              <a:t>기본으로 추천 </a:t>
+            </a:r>
+            <a:r>
+              <a:rPr lang="ko-KR" altLang="en-US" sz="1600" dirty="0" smtClean="0"/>
+              <a:t>사이트</a:t>
+            </a:r>
+            <a:r>
+              <a:rPr lang="en-US" altLang="ko-KR" sz="1600" dirty="0" smtClean="0"/>
+              <a:t>(</a:t>
+            </a:r>
+            <a:r>
+              <a:rPr lang="ko-KR" altLang="en-US" sz="1600" dirty="0" smtClean="0"/>
+              <a:t>매주 조회수 </a:t>
+            </a:r>
+            <a:r>
+              <a:rPr lang="ko-KR" altLang="en-US" sz="1600" dirty="0" err="1" smtClean="0"/>
+              <a:t>탑순위</a:t>
+            </a:r>
+            <a:r>
+              <a:rPr lang="en-US" altLang="ko-KR" sz="1600" dirty="0" smtClean="0"/>
+              <a:t>)</a:t>
+            </a:r>
+            <a:r>
+              <a:rPr lang="ko-KR" altLang="en-US" sz="1600" dirty="0" smtClean="0"/>
+              <a:t> </a:t>
+            </a:r>
+            <a:r>
+              <a:rPr lang="ko-KR" altLang="en-US" sz="1600" dirty="0" smtClean="0"/>
+              <a:t>뜨고</a:t>
+            </a:r>
+            <a:endParaRPr lang="en-US" altLang="ko-KR" sz="1600" dirty="0" smtClean="0"/>
           </a:p>
           <a:p>
             <a:pPr marL="342900" indent="-342900" algn="ctr">
               <a:buAutoNum type="arabicPeriod"/>
             </a:pPr>
             <a:r>
-              <a:rPr lang="ko-KR" altLang="en-US" dirty="0" smtClean="0"/>
+              <a:rPr lang="ko-KR" altLang="en-US" sz="1600" dirty="0" smtClean="0"/>
               <a:t>로그인 안한 경우 로그인 버튼</a:t>
             </a:r>
-            <a:endParaRPr lang="en-US" altLang="ko-KR" dirty="0" smtClean="0"/>
+            <a:endParaRPr lang="en-US" altLang="ko-KR" sz="1600" dirty="0" smtClean="0"/>
           </a:p>
           <a:p>
             <a:pPr marL="342900" indent="-342900" algn="ctr">
               <a:buAutoNum type="arabicPeriod"/>
             </a:pPr>
-            <a:endParaRPr lang="en-US" altLang="ko-KR" dirty="0"/>
+            <a:endParaRPr lang="en-US" altLang="ko-KR" sz="1600" dirty="0"/>
           </a:p>
           <a:p>
             <a:pPr algn="ctr"/>
             <a:r>
-              <a:rPr lang="en-US" altLang="ko-KR" dirty="0" smtClean="0"/>
+              <a:rPr lang="en-US" altLang="ko-KR" sz="1600" dirty="0" smtClean="0"/>
               <a:t>2. </a:t>
             </a:r>
             <a:r>
-              <a:rPr lang="ko-KR" altLang="en-US" dirty="0" smtClean="0"/>
-              <a:t>로그인 한 경우 내가 즐겨 찾은 사이트와 내 </a:t>
-            </a:r>
-            <a:r>
-              <a:rPr lang="ko-KR" altLang="en-US" dirty="0" err="1" smtClean="0"/>
-              <a:t>즐겨찾기</a:t>
-            </a:r>
-            <a:r>
-              <a:rPr lang="ko-KR" altLang="en-US" dirty="0" smtClean="0"/>
-              <a:t> 기록 표출</a:t>
-            </a:r>
-            <a:endParaRPr lang="ko-KR" altLang="en-US" dirty="0"/>
-          </a:p>
-        </p:txBody>
-      </p:sp>
-      <p:sp>
-        <p:nvSpPr>
-          <p:cNvPr id="9" name="모서리가 둥근 직사각형 8"/>
+              <a:rPr lang="ko-KR" altLang="en-US" sz="1600" dirty="0" smtClean="0"/>
+              <a:t>로그인 한 경우 내가 즐겨 찾은 사이트</a:t>
+            </a:r>
+            <a:r>
+              <a:rPr lang="en-US" altLang="ko-KR" sz="1600" dirty="0"/>
+              <a:t>((</a:t>
+            </a:r>
+            <a:r>
+              <a:rPr lang="ko-KR" altLang="en-US" sz="1600" dirty="0"/>
+              <a:t>최근에 방문 </a:t>
+            </a:r>
+            <a:r>
+              <a:rPr lang="en-US" altLang="ko-KR" sz="1600" dirty="0"/>
+              <a:t>or </a:t>
+            </a:r>
+            <a:r>
+              <a:rPr lang="ko-KR" altLang="en-US" sz="1600" dirty="0"/>
+              <a:t>가장 많이 방문</a:t>
+            </a:r>
+            <a:r>
+              <a:rPr lang="en-US" altLang="ko-KR" sz="1600" dirty="0"/>
+              <a:t>)</a:t>
+            </a:r>
+            <a:endParaRPr lang="ko-KR" altLang="en-US" sz="1600" dirty="0"/>
+          </a:p>
+        </p:txBody>
+      </p:sp>
+      <p:sp>
+        <p:nvSpPr>
+          <p:cNvPr id="14" name="모서리가 둥근 직사각형 13"/>
           <p:cNvSpPr/>
           <p:nvPr/>
         </p:nvSpPr>
         <p:spPr>
           <a:xfrm>
-            <a:off x="0" y="6149439"/>
-            <a:ext cx="12192000" cy="708561"/>
+            <a:off x="2241317" y="6314315"/>
+            <a:ext cx="9950681" cy="543685"/>
           </a:xfrm>
           <a:prstGeom prst="roundRect">
             <a:avLst/>
@@ -4833,83 +4176,83 @@
           <a:p>
             <a:pPr algn="ctr"/>
             <a:r>
-              <a:rPr lang="ko-KR" altLang="en-US" dirty="0" err="1" smtClean="0"/>
+              <a:rPr lang="ko-KR" altLang="en-US" sz="1600" dirty="0" err="1" smtClean="0"/>
               <a:t>푸터</a:t>
             </a:r>
             <a:r>
-              <a:rPr lang="ko-KR" altLang="en-US" dirty="0" smtClean="0"/>
+              <a:rPr lang="ko-KR" altLang="en-US" sz="1600" dirty="0" smtClean="0"/>
               <a:t> </a:t>
             </a:r>
             <a:r>
-              <a:rPr lang="en-US" altLang="ko-KR" dirty="0" smtClean="0"/>
+              <a:rPr lang="en-US" altLang="ko-KR" sz="1600" dirty="0" smtClean="0"/>
               <a:t>(</a:t>
             </a:r>
             <a:r>
-              <a:rPr lang="ko-KR" altLang="en-US" dirty="0" smtClean="0"/>
+              <a:rPr lang="ko-KR" altLang="en-US" sz="1600" dirty="0" smtClean="0"/>
               <a:t>서비스</a:t>
             </a:r>
             <a:r>
-              <a:rPr lang="en-US" altLang="ko-KR" dirty="0" smtClean="0"/>
+              <a:rPr lang="en-US" altLang="ko-KR" sz="1600" dirty="0" smtClean="0"/>
               <a:t>, </a:t>
             </a:r>
             <a:r>
-              <a:rPr lang="ko-KR" altLang="en-US" dirty="0" smtClean="0"/>
+              <a:rPr lang="ko-KR" altLang="en-US" sz="1600" dirty="0" smtClean="0"/>
               <a:t>문의</a:t>
             </a:r>
             <a:r>
-              <a:rPr lang="en-US" altLang="ko-KR" dirty="0" smtClean="0"/>
+              <a:rPr lang="en-US" altLang="ko-KR" sz="1600" dirty="0" smtClean="0"/>
               <a:t>, </a:t>
             </a:r>
             <a:r>
-              <a:rPr lang="ko-KR" altLang="en-US" dirty="0" smtClean="0"/>
+              <a:rPr lang="ko-KR" altLang="en-US" sz="1600" dirty="0" smtClean="0"/>
               <a:t>고객센터</a:t>
             </a:r>
             <a:r>
-              <a:rPr lang="en-US" altLang="ko-KR" dirty="0" smtClean="0"/>
+              <a:rPr lang="en-US" altLang="ko-KR" sz="1600" dirty="0" smtClean="0"/>
               <a:t>), </a:t>
             </a:r>
             <a:r>
-              <a:rPr lang="ko-KR" altLang="en-US" dirty="0" smtClean="0"/>
+              <a:rPr lang="ko-KR" altLang="en-US" sz="1600" dirty="0" smtClean="0"/>
               <a:t>기업 정보</a:t>
             </a:r>
             <a:r>
-              <a:rPr lang="en-US" altLang="ko-KR" dirty="0" smtClean="0"/>
+              <a:rPr lang="en-US" altLang="ko-KR" sz="1600" dirty="0" smtClean="0"/>
               <a:t>, </a:t>
             </a:r>
             <a:r>
-              <a:rPr lang="ko-KR" altLang="en-US" dirty="0" smtClean="0"/>
+              <a:rPr lang="ko-KR" altLang="en-US" sz="1600" dirty="0" smtClean="0"/>
               <a:t>개인정보 처리방침</a:t>
             </a:r>
             <a:r>
-              <a:rPr lang="en-US" altLang="ko-KR" dirty="0" smtClean="0"/>
+              <a:rPr lang="en-US" altLang="ko-KR" sz="1600" dirty="0" smtClean="0"/>
               <a:t>, </a:t>
             </a:r>
             <a:r>
-              <a:rPr lang="ko-KR" altLang="en-US" dirty="0" smtClean="0"/>
+              <a:rPr lang="ko-KR" altLang="en-US" sz="1600" dirty="0" smtClean="0"/>
               <a:t>이용약관</a:t>
             </a:r>
             <a:r>
-              <a:rPr lang="en-US" altLang="ko-KR" dirty="0" smtClean="0"/>
+              <a:rPr lang="en-US" altLang="ko-KR" sz="1600" dirty="0" smtClean="0"/>
               <a:t>, </a:t>
             </a:r>
             <a:r>
-              <a:rPr lang="ko-KR" altLang="en-US" smtClean="0"/>
+              <a:rPr lang="ko-KR" altLang="en-US" sz="1600" smtClean="0"/>
               <a:t>기타 등등</a:t>
             </a:r>
-            <a:endParaRPr lang="en-US" altLang="ko-KR" dirty="0" smtClean="0"/>
-          </a:p>
-        </p:txBody>
-      </p:sp>
-      <p:sp>
-        <p:nvSpPr>
-          <p:cNvPr id="10" name="모서리가 둥근 직사각형 9"/>
+            <a:endParaRPr lang="en-US" altLang="ko-KR" sz="1600" dirty="0" smtClean="0"/>
+          </a:p>
+        </p:txBody>
+      </p:sp>
+      <p:sp>
+        <p:nvSpPr>
+          <p:cNvPr id="15" name="모서리가 둥근 직사각형 14"/>
           <p:cNvSpPr/>
           <p:nvPr/>
         </p:nvSpPr>
         <p:spPr>
           <a:xfrm>
-            <a:off x="116773" y="972402"/>
-            <a:ext cx="11888190" cy="1576238"/>
+            <a:off x="2241318" y="1854821"/>
+            <a:ext cx="9950681" cy="1209463"/>
           </a:xfrm>
           <a:prstGeom prst="roundRect">
             <a:avLst/>
@@ -4937,33 +4280,181 @@
           <a:p>
             <a:pPr algn="ctr"/>
             <a:r>
-              <a:rPr lang="ko-KR" altLang="en-US" dirty="0" err="1" smtClean="0"/>
+              <a:rPr lang="ko-KR" altLang="en-US" sz="1600" dirty="0" err="1" smtClean="0"/>
               <a:t>베너</a:t>
             </a:r>
             <a:r>
-              <a:rPr lang="ko-KR" altLang="en-US" dirty="0" smtClean="0"/>
+              <a:rPr lang="ko-KR" altLang="en-US" sz="1600" dirty="0" smtClean="0"/>
               <a:t> 위치</a:t>
             </a:r>
             <a:r>
-              <a:rPr lang="en-US" altLang="ko-KR" dirty="0" smtClean="0"/>
+              <a:rPr lang="en-US" altLang="ko-KR" sz="1600" dirty="0" smtClean="0"/>
               <a:t>(</a:t>
             </a:r>
             <a:r>
-              <a:rPr lang="ko-KR" altLang="en-US" dirty="0" smtClean="0"/>
+              <a:rPr lang="ko-KR" altLang="en-US" sz="1600" dirty="0" smtClean="0"/>
               <a:t>새롭게 추천하거나 광고 받으면 여기 넣기</a:t>
             </a:r>
             <a:r>
-              <a:rPr lang="en-US" altLang="ko-KR" dirty="0" smtClean="0"/>
+              <a:rPr lang="en-US" altLang="ko-KR" sz="1600" dirty="0" smtClean="0"/>
               <a:t>)</a:t>
             </a:r>
-            <a:endParaRPr lang="ko-KR" altLang="en-US" dirty="0"/>
+            <a:endParaRPr lang="ko-KR" altLang="en-US" sz="1600" dirty="0"/>
+          </a:p>
+        </p:txBody>
+      </p:sp>
+      <p:sp>
+        <p:nvSpPr>
+          <p:cNvPr id="17" name="직사각형 16"/>
+          <p:cNvSpPr/>
+          <p:nvPr/>
+        </p:nvSpPr>
+        <p:spPr>
+          <a:xfrm>
+            <a:off x="2982476" y="47502"/>
+            <a:ext cx="9126974" cy="1113008"/>
+          </a:xfrm>
+          <a:prstGeom prst="rect">
+            <a:avLst/>
+          </a:prstGeom>
+          <a:solidFill>
+            <a:schemeClr val="bg1">
+              <a:lumMod val="95000"/>
+            </a:schemeClr>
+          </a:solidFill>
+          <a:ln>
+            <a:noFill/>
+          </a:ln>
+        </p:spPr>
+        <p:style>
+          <a:lnRef idx="2">
+            <a:schemeClr val="accent1">
+              <a:shade val="50000"/>
+            </a:schemeClr>
+          </a:lnRef>
+          <a:fillRef idx="1">
+            <a:schemeClr val="accent1"/>
+          </a:fillRef>
+          <a:effectRef idx="0">
+            <a:schemeClr val="accent1"/>
+          </a:effectRef>
+          <a:fontRef idx="minor">
+            <a:schemeClr val="lt1"/>
+          </a:fontRef>
+        </p:style>
+        <p:txBody>
+          <a:bodyPr rtlCol="0" anchor="t"/>
+          <a:lstStyle/>
+          <a:p>
+            <a:r>
+              <a:rPr lang="ko-KR" altLang="en-US" sz="1400" dirty="0" smtClean="0">
+                <a:solidFill>
+                  <a:schemeClr val="tx1"/>
+                </a:solidFill>
+              </a:rPr>
+              <a:t>고려 사항</a:t>
+            </a:r>
+            <a:endParaRPr lang="en-US" altLang="ko-KR" sz="1400" dirty="0" smtClean="0">
+              <a:solidFill>
+                <a:schemeClr val="tx1"/>
+              </a:solidFill>
+            </a:endParaRPr>
+          </a:p>
+          <a:p>
+            <a:pPr marL="285750" indent="-285750">
+              <a:buFontTx/>
+              <a:buChar char="-"/>
+            </a:pPr>
+            <a:r>
+              <a:rPr lang="ko-KR" altLang="en-US" sz="1400" dirty="0" smtClean="0">
+                <a:solidFill>
+                  <a:schemeClr val="tx1"/>
+                </a:solidFill>
+              </a:rPr>
+              <a:t>배너 위치</a:t>
+            </a:r>
+            <a:r>
+              <a:rPr lang="en-US" altLang="ko-KR" sz="1400" dirty="0" smtClean="0">
+                <a:solidFill>
+                  <a:schemeClr val="tx1"/>
+                </a:solidFill>
+              </a:rPr>
+              <a:t>(+</a:t>
+            </a:r>
+            <a:r>
+              <a:rPr lang="ko-KR" altLang="en-US" sz="1400" dirty="0" smtClean="0">
+                <a:solidFill>
+                  <a:schemeClr val="tx1"/>
+                </a:solidFill>
+              </a:rPr>
+              <a:t>배너 크기</a:t>
+            </a:r>
+            <a:r>
+              <a:rPr lang="en-US" altLang="ko-KR" sz="1400" dirty="0" smtClean="0">
+                <a:solidFill>
+                  <a:schemeClr val="tx1"/>
+                </a:solidFill>
+              </a:rPr>
+              <a:t>, </a:t>
+            </a:r>
+            <a:r>
+              <a:rPr lang="ko-KR" altLang="en-US" sz="1400" dirty="0" smtClean="0">
+                <a:solidFill>
+                  <a:schemeClr val="tx1"/>
+                </a:solidFill>
+              </a:rPr>
+              <a:t>표준 사이즈 검색</a:t>
+            </a:r>
+            <a:r>
+              <a:rPr lang="en-US" altLang="ko-KR" sz="1400" dirty="0">
+                <a:solidFill>
+                  <a:schemeClr val="tx1"/>
+                </a:solidFill>
+              </a:rPr>
+              <a:t>)</a:t>
+            </a:r>
+            <a:endParaRPr lang="en-US" altLang="ko-KR" sz="1400" dirty="0" smtClean="0">
+              <a:solidFill>
+                <a:schemeClr val="tx1"/>
+              </a:solidFill>
+            </a:endParaRPr>
+          </a:p>
+          <a:p>
+            <a:pPr marL="285750" indent="-285750">
+              <a:buFontTx/>
+              <a:buChar char="-"/>
+            </a:pPr>
+            <a:r>
+              <a:rPr lang="ko-KR" altLang="en-US" sz="1400" dirty="0" smtClean="0">
+                <a:solidFill>
+                  <a:schemeClr val="tx1"/>
+                </a:solidFill>
+              </a:rPr>
+              <a:t>최대 가로 크기</a:t>
+            </a:r>
+            <a:endParaRPr lang="en-US" altLang="ko-KR" sz="1400" dirty="0" smtClean="0">
+              <a:solidFill>
+                <a:schemeClr val="tx1"/>
+              </a:solidFill>
+            </a:endParaRPr>
+          </a:p>
+          <a:p>
+            <a:pPr marL="285750" indent="-285750">
+              <a:buFontTx/>
+              <a:buChar char="-"/>
+            </a:pPr>
+            <a:endParaRPr lang="ko-KR" altLang="en-US" sz="1400" dirty="0">
+              <a:solidFill>
+                <a:schemeClr val="tx1"/>
+              </a:solidFill>
+            </a:endParaRPr>
           </a:p>
         </p:txBody>
       </p:sp>
     </p:spTree>
     <p:extLst>
       <p:ext uri="{BB962C8B-B14F-4D97-AF65-F5344CB8AC3E}">
-        <p14:creationId xmlns:p14="http://schemas.microsoft.com/office/powerpoint/2010/main" val="368483393"/>
+        <p14:creationId xmlns:p14="http://schemas.microsoft.com/office/powerpoint/2010/main" val="1717136310"/>
       </p:ext>
     </p:extLst>
   </p:cSld>

</xml_diff>

<commit_message>
[c u] : add readme detailPage, edit documents
</commit_message>
<xml_diff>
--- a/bookmark.pptx
+++ b/bookmark.pptx
@@ -6,8 +6,12 @@
   </p:sldMasterIdLst>
   <p:sldIdLst>
     <p:sldId id="256" r:id="rId2"/>
-    <p:sldId id="260" r:id="rId3"/>
-    <p:sldId id="259" r:id="rId4"/>
+    <p:sldId id="264" r:id="rId3"/>
+    <p:sldId id="260" r:id="rId4"/>
+    <p:sldId id="261" r:id="rId5"/>
+    <p:sldId id="259" r:id="rId6"/>
+    <p:sldId id="263" r:id="rId7"/>
+    <p:sldId id="262" r:id="rId8"/>
   </p:sldIdLst>
   <p:sldSz cx="12192000" cy="6858000"/>
   <p:notesSz cx="6858000" cy="9144000"/>
@@ -257,7 +261,7 @@
           <a:p>
             <a:fld id="{9A0CBB99-4DF1-49E3-ACA0-C007A6485E48}" type="datetimeFigureOut">
               <a:rPr lang="ko-KR" altLang="en-US" smtClean="0"/>
-              <a:t>2024-04-05</a:t>
+              <a:t>2024-04-16</a:t>
             </a:fld>
             <a:endParaRPr lang="ko-KR" altLang="en-US"/>
           </a:p>
@@ -427,7 +431,7 @@
           <a:p>
             <a:fld id="{9A0CBB99-4DF1-49E3-ACA0-C007A6485E48}" type="datetimeFigureOut">
               <a:rPr lang="ko-KR" altLang="en-US" smtClean="0"/>
-              <a:t>2024-04-05</a:t>
+              <a:t>2024-04-16</a:t>
             </a:fld>
             <a:endParaRPr lang="ko-KR" altLang="en-US"/>
           </a:p>
@@ -607,7 +611,7 @@
           <a:p>
             <a:fld id="{9A0CBB99-4DF1-49E3-ACA0-C007A6485E48}" type="datetimeFigureOut">
               <a:rPr lang="ko-KR" altLang="en-US" smtClean="0"/>
-              <a:t>2024-04-05</a:t>
+              <a:t>2024-04-16</a:t>
             </a:fld>
             <a:endParaRPr lang="ko-KR" altLang="en-US"/>
           </a:p>
@@ -777,7 +781,7 @@
           <a:p>
             <a:fld id="{9A0CBB99-4DF1-49E3-ACA0-C007A6485E48}" type="datetimeFigureOut">
               <a:rPr lang="ko-KR" altLang="en-US" smtClean="0"/>
-              <a:t>2024-04-05</a:t>
+              <a:t>2024-04-16</a:t>
             </a:fld>
             <a:endParaRPr lang="ko-KR" altLang="en-US"/>
           </a:p>
@@ -1023,7 +1027,7 @@
           <a:p>
             <a:fld id="{9A0CBB99-4DF1-49E3-ACA0-C007A6485E48}" type="datetimeFigureOut">
               <a:rPr lang="ko-KR" altLang="en-US" smtClean="0"/>
-              <a:t>2024-04-05</a:t>
+              <a:t>2024-04-16</a:t>
             </a:fld>
             <a:endParaRPr lang="ko-KR" altLang="en-US"/>
           </a:p>
@@ -1255,7 +1259,7 @@
           <a:p>
             <a:fld id="{9A0CBB99-4DF1-49E3-ACA0-C007A6485E48}" type="datetimeFigureOut">
               <a:rPr lang="ko-KR" altLang="en-US" smtClean="0"/>
-              <a:t>2024-04-05</a:t>
+              <a:t>2024-04-16</a:t>
             </a:fld>
             <a:endParaRPr lang="ko-KR" altLang="en-US"/>
           </a:p>
@@ -1622,7 +1626,7 @@
           <a:p>
             <a:fld id="{9A0CBB99-4DF1-49E3-ACA0-C007A6485E48}" type="datetimeFigureOut">
               <a:rPr lang="ko-KR" altLang="en-US" smtClean="0"/>
-              <a:t>2024-04-05</a:t>
+              <a:t>2024-04-16</a:t>
             </a:fld>
             <a:endParaRPr lang="ko-KR" altLang="en-US"/>
           </a:p>
@@ -1740,7 +1744,7 @@
           <a:p>
             <a:fld id="{9A0CBB99-4DF1-49E3-ACA0-C007A6485E48}" type="datetimeFigureOut">
               <a:rPr lang="ko-KR" altLang="en-US" smtClean="0"/>
-              <a:t>2024-04-05</a:t>
+              <a:t>2024-04-16</a:t>
             </a:fld>
             <a:endParaRPr lang="ko-KR" altLang="en-US"/>
           </a:p>
@@ -1835,7 +1839,7 @@
           <a:p>
             <a:fld id="{9A0CBB99-4DF1-49E3-ACA0-C007A6485E48}" type="datetimeFigureOut">
               <a:rPr lang="ko-KR" altLang="en-US" smtClean="0"/>
-              <a:t>2024-04-05</a:t>
+              <a:t>2024-04-16</a:t>
             </a:fld>
             <a:endParaRPr lang="ko-KR" altLang="en-US"/>
           </a:p>
@@ -2112,7 +2116,7 @@
           <a:p>
             <a:fld id="{9A0CBB99-4DF1-49E3-ACA0-C007A6485E48}" type="datetimeFigureOut">
               <a:rPr lang="ko-KR" altLang="en-US" smtClean="0"/>
-              <a:t>2024-04-05</a:t>
+              <a:t>2024-04-16</a:t>
             </a:fld>
             <a:endParaRPr lang="ko-KR" altLang="en-US"/>
           </a:p>
@@ -2365,7 +2369,7 @@
           <a:p>
             <a:fld id="{9A0CBB99-4DF1-49E3-ACA0-C007A6485E48}" type="datetimeFigureOut">
               <a:rPr lang="ko-KR" altLang="en-US" smtClean="0"/>
-              <a:t>2024-04-05</a:t>
+              <a:t>2024-04-16</a:t>
             </a:fld>
             <a:endParaRPr lang="ko-KR" altLang="en-US"/>
           </a:p>
@@ -2578,7 +2582,7 @@
           <a:p>
             <a:fld id="{9A0CBB99-4DF1-49E3-ACA0-C007A6485E48}" type="datetimeFigureOut">
               <a:rPr lang="ko-KR" altLang="en-US" smtClean="0"/>
-              <a:t>2024-04-05</a:t>
+              <a:t>2024-04-16</a:t>
             </a:fld>
             <a:endParaRPr lang="ko-KR" altLang="en-US"/>
           </a:p>
@@ -3024,6 +3028,294 @@
 </file>
 
 <file path=ppt/slides/slide2.xml><?xml version="1.0" encoding="utf-8"?>
+<p:sld xmlns:a="http://schemas.openxmlformats.org/drawingml/2006/main" xmlns:r="http://schemas.openxmlformats.org/officeDocument/2006/relationships" xmlns:p="http://schemas.openxmlformats.org/presentationml/2006/main">
+  <p:cSld>
+    <p:spTree>
+      <p:nvGrpSpPr>
+        <p:cNvPr id="1" name=""/>
+        <p:cNvGrpSpPr/>
+        <p:nvPr/>
+      </p:nvGrpSpPr>
+      <p:grpSpPr>
+        <a:xfrm>
+          <a:off x="0" y="0"/>
+          <a:ext cx="0" cy="0"/>
+          <a:chOff x="0" y="0"/>
+          <a:chExt cx="0" cy="0"/>
+        </a:xfrm>
+      </p:grpSpPr>
+      <p:sp>
+        <p:nvSpPr>
+          <p:cNvPr id="5" name="직사각형 4"/>
+          <p:cNvSpPr/>
+          <p:nvPr/>
+        </p:nvSpPr>
+        <p:spPr>
+          <a:xfrm>
+            <a:off x="439387" y="225631"/>
+            <a:ext cx="11305309" cy="6418613"/>
+          </a:xfrm>
+          <a:prstGeom prst="rect">
+            <a:avLst/>
+          </a:prstGeom>
+          <a:noFill/>
+          <a:ln w="19050">
+            <a:solidFill>
+              <a:schemeClr val="tx1"/>
+            </a:solidFill>
+          </a:ln>
+        </p:spPr>
+        <p:style>
+          <a:lnRef idx="2">
+            <a:schemeClr val="accent1">
+              <a:shade val="50000"/>
+            </a:schemeClr>
+          </a:lnRef>
+          <a:fillRef idx="1">
+            <a:schemeClr val="accent1"/>
+          </a:fillRef>
+          <a:effectRef idx="0">
+            <a:schemeClr val="accent1"/>
+          </a:effectRef>
+          <a:fontRef idx="minor">
+            <a:schemeClr val="lt1"/>
+          </a:fontRef>
+        </p:style>
+        <p:txBody>
+          <a:bodyPr numCol="2" rtlCol="0" anchor="t"/>
+          <a:lstStyle/>
+          <a:p>
+            <a:pPr>
+              <a:lnSpc>
+                <a:spcPct val="150000"/>
+              </a:lnSpc>
+            </a:pPr>
+            <a:r>
+              <a:rPr lang="ko-KR" altLang="en-US" sz="1400" dirty="0" smtClean="0">
+                <a:solidFill>
+                  <a:schemeClr val="tx1"/>
+                </a:solidFill>
+              </a:rPr>
+              <a:t>다양하게 드는 생각 자유롭게 서술하고 나중에 정리</a:t>
+            </a:r>
+            <a:endParaRPr lang="en-US" altLang="ko-KR" sz="1400" dirty="0" smtClean="0">
+              <a:solidFill>
+                <a:schemeClr val="tx1"/>
+              </a:solidFill>
+            </a:endParaRPr>
+          </a:p>
+          <a:p>
+            <a:pPr>
+              <a:lnSpc>
+                <a:spcPct val="150000"/>
+              </a:lnSpc>
+            </a:pPr>
+            <a:r>
+              <a:rPr lang="ko-KR" altLang="en-US" sz="1400" dirty="0" smtClean="0">
+                <a:solidFill>
+                  <a:schemeClr val="tx1"/>
+                </a:solidFill>
+              </a:rPr>
+              <a:t>일단 정적 페이지는 카테고리를 </a:t>
+            </a:r>
+            <a:r>
+              <a:rPr lang="en-US" altLang="ko-KR" sz="1400" dirty="0" smtClean="0">
+                <a:solidFill>
+                  <a:schemeClr val="tx1"/>
+                </a:solidFill>
+              </a:rPr>
+              <a:t>1</a:t>
+            </a:r>
+            <a:r>
+              <a:rPr lang="ko-KR" altLang="en-US" sz="1400" dirty="0" smtClean="0">
+                <a:solidFill>
+                  <a:schemeClr val="tx1"/>
+                </a:solidFill>
+              </a:rPr>
+              <a:t>단계 </a:t>
+            </a:r>
+            <a:r>
+              <a:rPr lang="ko-KR" altLang="en-US" sz="1400" dirty="0" err="1" smtClean="0">
+                <a:solidFill>
+                  <a:schemeClr val="tx1"/>
+                </a:solidFill>
+              </a:rPr>
+              <a:t>기준까지만</a:t>
+            </a:r>
+            <a:r>
+              <a:rPr lang="ko-KR" altLang="en-US" sz="1400" dirty="0" smtClean="0">
+                <a:solidFill>
+                  <a:schemeClr val="tx1"/>
+                </a:solidFill>
+              </a:rPr>
+              <a:t> 만들자 그래서 </a:t>
+            </a:r>
+            <a:r>
+              <a:rPr lang="en-US" altLang="ko-KR" sz="1400" dirty="0" err="1" smtClean="0">
+                <a:solidFill>
+                  <a:schemeClr val="tx1"/>
+                </a:solidFill>
+              </a:rPr>
+              <a:t>nav</a:t>
+            </a:r>
+            <a:r>
+              <a:rPr lang="ko-KR" altLang="en-US" sz="1400" dirty="0" smtClean="0">
+                <a:solidFill>
+                  <a:schemeClr val="tx1"/>
+                </a:solidFill>
+              </a:rPr>
+              <a:t>를 단순하게 설계하고 처리하고 당연히 정렬 순서는 없다</a:t>
+            </a:r>
+            <a:r>
+              <a:rPr lang="en-US" altLang="ko-KR" sz="1400" dirty="0" smtClean="0">
+                <a:solidFill>
+                  <a:schemeClr val="tx1"/>
+                </a:solidFill>
+              </a:rPr>
+              <a:t>… </a:t>
+            </a:r>
+            <a:r>
+              <a:rPr lang="ko-KR" altLang="en-US" sz="1400" dirty="0" smtClean="0">
+                <a:solidFill>
+                  <a:schemeClr val="tx1"/>
+                </a:solidFill>
+              </a:rPr>
+              <a:t>왜냐면 데이터가 없기 때문에</a:t>
+            </a:r>
+            <a:r>
+              <a:rPr lang="en-US" altLang="ko-KR" sz="1400" dirty="0" smtClean="0">
+                <a:solidFill>
+                  <a:schemeClr val="tx1"/>
+                </a:solidFill>
+              </a:rPr>
+              <a:t>…… </a:t>
+            </a:r>
+            <a:r>
+              <a:rPr lang="en-US" altLang="ko-KR" sz="1400" dirty="0" err="1" smtClean="0">
+                <a:solidFill>
+                  <a:schemeClr val="tx1"/>
+                </a:solidFill>
+              </a:rPr>
+              <a:t>json</a:t>
+            </a:r>
+            <a:r>
+              <a:rPr lang="ko-KR" altLang="en-US" sz="1400" dirty="0" smtClean="0">
+                <a:solidFill>
+                  <a:schemeClr val="tx1"/>
+                </a:solidFill>
+              </a:rPr>
+              <a:t>을 실제 데이터로 쓰기에는</a:t>
+            </a:r>
+            <a:r>
+              <a:rPr lang="en-US" altLang="ko-KR" sz="1400" dirty="0" smtClean="0">
+                <a:solidFill>
+                  <a:schemeClr val="tx1"/>
+                </a:solidFill>
+              </a:rPr>
+              <a:t>……. </a:t>
+            </a:r>
+            <a:r>
+              <a:rPr lang="ko-KR" altLang="en-US" sz="1400" dirty="0" smtClean="0">
+                <a:solidFill>
+                  <a:schemeClr val="tx1"/>
+                </a:solidFill>
+              </a:rPr>
+              <a:t>애매하지 않을까</a:t>
+            </a:r>
+            <a:r>
+              <a:rPr lang="en-US" altLang="ko-KR" sz="1400" dirty="0" smtClean="0">
+                <a:solidFill>
+                  <a:schemeClr val="tx1"/>
+                </a:solidFill>
+              </a:rPr>
+              <a:t>… </a:t>
+            </a:r>
+            <a:r>
+              <a:rPr lang="ko-KR" altLang="en-US" sz="1400" dirty="0" err="1" smtClean="0">
+                <a:solidFill>
+                  <a:schemeClr val="tx1"/>
+                </a:solidFill>
+              </a:rPr>
+              <a:t>ㅇㅇ</a:t>
+            </a:r>
+            <a:r>
+              <a:rPr lang="en-US" altLang="ko-KR" sz="1400" dirty="0" smtClean="0">
+                <a:solidFill>
+                  <a:schemeClr val="tx1"/>
+                </a:solidFill>
+              </a:rPr>
+              <a:t>….</a:t>
+            </a:r>
+            <a:r>
+              <a:rPr lang="ko-KR" altLang="en-US" sz="1400" dirty="0" smtClean="0">
+                <a:solidFill>
+                  <a:schemeClr val="tx1"/>
+                </a:solidFill>
+              </a:rPr>
+              <a:t>다만</a:t>
+            </a:r>
+            <a:r>
+              <a:rPr lang="en-US" altLang="ko-KR" sz="1400" dirty="0" smtClean="0">
+                <a:solidFill>
+                  <a:schemeClr val="tx1"/>
+                </a:solidFill>
+              </a:rPr>
+              <a:t>, </a:t>
+            </a:r>
+            <a:r>
+              <a:rPr lang="ko-KR" altLang="en-US" sz="1400" dirty="0" smtClean="0">
+                <a:solidFill>
+                  <a:schemeClr val="tx1"/>
+                </a:solidFill>
+              </a:rPr>
+              <a:t>브라우저에 내 </a:t>
+            </a:r>
+            <a:r>
+              <a:rPr lang="ko-KR" altLang="en-US" sz="1400" dirty="0" err="1" smtClean="0">
+                <a:solidFill>
+                  <a:schemeClr val="tx1"/>
+                </a:solidFill>
+              </a:rPr>
+              <a:t>즐겨찾기</a:t>
+            </a:r>
+            <a:r>
+              <a:rPr lang="ko-KR" altLang="en-US" sz="1400" dirty="0" smtClean="0">
+                <a:solidFill>
+                  <a:schemeClr val="tx1"/>
+                </a:solidFill>
+              </a:rPr>
+              <a:t> </a:t>
+            </a:r>
+            <a:r>
+              <a:rPr lang="ko-KR" altLang="en-US" sz="1400" smtClean="0">
+                <a:solidFill>
+                  <a:schemeClr val="tx1"/>
+                </a:solidFill>
+              </a:rPr>
+              <a:t>등록으로 로그인 기능 없이도 어느정도 저장해서 사용할 수 있게 하자</a:t>
+            </a:r>
+            <a:endParaRPr lang="ko-KR" altLang="en-US" sz="1400" dirty="0">
+              <a:solidFill>
+                <a:schemeClr val="tx1"/>
+              </a:solidFill>
+            </a:endParaRPr>
+          </a:p>
+        </p:txBody>
+      </p:sp>
+    </p:spTree>
+    <p:extLst>
+      <p:ext uri="{BB962C8B-B14F-4D97-AF65-F5344CB8AC3E}">
+        <p14:creationId xmlns:p14="http://schemas.microsoft.com/office/powerpoint/2010/main" val="2859393584"/>
+      </p:ext>
+    </p:extLst>
+  </p:cSld>
+  <p:clrMapOvr>
+    <a:masterClrMapping/>
+  </p:clrMapOvr>
+</p:sld>
+</file>
+
+<file path=ppt/slides/slide3.xml><?xml version="1.0" encoding="utf-8"?>
 <p:sld xmlns:a="http://schemas.openxmlformats.org/drawingml/2006/main" xmlns:r="http://schemas.openxmlformats.org/officeDocument/2006/relationships" xmlns:p="http://schemas.openxmlformats.org/presentationml/2006/main">
   <p:cSld>
     <p:spTree>
@@ -3586,7 +3878,792 @@
 </p:sld>
 </file>
 
-<file path=ppt/slides/slide3.xml><?xml version="1.0" encoding="utf-8"?>
+<file path=ppt/slides/slide4.xml><?xml version="1.0" encoding="utf-8"?>
+<p:sld xmlns:a="http://schemas.openxmlformats.org/drawingml/2006/main" xmlns:r="http://schemas.openxmlformats.org/officeDocument/2006/relationships" xmlns:p="http://schemas.openxmlformats.org/presentationml/2006/main">
+  <p:cSld>
+    <p:spTree>
+      <p:nvGrpSpPr>
+        <p:cNvPr id="1" name=""/>
+        <p:cNvGrpSpPr/>
+        <p:nvPr/>
+      </p:nvGrpSpPr>
+      <p:grpSpPr>
+        <a:xfrm>
+          <a:off x="0" y="0"/>
+          <a:ext cx="0" cy="0"/>
+          <a:chOff x="0" y="0"/>
+          <a:chExt cx="0" cy="0"/>
+        </a:xfrm>
+      </p:grpSpPr>
+      <p:grpSp>
+        <p:nvGrpSpPr>
+          <p:cNvPr id="4" name="그룹 3"/>
+          <p:cNvGrpSpPr/>
+          <p:nvPr/>
+        </p:nvGrpSpPr>
+        <p:grpSpPr>
+          <a:xfrm>
+            <a:off x="53440" y="47501"/>
+            <a:ext cx="2820390" cy="469076"/>
+            <a:chOff x="53440" y="47501"/>
+            <a:chExt cx="2820390" cy="469076"/>
+          </a:xfrm>
+        </p:grpSpPr>
+        <p:sp>
+          <p:nvSpPr>
+            <p:cNvPr id="5" name="직사각형 4"/>
+            <p:cNvSpPr/>
+            <p:nvPr/>
+          </p:nvSpPr>
+          <p:spPr>
+            <a:xfrm>
+              <a:off x="53440" y="47501"/>
+              <a:ext cx="2820390" cy="469076"/>
+            </a:xfrm>
+            <a:prstGeom prst="rect">
+              <a:avLst/>
+            </a:prstGeom>
+            <a:noFill/>
+            <a:ln>
+              <a:noFill/>
+            </a:ln>
+          </p:spPr>
+          <p:style>
+            <a:lnRef idx="2">
+              <a:schemeClr val="accent1">
+                <a:shade val="50000"/>
+              </a:schemeClr>
+            </a:lnRef>
+            <a:fillRef idx="1">
+              <a:schemeClr val="accent1"/>
+            </a:fillRef>
+            <a:effectRef idx="0">
+              <a:schemeClr val="accent1"/>
+            </a:effectRef>
+            <a:fontRef idx="minor">
+              <a:schemeClr val="lt1"/>
+            </a:fontRef>
+          </p:style>
+          <p:txBody>
+            <a:bodyPr rtlCol="0" anchor="ctr"/>
+            <a:lstStyle/>
+            <a:p>
+              <a:pPr algn="ctr"/>
+              <a:r>
+                <a:rPr lang="ko-KR" altLang="en-US" sz="2000" b="1" dirty="0" smtClean="0">
+                  <a:solidFill>
+                    <a:schemeClr val="tx1"/>
+                  </a:solidFill>
+                </a:rPr>
+                <a:t>화면 흐름도</a:t>
+              </a:r>
+              <a:endParaRPr lang="en-US" altLang="ko-KR" sz="2000" b="1" dirty="0" smtClean="0">
+                <a:solidFill>
+                  <a:schemeClr val="tx1"/>
+                </a:solidFill>
+              </a:endParaRPr>
+            </a:p>
+          </p:txBody>
+        </p:sp>
+        <p:cxnSp>
+          <p:nvCxnSpPr>
+            <p:cNvPr id="6" name="직선 연결선 5"/>
+            <p:cNvCxnSpPr/>
+            <p:nvPr/>
+          </p:nvCxnSpPr>
+          <p:spPr>
+            <a:xfrm>
+              <a:off x="53440" y="516577"/>
+              <a:ext cx="2820390" cy="0"/>
+            </a:xfrm>
+            <a:prstGeom prst="line">
+              <a:avLst/>
+            </a:prstGeom>
+            <a:ln w="28575"/>
+          </p:spPr>
+          <p:style>
+            <a:lnRef idx="1">
+              <a:schemeClr val="accent1"/>
+            </a:lnRef>
+            <a:fillRef idx="0">
+              <a:schemeClr val="accent1"/>
+            </a:fillRef>
+            <a:effectRef idx="0">
+              <a:schemeClr val="accent1"/>
+            </a:effectRef>
+            <a:fontRef idx="minor">
+              <a:schemeClr val="tx1"/>
+            </a:fontRef>
+          </p:style>
+        </p:cxnSp>
+      </p:grpSp>
+      <p:grpSp>
+        <p:nvGrpSpPr>
+          <p:cNvPr id="3" name="그룹 2"/>
+          <p:cNvGrpSpPr/>
+          <p:nvPr/>
+        </p:nvGrpSpPr>
+        <p:grpSpPr>
+          <a:xfrm>
+            <a:off x="190005" y="3200399"/>
+            <a:ext cx="1591294" cy="1270660"/>
+            <a:chOff x="789709" y="1187532"/>
+            <a:chExt cx="1965366" cy="1347850"/>
+          </a:xfrm>
+        </p:grpSpPr>
+        <p:sp>
+          <p:nvSpPr>
+            <p:cNvPr id="2" name="직사각형 1"/>
+            <p:cNvSpPr/>
+            <p:nvPr/>
+          </p:nvSpPr>
+          <p:spPr>
+            <a:xfrm>
+              <a:off x="789709" y="1187532"/>
+              <a:ext cx="1965366" cy="979715"/>
+            </a:xfrm>
+            <a:prstGeom prst="rect">
+              <a:avLst/>
+            </a:prstGeom>
+          </p:spPr>
+          <p:style>
+            <a:lnRef idx="2">
+              <a:schemeClr val="accent1">
+                <a:shade val="50000"/>
+              </a:schemeClr>
+            </a:lnRef>
+            <a:fillRef idx="1">
+              <a:schemeClr val="accent1"/>
+            </a:fillRef>
+            <a:effectRef idx="0">
+              <a:schemeClr val="accent1"/>
+            </a:effectRef>
+            <a:fontRef idx="minor">
+              <a:schemeClr val="lt1"/>
+            </a:fontRef>
+          </p:style>
+          <p:txBody>
+            <a:bodyPr rtlCol="0" anchor="ctr"/>
+            <a:lstStyle/>
+            <a:p>
+              <a:pPr algn="ctr"/>
+              <a:endParaRPr lang="ko-KR" altLang="en-US"/>
+            </a:p>
+          </p:txBody>
+        </p:sp>
+        <p:sp>
+          <p:nvSpPr>
+            <p:cNvPr id="7" name="직사각형 6"/>
+            <p:cNvSpPr/>
+            <p:nvPr/>
+          </p:nvSpPr>
+          <p:spPr>
+            <a:xfrm>
+              <a:off x="789709" y="2167247"/>
+              <a:ext cx="1965366" cy="368135"/>
+            </a:xfrm>
+            <a:prstGeom prst="rect">
+              <a:avLst/>
+            </a:prstGeom>
+          </p:spPr>
+          <p:style>
+            <a:lnRef idx="2">
+              <a:schemeClr val="accent1">
+                <a:shade val="50000"/>
+              </a:schemeClr>
+            </a:lnRef>
+            <a:fillRef idx="1">
+              <a:schemeClr val="accent1"/>
+            </a:fillRef>
+            <a:effectRef idx="0">
+              <a:schemeClr val="accent1"/>
+            </a:effectRef>
+            <a:fontRef idx="minor">
+              <a:schemeClr val="lt1"/>
+            </a:fontRef>
+          </p:style>
+          <p:txBody>
+            <a:bodyPr rtlCol="0" anchor="ctr"/>
+            <a:lstStyle/>
+            <a:p>
+              <a:pPr algn="ctr"/>
+              <a:r>
+                <a:rPr lang="en-US" altLang="ko-KR" dirty="0" smtClean="0"/>
+                <a:t>index</a:t>
+              </a:r>
+              <a:endParaRPr lang="ko-KR" altLang="en-US" dirty="0"/>
+            </a:p>
+          </p:txBody>
+        </p:sp>
+      </p:grpSp>
+      <p:cxnSp>
+        <p:nvCxnSpPr>
+          <p:cNvPr id="10" name="꺾인 연결선 9"/>
+          <p:cNvCxnSpPr>
+            <a:stCxn id="2" idx="3"/>
+            <a:endCxn id="12" idx="1"/>
+          </p:cNvCxnSpPr>
+          <p:nvPr/>
+        </p:nvCxnSpPr>
+        <p:spPr>
+          <a:xfrm flipV="1">
+            <a:off x="1781299" y="704024"/>
+            <a:ext cx="1581343" cy="2958179"/>
+          </a:xfrm>
+          <a:prstGeom prst="bentConnector3">
+            <a:avLst>
+              <a:gd name="adj1" fmla="val 50000"/>
+            </a:avLst>
+          </a:prstGeom>
+          <a:ln>
+            <a:tailEnd type="triangle"/>
+          </a:ln>
+        </p:spPr>
+        <p:style>
+          <a:lnRef idx="1">
+            <a:schemeClr val="accent1"/>
+          </a:lnRef>
+          <a:fillRef idx="0">
+            <a:schemeClr val="accent1"/>
+          </a:fillRef>
+          <a:effectRef idx="0">
+            <a:schemeClr val="accent1"/>
+          </a:effectRef>
+          <a:fontRef idx="minor">
+            <a:schemeClr val="tx1"/>
+          </a:fontRef>
+        </p:style>
+      </p:cxnSp>
+      <p:grpSp>
+        <p:nvGrpSpPr>
+          <p:cNvPr id="11" name="그룹 10"/>
+          <p:cNvGrpSpPr/>
+          <p:nvPr/>
+        </p:nvGrpSpPr>
+        <p:grpSpPr>
+          <a:xfrm>
+            <a:off x="3362642" y="357064"/>
+            <a:ext cx="1195563" cy="954665"/>
+            <a:chOff x="789709" y="1187532"/>
+            <a:chExt cx="1965366" cy="1347850"/>
+          </a:xfrm>
+        </p:grpSpPr>
+        <p:sp>
+          <p:nvSpPr>
+            <p:cNvPr id="12" name="직사각형 11"/>
+            <p:cNvSpPr/>
+            <p:nvPr/>
+          </p:nvSpPr>
+          <p:spPr>
+            <a:xfrm>
+              <a:off x="789709" y="1187532"/>
+              <a:ext cx="1965366" cy="979715"/>
+            </a:xfrm>
+            <a:prstGeom prst="rect">
+              <a:avLst/>
+            </a:prstGeom>
+          </p:spPr>
+          <p:style>
+            <a:lnRef idx="2">
+              <a:schemeClr val="accent1">
+                <a:shade val="50000"/>
+              </a:schemeClr>
+            </a:lnRef>
+            <a:fillRef idx="1">
+              <a:schemeClr val="accent1"/>
+            </a:fillRef>
+            <a:effectRef idx="0">
+              <a:schemeClr val="accent1"/>
+            </a:effectRef>
+            <a:fontRef idx="minor">
+              <a:schemeClr val="lt1"/>
+            </a:fontRef>
+          </p:style>
+          <p:txBody>
+            <a:bodyPr rtlCol="0" anchor="ctr"/>
+            <a:lstStyle/>
+            <a:p>
+              <a:pPr algn="ctr"/>
+              <a:endParaRPr lang="ko-KR" altLang="en-US" sz="1400"/>
+            </a:p>
+          </p:txBody>
+        </p:sp>
+        <p:sp>
+          <p:nvSpPr>
+            <p:cNvPr id="13" name="직사각형 12"/>
+            <p:cNvSpPr/>
+            <p:nvPr/>
+          </p:nvSpPr>
+          <p:spPr>
+            <a:xfrm>
+              <a:off x="789709" y="2167247"/>
+              <a:ext cx="1965366" cy="368135"/>
+            </a:xfrm>
+            <a:prstGeom prst="rect">
+              <a:avLst/>
+            </a:prstGeom>
+          </p:spPr>
+          <p:style>
+            <a:lnRef idx="2">
+              <a:schemeClr val="accent1">
+                <a:shade val="50000"/>
+              </a:schemeClr>
+            </a:lnRef>
+            <a:fillRef idx="1">
+              <a:schemeClr val="accent1"/>
+            </a:fillRef>
+            <a:effectRef idx="0">
+              <a:schemeClr val="accent1"/>
+            </a:effectRef>
+            <a:fontRef idx="minor">
+              <a:schemeClr val="lt1"/>
+            </a:fontRef>
+          </p:style>
+          <p:txBody>
+            <a:bodyPr rtlCol="0" anchor="ctr"/>
+            <a:lstStyle/>
+            <a:p>
+              <a:pPr algn="ctr"/>
+              <a:r>
+                <a:rPr lang="en-US" altLang="ko-KR" sz="1400" dirty="0" smtClean="0"/>
+                <a:t>Category~</a:t>
+              </a:r>
+              <a:endParaRPr lang="ko-KR" altLang="en-US" sz="1400" dirty="0"/>
+            </a:p>
+          </p:txBody>
+        </p:sp>
+      </p:grpSp>
+      <p:grpSp>
+        <p:nvGrpSpPr>
+          <p:cNvPr id="14" name="그룹 13"/>
+          <p:cNvGrpSpPr/>
+          <p:nvPr/>
+        </p:nvGrpSpPr>
+        <p:grpSpPr>
+          <a:xfrm>
+            <a:off x="2553196" y="5128160"/>
+            <a:ext cx="1591294" cy="1270660"/>
+            <a:chOff x="789709" y="1187532"/>
+            <a:chExt cx="1965366" cy="1347850"/>
+          </a:xfrm>
+        </p:grpSpPr>
+        <p:sp>
+          <p:nvSpPr>
+            <p:cNvPr id="15" name="직사각형 14"/>
+            <p:cNvSpPr/>
+            <p:nvPr/>
+          </p:nvSpPr>
+          <p:spPr>
+            <a:xfrm>
+              <a:off x="789709" y="1187532"/>
+              <a:ext cx="1965366" cy="979715"/>
+            </a:xfrm>
+            <a:prstGeom prst="rect">
+              <a:avLst/>
+            </a:prstGeom>
+          </p:spPr>
+          <p:style>
+            <a:lnRef idx="2">
+              <a:schemeClr val="accent1">
+                <a:shade val="50000"/>
+              </a:schemeClr>
+            </a:lnRef>
+            <a:fillRef idx="1">
+              <a:schemeClr val="accent1"/>
+            </a:fillRef>
+            <a:effectRef idx="0">
+              <a:schemeClr val="accent1"/>
+            </a:effectRef>
+            <a:fontRef idx="minor">
+              <a:schemeClr val="lt1"/>
+            </a:fontRef>
+          </p:style>
+          <p:txBody>
+            <a:bodyPr rtlCol="0" anchor="ctr"/>
+            <a:lstStyle/>
+            <a:p>
+              <a:pPr algn="ctr"/>
+              <a:endParaRPr lang="ko-KR" altLang="en-US"/>
+            </a:p>
+          </p:txBody>
+        </p:sp>
+        <p:sp>
+          <p:nvSpPr>
+            <p:cNvPr id="16" name="직사각형 15"/>
+            <p:cNvSpPr/>
+            <p:nvPr/>
+          </p:nvSpPr>
+          <p:spPr>
+            <a:xfrm>
+              <a:off x="789709" y="2167247"/>
+              <a:ext cx="1965366" cy="368135"/>
+            </a:xfrm>
+            <a:prstGeom prst="rect">
+              <a:avLst/>
+            </a:prstGeom>
+          </p:spPr>
+          <p:style>
+            <a:lnRef idx="2">
+              <a:schemeClr val="accent1">
+                <a:shade val="50000"/>
+              </a:schemeClr>
+            </a:lnRef>
+            <a:fillRef idx="1">
+              <a:schemeClr val="accent1"/>
+            </a:fillRef>
+            <a:effectRef idx="0">
+              <a:schemeClr val="accent1"/>
+            </a:effectRef>
+            <a:fontRef idx="minor">
+              <a:schemeClr val="lt1"/>
+            </a:fontRef>
+          </p:style>
+          <p:txBody>
+            <a:bodyPr rtlCol="0" anchor="ctr"/>
+            <a:lstStyle/>
+            <a:p>
+              <a:pPr algn="ctr"/>
+              <a:r>
+                <a:rPr lang="en-US" altLang="ko-KR" dirty="0" err="1" smtClean="0"/>
+                <a:t>mypage</a:t>
+              </a:r>
+              <a:endParaRPr lang="ko-KR" altLang="en-US" dirty="0"/>
+            </a:p>
+          </p:txBody>
+        </p:sp>
+      </p:grpSp>
+      <p:grpSp>
+        <p:nvGrpSpPr>
+          <p:cNvPr id="17" name="그룹 16"/>
+          <p:cNvGrpSpPr/>
+          <p:nvPr/>
+        </p:nvGrpSpPr>
+        <p:grpSpPr>
+          <a:xfrm>
+            <a:off x="3362642" y="1401102"/>
+            <a:ext cx="1195563" cy="954665"/>
+            <a:chOff x="789709" y="1187532"/>
+            <a:chExt cx="1965366" cy="1347850"/>
+          </a:xfrm>
+        </p:grpSpPr>
+        <p:sp>
+          <p:nvSpPr>
+            <p:cNvPr id="18" name="직사각형 17"/>
+            <p:cNvSpPr/>
+            <p:nvPr/>
+          </p:nvSpPr>
+          <p:spPr>
+            <a:xfrm>
+              <a:off x="789709" y="1187532"/>
+              <a:ext cx="1965366" cy="979715"/>
+            </a:xfrm>
+            <a:prstGeom prst="rect">
+              <a:avLst/>
+            </a:prstGeom>
+          </p:spPr>
+          <p:style>
+            <a:lnRef idx="2">
+              <a:schemeClr val="accent1">
+                <a:shade val="50000"/>
+              </a:schemeClr>
+            </a:lnRef>
+            <a:fillRef idx="1">
+              <a:schemeClr val="accent1"/>
+            </a:fillRef>
+            <a:effectRef idx="0">
+              <a:schemeClr val="accent1"/>
+            </a:effectRef>
+            <a:fontRef idx="minor">
+              <a:schemeClr val="lt1"/>
+            </a:fontRef>
+          </p:style>
+          <p:txBody>
+            <a:bodyPr rtlCol="0" anchor="ctr"/>
+            <a:lstStyle/>
+            <a:p>
+              <a:pPr algn="ctr"/>
+              <a:endParaRPr lang="ko-KR" altLang="en-US" sz="1400"/>
+            </a:p>
+          </p:txBody>
+        </p:sp>
+        <p:sp>
+          <p:nvSpPr>
+            <p:cNvPr id="19" name="직사각형 18"/>
+            <p:cNvSpPr/>
+            <p:nvPr/>
+          </p:nvSpPr>
+          <p:spPr>
+            <a:xfrm>
+              <a:off x="789709" y="2167247"/>
+              <a:ext cx="1965366" cy="368135"/>
+            </a:xfrm>
+            <a:prstGeom prst="rect">
+              <a:avLst/>
+            </a:prstGeom>
+          </p:spPr>
+          <p:style>
+            <a:lnRef idx="2">
+              <a:schemeClr val="accent1">
+                <a:shade val="50000"/>
+              </a:schemeClr>
+            </a:lnRef>
+            <a:fillRef idx="1">
+              <a:schemeClr val="accent1"/>
+            </a:fillRef>
+            <a:effectRef idx="0">
+              <a:schemeClr val="accent1"/>
+            </a:effectRef>
+            <a:fontRef idx="minor">
+              <a:schemeClr val="lt1"/>
+            </a:fontRef>
+          </p:style>
+          <p:txBody>
+            <a:bodyPr rtlCol="0" anchor="ctr"/>
+            <a:lstStyle/>
+            <a:p>
+              <a:pPr algn="ctr"/>
+              <a:r>
+                <a:rPr lang="en-US" altLang="ko-KR" sz="1400" dirty="0" smtClean="0"/>
+                <a:t>Category~</a:t>
+              </a:r>
+              <a:endParaRPr lang="ko-KR" altLang="en-US" sz="1400" dirty="0"/>
+            </a:p>
+          </p:txBody>
+        </p:sp>
+      </p:grpSp>
+      <p:grpSp>
+        <p:nvGrpSpPr>
+          <p:cNvPr id="20" name="그룹 19"/>
+          <p:cNvGrpSpPr/>
+          <p:nvPr/>
+        </p:nvGrpSpPr>
+        <p:grpSpPr>
+          <a:xfrm>
+            <a:off x="3362641" y="2423678"/>
+            <a:ext cx="1195563" cy="954665"/>
+            <a:chOff x="789709" y="1187532"/>
+            <a:chExt cx="1965366" cy="1347850"/>
+          </a:xfrm>
+        </p:grpSpPr>
+        <p:sp>
+          <p:nvSpPr>
+            <p:cNvPr id="21" name="직사각형 20"/>
+            <p:cNvSpPr/>
+            <p:nvPr/>
+          </p:nvSpPr>
+          <p:spPr>
+            <a:xfrm>
+              <a:off x="789709" y="1187532"/>
+              <a:ext cx="1965366" cy="979715"/>
+            </a:xfrm>
+            <a:prstGeom prst="rect">
+              <a:avLst/>
+            </a:prstGeom>
+          </p:spPr>
+          <p:style>
+            <a:lnRef idx="2">
+              <a:schemeClr val="accent1">
+                <a:shade val="50000"/>
+              </a:schemeClr>
+            </a:lnRef>
+            <a:fillRef idx="1">
+              <a:schemeClr val="accent1"/>
+            </a:fillRef>
+            <a:effectRef idx="0">
+              <a:schemeClr val="accent1"/>
+            </a:effectRef>
+            <a:fontRef idx="minor">
+              <a:schemeClr val="lt1"/>
+            </a:fontRef>
+          </p:style>
+          <p:txBody>
+            <a:bodyPr rtlCol="0" anchor="ctr"/>
+            <a:lstStyle/>
+            <a:p>
+              <a:pPr algn="ctr"/>
+              <a:endParaRPr lang="ko-KR" altLang="en-US" sz="1400"/>
+            </a:p>
+          </p:txBody>
+        </p:sp>
+        <p:sp>
+          <p:nvSpPr>
+            <p:cNvPr id="22" name="직사각형 21"/>
+            <p:cNvSpPr/>
+            <p:nvPr/>
+          </p:nvSpPr>
+          <p:spPr>
+            <a:xfrm>
+              <a:off x="789709" y="2167247"/>
+              <a:ext cx="1965366" cy="368135"/>
+            </a:xfrm>
+            <a:prstGeom prst="rect">
+              <a:avLst/>
+            </a:prstGeom>
+          </p:spPr>
+          <p:style>
+            <a:lnRef idx="2">
+              <a:schemeClr val="accent1">
+                <a:shade val="50000"/>
+              </a:schemeClr>
+            </a:lnRef>
+            <a:fillRef idx="1">
+              <a:schemeClr val="accent1"/>
+            </a:fillRef>
+            <a:effectRef idx="0">
+              <a:schemeClr val="accent1"/>
+            </a:effectRef>
+            <a:fontRef idx="minor">
+              <a:schemeClr val="lt1"/>
+            </a:fontRef>
+          </p:style>
+          <p:txBody>
+            <a:bodyPr rtlCol="0" anchor="ctr"/>
+            <a:lstStyle/>
+            <a:p>
+              <a:pPr algn="ctr"/>
+              <a:r>
+                <a:rPr lang="en-US" altLang="ko-KR" sz="1400" dirty="0" smtClean="0"/>
+                <a:t>Category~</a:t>
+              </a:r>
+              <a:endParaRPr lang="ko-KR" altLang="en-US" sz="1400" dirty="0"/>
+            </a:p>
+          </p:txBody>
+        </p:sp>
+      </p:grpSp>
+      <p:sp>
+        <p:nvSpPr>
+          <p:cNvPr id="8" name="순서도: 연결자 7"/>
+          <p:cNvSpPr/>
+          <p:nvPr/>
+        </p:nvSpPr>
+        <p:spPr>
+          <a:xfrm>
+            <a:off x="3899483" y="3475284"/>
+            <a:ext cx="121878" cy="127363"/>
+          </a:xfrm>
+          <a:prstGeom prst="flowChartConnector">
+            <a:avLst/>
+          </a:prstGeom>
+        </p:spPr>
+        <p:style>
+          <a:lnRef idx="2">
+            <a:schemeClr val="accent1">
+              <a:shade val="50000"/>
+            </a:schemeClr>
+          </a:lnRef>
+          <a:fillRef idx="1">
+            <a:schemeClr val="accent1"/>
+          </a:fillRef>
+          <a:effectRef idx="0">
+            <a:schemeClr val="accent1"/>
+          </a:effectRef>
+          <a:fontRef idx="minor">
+            <a:schemeClr val="lt1"/>
+          </a:fontRef>
+        </p:style>
+        <p:txBody>
+          <a:bodyPr rtlCol="0" anchor="ctr"/>
+          <a:lstStyle/>
+          <a:p>
+            <a:pPr algn="ctr"/>
+            <a:endParaRPr lang="ko-KR" altLang="en-US"/>
+          </a:p>
+        </p:txBody>
+      </p:sp>
+      <p:sp>
+        <p:nvSpPr>
+          <p:cNvPr id="24" name="순서도: 연결자 23"/>
+          <p:cNvSpPr/>
+          <p:nvPr/>
+        </p:nvSpPr>
+        <p:spPr>
+          <a:xfrm>
+            <a:off x="3899483" y="3692316"/>
+            <a:ext cx="121878" cy="127363"/>
+          </a:xfrm>
+          <a:prstGeom prst="flowChartConnector">
+            <a:avLst/>
+          </a:prstGeom>
+        </p:spPr>
+        <p:style>
+          <a:lnRef idx="2">
+            <a:schemeClr val="accent1">
+              <a:shade val="50000"/>
+            </a:schemeClr>
+          </a:lnRef>
+          <a:fillRef idx="1">
+            <a:schemeClr val="accent1"/>
+          </a:fillRef>
+          <a:effectRef idx="0">
+            <a:schemeClr val="accent1"/>
+          </a:effectRef>
+          <a:fontRef idx="minor">
+            <a:schemeClr val="lt1"/>
+          </a:fontRef>
+        </p:style>
+        <p:txBody>
+          <a:bodyPr rtlCol="0" anchor="ctr"/>
+          <a:lstStyle/>
+          <a:p>
+            <a:pPr algn="ctr"/>
+            <a:endParaRPr lang="ko-KR" altLang="en-US"/>
+          </a:p>
+        </p:txBody>
+      </p:sp>
+      <p:sp>
+        <p:nvSpPr>
+          <p:cNvPr id="25" name="순서도: 연결자 24"/>
+          <p:cNvSpPr/>
+          <p:nvPr/>
+        </p:nvSpPr>
+        <p:spPr>
+          <a:xfrm>
+            <a:off x="3899483" y="3917650"/>
+            <a:ext cx="121878" cy="127363"/>
+          </a:xfrm>
+          <a:prstGeom prst="flowChartConnector">
+            <a:avLst/>
+          </a:prstGeom>
+        </p:spPr>
+        <p:style>
+          <a:lnRef idx="2">
+            <a:schemeClr val="accent1">
+              <a:shade val="50000"/>
+            </a:schemeClr>
+          </a:lnRef>
+          <a:fillRef idx="1">
+            <a:schemeClr val="accent1"/>
+          </a:fillRef>
+          <a:effectRef idx="0">
+            <a:schemeClr val="accent1"/>
+          </a:effectRef>
+          <a:fontRef idx="minor">
+            <a:schemeClr val="lt1"/>
+          </a:fontRef>
+        </p:style>
+        <p:txBody>
+          <a:bodyPr rtlCol="0" anchor="ctr"/>
+          <a:lstStyle/>
+          <a:p>
+            <a:pPr algn="ctr"/>
+            <a:endParaRPr lang="ko-KR" altLang="en-US"/>
+          </a:p>
+        </p:txBody>
+      </p:sp>
+    </p:spTree>
+    <p:extLst>
+      <p:ext uri="{BB962C8B-B14F-4D97-AF65-F5344CB8AC3E}">
+        <p14:creationId xmlns:p14="http://schemas.microsoft.com/office/powerpoint/2010/main" val="2293451313"/>
+      </p:ext>
+    </p:extLst>
+  </p:cSld>
+  <p:clrMapOvr>
+    <a:masterClrMapping/>
+  </p:clrMapOvr>
+</p:sld>
+</file>
+
+<file path=ppt/slides/slide5.xml><?xml version="1.0" encoding="utf-8"?>
 <p:sld xmlns:a="http://schemas.openxmlformats.org/drawingml/2006/main" xmlns:r="http://schemas.openxmlformats.org/officeDocument/2006/relationships" xmlns:p="http://schemas.openxmlformats.org/presentationml/2006/main">
   <p:cSld>
     <p:spTree>
@@ -3663,7 +4740,7 @@
                     <a:schemeClr val="tx1"/>
                   </a:solidFill>
                 </a:rPr>
-                <a:t>Main</a:t>
+                <a:t>index</a:t>
               </a:r>
             </a:p>
           </p:txBody>
@@ -4057,11 +5134,7 @@
             <a:pPr algn="ctr"/>
             <a:r>
               <a:rPr lang="ko-KR" altLang="en-US" sz="1600" dirty="0" smtClean="0"/>
-              <a:t>기본으로 추천 </a:t>
-            </a:r>
-            <a:r>
-              <a:rPr lang="ko-KR" altLang="en-US" sz="1600" dirty="0" smtClean="0"/>
-              <a:t>사이트</a:t>
+              <a:t>기본으로 추천 사이트</a:t>
             </a:r>
             <a:r>
               <a:rPr lang="en-US" altLang="ko-KR" sz="1600" dirty="0" smtClean="0"/>
@@ -4081,11 +5154,7 @@
             </a:r>
             <a:r>
               <a:rPr lang="ko-KR" altLang="en-US" sz="1600" dirty="0" smtClean="0"/>
-              <a:t> </a:t>
-            </a:r>
-            <a:r>
-              <a:rPr lang="ko-KR" altLang="en-US" sz="1600" dirty="0" smtClean="0"/>
-              <a:t>뜨고</a:t>
+              <a:t> 뜨고</a:t>
             </a:r>
             <a:endParaRPr lang="en-US" altLang="ko-KR" sz="1600" dirty="0" smtClean="0"/>
           </a:p>
@@ -4455,6 +5524,1075 @@
     <p:extLst>
       <p:ext uri="{BB962C8B-B14F-4D97-AF65-F5344CB8AC3E}">
         <p14:creationId xmlns:p14="http://schemas.microsoft.com/office/powerpoint/2010/main" val="1717136310"/>
+      </p:ext>
+    </p:extLst>
+  </p:cSld>
+  <p:clrMapOvr>
+    <a:masterClrMapping/>
+  </p:clrMapOvr>
+</p:sld>
+</file>
+
+<file path=ppt/slides/slide6.xml><?xml version="1.0" encoding="utf-8"?>
+<p:sld xmlns:a="http://schemas.openxmlformats.org/drawingml/2006/main" xmlns:r="http://schemas.openxmlformats.org/officeDocument/2006/relationships" xmlns:p="http://schemas.openxmlformats.org/presentationml/2006/main">
+  <p:cSld>
+    <p:spTree>
+      <p:nvGrpSpPr>
+        <p:cNvPr id="1" name=""/>
+        <p:cNvGrpSpPr/>
+        <p:nvPr/>
+      </p:nvGrpSpPr>
+      <p:grpSpPr>
+        <a:xfrm>
+          <a:off x="0" y="0"/>
+          <a:ext cx="0" cy="0"/>
+          <a:chOff x="0" y="0"/>
+          <a:chExt cx="0" cy="0"/>
+        </a:xfrm>
+      </p:grpSpPr>
+      <p:grpSp>
+        <p:nvGrpSpPr>
+          <p:cNvPr id="16" name="그룹 15"/>
+          <p:cNvGrpSpPr/>
+          <p:nvPr/>
+        </p:nvGrpSpPr>
+        <p:grpSpPr>
+          <a:xfrm>
+            <a:off x="53440" y="47501"/>
+            <a:ext cx="2820390" cy="469076"/>
+            <a:chOff x="53440" y="47501"/>
+            <a:chExt cx="2820390" cy="469076"/>
+          </a:xfrm>
+        </p:grpSpPr>
+        <p:sp>
+          <p:nvSpPr>
+            <p:cNvPr id="5" name="직사각형 4"/>
+            <p:cNvSpPr/>
+            <p:nvPr/>
+          </p:nvSpPr>
+          <p:spPr>
+            <a:xfrm>
+              <a:off x="53440" y="47501"/>
+              <a:ext cx="2820390" cy="469076"/>
+            </a:xfrm>
+            <a:prstGeom prst="rect">
+              <a:avLst/>
+            </a:prstGeom>
+            <a:noFill/>
+            <a:ln>
+              <a:noFill/>
+            </a:ln>
+          </p:spPr>
+          <p:style>
+            <a:lnRef idx="2">
+              <a:schemeClr val="accent1">
+                <a:shade val="50000"/>
+              </a:schemeClr>
+            </a:lnRef>
+            <a:fillRef idx="1">
+              <a:schemeClr val="accent1"/>
+            </a:fillRef>
+            <a:effectRef idx="0">
+              <a:schemeClr val="accent1"/>
+            </a:effectRef>
+            <a:fontRef idx="minor">
+              <a:schemeClr val="lt1"/>
+            </a:fontRef>
+          </p:style>
+          <p:txBody>
+            <a:bodyPr rtlCol="0" anchor="ctr"/>
+            <a:lstStyle/>
+            <a:p>
+              <a:pPr algn="ctr"/>
+              <a:r>
+                <a:rPr lang="en-US" altLang="ko-KR" sz="2000" b="1" dirty="0" smtClean="0">
+                  <a:solidFill>
+                    <a:schemeClr val="tx1"/>
+                  </a:solidFill>
+                </a:rPr>
+                <a:t>Category~</a:t>
+              </a:r>
+              <a:endParaRPr lang="en-US" altLang="ko-KR" sz="2000" b="1" dirty="0" smtClean="0">
+                <a:solidFill>
+                  <a:schemeClr val="tx1"/>
+                </a:solidFill>
+              </a:endParaRPr>
+            </a:p>
+          </p:txBody>
+        </p:sp>
+        <p:cxnSp>
+          <p:nvCxnSpPr>
+            <p:cNvPr id="7" name="직선 연결선 6"/>
+            <p:cNvCxnSpPr/>
+            <p:nvPr/>
+          </p:nvCxnSpPr>
+          <p:spPr>
+            <a:xfrm>
+              <a:off x="53440" y="516577"/>
+              <a:ext cx="2820390" cy="0"/>
+            </a:xfrm>
+            <a:prstGeom prst="line">
+              <a:avLst/>
+            </a:prstGeom>
+            <a:ln w="28575"/>
+          </p:spPr>
+          <p:style>
+            <a:lnRef idx="1">
+              <a:schemeClr val="accent1"/>
+            </a:lnRef>
+            <a:fillRef idx="0">
+              <a:schemeClr val="accent1"/>
+            </a:fillRef>
+            <a:effectRef idx="0">
+              <a:schemeClr val="accent1"/>
+            </a:effectRef>
+            <a:fontRef idx="minor">
+              <a:schemeClr val="tx1"/>
+            </a:fontRef>
+          </p:style>
+        </p:cxnSp>
+      </p:grpSp>
+      <p:sp>
+        <p:nvSpPr>
+          <p:cNvPr id="8" name="직사각형 7"/>
+          <p:cNvSpPr/>
+          <p:nvPr/>
+        </p:nvSpPr>
+        <p:spPr>
+          <a:xfrm>
+            <a:off x="119578" y="951756"/>
+            <a:ext cx="1920638" cy="5810994"/>
+          </a:xfrm>
+          <a:prstGeom prst="rect">
+            <a:avLst/>
+          </a:prstGeom>
+          <a:solidFill>
+            <a:schemeClr val="bg1">
+              <a:lumMod val="95000"/>
+            </a:schemeClr>
+          </a:solidFill>
+          <a:ln>
+            <a:noFill/>
+          </a:ln>
+        </p:spPr>
+        <p:style>
+          <a:lnRef idx="2">
+            <a:schemeClr val="accent1">
+              <a:shade val="50000"/>
+            </a:schemeClr>
+          </a:lnRef>
+          <a:fillRef idx="1">
+            <a:schemeClr val="accent1"/>
+          </a:fillRef>
+          <a:effectRef idx="0">
+            <a:schemeClr val="accent1"/>
+          </a:effectRef>
+          <a:fontRef idx="minor">
+            <a:schemeClr val="lt1"/>
+          </a:fontRef>
+        </p:style>
+        <p:txBody>
+          <a:bodyPr rtlCol="0" anchor="t"/>
+          <a:lstStyle/>
+          <a:p>
+            <a:r>
+              <a:rPr lang="ko-KR" altLang="en-US" sz="1400" dirty="0" smtClean="0">
+                <a:solidFill>
+                  <a:schemeClr val="tx1"/>
+                </a:solidFill>
+              </a:rPr>
+              <a:t>주요 </a:t>
+            </a:r>
+            <a:r>
+              <a:rPr lang="ko-KR" altLang="en-US" sz="1400" dirty="0" smtClean="0">
+                <a:solidFill>
+                  <a:schemeClr val="tx1"/>
+                </a:solidFill>
+              </a:rPr>
+              <a:t>기능</a:t>
+            </a:r>
+            <a:endParaRPr lang="en-US" altLang="ko-KR" sz="1400" dirty="0" smtClean="0">
+              <a:solidFill>
+                <a:schemeClr val="tx1"/>
+              </a:solidFill>
+            </a:endParaRPr>
+          </a:p>
+          <a:p>
+            <a:endParaRPr lang="ko-KR" altLang="en-US" sz="1400" dirty="0">
+              <a:solidFill>
+                <a:schemeClr val="tx1"/>
+              </a:solidFill>
+            </a:endParaRPr>
+          </a:p>
+        </p:txBody>
+      </p:sp>
+      <p:sp>
+        <p:nvSpPr>
+          <p:cNvPr id="4" name="직사각형 3"/>
+          <p:cNvSpPr>
+            <a:spLocks noChangeAspect="1"/>
+          </p:cNvSpPr>
+          <p:nvPr/>
+        </p:nvSpPr>
+        <p:spPr>
+          <a:xfrm>
+            <a:off x="2241319" y="1260742"/>
+            <a:ext cx="9950681" cy="5597258"/>
+          </a:xfrm>
+          <a:prstGeom prst="rect">
+            <a:avLst/>
+          </a:prstGeom>
+          <a:noFill/>
+          <a:ln w="19050"/>
+        </p:spPr>
+        <p:style>
+          <a:lnRef idx="2">
+            <a:schemeClr val="accent1">
+              <a:shade val="50000"/>
+            </a:schemeClr>
+          </a:lnRef>
+          <a:fillRef idx="1">
+            <a:schemeClr val="accent1"/>
+          </a:fillRef>
+          <a:effectRef idx="0">
+            <a:schemeClr val="accent1"/>
+          </a:effectRef>
+          <a:fontRef idx="minor">
+            <a:schemeClr val="lt1"/>
+          </a:fontRef>
+        </p:style>
+        <p:txBody>
+          <a:bodyPr rtlCol="0" anchor="ctr"/>
+          <a:lstStyle/>
+          <a:p>
+            <a:pPr algn="ctr"/>
+            <a:endParaRPr lang="ko-KR" altLang="en-US"/>
+          </a:p>
+        </p:txBody>
+      </p:sp>
+      <p:sp>
+        <p:nvSpPr>
+          <p:cNvPr id="9" name="모서리가 둥근 직사각형 8"/>
+          <p:cNvSpPr/>
+          <p:nvPr/>
+        </p:nvSpPr>
+        <p:spPr>
+          <a:xfrm>
+            <a:off x="2241319" y="1275048"/>
+            <a:ext cx="9950681" cy="543685"/>
+          </a:xfrm>
+          <a:prstGeom prst="roundRect">
+            <a:avLst/>
+          </a:prstGeom>
+        </p:spPr>
+        <p:style>
+          <a:lnRef idx="2">
+            <a:schemeClr val="accent1">
+              <a:shade val="50000"/>
+            </a:schemeClr>
+          </a:lnRef>
+          <a:fillRef idx="1">
+            <a:schemeClr val="accent1"/>
+          </a:fillRef>
+          <a:effectRef idx="0">
+            <a:schemeClr val="accent1"/>
+          </a:effectRef>
+          <a:fontRef idx="minor">
+            <a:schemeClr val="lt1"/>
+          </a:fontRef>
+        </p:style>
+        <p:txBody>
+          <a:bodyPr rtlCol="0" anchor="ctr"/>
+          <a:lstStyle/>
+          <a:p>
+            <a:pPr algn="ctr"/>
+            <a:r>
+              <a:rPr lang="ko-KR" altLang="en-US" sz="1600" dirty="0" smtClean="0"/>
+              <a:t>헤더</a:t>
+            </a:r>
+            <a:endParaRPr lang="en-US" altLang="ko-KR" sz="1600" dirty="0" smtClean="0"/>
+          </a:p>
+        </p:txBody>
+      </p:sp>
+      <p:sp>
+        <p:nvSpPr>
+          <p:cNvPr id="10" name="모서리가 둥근 직사각형 9"/>
+          <p:cNvSpPr/>
+          <p:nvPr/>
+        </p:nvSpPr>
+        <p:spPr>
+          <a:xfrm>
+            <a:off x="2442420" y="1399578"/>
+            <a:ext cx="930453" cy="318922"/>
+          </a:xfrm>
+          <a:prstGeom prst="roundRect">
+            <a:avLst/>
+          </a:prstGeom>
+        </p:spPr>
+        <p:style>
+          <a:lnRef idx="2">
+            <a:schemeClr val="accent1">
+              <a:shade val="50000"/>
+            </a:schemeClr>
+          </a:lnRef>
+          <a:fillRef idx="1">
+            <a:schemeClr val="accent1"/>
+          </a:fillRef>
+          <a:effectRef idx="0">
+            <a:schemeClr val="accent1"/>
+          </a:effectRef>
+          <a:fontRef idx="minor">
+            <a:schemeClr val="lt1"/>
+          </a:fontRef>
+        </p:style>
+        <p:txBody>
+          <a:bodyPr rtlCol="0" anchor="ctr"/>
+          <a:lstStyle/>
+          <a:p>
+            <a:pPr algn="ctr"/>
+            <a:r>
+              <a:rPr lang="ko-KR" altLang="en-US" sz="1600" smtClean="0"/>
+              <a:t>로고</a:t>
+            </a:r>
+            <a:endParaRPr lang="ko-KR" altLang="en-US" sz="1600"/>
+          </a:p>
+        </p:txBody>
+      </p:sp>
+      <p:sp>
+        <p:nvSpPr>
+          <p:cNvPr id="11" name="모서리가 둥근 직사각형 10"/>
+          <p:cNvSpPr/>
+          <p:nvPr/>
+        </p:nvSpPr>
+        <p:spPr>
+          <a:xfrm>
+            <a:off x="2241318" y="1833038"/>
+            <a:ext cx="9950682" cy="1224857"/>
+          </a:xfrm>
+          <a:prstGeom prst="roundRect">
+            <a:avLst/>
+          </a:prstGeom>
+        </p:spPr>
+        <p:style>
+          <a:lnRef idx="2">
+            <a:schemeClr val="accent1">
+              <a:shade val="50000"/>
+            </a:schemeClr>
+          </a:lnRef>
+          <a:fillRef idx="1">
+            <a:schemeClr val="accent1"/>
+          </a:fillRef>
+          <a:effectRef idx="0">
+            <a:schemeClr val="accent1"/>
+          </a:effectRef>
+          <a:fontRef idx="minor">
+            <a:schemeClr val="lt1"/>
+          </a:fontRef>
+        </p:style>
+        <p:txBody>
+          <a:bodyPr rtlCol="0" anchor="ctr"/>
+          <a:lstStyle/>
+          <a:p>
+            <a:pPr algn="ctr"/>
+            <a:r>
+              <a:rPr lang="ko-KR" altLang="en-US" sz="1600" dirty="0" smtClean="0"/>
+              <a:t>네비게이션 </a:t>
+            </a:r>
+            <a:r>
+              <a:rPr lang="en-US" altLang="ko-KR" sz="1600" dirty="0" smtClean="0"/>
+              <a:t>(</a:t>
+            </a:r>
+            <a:r>
+              <a:rPr lang="ko-KR" altLang="en-US" sz="1600" dirty="0" smtClean="0"/>
+              <a:t>사이트 이동 방향</a:t>
+            </a:r>
+            <a:r>
+              <a:rPr lang="en-US" altLang="ko-KR" sz="1600" dirty="0" smtClean="0"/>
+              <a:t>) : </a:t>
+            </a:r>
+            <a:r>
+              <a:rPr lang="ko-KR" altLang="en-US" sz="1600" dirty="0" smtClean="0"/>
+              <a:t>카테고리 표시 모바일도 가능하게 왼쪽에 확장 버튼 만들어서 누르면</a:t>
+            </a:r>
+            <a:endParaRPr lang="en-US" altLang="ko-KR" sz="1600" dirty="0" smtClean="0"/>
+          </a:p>
+          <a:p>
+            <a:pPr algn="ctr"/>
+            <a:r>
+              <a:rPr lang="ko-KR" altLang="en-US" sz="1600" dirty="0" smtClean="0"/>
+              <a:t>아래로 네비게이션 </a:t>
+            </a:r>
+            <a:r>
+              <a:rPr lang="ko-KR" altLang="en-US" sz="1600" dirty="0" smtClean="0"/>
+              <a:t>확장하자</a:t>
+            </a:r>
+            <a:endParaRPr lang="en-US" altLang="ko-KR" sz="1600" dirty="0" smtClean="0"/>
+          </a:p>
+          <a:p>
+            <a:pPr algn="ctr"/>
+            <a:r>
+              <a:rPr lang="ko-KR" altLang="en-US" sz="1600" dirty="0" smtClean="0"/>
+              <a:t>선택한 카테고리 표시 </a:t>
+            </a:r>
+            <a:r>
+              <a:rPr lang="en-US" altLang="ko-KR" sz="1600" dirty="0" smtClean="0"/>
+              <a:t>+ </a:t>
+            </a:r>
+            <a:r>
+              <a:rPr lang="ko-KR" altLang="en-US" sz="1600" dirty="0" smtClean="0"/>
+              <a:t>확장해주고</a:t>
+            </a:r>
+            <a:endParaRPr lang="ko-KR" altLang="en-US" sz="1600" dirty="0"/>
+          </a:p>
+        </p:txBody>
+      </p:sp>
+      <p:sp>
+        <p:nvSpPr>
+          <p:cNvPr id="12" name="모서리가 둥근 직사각형 11"/>
+          <p:cNvSpPr/>
+          <p:nvPr/>
+        </p:nvSpPr>
+        <p:spPr>
+          <a:xfrm>
+            <a:off x="8487256" y="1375281"/>
+            <a:ext cx="3192779" cy="343220"/>
+          </a:xfrm>
+          <a:prstGeom prst="roundRect">
+            <a:avLst/>
+          </a:prstGeom>
+        </p:spPr>
+        <p:style>
+          <a:lnRef idx="2">
+            <a:schemeClr val="accent1">
+              <a:shade val="50000"/>
+            </a:schemeClr>
+          </a:lnRef>
+          <a:fillRef idx="1">
+            <a:schemeClr val="accent1"/>
+          </a:fillRef>
+          <a:effectRef idx="0">
+            <a:schemeClr val="accent1"/>
+          </a:effectRef>
+          <a:fontRef idx="minor">
+            <a:schemeClr val="lt1"/>
+          </a:fontRef>
+        </p:style>
+        <p:txBody>
+          <a:bodyPr rtlCol="0" anchor="ctr"/>
+          <a:lstStyle/>
+          <a:p>
+            <a:pPr algn="ctr"/>
+            <a:r>
+              <a:rPr lang="ko-KR" altLang="en-US" sz="1600" dirty="0" smtClean="0"/>
+              <a:t>로그인 및 페이지 기본 기능</a:t>
+            </a:r>
+            <a:endParaRPr lang="ko-KR" altLang="en-US" sz="1600" dirty="0"/>
+          </a:p>
+        </p:txBody>
+      </p:sp>
+      <p:sp>
+        <p:nvSpPr>
+          <p:cNvPr id="13" name="모서리가 둥근 직사각형 12"/>
+          <p:cNvSpPr/>
+          <p:nvPr/>
+        </p:nvSpPr>
+        <p:spPr>
+          <a:xfrm>
+            <a:off x="2241319" y="3072200"/>
+            <a:ext cx="9950681" cy="2942652"/>
+          </a:xfrm>
+          <a:prstGeom prst="roundRect">
+            <a:avLst/>
+          </a:prstGeom>
+        </p:spPr>
+        <p:style>
+          <a:lnRef idx="2">
+            <a:schemeClr val="accent1">
+              <a:shade val="50000"/>
+            </a:schemeClr>
+          </a:lnRef>
+          <a:fillRef idx="1">
+            <a:schemeClr val="accent1"/>
+          </a:fillRef>
+          <a:effectRef idx="0">
+            <a:schemeClr val="accent1"/>
+          </a:effectRef>
+          <a:fontRef idx="minor">
+            <a:schemeClr val="lt1"/>
+          </a:fontRef>
+        </p:style>
+        <p:txBody>
+          <a:bodyPr rtlCol="0" anchor="ctr"/>
+          <a:lstStyle/>
+          <a:p>
+            <a:pPr algn="ctr"/>
+            <a:r>
+              <a:rPr lang="ko-KR" altLang="en-US" sz="1600" dirty="0" smtClean="0"/>
+              <a:t>메인 </a:t>
+            </a:r>
+            <a:r>
+              <a:rPr lang="ko-KR" altLang="en-US" sz="1600" dirty="0" smtClean="0"/>
+              <a:t>페이지</a:t>
+            </a:r>
+            <a:endParaRPr lang="en-US" altLang="ko-KR" sz="1600" dirty="0" smtClean="0"/>
+          </a:p>
+          <a:p>
+            <a:pPr algn="ctr"/>
+            <a:r>
+              <a:rPr lang="ko-KR" altLang="en-US" sz="1600" dirty="0" smtClean="0"/>
+              <a:t>정렬 기준 </a:t>
+            </a:r>
+            <a:r>
+              <a:rPr lang="en-US" altLang="ko-KR" sz="1600" dirty="0" smtClean="0"/>
+              <a:t>1. </a:t>
+            </a:r>
+            <a:r>
+              <a:rPr lang="ko-KR" altLang="en-US" sz="1600" dirty="0" smtClean="0"/>
+              <a:t>조회수</a:t>
+            </a:r>
+            <a:r>
+              <a:rPr lang="en-US" altLang="ko-KR" sz="1600" dirty="0" smtClean="0"/>
+              <a:t>, </a:t>
+            </a:r>
+            <a:r>
+              <a:rPr lang="ko-KR" altLang="en-US" sz="1600" dirty="0" smtClean="0"/>
+              <a:t>좋아요 수</a:t>
+            </a:r>
+            <a:r>
+              <a:rPr lang="en-US" altLang="ko-KR" sz="1600" dirty="0" smtClean="0"/>
+              <a:t>, </a:t>
+            </a:r>
+            <a:r>
+              <a:rPr lang="ko-KR" altLang="en-US" sz="1600" dirty="0" smtClean="0"/>
+              <a:t>추천 수</a:t>
+            </a:r>
+            <a:r>
+              <a:rPr lang="en-US" altLang="ko-KR" sz="1600" dirty="0" smtClean="0"/>
+              <a:t>, </a:t>
+            </a:r>
+            <a:r>
+              <a:rPr lang="ko-KR" altLang="en-US" sz="1600" dirty="0" smtClean="0"/>
+              <a:t>등록 순</a:t>
+            </a:r>
+            <a:r>
+              <a:rPr lang="en-US" altLang="ko-KR" sz="1600" dirty="0" smtClean="0"/>
+              <a:t> 2.</a:t>
+            </a:r>
+            <a:r>
+              <a:rPr lang="ko-KR" altLang="en-US" sz="1600" dirty="0" smtClean="0"/>
+              <a:t>내림차순</a:t>
+            </a:r>
+            <a:r>
+              <a:rPr lang="en-US" altLang="ko-KR" sz="1600" dirty="0" smtClean="0"/>
+              <a:t>, </a:t>
+            </a:r>
+            <a:r>
+              <a:rPr lang="ko-KR" altLang="en-US" sz="1600" dirty="0" smtClean="0"/>
+              <a:t>오름차순</a:t>
+            </a:r>
+            <a:endParaRPr lang="en-US" altLang="ko-KR" sz="1600" dirty="0" smtClean="0"/>
+          </a:p>
+          <a:p>
+            <a:pPr algn="ctr"/>
+            <a:r>
+              <a:rPr lang="en-US" altLang="ko-KR" sz="1600" dirty="0" smtClean="0"/>
+              <a:t>(</a:t>
+            </a:r>
+            <a:r>
+              <a:rPr lang="ko-KR" altLang="en-US" sz="1600" dirty="0" smtClean="0"/>
+              <a:t>디폴트는 조회수 내림차순</a:t>
+            </a:r>
+            <a:r>
+              <a:rPr lang="en-US" altLang="ko-KR" sz="1600" dirty="0" smtClean="0"/>
+              <a:t>)</a:t>
+            </a:r>
+            <a:endParaRPr lang="en-US" altLang="ko-KR" sz="1600" dirty="0" smtClean="0"/>
+          </a:p>
+          <a:p>
+            <a:pPr algn="ctr"/>
+            <a:r>
+              <a:rPr lang="ko-KR" altLang="en-US" sz="1600" dirty="0" smtClean="0"/>
+              <a:t>카테고리 내에 사이트 </a:t>
+            </a:r>
+            <a:r>
+              <a:rPr lang="ko-KR" altLang="en-US" sz="1600" dirty="0" smtClean="0"/>
+              <a:t>정렬해서 보여주자 카드 반복</a:t>
+            </a:r>
+            <a:endParaRPr lang="en-US" altLang="ko-KR" sz="1600" dirty="0" smtClean="0"/>
+          </a:p>
+          <a:p>
+            <a:pPr algn="ctr"/>
+            <a:endParaRPr lang="ko-KR" altLang="en-US" sz="1600" dirty="0"/>
+          </a:p>
+        </p:txBody>
+      </p:sp>
+      <p:sp>
+        <p:nvSpPr>
+          <p:cNvPr id="14" name="모서리가 둥근 직사각형 13"/>
+          <p:cNvSpPr/>
+          <p:nvPr/>
+        </p:nvSpPr>
+        <p:spPr>
+          <a:xfrm>
+            <a:off x="2241317" y="6314315"/>
+            <a:ext cx="9950681" cy="543685"/>
+          </a:xfrm>
+          <a:prstGeom prst="roundRect">
+            <a:avLst/>
+          </a:prstGeom>
+        </p:spPr>
+        <p:style>
+          <a:lnRef idx="2">
+            <a:schemeClr val="accent1">
+              <a:shade val="50000"/>
+            </a:schemeClr>
+          </a:lnRef>
+          <a:fillRef idx="1">
+            <a:schemeClr val="accent1"/>
+          </a:fillRef>
+          <a:effectRef idx="0">
+            <a:schemeClr val="accent1"/>
+          </a:effectRef>
+          <a:fontRef idx="minor">
+            <a:schemeClr val="lt1"/>
+          </a:fontRef>
+        </p:style>
+        <p:txBody>
+          <a:bodyPr rtlCol="0" anchor="ctr"/>
+          <a:lstStyle/>
+          <a:p>
+            <a:pPr algn="ctr"/>
+            <a:r>
+              <a:rPr lang="ko-KR" altLang="en-US" sz="1600" dirty="0" err="1" smtClean="0"/>
+              <a:t>푸터</a:t>
+            </a:r>
+            <a:r>
+              <a:rPr lang="ko-KR" altLang="en-US" sz="1600" dirty="0" smtClean="0"/>
+              <a:t> </a:t>
+            </a:r>
+            <a:r>
+              <a:rPr lang="en-US" altLang="ko-KR" sz="1600" dirty="0" smtClean="0"/>
+              <a:t>(</a:t>
+            </a:r>
+            <a:r>
+              <a:rPr lang="ko-KR" altLang="en-US" sz="1600" dirty="0" smtClean="0"/>
+              <a:t>서비스</a:t>
+            </a:r>
+            <a:r>
+              <a:rPr lang="en-US" altLang="ko-KR" sz="1600" dirty="0" smtClean="0"/>
+              <a:t>, </a:t>
+            </a:r>
+            <a:r>
+              <a:rPr lang="ko-KR" altLang="en-US" sz="1600" dirty="0" smtClean="0"/>
+              <a:t>문의</a:t>
+            </a:r>
+            <a:r>
+              <a:rPr lang="en-US" altLang="ko-KR" sz="1600" dirty="0" smtClean="0"/>
+              <a:t>, </a:t>
+            </a:r>
+            <a:r>
+              <a:rPr lang="ko-KR" altLang="en-US" sz="1600" dirty="0" smtClean="0"/>
+              <a:t>고객센터</a:t>
+            </a:r>
+            <a:r>
+              <a:rPr lang="en-US" altLang="ko-KR" sz="1600" dirty="0" smtClean="0"/>
+              <a:t>), </a:t>
+            </a:r>
+            <a:r>
+              <a:rPr lang="ko-KR" altLang="en-US" sz="1600" dirty="0" smtClean="0"/>
+              <a:t>기업 정보</a:t>
+            </a:r>
+            <a:r>
+              <a:rPr lang="en-US" altLang="ko-KR" sz="1600" dirty="0" smtClean="0"/>
+              <a:t>, </a:t>
+            </a:r>
+            <a:r>
+              <a:rPr lang="ko-KR" altLang="en-US" sz="1600" dirty="0" smtClean="0"/>
+              <a:t>개인정보 처리방침</a:t>
+            </a:r>
+            <a:r>
+              <a:rPr lang="en-US" altLang="ko-KR" sz="1600" dirty="0" smtClean="0"/>
+              <a:t>, </a:t>
+            </a:r>
+            <a:r>
+              <a:rPr lang="ko-KR" altLang="en-US" sz="1600" dirty="0" smtClean="0"/>
+              <a:t>이용약관</a:t>
+            </a:r>
+            <a:r>
+              <a:rPr lang="en-US" altLang="ko-KR" sz="1600" dirty="0" smtClean="0"/>
+              <a:t>, </a:t>
+            </a:r>
+            <a:r>
+              <a:rPr lang="ko-KR" altLang="en-US" sz="1600" smtClean="0"/>
+              <a:t>기타 등등</a:t>
+            </a:r>
+            <a:endParaRPr lang="en-US" altLang="ko-KR" sz="1600" dirty="0" smtClean="0"/>
+          </a:p>
+        </p:txBody>
+      </p:sp>
+      <p:sp>
+        <p:nvSpPr>
+          <p:cNvPr id="17" name="직사각형 16"/>
+          <p:cNvSpPr/>
+          <p:nvPr/>
+        </p:nvSpPr>
+        <p:spPr>
+          <a:xfrm>
+            <a:off x="2982476" y="47502"/>
+            <a:ext cx="9126974" cy="1113008"/>
+          </a:xfrm>
+          <a:prstGeom prst="rect">
+            <a:avLst/>
+          </a:prstGeom>
+          <a:solidFill>
+            <a:schemeClr val="bg1">
+              <a:lumMod val="95000"/>
+            </a:schemeClr>
+          </a:solidFill>
+          <a:ln>
+            <a:noFill/>
+          </a:ln>
+        </p:spPr>
+        <p:style>
+          <a:lnRef idx="2">
+            <a:schemeClr val="accent1">
+              <a:shade val="50000"/>
+            </a:schemeClr>
+          </a:lnRef>
+          <a:fillRef idx="1">
+            <a:schemeClr val="accent1"/>
+          </a:fillRef>
+          <a:effectRef idx="0">
+            <a:schemeClr val="accent1"/>
+          </a:effectRef>
+          <a:fontRef idx="minor">
+            <a:schemeClr val="lt1"/>
+          </a:fontRef>
+        </p:style>
+        <p:txBody>
+          <a:bodyPr rtlCol="0" anchor="t"/>
+          <a:lstStyle/>
+          <a:p>
+            <a:r>
+              <a:rPr lang="ko-KR" altLang="en-US" sz="1400" dirty="0" smtClean="0">
+                <a:solidFill>
+                  <a:schemeClr val="tx1"/>
+                </a:solidFill>
+              </a:rPr>
+              <a:t>고려 사항</a:t>
+            </a:r>
+            <a:endParaRPr lang="en-US" altLang="ko-KR" sz="1400" dirty="0" smtClean="0">
+              <a:solidFill>
+                <a:schemeClr val="tx1"/>
+              </a:solidFill>
+            </a:endParaRPr>
+          </a:p>
+          <a:p>
+            <a:pPr marL="285750" indent="-285750">
+              <a:buFontTx/>
+              <a:buChar char="-"/>
+            </a:pPr>
+            <a:r>
+              <a:rPr lang="ko-KR" altLang="en-US" sz="1400" dirty="0" smtClean="0">
+                <a:solidFill>
+                  <a:schemeClr val="tx1"/>
+                </a:solidFill>
+              </a:rPr>
+              <a:t>배너 위치</a:t>
+            </a:r>
+            <a:r>
+              <a:rPr lang="en-US" altLang="ko-KR" sz="1400" dirty="0" smtClean="0">
+                <a:solidFill>
+                  <a:schemeClr val="tx1"/>
+                </a:solidFill>
+              </a:rPr>
+              <a:t>(+</a:t>
+            </a:r>
+            <a:r>
+              <a:rPr lang="ko-KR" altLang="en-US" sz="1400" dirty="0" smtClean="0">
+                <a:solidFill>
+                  <a:schemeClr val="tx1"/>
+                </a:solidFill>
+              </a:rPr>
+              <a:t>배너 크기</a:t>
+            </a:r>
+            <a:r>
+              <a:rPr lang="en-US" altLang="ko-KR" sz="1400" dirty="0" smtClean="0">
+                <a:solidFill>
+                  <a:schemeClr val="tx1"/>
+                </a:solidFill>
+              </a:rPr>
+              <a:t>, </a:t>
+            </a:r>
+            <a:r>
+              <a:rPr lang="ko-KR" altLang="en-US" sz="1400" dirty="0" smtClean="0">
+                <a:solidFill>
+                  <a:schemeClr val="tx1"/>
+                </a:solidFill>
+              </a:rPr>
+              <a:t>표준 사이즈 검색</a:t>
+            </a:r>
+            <a:r>
+              <a:rPr lang="en-US" altLang="ko-KR" sz="1400" dirty="0">
+                <a:solidFill>
+                  <a:schemeClr val="tx1"/>
+                </a:solidFill>
+              </a:rPr>
+              <a:t>)</a:t>
+            </a:r>
+            <a:endParaRPr lang="en-US" altLang="ko-KR" sz="1400" dirty="0" smtClean="0">
+              <a:solidFill>
+                <a:schemeClr val="tx1"/>
+              </a:solidFill>
+            </a:endParaRPr>
+          </a:p>
+          <a:p>
+            <a:pPr marL="285750" indent="-285750">
+              <a:buFontTx/>
+              <a:buChar char="-"/>
+            </a:pPr>
+            <a:r>
+              <a:rPr lang="ko-KR" altLang="en-US" sz="1400" dirty="0" smtClean="0">
+                <a:solidFill>
+                  <a:schemeClr val="tx1"/>
+                </a:solidFill>
+              </a:rPr>
+              <a:t>최대 가로 크기</a:t>
+            </a:r>
+            <a:endParaRPr lang="en-US" altLang="ko-KR" sz="1400" dirty="0" smtClean="0">
+              <a:solidFill>
+                <a:schemeClr val="tx1"/>
+              </a:solidFill>
+            </a:endParaRPr>
+          </a:p>
+          <a:p>
+            <a:pPr marL="285750" indent="-285750">
+              <a:buFontTx/>
+              <a:buChar char="-"/>
+            </a:pPr>
+            <a:endParaRPr lang="ko-KR" altLang="en-US" sz="1400" dirty="0">
+              <a:solidFill>
+                <a:schemeClr val="tx1"/>
+              </a:solidFill>
+            </a:endParaRPr>
+          </a:p>
+        </p:txBody>
+      </p:sp>
+    </p:spTree>
+    <p:extLst>
+      <p:ext uri="{BB962C8B-B14F-4D97-AF65-F5344CB8AC3E}">
+        <p14:creationId xmlns:p14="http://schemas.microsoft.com/office/powerpoint/2010/main" val="134506519"/>
+      </p:ext>
+    </p:extLst>
+  </p:cSld>
+  <p:clrMapOvr>
+    <a:masterClrMapping/>
+  </p:clrMapOvr>
+</p:sld>
+</file>
+
+<file path=ppt/slides/slide7.xml><?xml version="1.0" encoding="utf-8"?>
+<p:sld xmlns:a="http://schemas.openxmlformats.org/drawingml/2006/main" xmlns:r="http://schemas.openxmlformats.org/officeDocument/2006/relationships" xmlns:p="http://schemas.openxmlformats.org/presentationml/2006/main">
+  <p:cSld>
+    <p:spTree>
+      <p:nvGrpSpPr>
+        <p:cNvPr id="1" name=""/>
+        <p:cNvGrpSpPr/>
+        <p:nvPr/>
+      </p:nvGrpSpPr>
+      <p:grpSpPr>
+        <a:xfrm>
+          <a:off x="0" y="0"/>
+          <a:ext cx="0" cy="0"/>
+          <a:chOff x="0" y="0"/>
+          <a:chExt cx="0" cy="0"/>
+        </a:xfrm>
+      </p:grpSpPr>
+      <p:grpSp>
+        <p:nvGrpSpPr>
+          <p:cNvPr id="7" name="그룹 6"/>
+          <p:cNvGrpSpPr/>
+          <p:nvPr/>
+        </p:nvGrpSpPr>
+        <p:grpSpPr>
+          <a:xfrm>
+            <a:off x="896587" y="835725"/>
+            <a:ext cx="3034145" cy="1521528"/>
+            <a:chOff x="896587" y="835725"/>
+            <a:chExt cx="3034145" cy="1521528"/>
+          </a:xfrm>
+        </p:grpSpPr>
+        <p:sp>
+          <p:nvSpPr>
+            <p:cNvPr id="4" name="직사각형 3"/>
+            <p:cNvSpPr/>
+            <p:nvPr/>
+          </p:nvSpPr>
+          <p:spPr>
+            <a:xfrm>
+              <a:off x="1252846" y="1110343"/>
+              <a:ext cx="2677886" cy="1246910"/>
+            </a:xfrm>
+            <a:prstGeom prst="rect">
+              <a:avLst/>
+            </a:prstGeom>
+            <a:noFill/>
+            <a:ln w="19050">
+              <a:solidFill>
+                <a:schemeClr val="tx1"/>
+              </a:solidFill>
+            </a:ln>
+          </p:spPr>
+          <p:style>
+            <a:lnRef idx="2">
+              <a:schemeClr val="accent1">
+                <a:shade val="50000"/>
+              </a:schemeClr>
+            </a:lnRef>
+            <a:fillRef idx="1">
+              <a:schemeClr val="accent1"/>
+            </a:fillRef>
+            <a:effectRef idx="0">
+              <a:schemeClr val="accent1"/>
+            </a:effectRef>
+            <a:fontRef idx="minor">
+              <a:schemeClr val="lt1"/>
+            </a:fontRef>
+          </p:style>
+          <p:txBody>
+            <a:bodyPr rtlCol="0" anchor="ctr"/>
+            <a:lstStyle/>
+            <a:p>
+              <a:pPr algn="ctr"/>
+              <a:endParaRPr lang="ko-KR" altLang="en-US"/>
+            </a:p>
+          </p:txBody>
+        </p:sp>
+        <p:sp>
+          <p:nvSpPr>
+            <p:cNvPr id="5" name="직사각형 4"/>
+            <p:cNvSpPr/>
+            <p:nvPr/>
+          </p:nvSpPr>
+          <p:spPr>
+            <a:xfrm>
+              <a:off x="1429986" y="1490354"/>
+              <a:ext cx="2328288" cy="612177"/>
+            </a:xfrm>
+            <a:prstGeom prst="rect">
+              <a:avLst/>
+            </a:prstGeom>
+            <a:solidFill>
+              <a:schemeClr val="tx1"/>
+            </a:solidFill>
+            <a:ln w="19050">
+              <a:noFill/>
+            </a:ln>
+          </p:spPr>
+          <p:style>
+            <a:lnRef idx="2">
+              <a:schemeClr val="accent1">
+                <a:shade val="50000"/>
+              </a:schemeClr>
+            </a:lnRef>
+            <a:fillRef idx="1">
+              <a:schemeClr val="accent1"/>
+            </a:fillRef>
+            <a:effectRef idx="0">
+              <a:schemeClr val="accent1"/>
+            </a:effectRef>
+            <a:fontRef idx="minor">
+              <a:schemeClr val="lt1"/>
+            </a:fontRef>
+          </p:style>
+          <p:txBody>
+            <a:bodyPr rtlCol="0" anchor="ctr"/>
+            <a:lstStyle/>
+            <a:p>
+              <a:pPr algn="ctr"/>
+              <a:r>
+                <a:rPr lang="en-US" altLang="ko-KR" dirty="0" smtClean="0">
+                  <a:solidFill>
+                    <a:schemeClr val="bg1"/>
+                  </a:solidFill>
+                </a:rPr>
+                <a:t>BOOKMARK</a:t>
+              </a:r>
+              <a:endParaRPr lang="ko-KR" altLang="en-US" dirty="0">
+                <a:solidFill>
+                  <a:schemeClr val="bg1"/>
+                </a:solidFill>
+              </a:endParaRPr>
+            </a:p>
+          </p:txBody>
+        </p:sp>
+        <p:sp>
+          <p:nvSpPr>
+            <p:cNvPr id="6" name="직사각형 5"/>
+            <p:cNvSpPr/>
+            <p:nvPr/>
+          </p:nvSpPr>
+          <p:spPr>
+            <a:xfrm>
+              <a:off x="896587" y="835725"/>
+              <a:ext cx="1618012" cy="549234"/>
+            </a:xfrm>
+            <a:prstGeom prst="rect">
+              <a:avLst/>
+            </a:prstGeom>
+            <a:solidFill>
+              <a:schemeClr val="bg1"/>
+            </a:solidFill>
+            <a:ln>
+              <a:noFill/>
+            </a:ln>
+          </p:spPr>
+          <p:style>
+            <a:lnRef idx="2">
+              <a:schemeClr val="accent1">
+                <a:shade val="50000"/>
+              </a:schemeClr>
+            </a:lnRef>
+            <a:fillRef idx="1">
+              <a:schemeClr val="accent1"/>
+            </a:fillRef>
+            <a:effectRef idx="0">
+              <a:schemeClr val="accent1"/>
+            </a:effectRef>
+            <a:fontRef idx="minor">
+              <a:schemeClr val="lt1"/>
+            </a:fontRef>
+          </p:style>
+          <p:txBody>
+            <a:bodyPr rtlCol="0" anchor="ctr"/>
+            <a:lstStyle/>
+            <a:p>
+              <a:pPr algn="ctr"/>
+              <a:r>
+                <a:rPr lang="en-US" altLang="ko-KR" sz="3200" dirty="0" smtClean="0">
+                  <a:solidFill>
+                    <a:schemeClr val="tx1"/>
+                  </a:solidFill>
+                  <a:latin typeface="HY견고딕" panose="02030600000101010101" pitchFamily="18" charset="-127"/>
+                  <a:ea typeface="HY견고딕" panose="02030600000101010101" pitchFamily="18" charset="-127"/>
+                </a:rPr>
+                <a:t>LOGO</a:t>
+              </a:r>
+              <a:endParaRPr lang="ko-KR" altLang="en-US" sz="3200" dirty="0">
+                <a:solidFill>
+                  <a:schemeClr val="tx1"/>
+                </a:solidFill>
+                <a:latin typeface="HY견고딕" panose="02030600000101010101" pitchFamily="18" charset="-127"/>
+                <a:ea typeface="HY견고딕" panose="02030600000101010101" pitchFamily="18" charset="-127"/>
+              </a:endParaRPr>
+            </a:p>
+          </p:txBody>
+        </p:sp>
+      </p:grpSp>
+    </p:spTree>
+    <p:extLst>
+      <p:ext uri="{BB962C8B-B14F-4D97-AF65-F5344CB8AC3E}">
+        <p14:creationId xmlns:p14="http://schemas.microsoft.com/office/powerpoint/2010/main" val="2565186976"/>
       </p:ext>
     </p:extLst>
   </p:cSld>

</xml_diff>

<commit_message>
[u] : edit generally, add temp mybookmark
</commit_message>
<xml_diff>
--- a/bookmark.pptx
+++ b/bookmark.pptx
@@ -11,7 +11,8 @@
     <p:sldId id="261" r:id="rId5"/>
     <p:sldId id="259" r:id="rId6"/>
     <p:sldId id="263" r:id="rId7"/>
-    <p:sldId id="262" r:id="rId8"/>
+    <p:sldId id="265" r:id="rId8"/>
+    <p:sldId id="262" r:id="rId9"/>
   </p:sldIdLst>
   <p:sldSz cx="12192000" cy="6858000"/>
   <p:notesSz cx="6858000" cy="9144000"/>
@@ -261,7 +262,7 @@
           <a:p>
             <a:fld id="{9A0CBB99-4DF1-49E3-ACA0-C007A6485E48}" type="datetimeFigureOut">
               <a:rPr lang="ko-KR" altLang="en-US" smtClean="0"/>
-              <a:t>2024-04-16</a:t>
+              <a:t>2024-04-18</a:t>
             </a:fld>
             <a:endParaRPr lang="ko-KR" altLang="en-US"/>
           </a:p>
@@ -431,7 +432,7 @@
           <a:p>
             <a:fld id="{9A0CBB99-4DF1-49E3-ACA0-C007A6485E48}" type="datetimeFigureOut">
               <a:rPr lang="ko-KR" altLang="en-US" smtClean="0"/>
-              <a:t>2024-04-16</a:t>
+              <a:t>2024-04-18</a:t>
             </a:fld>
             <a:endParaRPr lang="ko-KR" altLang="en-US"/>
           </a:p>
@@ -611,7 +612,7 @@
           <a:p>
             <a:fld id="{9A0CBB99-4DF1-49E3-ACA0-C007A6485E48}" type="datetimeFigureOut">
               <a:rPr lang="ko-KR" altLang="en-US" smtClean="0"/>
-              <a:t>2024-04-16</a:t>
+              <a:t>2024-04-18</a:t>
             </a:fld>
             <a:endParaRPr lang="ko-KR" altLang="en-US"/>
           </a:p>
@@ -781,7 +782,7 @@
           <a:p>
             <a:fld id="{9A0CBB99-4DF1-49E3-ACA0-C007A6485E48}" type="datetimeFigureOut">
               <a:rPr lang="ko-KR" altLang="en-US" smtClean="0"/>
-              <a:t>2024-04-16</a:t>
+              <a:t>2024-04-18</a:t>
             </a:fld>
             <a:endParaRPr lang="ko-KR" altLang="en-US"/>
           </a:p>
@@ -1027,7 +1028,7 @@
           <a:p>
             <a:fld id="{9A0CBB99-4DF1-49E3-ACA0-C007A6485E48}" type="datetimeFigureOut">
               <a:rPr lang="ko-KR" altLang="en-US" smtClean="0"/>
-              <a:t>2024-04-16</a:t>
+              <a:t>2024-04-18</a:t>
             </a:fld>
             <a:endParaRPr lang="ko-KR" altLang="en-US"/>
           </a:p>
@@ -1259,7 +1260,7 @@
           <a:p>
             <a:fld id="{9A0CBB99-4DF1-49E3-ACA0-C007A6485E48}" type="datetimeFigureOut">
               <a:rPr lang="ko-KR" altLang="en-US" smtClean="0"/>
-              <a:t>2024-04-16</a:t>
+              <a:t>2024-04-18</a:t>
             </a:fld>
             <a:endParaRPr lang="ko-KR" altLang="en-US"/>
           </a:p>
@@ -1626,7 +1627,7 @@
           <a:p>
             <a:fld id="{9A0CBB99-4DF1-49E3-ACA0-C007A6485E48}" type="datetimeFigureOut">
               <a:rPr lang="ko-KR" altLang="en-US" smtClean="0"/>
-              <a:t>2024-04-16</a:t>
+              <a:t>2024-04-18</a:t>
             </a:fld>
             <a:endParaRPr lang="ko-KR" altLang="en-US"/>
           </a:p>
@@ -1744,7 +1745,7 @@
           <a:p>
             <a:fld id="{9A0CBB99-4DF1-49E3-ACA0-C007A6485E48}" type="datetimeFigureOut">
               <a:rPr lang="ko-KR" altLang="en-US" smtClean="0"/>
-              <a:t>2024-04-16</a:t>
+              <a:t>2024-04-18</a:t>
             </a:fld>
             <a:endParaRPr lang="ko-KR" altLang="en-US"/>
           </a:p>
@@ -1839,7 +1840,7 @@
           <a:p>
             <a:fld id="{9A0CBB99-4DF1-49E3-ACA0-C007A6485E48}" type="datetimeFigureOut">
               <a:rPr lang="ko-KR" altLang="en-US" smtClean="0"/>
-              <a:t>2024-04-16</a:t>
+              <a:t>2024-04-18</a:t>
             </a:fld>
             <a:endParaRPr lang="ko-KR" altLang="en-US"/>
           </a:p>
@@ -2116,7 +2117,7 @@
           <a:p>
             <a:fld id="{9A0CBB99-4DF1-49E3-ACA0-C007A6485E48}" type="datetimeFigureOut">
               <a:rPr lang="ko-KR" altLang="en-US" smtClean="0"/>
-              <a:t>2024-04-16</a:t>
+              <a:t>2024-04-18</a:t>
             </a:fld>
             <a:endParaRPr lang="ko-KR" altLang="en-US"/>
           </a:p>
@@ -2369,7 +2370,7 @@
           <a:p>
             <a:fld id="{9A0CBB99-4DF1-49E3-ACA0-C007A6485E48}" type="datetimeFigureOut">
               <a:rPr lang="ko-KR" altLang="en-US" smtClean="0"/>
-              <a:t>2024-04-16</a:t>
+              <a:t>2024-04-18</a:t>
             </a:fld>
             <a:endParaRPr lang="ko-KR" altLang="en-US"/>
           </a:p>
@@ -2582,7 +2583,7 @@
           <a:p>
             <a:fld id="{9A0CBB99-4DF1-49E3-ACA0-C007A6485E48}" type="datetimeFigureOut">
               <a:rPr lang="ko-KR" altLang="en-US" smtClean="0"/>
-              <a:t>2024-04-16</a:t>
+              <a:t>2024-04-18</a:t>
             </a:fld>
             <a:endParaRPr lang="ko-KR" altLang="en-US"/>
           </a:p>
@@ -5612,6 +5613,878 @@
                 </a:rPr>
                 <a:t>Category~</a:t>
               </a:r>
+            </a:p>
+          </p:txBody>
+        </p:sp>
+        <p:cxnSp>
+          <p:nvCxnSpPr>
+            <p:cNvPr id="7" name="직선 연결선 6"/>
+            <p:cNvCxnSpPr/>
+            <p:nvPr/>
+          </p:nvCxnSpPr>
+          <p:spPr>
+            <a:xfrm>
+              <a:off x="53440" y="516577"/>
+              <a:ext cx="2820390" cy="0"/>
+            </a:xfrm>
+            <a:prstGeom prst="line">
+              <a:avLst/>
+            </a:prstGeom>
+            <a:ln w="28575"/>
+          </p:spPr>
+          <p:style>
+            <a:lnRef idx="1">
+              <a:schemeClr val="accent1"/>
+            </a:lnRef>
+            <a:fillRef idx="0">
+              <a:schemeClr val="accent1"/>
+            </a:fillRef>
+            <a:effectRef idx="0">
+              <a:schemeClr val="accent1"/>
+            </a:effectRef>
+            <a:fontRef idx="minor">
+              <a:schemeClr val="tx1"/>
+            </a:fontRef>
+          </p:style>
+        </p:cxnSp>
+      </p:grpSp>
+      <p:sp>
+        <p:nvSpPr>
+          <p:cNvPr id="8" name="직사각형 7"/>
+          <p:cNvSpPr/>
+          <p:nvPr/>
+        </p:nvSpPr>
+        <p:spPr>
+          <a:xfrm>
+            <a:off x="119578" y="951756"/>
+            <a:ext cx="1920638" cy="5810994"/>
+          </a:xfrm>
+          <a:prstGeom prst="rect">
+            <a:avLst/>
+          </a:prstGeom>
+          <a:solidFill>
+            <a:schemeClr val="bg1">
+              <a:lumMod val="95000"/>
+            </a:schemeClr>
+          </a:solidFill>
+          <a:ln>
+            <a:noFill/>
+          </a:ln>
+        </p:spPr>
+        <p:style>
+          <a:lnRef idx="2">
+            <a:schemeClr val="accent1">
+              <a:shade val="50000"/>
+            </a:schemeClr>
+          </a:lnRef>
+          <a:fillRef idx="1">
+            <a:schemeClr val="accent1"/>
+          </a:fillRef>
+          <a:effectRef idx="0">
+            <a:schemeClr val="accent1"/>
+          </a:effectRef>
+          <a:fontRef idx="minor">
+            <a:schemeClr val="lt1"/>
+          </a:fontRef>
+        </p:style>
+        <p:txBody>
+          <a:bodyPr rtlCol="0" anchor="t"/>
+          <a:lstStyle/>
+          <a:p>
+            <a:r>
+              <a:rPr lang="ko-KR" altLang="en-US" sz="1400" dirty="0" smtClean="0">
+                <a:solidFill>
+                  <a:schemeClr val="tx1"/>
+                </a:solidFill>
+              </a:rPr>
+              <a:t>주요 기능</a:t>
+            </a:r>
+            <a:endParaRPr lang="en-US" altLang="ko-KR" sz="1400" dirty="0" smtClean="0">
+              <a:solidFill>
+                <a:schemeClr val="tx1"/>
+              </a:solidFill>
+            </a:endParaRPr>
+          </a:p>
+          <a:p>
+            <a:endParaRPr lang="ko-KR" altLang="en-US" sz="1400" dirty="0">
+              <a:solidFill>
+                <a:schemeClr val="tx1"/>
+              </a:solidFill>
+            </a:endParaRPr>
+          </a:p>
+        </p:txBody>
+      </p:sp>
+      <p:sp>
+        <p:nvSpPr>
+          <p:cNvPr id="4" name="직사각형 3"/>
+          <p:cNvSpPr>
+            <a:spLocks noChangeAspect="1"/>
+          </p:cNvSpPr>
+          <p:nvPr/>
+        </p:nvSpPr>
+        <p:spPr>
+          <a:xfrm>
+            <a:off x="2241319" y="1260742"/>
+            <a:ext cx="9950681" cy="5597258"/>
+          </a:xfrm>
+          <a:prstGeom prst="rect">
+            <a:avLst/>
+          </a:prstGeom>
+          <a:noFill/>
+          <a:ln w="19050"/>
+        </p:spPr>
+        <p:style>
+          <a:lnRef idx="2">
+            <a:schemeClr val="accent1">
+              <a:shade val="50000"/>
+            </a:schemeClr>
+          </a:lnRef>
+          <a:fillRef idx="1">
+            <a:schemeClr val="accent1"/>
+          </a:fillRef>
+          <a:effectRef idx="0">
+            <a:schemeClr val="accent1"/>
+          </a:effectRef>
+          <a:fontRef idx="minor">
+            <a:schemeClr val="lt1"/>
+          </a:fontRef>
+        </p:style>
+        <p:txBody>
+          <a:bodyPr rtlCol="0" anchor="ctr"/>
+          <a:lstStyle/>
+          <a:p>
+            <a:pPr algn="ctr"/>
+            <a:endParaRPr lang="ko-KR" altLang="en-US"/>
+          </a:p>
+        </p:txBody>
+      </p:sp>
+      <p:sp>
+        <p:nvSpPr>
+          <p:cNvPr id="9" name="모서리가 둥근 직사각형 8"/>
+          <p:cNvSpPr/>
+          <p:nvPr/>
+        </p:nvSpPr>
+        <p:spPr>
+          <a:xfrm>
+            <a:off x="2241319" y="1275048"/>
+            <a:ext cx="9950681" cy="543685"/>
+          </a:xfrm>
+          <a:prstGeom prst="roundRect">
+            <a:avLst/>
+          </a:prstGeom>
+        </p:spPr>
+        <p:style>
+          <a:lnRef idx="2">
+            <a:schemeClr val="accent1">
+              <a:shade val="50000"/>
+            </a:schemeClr>
+          </a:lnRef>
+          <a:fillRef idx="1">
+            <a:schemeClr val="accent1"/>
+          </a:fillRef>
+          <a:effectRef idx="0">
+            <a:schemeClr val="accent1"/>
+          </a:effectRef>
+          <a:fontRef idx="minor">
+            <a:schemeClr val="lt1"/>
+          </a:fontRef>
+        </p:style>
+        <p:txBody>
+          <a:bodyPr rtlCol="0" anchor="ctr"/>
+          <a:lstStyle/>
+          <a:p>
+            <a:pPr algn="ctr"/>
+            <a:r>
+              <a:rPr lang="ko-KR" altLang="en-US" sz="1600" dirty="0" smtClean="0"/>
+              <a:t>헤더</a:t>
+            </a:r>
+            <a:endParaRPr lang="en-US" altLang="ko-KR" sz="1600" dirty="0" smtClean="0"/>
+          </a:p>
+        </p:txBody>
+      </p:sp>
+      <p:sp>
+        <p:nvSpPr>
+          <p:cNvPr id="10" name="모서리가 둥근 직사각형 9"/>
+          <p:cNvSpPr/>
+          <p:nvPr/>
+        </p:nvSpPr>
+        <p:spPr>
+          <a:xfrm>
+            <a:off x="2442420" y="1399578"/>
+            <a:ext cx="930453" cy="318922"/>
+          </a:xfrm>
+          <a:prstGeom prst="roundRect">
+            <a:avLst/>
+          </a:prstGeom>
+        </p:spPr>
+        <p:style>
+          <a:lnRef idx="2">
+            <a:schemeClr val="accent1">
+              <a:shade val="50000"/>
+            </a:schemeClr>
+          </a:lnRef>
+          <a:fillRef idx="1">
+            <a:schemeClr val="accent1"/>
+          </a:fillRef>
+          <a:effectRef idx="0">
+            <a:schemeClr val="accent1"/>
+          </a:effectRef>
+          <a:fontRef idx="minor">
+            <a:schemeClr val="lt1"/>
+          </a:fontRef>
+        </p:style>
+        <p:txBody>
+          <a:bodyPr rtlCol="0" anchor="ctr"/>
+          <a:lstStyle/>
+          <a:p>
+            <a:pPr algn="ctr"/>
+            <a:r>
+              <a:rPr lang="ko-KR" altLang="en-US" sz="1600" smtClean="0"/>
+              <a:t>로고</a:t>
+            </a:r>
+            <a:endParaRPr lang="ko-KR" altLang="en-US" sz="1600"/>
+          </a:p>
+        </p:txBody>
+      </p:sp>
+      <p:sp>
+        <p:nvSpPr>
+          <p:cNvPr id="11" name="모서리가 둥근 직사각형 10"/>
+          <p:cNvSpPr/>
+          <p:nvPr/>
+        </p:nvSpPr>
+        <p:spPr>
+          <a:xfrm>
+            <a:off x="2241318" y="1833038"/>
+            <a:ext cx="9950682" cy="1224857"/>
+          </a:xfrm>
+          <a:prstGeom prst="roundRect">
+            <a:avLst/>
+          </a:prstGeom>
+        </p:spPr>
+        <p:style>
+          <a:lnRef idx="2">
+            <a:schemeClr val="accent1">
+              <a:shade val="50000"/>
+            </a:schemeClr>
+          </a:lnRef>
+          <a:fillRef idx="1">
+            <a:schemeClr val="accent1"/>
+          </a:fillRef>
+          <a:effectRef idx="0">
+            <a:schemeClr val="accent1"/>
+          </a:effectRef>
+          <a:fontRef idx="minor">
+            <a:schemeClr val="lt1"/>
+          </a:fontRef>
+        </p:style>
+        <p:txBody>
+          <a:bodyPr rtlCol="0" anchor="ctr"/>
+          <a:lstStyle/>
+          <a:p>
+            <a:pPr algn="ctr"/>
+            <a:r>
+              <a:rPr lang="ko-KR" altLang="en-US" sz="1600" dirty="0" smtClean="0"/>
+              <a:t>네비게이션 </a:t>
+            </a:r>
+            <a:r>
+              <a:rPr lang="en-US" altLang="ko-KR" sz="1600" dirty="0" smtClean="0"/>
+              <a:t>(</a:t>
+            </a:r>
+            <a:r>
+              <a:rPr lang="ko-KR" altLang="en-US" sz="1600" dirty="0" smtClean="0"/>
+              <a:t>사이트 이동 방향</a:t>
+            </a:r>
+            <a:r>
+              <a:rPr lang="en-US" altLang="ko-KR" sz="1600" dirty="0" smtClean="0"/>
+              <a:t>) : </a:t>
+            </a:r>
+            <a:r>
+              <a:rPr lang="ko-KR" altLang="en-US" sz="1600" dirty="0" smtClean="0"/>
+              <a:t>카테고리 표시 모바일도 가능하게 왼쪽에 확장 버튼 만들어서 누르면</a:t>
+            </a:r>
+            <a:endParaRPr lang="en-US" altLang="ko-KR" sz="1600" dirty="0" smtClean="0"/>
+          </a:p>
+          <a:p>
+            <a:pPr algn="ctr"/>
+            <a:r>
+              <a:rPr lang="ko-KR" altLang="en-US" sz="1600" dirty="0" smtClean="0"/>
+              <a:t>아래로 네비게이션 확장하자</a:t>
+            </a:r>
+            <a:endParaRPr lang="en-US" altLang="ko-KR" sz="1600" dirty="0" smtClean="0"/>
+          </a:p>
+          <a:p>
+            <a:pPr algn="ctr"/>
+            <a:r>
+              <a:rPr lang="ko-KR" altLang="en-US" sz="1600" dirty="0" smtClean="0"/>
+              <a:t>선택한 카테고리 표시 </a:t>
+            </a:r>
+            <a:r>
+              <a:rPr lang="en-US" altLang="ko-KR" sz="1600" dirty="0" smtClean="0"/>
+              <a:t>+ </a:t>
+            </a:r>
+            <a:r>
+              <a:rPr lang="ko-KR" altLang="en-US" sz="1600" dirty="0" smtClean="0"/>
+              <a:t>확장해주고</a:t>
+            </a:r>
+            <a:endParaRPr lang="ko-KR" altLang="en-US" sz="1600" dirty="0"/>
+          </a:p>
+        </p:txBody>
+      </p:sp>
+      <p:sp>
+        <p:nvSpPr>
+          <p:cNvPr id="12" name="모서리가 둥근 직사각형 11"/>
+          <p:cNvSpPr/>
+          <p:nvPr/>
+        </p:nvSpPr>
+        <p:spPr>
+          <a:xfrm>
+            <a:off x="8487256" y="1375281"/>
+            <a:ext cx="3192779" cy="343220"/>
+          </a:xfrm>
+          <a:prstGeom prst="roundRect">
+            <a:avLst/>
+          </a:prstGeom>
+        </p:spPr>
+        <p:style>
+          <a:lnRef idx="2">
+            <a:schemeClr val="accent1">
+              <a:shade val="50000"/>
+            </a:schemeClr>
+          </a:lnRef>
+          <a:fillRef idx="1">
+            <a:schemeClr val="accent1"/>
+          </a:fillRef>
+          <a:effectRef idx="0">
+            <a:schemeClr val="accent1"/>
+          </a:effectRef>
+          <a:fontRef idx="minor">
+            <a:schemeClr val="lt1"/>
+          </a:fontRef>
+        </p:style>
+        <p:txBody>
+          <a:bodyPr rtlCol="0" anchor="ctr"/>
+          <a:lstStyle/>
+          <a:p>
+            <a:pPr algn="ctr"/>
+            <a:r>
+              <a:rPr lang="ko-KR" altLang="en-US" sz="1600" dirty="0" smtClean="0"/>
+              <a:t>로그인 및 페이지 기본 기능</a:t>
+            </a:r>
+            <a:endParaRPr lang="ko-KR" altLang="en-US" sz="1600" dirty="0"/>
+          </a:p>
+        </p:txBody>
+      </p:sp>
+      <p:sp>
+        <p:nvSpPr>
+          <p:cNvPr id="13" name="모서리가 둥근 직사각형 12"/>
+          <p:cNvSpPr/>
+          <p:nvPr/>
+        </p:nvSpPr>
+        <p:spPr>
+          <a:xfrm>
+            <a:off x="2241319" y="3072200"/>
+            <a:ext cx="9950681" cy="2942652"/>
+          </a:xfrm>
+          <a:prstGeom prst="roundRect">
+            <a:avLst/>
+          </a:prstGeom>
+        </p:spPr>
+        <p:style>
+          <a:lnRef idx="2">
+            <a:schemeClr val="accent1">
+              <a:shade val="50000"/>
+            </a:schemeClr>
+          </a:lnRef>
+          <a:fillRef idx="1">
+            <a:schemeClr val="accent1"/>
+          </a:fillRef>
+          <a:effectRef idx="0">
+            <a:schemeClr val="accent1"/>
+          </a:effectRef>
+          <a:fontRef idx="minor">
+            <a:schemeClr val="lt1"/>
+          </a:fontRef>
+        </p:style>
+        <p:txBody>
+          <a:bodyPr rtlCol="0" anchor="ctr"/>
+          <a:lstStyle/>
+          <a:p>
+            <a:pPr algn="ctr"/>
+            <a:r>
+              <a:rPr lang="ko-KR" altLang="en-US" sz="1600" dirty="0" smtClean="0"/>
+              <a:t>메인 페이지</a:t>
+            </a:r>
+            <a:endParaRPr lang="en-US" altLang="ko-KR" sz="1600" dirty="0" smtClean="0"/>
+          </a:p>
+          <a:p>
+            <a:pPr algn="ctr"/>
+            <a:r>
+              <a:rPr lang="ko-KR" altLang="en-US" sz="1600" dirty="0" smtClean="0"/>
+              <a:t>정렬 기준 </a:t>
+            </a:r>
+            <a:r>
+              <a:rPr lang="en-US" altLang="ko-KR" sz="1600" dirty="0" smtClean="0"/>
+              <a:t>1. </a:t>
+            </a:r>
+            <a:r>
+              <a:rPr lang="ko-KR" altLang="en-US" sz="1600" dirty="0" smtClean="0"/>
+              <a:t>조회수</a:t>
+            </a:r>
+            <a:r>
+              <a:rPr lang="en-US" altLang="ko-KR" sz="1600" dirty="0" smtClean="0"/>
+              <a:t>, </a:t>
+            </a:r>
+            <a:r>
+              <a:rPr lang="ko-KR" altLang="en-US" sz="1600" dirty="0" smtClean="0"/>
+              <a:t>좋아요 수</a:t>
+            </a:r>
+            <a:r>
+              <a:rPr lang="en-US" altLang="ko-KR" sz="1600" dirty="0" smtClean="0"/>
+              <a:t>, </a:t>
+            </a:r>
+            <a:r>
+              <a:rPr lang="ko-KR" altLang="en-US" sz="1600" dirty="0" smtClean="0"/>
+              <a:t>추천 수</a:t>
+            </a:r>
+            <a:r>
+              <a:rPr lang="en-US" altLang="ko-KR" sz="1600" dirty="0" smtClean="0"/>
+              <a:t>, </a:t>
+            </a:r>
+            <a:r>
+              <a:rPr lang="ko-KR" altLang="en-US" sz="1600" dirty="0" smtClean="0"/>
+              <a:t>등록 </a:t>
+            </a:r>
+            <a:r>
+              <a:rPr lang="ko-KR" altLang="en-US" sz="1600" dirty="0" smtClean="0"/>
+              <a:t>순</a:t>
+            </a:r>
+            <a:r>
+              <a:rPr lang="en-US" altLang="ko-KR" sz="1600" dirty="0" smtClean="0"/>
+              <a:t>, </a:t>
+            </a:r>
+            <a:r>
+              <a:rPr lang="ko-KR" altLang="en-US" sz="1600" dirty="0" smtClean="0"/>
+              <a:t>가나다순</a:t>
+            </a:r>
+            <a:r>
+              <a:rPr lang="en-US" altLang="ko-KR" sz="1600" dirty="0" smtClean="0"/>
+              <a:t> </a:t>
+            </a:r>
+            <a:r>
+              <a:rPr lang="en-US" altLang="ko-KR" sz="1600" dirty="0" smtClean="0"/>
+              <a:t>2.</a:t>
+            </a:r>
+            <a:r>
+              <a:rPr lang="ko-KR" altLang="en-US" sz="1600" dirty="0" smtClean="0"/>
+              <a:t>내림차순</a:t>
+            </a:r>
+            <a:r>
+              <a:rPr lang="en-US" altLang="ko-KR" sz="1600" dirty="0" smtClean="0"/>
+              <a:t>, </a:t>
+            </a:r>
+            <a:r>
+              <a:rPr lang="ko-KR" altLang="en-US" sz="1600" dirty="0" smtClean="0"/>
+              <a:t>오름차순</a:t>
+            </a:r>
+            <a:endParaRPr lang="en-US" altLang="ko-KR" sz="1600" dirty="0" smtClean="0"/>
+          </a:p>
+          <a:p>
+            <a:pPr algn="ctr"/>
+            <a:r>
+              <a:rPr lang="en-US" altLang="ko-KR" sz="1600" dirty="0" smtClean="0"/>
+              <a:t>(</a:t>
+            </a:r>
+            <a:r>
+              <a:rPr lang="ko-KR" altLang="en-US" sz="1600" dirty="0" smtClean="0"/>
+              <a:t>디폴트는 조회수 내림차순</a:t>
+            </a:r>
+            <a:r>
+              <a:rPr lang="en-US" altLang="ko-KR" sz="1600" dirty="0" smtClean="0"/>
+              <a:t>)</a:t>
+            </a:r>
+          </a:p>
+          <a:p>
+            <a:pPr algn="ctr"/>
+            <a:r>
+              <a:rPr lang="ko-KR" altLang="en-US" sz="1600" dirty="0" smtClean="0"/>
+              <a:t>카테고리 내에 사이트 정렬해서 보여주자 카드 반복</a:t>
+            </a:r>
+            <a:endParaRPr lang="en-US" altLang="ko-KR" sz="1600" dirty="0" smtClean="0"/>
+          </a:p>
+          <a:p>
+            <a:pPr algn="ctr"/>
+            <a:endParaRPr lang="ko-KR" altLang="en-US" sz="1600" dirty="0"/>
+          </a:p>
+        </p:txBody>
+      </p:sp>
+      <p:sp>
+        <p:nvSpPr>
+          <p:cNvPr id="14" name="모서리가 둥근 직사각형 13"/>
+          <p:cNvSpPr/>
+          <p:nvPr/>
+        </p:nvSpPr>
+        <p:spPr>
+          <a:xfrm>
+            <a:off x="2241317" y="6314315"/>
+            <a:ext cx="9950681" cy="543685"/>
+          </a:xfrm>
+          <a:prstGeom prst="roundRect">
+            <a:avLst/>
+          </a:prstGeom>
+        </p:spPr>
+        <p:style>
+          <a:lnRef idx="2">
+            <a:schemeClr val="accent1">
+              <a:shade val="50000"/>
+            </a:schemeClr>
+          </a:lnRef>
+          <a:fillRef idx="1">
+            <a:schemeClr val="accent1"/>
+          </a:fillRef>
+          <a:effectRef idx="0">
+            <a:schemeClr val="accent1"/>
+          </a:effectRef>
+          <a:fontRef idx="minor">
+            <a:schemeClr val="lt1"/>
+          </a:fontRef>
+        </p:style>
+        <p:txBody>
+          <a:bodyPr rtlCol="0" anchor="ctr"/>
+          <a:lstStyle/>
+          <a:p>
+            <a:pPr algn="ctr"/>
+            <a:r>
+              <a:rPr lang="ko-KR" altLang="en-US" sz="1600" dirty="0" err="1" smtClean="0"/>
+              <a:t>푸터</a:t>
+            </a:r>
+            <a:r>
+              <a:rPr lang="ko-KR" altLang="en-US" sz="1600" dirty="0" smtClean="0"/>
+              <a:t> </a:t>
+            </a:r>
+            <a:r>
+              <a:rPr lang="en-US" altLang="ko-KR" sz="1600" dirty="0" smtClean="0"/>
+              <a:t>(</a:t>
+            </a:r>
+            <a:r>
+              <a:rPr lang="ko-KR" altLang="en-US" sz="1600" dirty="0" smtClean="0"/>
+              <a:t>서비스</a:t>
+            </a:r>
+            <a:r>
+              <a:rPr lang="en-US" altLang="ko-KR" sz="1600" dirty="0" smtClean="0"/>
+              <a:t>, </a:t>
+            </a:r>
+            <a:r>
+              <a:rPr lang="ko-KR" altLang="en-US" sz="1600" dirty="0" smtClean="0"/>
+              <a:t>문의</a:t>
+            </a:r>
+            <a:r>
+              <a:rPr lang="en-US" altLang="ko-KR" sz="1600" dirty="0" smtClean="0"/>
+              <a:t>, </a:t>
+            </a:r>
+            <a:r>
+              <a:rPr lang="ko-KR" altLang="en-US" sz="1600" dirty="0" smtClean="0"/>
+              <a:t>고객센터</a:t>
+            </a:r>
+            <a:r>
+              <a:rPr lang="en-US" altLang="ko-KR" sz="1600" dirty="0" smtClean="0"/>
+              <a:t>), </a:t>
+            </a:r>
+            <a:r>
+              <a:rPr lang="ko-KR" altLang="en-US" sz="1600" dirty="0" smtClean="0"/>
+              <a:t>기업 정보</a:t>
+            </a:r>
+            <a:r>
+              <a:rPr lang="en-US" altLang="ko-KR" sz="1600" dirty="0" smtClean="0"/>
+              <a:t>, </a:t>
+            </a:r>
+            <a:r>
+              <a:rPr lang="ko-KR" altLang="en-US" sz="1600" dirty="0" smtClean="0"/>
+              <a:t>개인정보 처리방침</a:t>
+            </a:r>
+            <a:r>
+              <a:rPr lang="en-US" altLang="ko-KR" sz="1600" dirty="0" smtClean="0"/>
+              <a:t>, </a:t>
+            </a:r>
+            <a:r>
+              <a:rPr lang="ko-KR" altLang="en-US" sz="1600" dirty="0" smtClean="0"/>
+              <a:t>이용약관</a:t>
+            </a:r>
+            <a:r>
+              <a:rPr lang="en-US" altLang="ko-KR" sz="1600" dirty="0" smtClean="0"/>
+              <a:t>, </a:t>
+            </a:r>
+            <a:r>
+              <a:rPr lang="ko-KR" altLang="en-US" sz="1600" smtClean="0"/>
+              <a:t>기타 등등</a:t>
+            </a:r>
+            <a:endParaRPr lang="en-US" altLang="ko-KR" sz="1600" dirty="0" smtClean="0"/>
+          </a:p>
+        </p:txBody>
+      </p:sp>
+      <p:sp>
+        <p:nvSpPr>
+          <p:cNvPr id="17" name="직사각형 16"/>
+          <p:cNvSpPr/>
+          <p:nvPr/>
+        </p:nvSpPr>
+        <p:spPr>
+          <a:xfrm>
+            <a:off x="2982476" y="47502"/>
+            <a:ext cx="9126974" cy="1113008"/>
+          </a:xfrm>
+          <a:prstGeom prst="rect">
+            <a:avLst/>
+          </a:prstGeom>
+          <a:solidFill>
+            <a:schemeClr val="bg1">
+              <a:lumMod val="95000"/>
+            </a:schemeClr>
+          </a:solidFill>
+          <a:ln>
+            <a:noFill/>
+          </a:ln>
+        </p:spPr>
+        <p:style>
+          <a:lnRef idx="2">
+            <a:schemeClr val="accent1">
+              <a:shade val="50000"/>
+            </a:schemeClr>
+          </a:lnRef>
+          <a:fillRef idx="1">
+            <a:schemeClr val="accent1"/>
+          </a:fillRef>
+          <a:effectRef idx="0">
+            <a:schemeClr val="accent1"/>
+          </a:effectRef>
+          <a:fontRef idx="minor">
+            <a:schemeClr val="lt1"/>
+          </a:fontRef>
+        </p:style>
+        <p:txBody>
+          <a:bodyPr rtlCol="0" anchor="t"/>
+          <a:lstStyle/>
+          <a:p>
+            <a:r>
+              <a:rPr lang="ko-KR" altLang="en-US" sz="1400" dirty="0" smtClean="0">
+                <a:solidFill>
+                  <a:schemeClr val="tx1"/>
+                </a:solidFill>
+              </a:rPr>
+              <a:t>고려 사항</a:t>
+            </a:r>
+            <a:endParaRPr lang="en-US" altLang="ko-KR" sz="1400" dirty="0" smtClean="0">
+              <a:solidFill>
+                <a:schemeClr val="tx1"/>
+              </a:solidFill>
+            </a:endParaRPr>
+          </a:p>
+          <a:p>
+            <a:pPr marL="285750" indent="-285750">
+              <a:buFontTx/>
+              <a:buChar char="-"/>
+            </a:pPr>
+            <a:r>
+              <a:rPr lang="ko-KR" altLang="en-US" sz="1400" dirty="0" smtClean="0">
+                <a:solidFill>
+                  <a:schemeClr val="tx1"/>
+                </a:solidFill>
+              </a:rPr>
+              <a:t>배너 위치</a:t>
+            </a:r>
+            <a:r>
+              <a:rPr lang="en-US" altLang="ko-KR" sz="1400" dirty="0" smtClean="0">
+                <a:solidFill>
+                  <a:schemeClr val="tx1"/>
+                </a:solidFill>
+              </a:rPr>
+              <a:t>(+</a:t>
+            </a:r>
+            <a:r>
+              <a:rPr lang="ko-KR" altLang="en-US" sz="1400" dirty="0" smtClean="0">
+                <a:solidFill>
+                  <a:schemeClr val="tx1"/>
+                </a:solidFill>
+              </a:rPr>
+              <a:t>배너 크기</a:t>
+            </a:r>
+            <a:r>
+              <a:rPr lang="en-US" altLang="ko-KR" sz="1400" dirty="0" smtClean="0">
+                <a:solidFill>
+                  <a:schemeClr val="tx1"/>
+                </a:solidFill>
+              </a:rPr>
+              <a:t>, </a:t>
+            </a:r>
+            <a:r>
+              <a:rPr lang="ko-KR" altLang="en-US" sz="1400" dirty="0" smtClean="0">
+                <a:solidFill>
+                  <a:schemeClr val="tx1"/>
+                </a:solidFill>
+              </a:rPr>
+              <a:t>표준 사이즈 검색</a:t>
+            </a:r>
+            <a:r>
+              <a:rPr lang="en-US" altLang="ko-KR" sz="1400" dirty="0">
+                <a:solidFill>
+                  <a:schemeClr val="tx1"/>
+                </a:solidFill>
+              </a:rPr>
+              <a:t>)</a:t>
+            </a:r>
+            <a:endParaRPr lang="en-US" altLang="ko-KR" sz="1400" dirty="0" smtClean="0">
+              <a:solidFill>
+                <a:schemeClr val="tx1"/>
+              </a:solidFill>
+            </a:endParaRPr>
+          </a:p>
+          <a:p>
+            <a:pPr marL="285750" indent="-285750">
+              <a:buFontTx/>
+              <a:buChar char="-"/>
+            </a:pPr>
+            <a:r>
+              <a:rPr lang="ko-KR" altLang="en-US" sz="1400" dirty="0" smtClean="0">
+                <a:solidFill>
+                  <a:schemeClr val="tx1"/>
+                </a:solidFill>
+              </a:rPr>
+              <a:t>최대 가로 크기</a:t>
+            </a:r>
+            <a:endParaRPr lang="en-US" altLang="ko-KR" sz="1400" dirty="0" smtClean="0">
+              <a:solidFill>
+                <a:schemeClr val="tx1"/>
+              </a:solidFill>
+            </a:endParaRPr>
+          </a:p>
+          <a:p>
+            <a:pPr marL="285750" indent="-285750">
+              <a:buFontTx/>
+              <a:buChar char="-"/>
+            </a:pPr>
+            <a:endParaRPr lang="ko-KR" altLang="en-US" sz="1400" dirty="0">
+              <a:solidFill>
+                <a:schemeClr val="tx1"/>
+              </a:solidFill>
+            </a:endParaRPr>
+          </a:p>
+        </p:txBody>
+      </p:sp>
+    </p:spTree>
+    <p:extLst>
+      <p:ext uri="{BB962C8B-B14F-4D97-AF65-F5344CB8AC3E}">
+        <p14:creationId xmlns:p14="http://schemas.microsoft.com/office/powerpoint/2010/main" val="134506519"/>
+      </p:ext>
+    </p:extLst>
+  </p:cSld>
+  <p:clrMapOvr>
+    <a:masterClrMapping/>
+  </p:clrMapOvr>
+</p:sld>
+</file>
+
+<file path=ppt/slides/slide7.xml><?xml version="1.0" encoding="utf-8"?>
+<p:sld xmlns:a="http://schemas.openxmlformats.org/drawingml/2006/main" xmlns:r="http://schemas.openxmlformats.org/officeDocument/2006/relationships" xmlns:p="http://schemas.openxmlformats.org/presentationml/2006/main">
+  <p:cSld>
+    <p:spTree>
+      <p:nvGrpSpPr>
+        <p:cNvPr id="1" name=""/>
+        <p:cNvGrpSpPr/>
+        <p:nvPr/>
+      </p:nvGrpSpPr>
+      <p:grpSpPr>
+        <a:xfrm>
+          <a:off x="0" y="0"/>
+          <a:ext cx="0" cy="0"/>
+          <a:chOff x="0" y="0"/>
+          <a:chExt cx="0" cy="0"/>
+        </a:xfrm>
+      </p:grpSpPr>
+      <p:grpSp>
+        <p:nvGrpSpPr>
+          <p:cNvPr id="16" name="그룹 15"/>
+          <p:cNvGrpSpPr/>
+          <p:nvPr/>
+        </p:nvGrpSpPr>
+        <p:grpSpPr>
+          <a:xfrm>
+            <a:off x="53440" y="47501"/>
+            <a:ext cx="4441370" cy="469076"/>
+            <a:chOff x="53440" y="47501"/>
+            <a:chExt cx="2820390" cy="469076"/>
+          </a:xfrm>
+        </p:grpSpPr>
+        <p:sp>
+          <p:nvSpPr>
+            <p:cNvPr id="5" name="직사각형 4"/>
+            <p:cNvSpPr/>
+            <p:nvPr/>
+          </p:nvSpPr>
+          <p:spPr>
+            <a:xfrm>
+              <a:off x="53440" y="47501"/>
+              <a:ext cx="2820390" cy="469076"/>
+            </a:xfrm>
+            <a:prstGeom prst="rect">
+              <a:avLst/>
+            </a:prstGeom>
+            <a:noFill/>
+            <a:ln>
+              <a:noFill/>
+            </a:ln>
+          </p:spPr>
+          <p:style>
+            <a:lnRef idx="2">
+              <a:schemeClr val="accent1">
+                <a:shade val="50000"/>
+              </a:schemeClr>
+            </a:lnRef>
+            <a:fillRef idx="1">
+              <a:schemeClr val="accent1"/>
+            </a:fillRef>
+            <a:effectRef idx="0">
+              <a:schemeClr val="accent1"/>
+            </a:effectRef>
+            <a:fontRef idx="minor">
+              <a:schemeClr val="lt1"/>
+            </a:fontRef>
+          </p:style>
+          <p:txBody>
+            <a:bodyPr rtlCol="0" anchor="ctr"/>
+            <a:lstStyle/>
+            <a:p>
+              <a:pPr algn="ctr"/>
+              <a:r>
+                <a:rPr lang="en-US" altLang="ko-KR" sz="2000" b="1" dirty="0" smtClean="0">
+                  <a:solidFill>
+                    <a:schemeClr val="tx1"/>
+                  </a:solidFill>
+                </a:rPr>
+                <a:t>Category</a:t>
+              </a:r>
+              <a:r>
+                <a:rPr lang="en-US" altLang="ko-KR" sz="2000" b="1" dirty="0" smtClean="0">
+                  <a:solidFill>
+                    <a:schemeClr val="tx1"/>
+                  </a:solidFill>
+                </a:rPr>
+                <a:t>~ (</a:t>
+              </a:r>
+              <a:r>
+                <a:rPr lang="ko-KR" altLang="en-US" sz="2000" b="1" dirty="0" smtClean="0">
+                  <a:solidFill>
+                    <a:schemeClr val="tx1"/>
+                  </a:solidFill>
+                </a:rPr>
+                <a:t>내부 메인 페이지</a:t>
+              </a:r>
+              <a:r>
+                <a:rPr lang="en-US" altLang="ko-KR" sz="2000" b="1" dirty="0" smtClean="0">
+                  <a:solidFill>
+                    <a:schemeClr val="tx1"/>
+                  </a:solidFill>
+                </a:rPr>
+                <a:t>)</a:t>
+              </a:r>
               <a:endParaRPr lang="en-US" altLang="ko-KR" sz="2000" b="1" dirty="0" smtClean="0">
                 <a:solidFill>
                   <a:schemeClr val="tx1"/>
@@ -5701,15 +6574,7 @@
                   <a:schemeClr val="tx1"/>
                 </a:solidFill>
               </a:rPr>
-              <a:t>주요 </a:t>
-            </a:r>
-            <a:r>
-              <a:rPr lang="ko-KR" altLang="en-US" sz="1400" dirty="0" smtClean="0">
-                <a:solidFill>
-                  <a:schemeClr val="tx1"/>
-                </a:solidFill>
-              </a:rPr>
-              <a:t>기능</a:t>
+              <a:t>주요 기능</a:t>
             </a:r>
             <a:endParaRPr lang="en-US" altLang="ko-KR" sz="1400" dirty="0" smtClean="0">
               <a:solidFill>
@@ -5772,474 +6637,14 @@
       </p:sp>
       <p:sp>
         <p:nvSpPr>
-          <p:cNvPr id="9" name="모서리가 둥근 직사각형 8"/>
-          <p:cNvSpPr/>
-          <p:nvPr/>
-        </p:nvSpPr>
-        <p:spPr>
-          <a:xfrm>
-            <a:off x="2241319" y="1275048"/>
-            <a:ext cx="9950681" cy="543685"/>
-          </a:xfrm>
-          <a:prstGeom prst="roundRect">
-            <a:avLst/>
-          </a:prstGeom>
-        </p:spPr>
-        <p:style>
-          <a:lnRef idx="2">
-            <a:schemeClr val="accent1">
-              <a:shade val="50000"/>
-            </a:schemeClr>
-          </a:lnRef>
-          <a:fillRef idx="1">
-            <a:schemeClr val="accent1"/>
-          </a:fillRef>
-          <a:effectRef idx="0">
-            <a:schemeClr val="accent1"/>
-          </a:effectRef>
-          <a:fontRef idx="minor">
-            <a:schemeClr val="lt1"/>
-          </a:fontRef>
-        </p:style>
-        <p:txBody>
-          <a:bodyPr rtlCol="0" anchor="ctr"/>
-          <a:lstStyle/>
-          <a:p>
-            <a:pPr algn="ctr"/>
-            <a:r>
-              <a:rPr lang="ko-KR" altLang="en-US" sz="1600" dirty="0" smtClean="0"/>
-              <a:t>헤더</a:t>
-            </a:r>
-            <a:endParaRPr lang="en-US" altLang="ko-KR" sz="1600" dirty="0" smtClean="0"/>
-          </a:p>
-        </p:txBody>
-      </p:sp>
-      <p:sp>
-        <p:nvSpPr>
-          <p:cNvPr id="10" name="모서리가 둥근 직사각형 9"/>
-          <p:cNvSpPr/>
-          <p:nvPr/>
-        </p:nvSpPr>
-        <p:spPr>
-          <a:xfrm>
-            <a:off x="2442420" y="1399578"/>
-            <a:ext cx="930453" cy="318922"/>
-          </a:xfrm>
-          <a:prstGeom prst="roundRect">
-            <a:avLst/>
-          </a:prstGeom>
-        </p:spPr>
-        <p:style>
-          <a:lnRef idx="2">
-            <a:schemeClr val="accent1">
-              <a:shade val="50000"/>
-            </a:schemeClr>
-          </a:lnRef>
-          <a:fillRef idx="1">
-            <a:schemeClr val="accent1"/>
-          </a:fillRef>
-          <a:effectRef idx="0">
-            <a:schemeClr val="accent1"/>
-          </a:effectRef>
-          <a:fontRef idx="minor">
-            <a:schemeClr val="lt1"/>
-          </a:fontRef>
-        </p:style>
-        <p:txBody>
-          <a:bodyPr rtlCol="0" anchor="ctr"/>
-          <a:lstStyle/>
-          <a:p>
-            <a:pPr algn="ctr"/>
-            <a:r>
-              <a:rPr lang="ko-KR" altLang="en-US" sz="1600" smtClean="0"/>
-              <a:t>로고</a:t>
-            </a:r>
-            <a:endParaRPr lang="ko-KR" altLang="en-US" sz="1600"/>
-          </a:p>
-        </p:txBody>
-      </p:sp>
-      <p:sp>
-        <p:nvSpPr>
-          <p:cNvPr id="11" name="모서리가 둥근 직사각형 10"/>
-          <p:cNvSpPr/>
-          <p:nvPr/>
-        </p:nvSpPr>
-        <p:spPr>
-          <a:xfrm>
-            <a:off x="2241318" y="1833038"/>
-            <a:ext cx="9950682" cy="1224857"/>
-          </a:xfrm>
-          <a:prstGeom prst="roundRect">
-            <a:avLst/>
-          </a:prstGeom>
-        </p:spPr>
-        <p:style>
-          <a:lnRef idx="2">
-            <a:schemeClr val="accent1">
-              <a:shade val="50000"/>
-            </a:schemeClr>
-          </a:lnRef>
-          <a:fillRef idx="1">
-            <a:schemeClr val="accent1"/>
-          </a:fillRef>
-          <a:effectRef idx="0">
-            <a:schemeClr val="accent1"/>
-          </a:effectRef>
-          <a:fontRef idx="minor">
-            <a:schemeClr val="lt1"/>
-          </a:fontRef>
-        </p:style>
-        <p:txBody>
-          <a:bodyPr rtlCol="0" anchor="ctr"/>
-          <a:lstStyle/>
-          <a:p>
-            <a:pPr algn="ctr"/>
-            <a:r>
-              <a:rPr lang="ko-KR" altLang="en-US" sz="1600" dirty="0" smtClean="0"/>
-              <a:t>네비게이션 </a:t>
-            </a:r>
-            <a:r>
-              <a:rPr lang="en-US" altLang="ko-KR" sz="1600" dirty="0" smtClean="0"/>
-              <a:t>(</a:t>
-            </a:r>
-            <a:r>
-              <a:rPr lang="ko-KR" altLang="en-US" sz="1600" dirty="0" smtClean="0"/>
-              <a:t>사이트 이동 방향</a:t>
-            </a:r>
-            <a:r>
-              <a:rPr lang="en-US" altLang="ko-KR" sz="1600" dirty="0" smtClean="0"/>
-              <a:t>) : </a:t>
-            </a:r>
-            <a:r>
-              <a:rPr lang="ko-KR" altLang="en-US" sz="1600" dirty="0" smtClean="0"/>
-              <a:t>카테고리 표시 모바일도 가능하게 왼쪽에 확장 버튼 만들어서 누르면</a:t>
-            </a:r>
-            <a:endParaRPr lang="en-US" altLang="ko-KR" sz="1600" dirty="0" smtClean="0"/>
-          </a:p>
-          <a:p>
-            <a:pPr algn="ctr"/>
-            <a:r>
-              <a:rPr lang="ko-KR" altLang="en-US" sz="1600" dirty="0" smtClean="0"/>
-              <a:t>아래로 네비게이션 </a:t>
-            </a:r>
-            <a:r>
-              <a:rPr lang="ko-KR" altLang="en-US" sz="1600" dirty="0" smtClean="0"/>
-              <a:t>확장하자</a:t>
-            </a:r>
-            <a:endParaRPr lang="en-US" altLang="ko-KR" sz="1600" dirty="0" smtClean="0"/>
-          </a:p>
-          <a:p>
-            <a:pPr algn="ctr"/>
-            <a:r>
-              <a:rPr lang="ko-KR" altLang="en-US" sz="1600" dirty="0" smtClean="0"/>
-              <a:t>선택한 카테고리 표시 </a:t>
-            </a:r>
-            <a:r>
-              <a:rPr lang="en-US" altLang="ko-KR" sz="1600" dirty="0" smtClean="0"/>
-              <a:t>+ </a:t>
-            </a:r>
-            <a:r>
-              <a:rPr lang="ko-KR" altLang="en-US" sz="1600" dirty="0" smtClean="0"/>
-              <a:t>확장해주고</a:t>
-            </a:r>
-            <a:endParaRPr lang="ko-KR" altLang="en-US" sz="1600" dirty="0"/>
-          </a:p>
-        </p:txBody>
-      </p:sp>
-      <p:sp>
-        <p:nvSpPr>
-          <p:cNvPr id="12" name="모서리가 둥근 직사각형 11"/>
-          <p:cNvSpPr/>
-          <p:nvPr/>
-        </p:nvSpPr>
-        <p:spPr>
-          <a:xfrm>
-            <a:off x="8487256" y="1375281"/>
-            <a:ext cx="3192779" cy="343220"/>
-          </a:xfrm>
-          <a:prstGeom prst="roundRect">
-            <a:avLst/>
-          </a:prstGeom>
-        </p:spPr>
-        <p:style>
-          <a:lnRef idx="2">
-            <a:schemeClr val="accent1">
-              <a:shade val="50000"/>
-            </a:schemeClr>
-          </a:lnRef>
-          <a:fillRef idx="1">
-            <a:schemeClr val="accent1"/>
-          </a:fillRef>
-          <a:effectRef idx="0">
-            <a:schemeClr val="accent1"/>
-          </a:effectRef>
-          <a:fontRef idx="minor">
-            <a:schemeClr val="lt1"/>
-          </a:fontRef>
-        </p:style>
-        <p:txBody>
-          <a:bodyPr rtlCol="0" anchor="ctr"/>
-          <a:lstStyle/>
-          <a:p>
-            <a:pPr algn="ctr"/>
-            <a:r>
-              <a:rPr lang="ko-KR" altLang="en-US" sz="1600" dirty="0" smtClean="0"/>
-              <a:t>로그인 및 페이지 기본 기능</a:t>
-            </a:r>
-            <a:endParaRPr lang="ko-KR" altLang="en-US" sz="1600" dirty="0"/>
-          </a:p>
-        </p:txBody>
-      </p:sp>
-      <p:sp>
-        <p:nvSpPr>
-          <p:cNvPr id="13" name="모서리가 둥근 직사각형 12"/>
-          <p:cNvSpPr/>
-          <p:nvPr/>
-        </p:nvSpPr>
-        <p:spPr>
-          <a:xfrm>
-            <a:off x="2241319" y="3072200"/>
-            <a:ext cx="9950681" cy="2942652"/>
-          </a:xfrm>
-          <a:prstGeom prst="roundRect">
-            <a:avLst/>
-          </a:prstGeom>
-        </p:spPr>
-        <p:style>
-          <a:lnRef idx="2">
-            <a:schemeClr val="accent1">
-              <a:shade val="50000"/>
-            </a:schemeClr>
-          </a:lnRef>
-          <a:fillRef idx="1">
-            <a:schemeClr val="accent1"/>
-          </a:fillRef>
-          <a:effectRef idx="0">
-            <a:schemeClr val="accent1"/>
-          </a:effectRef>
-          <a:fontRef idx="minor">
-            <a:schemeClr val="lt1"/>
-          </a:fontRef>
-        </p:style>
-        <p:txBody>
-          <a:bodyPr rtlCol="0" anchor="ctr"/>
-          <a:lstStyle/>
-          <a:p>
-            <a:pPr algn="ctr"/>
-            <a:r>
-              <a:rPr lang="ko-KR" altLang="en-US" sz="1600" dirty="0" smtClean="0"/>
-              <a:t>메인 </a:t>
-            </a:r>
-            <a:r>
-              <a:rPr lang="ko-KR" altLang="en-US" sz="1600" dirty="0" smtClean="0"/>
-              <a:t>페이지</a:t>
-            </a:r>
-            <a:endParaRPr lang="en-US" altLang="ko-KR" sz="1600" dirty="0" smtClean="0"/>
-          </a:p>
-          <a:p>
-            <a:pPr algn="ctr"/>
-            <a:r>
-              <a:rPr lang="ko-KR" altLang="en-US" sz="1600" dirty="0" smtClean="0"/>
-              <a:t>정렬 기준 </a:t>
-            </a:r>
-            <a:r>
-              <a:rPr lang="en-US" altLang="ko-KR" sz="1600" dirty="0" smtClean="0"/>
-              <a:t>1. </a:t>
-            </a:r>
-            <a:r>
-              <a:rPr lang="ko-KR" altLang="en-US" sz="1600" dirty="0" smtClean="0"/>
-              <a:t>조회수</a:t>
-            </a:r>
-            <a:r>
-              <a:rPr lang="en-US" altLang="ko-KR" sz="1600" dirty="0" smtClean="0"/>
-              <a:t>, </a:t>
-            </a:r>
-            <a:r>
-              <a:rPr lang="ko-KR" altLang="en-US" sz="1600" dirty="0" smtClean="0"/>
-              <a:t>좋아요 수</a:t>
-            </a:r>
-            <a:r>
-              <a:rPr lang="en-US" altLang="ko-KR" sz="1600" dirty="0" smtClean="0"/>
-              <a:t>, </a:t>
-            </a:r>
-            <a:r>
-              <a:rPr lang="ko-KR" altLang="en-US" sz="1600" dirty="0" smtClean="0"/>
-              <a:t>추천 수</a:t>
-            </a:r>
-            <a:r>
-              <a:rPr lang="en-US" altLang="ko-KR" sz="1600" dirty="0" smtClean="0"/>
-              <a:t>, </a:t>
-            </a:r>
-            <a:r>
-              <a:rPr lang="ko-KR" altLang="en-US" sz="1600" dirty="0" smtClean="0"/>
-              <a:t>등록 순</a:t>
-            </a:r>
-            <a:r>
-              <a:rPr lang="en-US" altLang="ko-KR" sz="1600" dirty="0" smtClean="0"/>
-              <a:t> 2.</a:t>
-            </a:r>
-            <a:r>
-              <a:rPr lang="ko-KR" altLang="en-US" sz="1600" dirty="0" smtClean="0"/>
-              <a:t>내림차순</a:t>
-            </a:r>
-            <a:r>
-              <a:rPr lang="en-US" altLang="ko-KR" sz="1600" dirty="0" smtClean="0"/>
-              <a:t>, </a:t>
-            </a:r>
-            <a:r>
-              <a:rPr lang="ko-KR" altLang="en-US" sz="1600" dirty="0" smtClean="0"/>
-              <a:t>오름차순</a:t>
-            </a:r>
-            <a:endParaRPr lang="en-US" altLang="ko-KR" sz="1600" dirty="0" smtClean="0"/>
-          </a:p>
-          <a:p>
-            <a:pPr algn="ctr"/>
-            <a:r>
-              <a:rPr lang="en-US" altLang="ko-KR" sz="1600" dirty="0" smtClean="0"/>
-              <a:t>(</a:t>
-            </a:r>
-            <a:r>
-              <a:rPr lang="ko-KR" altLang="en-US" sz="1600" dirty="0" smtClean="0"/>
-              <a:t>디폴트는 조회수 내림차순</a:t>
-            </a:r>
-            <a:r>
-              <a:rPr lang="en-US" altLang="ko-KR" sz="1600" dirty="0" smtClean="0"/>
-              <a:t>)</a:t>
-            </a:r>
-            <a:endParaRPr lang="en-US" altLang="ko-KR" sz="1600" dirty="0" smtClean="0"/>
-          </a:p>
-          <a:p>
-            <a:pPr algn="ctr"/>
-            <a:r>
-              <a:rPr lang="ko-KR" altLang="en-US" sz="1600" dirty="0" smtClean="0"/>
-              <a:t>카테고리 내에 사이트 </a:t>
-            </a:r>
-            <a:r>
-              <a:rPr lang="ko-KR" altLang="en-US" sz="1600" dirty="0" smtClean="0"/>
-              <a:t>정렬해서 보여주자 카드 반복</a:t>
-            </a:r>
-            <a:endParaRPr lang="en-US" altLang="ko-KR" sz="1600" dirty="0" smtClean="0"/>
-          </a:p>
-          <a:p>
-            <a:pPr algn="ctr"/>
-            <a:endParaRPr lang="ko-KR" altLang="en-US" sz="1600" dirty="0"/>
-          </a:p>
-        </p:txBody>
-      </p:sp>
-      <p:sp>
-        <p:nvSpPr>
-          <p:cNvPr id="14" name="모서리가 둥근 직사각형 13"/>
-          <p:cNvSpPr/>
-          <p:nvPr/>
-        </p:nvSpPr>
-        <p:spPr>
-          <a:xfrm>
-            <a:off x="2241317" y="6314315"/>
-            <a:ext cx="9950681" cy="543685"/>
-          </a:xfrm>
-          <a:prstGeom prst="roundRect">
-            <a:avLst/>
-          </a:prstGeom>
-        </p:spPr>
-        <p:style>
-          <a:lnRef idx="2">
-            <a:schemeClr val="accent1">
-              <a:shade val="50000"/>
-            </a:schemeClr>
-          </a:lnRef>
-          <a:fillRef idx="1">
-            <a:schemeClr val="accent1"/>
-          </a:fillRef>
-          <a:effectRef idx="0">
-            <a:schemeClr val="accent1"/>
-          </a:effectRef>
-          <a:fontRef idx="minor">
-            <a:schemeClr val="lt1"/>
-          </a:fontRef>
-        </p:style>
-        <p:txBody>
-          <a:bodyPr rtlCol="0" anchor="ctr"/>
-          <a:lstStyle/>
-          <a:p>
-            <a:pPr algn="ctr"/>
-            <a:r>
-              <a:rPr lang="ko-KR" altLang="en-US" sz="1600" dirty="0" err="1" smtClean="0"/>
-              <a:t>푸터</a:t>
-            </a:r>
-            <a:r>
-              <a:rPr lang="ko-KR" altLang="en-US" sz="1600" dirty="0" smtClean="0"/>
-              <a:t> </a:t>
-            </a:r>
-            <a:r>
-              <a:rPr lang="en-US" altLang="ko-KR" sz="1600" dirty="0" smtClean="0"/>
-              <a:t>(</a:t>
-            </a:r>
-            <a:r>
-              <a:rPr lang="ko-KR" altLang="en-US" sz="1600" dirty="0" smtClean="0"/>
-              <a:t>서비스</a:t>
-            </a:r>
-            <a:r>
-              <a:rPr lang="en-US" altLang="ko-KR" sz="1600" dirty="0" smtClean="0"/>
-              <a:t>, </a:t>
-            </a:r>
-            <a:r>
-              <a:rPr lang="ko-KR" altLang="en-US" sz="1600" dirty="0" smtClean="0"/>
-              <a:t>문의</a:t>
-            </a:r>
-            <a:r>
-              <a:rPr lang="en-US" altLang="ko-KR" sz="1600" dirty="0" smtClean="0"/>
-              <a:t>, </a:t>
-            </a:r>
-            <a:r>
-              <a:rPr lang="ko-KR" altLang="en-US" sz="1600" dirty="0" smtClean="0"/>
-              <a:t>고객센터</a:t>
-            </a:r>
-            <a:r>
-              <a:rPr lang="en-US" altLang="ko-KR" sz="1600" dirty="0" smtClean="0"/>
-              <a:t>), </a:t>
-            </a:r>
-            <a:r>
-              <a:rPr lang="ko-KR" altLang="en-US" sz="1600" dirty="0" smtClean="0"/>
-              <a:t>기업 정보</a:t>
-            </a:r>
-            <a:r>
-              <a:rPr lang="en-US" altLang="ko-KR" sz="1600" dirty="0" smtClean="0"/>
-              <a:t>, </a:t>
-            </a:r>
-            <a:r>
-              <a:rPr lang="ko-KR" altLang="en-US" sz="1600" dirty="0" smtClean="0"/>
-              <a:t>개인정보 처리방침</a:t>
-            </a:r>
-            <a:r>
-              <a:rPr lang="en-US" altLang="ko-KR" sz="1600" dirty="0" smtClean="0"/>
-              <a:t>, </a:t>
-            </a:r>
-            <a:r>
-              <a:rPr lang="ko-KR" altLang="en-US" sz="1600" dirty="0" smtClean="0"/>
-              <a:t>이용약관</a:t>
-            </a:r>
-            <a:r>
-              <a:rPr lang="en-US" altLang="ko-KR" sz="1600" dirty="0" smtClean="0"/>
-              <a:t>, </a:t>
-            </a:r>
-            <a:r>
-              <a:rPr lang="ko-KR" altLang="en-US" sz="1600" smtClean="0"/>
-              <a:t>기타 등등</a:t>
-            </a:r>
-            <a:endParaRPr lang="en-US" altLang="ko-KR" sz="1600" dirty="0" smtClean="0"/>
-          </a:p>
-        </p:txBody>
-      </p:sp>
-      <p:sp>
-        <p:nvSpPr>
           <p:cNvPr id="17" name="직사각형 16"/>
           <p:cNvSpPr/>
           <p:nvPr/>
         </p:nvSpPr>
         <p:spPr>
           <a:xfrm>
-            <a:off x="2982476" y="47502"/>
-            <a:ext cx="9126974" cy="1113008"/>
+            <a:off x="4566062" y="47502"/>
+            <a:ext cx="7543388" cy="1113008"/>
           </a:xfrm>
           <a:prstGeom prst="rect">
             <a:avLst/>
@@ -6378,10 +6783,664 @@
           </a:p>
         </p:txBody>
       </p:sp>
+      <p:sp>
+        <p:nvSpPr>
+          <p:cNvPr id="2" name="직사각형 1"/>
+          <p:cNvSpPr/>
+          <p:nvPr/>
+        </p:nvSpPr>
+        <p:spPr>
+          <a:xfrm>
+            <a:off x="2241319" y="1283176"/>
+            <a:ext cx="9950681" cy="5533260"/>
+          </a:xfrm>
+          <a:prstGeom prst="rect">
+            <a:avLst/>
+          </a:prstGeom>
+          <a:solidFill>
+            <a:schemeClr val="bg1">
+              <a:lumMod val="75000"/>
+            </a:schemeClr>
+          </a:solidFill>
+        </p:spPr>
+        <p:style>
+          <a:lnRef idx="2">
+            <a:schemeClr val="accent1">
+              <a:shade val="50000"/>
+            </a:schemeClr>
+          </a:lnRef>
+          <a:fillRef idx="1">
+            <a:schemeClr val="accent1"/>
+          </a:fillRef>
+          <a:effectRef idx="0">
+            <a:schemeClr val="accent1"/>
+          </a:effectRef>
+          <a:fontRef idx="minor">
+            <a:schemeClr val="lt1"/>
+          </a:fontRef>
+        </p:style>
+        <p:txBody>
+          <a:bodyPr rtlCol="0" anchor="ctr"/>
+          <a:lstStyle/>
+          <a:p>
+            <a:pPr algn="ctr"/>
+            <a:endParaRPr lang="en-US" altLang="ko-KR" dirty="0" smtClean="0"/>
+          </a:p>
+          <a:p>
+            <a:pPr algn="ctr"/>
+            <a:endParaRPr lang="en-US" altLang="ko-KR" dirty="0"/>
+          </a:p>
+          <a:p>
+            <a:pPr algn="ctr"/>
+            <a:r>
+              <a:rPr lang="ko-KR" altLang="en-US" dirty="0" smtClean="0"/>
+              <a:t>메인 페이지</a:t>
+            </a:r>
+            <a:endParaRPr lang="en-US" altLang="ko-KR" dirty="0" smtClean="0"/>
+          </a:p>
+          <a:p>
+            <a:pPr algn="ctr"/>
+            <a:r>
+              <a:rPr lang="ko-KR" altLang="en-US" dirty="0"/>
+              <a:t>카테고리 내에 사이트 정렬해서 보여주자 카드 반복</a:t>
+            </a:r>
+            <a:endParaRPr lang="en-US" altLang="ko-KR" dirty="0"/>
+          </a:p>
+          <a:p>
+            <a:pPr algn="ctr"/>
+            <a:endParaRPr lang="en-US" altLang="ko-KR" dirty="0"/>
+          </a:p>
+        </p:txBody>
+      </p:sp>
+      <p:grpSp>
+        <p:nvGrpSpPr>
+          <p:cNvPr id="15" name="그룹 14"/>
+          <p:cNvGrpSpPr/>
+          <p:nvPr/>
+        </p:nvGrpSpPr>
+        <p:grpSpPr>
+          <a:xfrm>
+            <a:off x="2835233" y="2296560"/>
+            <a:ext cx="3461657" cy="2714827"/>
+            <a:chOff x="2375065" y="1793174"/>
+            <a:chExt cx="3610099" cy="2826327"/>
+          </a:xfrm>
+        </p:grpSpPr>
+        <p:sp>
+          <p:nvSpPr>
+            <p:cNvPr id="3" name="직사각형 2"/>
+            <p:cNvSpPr/>
+            <p:nvPr/>
+          </p:nvSpPr>
+          <p:spPr>
+            <a:xfrm>
+              <a:off x="2375065" y="1793174"/>
+              <a:ext cx="3610099" cy="2826327"/>
+            </a:xfrm>
+            <a:prstGeom prst="rect">
+              <a:avLst/>
+            </a:prstGeom>
+          </p:spPr>
+          <p:style>
+            <a:lnRef idx="2">
+              <a:schemeClr val="accent1">
+                <a:shade val="50000"/>
+              </a:schemeClr>
+            </a:lnRef>
+            <a:fillRef idx="1">
+              <a:schemeClr val="accent1"/>
+            </a:fillRef>
+            <a:effectRef idx="0">
+              <a:schemeClr val="accent1"/>
+            </a:effectRef>
+            <a:fontRef idx="minor">
+              <a:schemeClr val="lt1"/>
+            </a:fontRef>
+          </p:style>
+          <p:txBody>
+            <a:bodyPr rtlCol="0" anchor="t"/>
+            <a:lstStyle/>
+            <a:p>
+              <a:pPr algn="ctr"/>
+              <a:r>
+                <a:rPr lang="ko-KR" altLang="en-US" sz="1600" dirty="0" smtClean="0"/>
+                <a:t>이미지</a:t>
+              </a:r>
+              <a:endParaRPr lang="en-US" altLang="ko-KR" sz="1600" dirty="0" smtClean="0"/>
+            </a:p>
+            <a:p>
+              <a:pPr algn="ctr"/>
+              <a:r>
+                <a:rPr lang="ko-KR" altLang="en-US" sz="1600" dirty="0" smtClean="0"/>
+                <a:t>이름</a:t>
+              </a:r>
+              <a:endParaRPr lang="en-US" altLang="ko-KR" sz="1600" dirty="0" smtClean="0"/>
+            </a:p>
+            <a:p>
+              <a:pPr algn="ctr"/>
+              <a:r>
+                <a:rPr lang="ko-KR" altLang="en-US" sz="1600" dirty="0" smtClean="0"/>
+                <a:t>설명</a:t>
+              </a:r>
+              <a:endParaRPr lang="en-US" altLang="ko-KR" sz="1600" dirty="0" smtClean="0"/>
+            </a:p>
+            <a:p>
+              <a:pPr algn="ctr"/>
+              <a:r>
+                <a:rPr lang="en-US" altLang="ko-KR" sz="1600" dirty="0" err="1" smtClean="0"/>
+                <a:t>Url</a:t>
+              </a:r>
+              <a:r>
+                <a:rPr lang="ko-KR" altLang="en-US" sz="1600" dirty="0" smtClean="0"/>
+                <a:t>은 고민 중</a:t>
+              </a:r>
+              <a:endParaRPr lang="en-US" altLang="ko-KR" sz="1600" dirty="0" smtClean="0"/>
+            </a:p>
+            <a:p>
+              <a:pPr algn="ctr"/>
+              <a:r>
+                <a:rPr lang="ko-KR" altLang="en-US" sz="1600" dirty="0" smtClean="0"/>
+                <a:t>클릭 수</a:t>
+              </a:r>
+              <a:endParaRPr lang="en-US" altLang="ko-KR" sz="1600" dirty="0" smtClean="0"/>
+            </a:p>
+            <a:p>
+              <a:pPr algn="ctr"/>
+              <a:r>
+                <a:rPr lang="ko-KR" altLang="en-US" sz="1600" dirty="0" smtClean="0"/>
+                <a:t>좋아요</a:t>
+              </a:r>
+              <a:endParaRPr lang="en-US" altLang="ko-KR" sz="1600" dirty="0" smtClean="0"/>
+            </a:p>
+            <a:p>
+              <a:pPr algn="ctr"/>
+              <a:r>
+                <a:rPr lang="ko-KR" altLang="en-US" sz="1600" dirty="0" smtClean="0"/>
+                <a:t>싫어요</a:t>
+              </a:r>
+              <a:endParaRPr lang="ko-KR" altLang="en-US" sz="1600" dirty="0"/>
+            </a:p>
+          </p:txBody>
+        </p:sp>
+        <p:sp>
+          <p:nvSpPr>
+            <p:cNvPr id="6" name="직사각형 5"/>
+            <p:cNvSpPr/>
+            <p:nvPr/>
+          </p:nvSpPr>
+          <p:spPr>
+            <a:xfrm>
+              <a:off x="2505441" y="4197928"/>
+              <a:ext cx="1348354" cy="362197"/>
+            </a:xfrm>
+            <a:prstGeom prst="rect">
+              <a:avLst/>
+            </a:prstGeom>
+          </p:spPr>
+          <p:style>
+            <a:lnRef idx="2">
+              <a:schemeClr val="accent1">
+                <a:shade val="50000"/>
+              </a:schemeClr>
+            </a:lnRef>
+            <a:fillRef idx="1">
+              <a:schemeClr val="accent1"/>
+            </a:fillRef>
+            <a:effectRef idx="0">
+              <a:schemeClr val="accent1"/>
+            </a:effectRef>
+            <a:fontRef idx="minor">
+              <a:schemeClr val="lt1"/>
+            </a:fontRef>
+          </p:style>
+          <p:txBody>
+            <a:bodyPr rtlCol="0" anchor="ctr"/>
+            <a:lstStyle/>
+            <a:p>
+              <a:pPr algn="ctr"/>
+              <a:r>
+                <a:rPr lang="ko-KR" altLang="en-US" sz="1600" dirty="0" smtClean="0"/>
+                <a:t>평가하기</a:t>
+              </a:r>
+              <a:endParaRPr lang="ko-KR" altLang="en-US" sz="1600" dirty="0"/>
+            </a:p>
+          </p:txBody>
+        </p:sp>
+        <p:sp>
+          <p:nvSpPr>
+            <p:cNvPr id="18" name="직사각형 17"/>
+            <p:cNvSpPr/>
+            <p:nvPr/>
+          </p:nvSpPr>
+          <p:spPr>
+            <a:xfrm>
+              <a:off x="3901045" y="4200897"/>
+              <a:ext cx="2024742" cy="362197"/>
+            </a:xfrm>
+            <a:prstGeom prst="rect">
+              <a:avLst/>
+            </a:prstGeom>
+          </p:spPr>
+          <p:style>
+            <a:lnRef idx="2">
+              <a:schemeClr val="accent1">
+                <a:shade val="50000"/>
+              </a:schemeClr>
+            </a:lnRef>
+            <a:fillRef idx="1">
+              <a:schemeClr val="accent1"/>
+            </a:fillRef>
+            <a:effectRef idx="0">
+              <a:schemeClr val="accent1"/>
+            </a:effectRef>
+            <a:fontRef idx="minor">
+              <a:schemeClr val="lt1"/>
+            </a:fontRef>
+          </p:style>
+          <p:txBody>
+            <a:bodyPr rtlCol="0" anchor="ctr"/>
+            <a:lstStyle/>
+            <a:p>
+              <a:pPr algn="ctr"/>
+              <a:r>
+                <a:rPr lang="ko-KR" altLang="en-US" sz="1600" dirty="0" smtClean="0"/>
+                <a:t>내 </a:t>
+              </a:r>
+              <a:r>
+                <a:rPr lang="ko-KR" altLang="en-US" sz="1600" dirty="0" err="1" smtClean="0"/>
+                <a:t>즐겨찾기</a:t>
+              </a:r>
+              <a:r>
+                <a:rPr lang="ko-KR" altLang="en-US" sz="1600" dirty="0" smtClean="0"/>
+                <a:t> 등록</a:t>
+              </a:r>
+              <a:endParaRPr lang="ko-KR" altLang="en-US" sz="1600" dirty="0"/>
+            </a:p>
+          </p:txBody>
+        </p:sp>
+      </p:grpSp>
+      <p:grpSp>
+        <p:nvGrpSpPr>
+          <p:cNvPr id="19" name="그룹 18"/>
+          <p:cNvGrpSpPr/>
+          <p:nvPr/>
+        </p:nvGrpSpPr>
+        <p:grpSpPr>
+          <a:xfrm>
+            <a:off x="8147461" y="2296560"/>
+            <a:ext cx="3461657" cy="2714827"/>
+            <a:chOff x="2375065" y="1793174"/>
+            <a:chExt cx="3610099" cy="2826327"/>
+          </a:xfrm>
+        </p:grpSpPr>
+        <p:sp>
+          <p:nvSpPr>
+            <p:cNvPr id="20" name="직사각형 19"/>
+            <p:cNvSpPr/>
+            <p:nvPr/>
+          </p:nvSpPr>
+          <p:spPr>
+            <a:xfrm>
+              <a:off x="2375065" y="1793174"/>
+              <a:ext cx="3610099" cy="2826327"/>
+            </a:xfrm>
+            <a:prstGeom prst="rect">
+              <a:avLst/>
+            </a:prstGeom>
+          </p:spPr>
+          <p:style>
+            <a:lnRef idx="2">
+              <a:schemeClr val="accent1">
+                <a:shade val="50000"/>
+              </a:schemeClr>
+            </a:lnRef>
+            <a:fillRef idx="1">
+              <a:schemeClr val="accent1"/>
+            </a:fillRef>
+            <a:effectRef idx="0">
+              <a:schemeClr val="accent1"/>
+            </a:effectRef>
+            <a:fontRef idx="minor">
+              <a:schemeClr val="lt1"/>
+            </a:fontRef>
+          </p:style>
+          <p:txBody>
+            <a:bodyPr rtlCol="0" anchor="t"/>
+            <a:lstStyle/>
+            <a:p>
+              <a:pPr algn="ctr"/>
+              <a:r>
+                <a:rPr lang="ko-KR" altLang="en-US" sz="1600" dirty="0" smtClean="0"/>
+                <a:t>이미지</a:t>
+              </a:r>
+              <a:endParaRPr lang="en-US" altLang="ko-KR" sz="1600" dirty="0" smtClean="0"/>
+            </a:p>
+            <a:p>
+              <a:pPr algn="ctr"/>
+              <a:r>
+                <a:rPr lang="ko-KR" altLang="en-US" sz="1600" dirty="0" smtClean="0"/>
+                <a:t>이름</a:t>
+              </a:r>
+              <a:endParaRPr lang="en-US" altLang="ko-KR" sz="1600" dirty="0" smtClean="0"/>
+            </a:p>
+            <a:p>
+              <a:pPr algn="ctr"/>
+              <a:r>
+                <a:rPr lang="ko-KR" altLang="en-US" sz="1600" dirty="0" smtClean="0"/>
+                <a:t>설명</a:t>
+              </a:r>
+              <a:endParaRPr lang="en-US" altLang="ko-KR" sz="1600" dirty="0" smtClean="0"/>
+            </a:p>
+            <a:p>
+              <a:pPr algn="ctr"/>
+              <a:r>
+                <a:rPr lang="en-US" altLang="ko-KR" sz="1600" dirty="0" err="1" smtClean="0"/>
+                <a:t>Url</a:t>
+              </a:r>
+              <a:r>
+                <a:rPr lang="ko-KR" altLang="en-US" sz="1600" dirty="0" smtClean="0"/>
+                <a:t>은 고민 중</a:t>
+              </a:r>
+              <a:endParaRPr lang="en-US" altLang="ko-KR" sz="1600" dirty="0" smtClean="0"/>
+            </a:p>
+            <a:p>
+              <a:pPr algn="ctr"/>
+              <a:r>
+                <a:rPr lang="ko-KR" altLang="en-US" sz="1600" dirty="0" smtClean="0"/>
+                <a:t>클릭 수</a:t>
+              </a:r>
+              <a:endParaRPr lang="en-US" altLang="ko-KR" sz="1600" dirty="0" smtClean="0"/>
+            </a:p>
+            <a:p>
+              <a:pPr algn="ctr"/>
+              <a:r>
+                <a:rPr lang="ko-KR" altLang="en-US" sz="1600" dirty="0" smtClean="0"/>
+                <a:t>좋아요</a:t>
+              </a:r>
+              <a:endParaRPr lang="en-US" altLang="ko-KR" sz="1600" dirty="0" smtClean="0"/>
+            </a:p>
+            <a:p>
+              <a:pPr algn="ctr"/>
+              <a:r>
+                <a:rPr lang="ko-KR" altLang="en-US" sz="1600" dirty="0" smtClean="0"/>
+                <a:t>싫어요</a:t>
+              </a:r>
+              <a:endParaRPr lang="ko-KR" altLang="en-US" sz="1600" dirty="0"/>
+            </a:p>
+          </p:txBody>
+        </p:sp>
+        <p:sp>
+          <p:nvSpPr>
+            <p:cNvPr id="21" name="직사각형 20"/>
+            <p:cNvSpPr/>
+            <p:nvPr/>
+          </p:nvSpPr>
+          <p:spPr>
+            <a:xfrm>
+              <a:off x="2505441" y="4197928"/>
+              <a:ext cx="1348354" cy="362197"/>
+            </a:xfrm>
+            <a:prstGeom prst="rect">
+              <a:avLst/>
+            </a:prstGeom>
+          </p:spPr>
+          <p:style>
+            <a:lnRef idx="2">
+              <a:schemeClr val="accent1">
+                <a:shade val="50000"/>
+              </a:schemeClr>
+            </a:lnRef>
+            <a:fillRef idx="1">
+              <a:schemeClr val="accent1"/>
+            </a:fillRef>
+            <a:effectRef idx="0">
+              <a:schemeClr val="accent1"/>
+            </a:effectRef>
+            <a:fontRef idx="minor">
+              <a:schemeClr val="lt1"/>
+            </a:fontRef>
+          </p:style>
+          <p:txBody>
+            <a:bodyPr rtlCol="0" anchor="ctr"/>
+            <a:lstStyle/>
+            <a:p>
+              <a:pPr algn="ctr"/>
+              <a:r>
+                <a:rPr lang="ko-KR" altLang="en-US" sz="1600" dirty="0" smtClean="0"/>
+                <a:t>평가하기</a:t>
+              </a:r>
+              <a:endParaRPr lang="ko-KR" altLang="en-US" sz="1600" dirty="0"/>
+            </a:p>
+          </p:txBody>
+        </p:sp>
+        <p:sp>
+          <p:nvSpPr>
+            <p:cNvPr id="22" name="직사각형 21"/>
+            <p:cNvSpPr/>
+            <p:nvPr/>
+          </p:nvSpPr>
+          <p:spPr>
+            <a:xfrm>
+              <a:off x="3901045" y="4200897"/>
+              <a:ext cx="2024742" cy="362197"/>
+            </a:xfrm>
+            <a:prstGeom prst="rect">
+              <a:avLst/>
+            </a:prstGeom>
+          </p:spPr>
+          <p:style>
+            <a:lnRef idx="2">
+              <a:schemeClr val="accent1">
+                <a:shade val="50000"/>
+              </a:schemeClr>
+            </a:lnRef>
+            <a:fillRef idx="1">
+              <a:schemeClr val="accent1"/>
+            </a:fillRef>
+            <a:effectRef idx="0">
+              <a:schemeClr val="accent1"/>
+            </a:effectRef>
+            <a:fontRef idx="minor">
+              <a:schemeClr val="lt1"/>
+            </a:fontRef>
+          </p:style>
+          <p:txBody>
+            <a:bodyPr rtlCol="0" anchor="ctr"/>
+            <a:lstStyle/>
+            <a:p>
+              <a:pPr algn="ctr"/>
+              <a:r>
+                <a:rPr lang="ko-KR" altLang="en-US" sz="1600" dirty="0" smtClean="0"/>
+                <a:t>내 </a:t>
+              </a:r>
+              <a:r>
+                <a:rPr lang="ko-KR" altLang="en-US" sz="1600" dirty="0" err="1" smtClean="0"/>
+                <a:t>즐겨찾기</a:t>
+              </a:r>
+              <a:r>
+                <a:rPr lang="ko-KR" altLang="en-US" sz="1600" dirty="0" smtClean="0"/>
+                <a:t> 등록</a:t>
+              </a:r>
+              <a:endParaRPr lang="ko-KR" altLang="en-US" sz="1600" dirty="0"/>
+            </a:p>
+          </p:txBody>
+        </p:sp>
+      </p:grpSp>
+      <p:sp>
+        <p:nvSpPr>
+          <p:cNvPr id="23" name="직사각형 22"/>
+          <p:cNvSpPr/>
+          <p:nvPr/>
+        </p:nvSpPr>
+        <p:spPr>
+          <a:xfrm>
+            <a:off x="2683823" y="1454727"/>
+            <a:ext cx="4096987" cy="611579"/>
+          </a:xfrm>
+          <a:prstGeom prst="rect">
+            <a:avLst/>
+          </a:prstGeom>
+        </p:spPr>
+        <p:style>
+          <a:lnRef idx="2">
+            <a:schemeClr val="accent1">
+              <a:shade val="50000"/>
+            </a:schemeClr>
+          </a:lnRef>
+          <a:fillRef idx="1">
+            <a:schemeClr val="accent1"/>
+          </a:fillRef>
+          <a:effectRef idx="0">
+            <a:schemeClr val="accent1"/>
+          </a:effectRef>
+          <a:fontRef idx="minor">
+            <a:schemeClr val="lt1"/>
+          </a:fontRef>
+        </p:style>
+        <p:txBody>
+          <a:bodyPr rtlCol="0" anchor="ctr"/>
+          <a:lstStyle/>
+          <a:p>
+            <a:pPr algn="ctr"/>
+            <a:r>
+              <a:rPr lang="ko-KR" altLang="en-US" dirty="0" smtClean="0"/>
+              <a:t>선택한 카테고리</a:t>
+            </a:r>
+            <a:endParaRPr lang="ko-KR" altLang="en-US" dirty="0"/>
+          </a:p>
+        </p:txBody>
+      </p:sp>
+      <p:sp>
+        <p:nvSpPr>
+          <p:cNvPr id="24" name="직사각형 23"/>
+          <p:cNvSpPr/>
+          <p:nvPr/>
+        </p:nvSpPr>
+        <p:spPr>
+          <a:xfrm>
+            <a:off x="7223315" y="1484079"/>
+            <a:ext cx="4632218" cy="755447"/>
+          </a:xfrm>
+          <a:prstGeom prst="rect">
+            <a:avLst/>
+          </a:prstGeom>
+        </p:spPr>
+        <p:style>
+          <a:lnRef idx="2">
+            <a:schemeClr val="accent1">
+              <a:shade val="50000"/>
+            </a:schemeClr>
+          </a:lnRef>
+          <a:fillRef idx="1">
+            <a:schemeClr val="accent1"/>
+          </a:fillRef>
+          <a:effectRef idx="0">
+            <a:schemeClr val="accent1"/>
+          </a:effectRef>
+          <a:fontRef idx="minor">
+            <a:schemeClr val="lt1"/>
+          </a:fontRef>
+        </p:style>
+        <p:txBody>
+          <a:bodyPr rtlCol="0" anchor="ctr"/>
+          <a:lstStyle/>
+          <a:p>
+            <a:pPr algn="ctr"/>
+            <a:r>
+              <a:rPr lang="ko-KR" altLang="en-US" sz="1100" dirty="0" smtClean="0"/>
+              <a:t>정렬 기준</a:t>
+            </a:r>
+            <a:endParaRPr lang="en-US" altLang="ko-KR" sz="1100" dirty="0" smtClean="0"/>
+          </a:p>
+          <a:p>
+            <a:pPr algn="ctr"/>
+            <a:r>
+              <a:rPr lang="ko-KR" altLang="en-US" sz="1100" dirty="0"/>
+              <a:t>정렬 기준 </a:t>
+            </a:r>
+            <a:r>
+              <a:rPr lang="en-US" altLang="ko-KR" sz="1100" dirty="0"/>
+              <a:t>1. </a:t>
+            </a:r>
+            <a:r>
+              <a:rPr lang="ko-KR" altLang="en-US" sz="1100" dirty="0"/>
+              <a:t>조회수</a:t>
+            </a:r>
+            <a:r>
+              <a:rPr lang="en-US" altLang="ko-KR" sz="1100" dirty="0"/>
+              <a:t>, </a:t>
+            </a:r>
+            <a:r>
+              <a:rPr lang="ko-KR" altLang="en-US" sz="1100" dirty="0"/>
+              <a:t>좋아요 수</a:t>
+            </a:r>
+            <a:r>
+              <a:rPr lang="en-US" altLang="ko-KR" sz="1100" dirty="0"/>
+              <a:t>, </a:t>
+            </a:r>
+            <a:r>
+              <a:rPr lang="ko-KR" altLang="en-US" sz="1100" dirty="0"/>
+              <a:t>추천 수</a:t>
+            </a:r>
+            <a:r>
+              <a:rPr lang="en-US" altLang="ko-KR" sz="1100" dirty="0"/>
+              <a:t>, </a:t>
+            </a:r>
+            <a:r>
+              <a:rPr lang="ko-KR" altLang="en-US" sz="1100" dirty="0"/>
+              <a:t>등록 순</a:t>
+            </a:r>
+            <a:r>
+              <a:rPr lang="en-US" altLang="ko-KR" sz="1100" dirty="0"/>
+              <a:t>, </a:t>
+            </a:r>
+            <a:r>
+              <a:rPr lang="ko-KR" altLang="en-US" sz="1100" dirty="0"/>
+              <a:t>가나다순</a:t>
+            </a:r>
+            <a:r>
+              <a:rPr lang="en-US" altLang="ko-KR" sz="1100" dirty="0"/>
+              <a:t> 2.</a:t>
+            </a:r>
+            <a:r>
+              <a:rPr lang="ko-KR" altLang="en-US" sz="1100" dirty="0"/>
+              <a:t>내림차순</a:t>
+            </a:r>
+            <a:r>
+              <a:rPr lang="en-US" altLang="ko-KR" sz="1100" dirty="0"/>
+              <a:t>, </a:t>
+            </a:r>
+            <a:r>
+              <a:rPr lang="ko-KR" altLang="en-US" sz="1100" dirty="0"/>
+              <a:t>오름차순</a:t>
+            </a:r>
+            <a:endParaRPr lang="en-US" altLang="ko-KR" sz="1100" dirty="0"/>
+          </a:p>
+          <a:p>
+            <a:pPr algn="ctr"/>
+            <a:r>
+              <a:rPr lang="en-US" altLang="ko-KR" sz="1100" dirty="0"/>
+              <a:t>(</a:t>
+            </a:r>
+            <a:r>
+              <a:rPr lang="ko-KR" altLang="en-US" sz="1100" dirty="0"/>
+              <a:t>디폴트는 조회수 내림차순</a:t>
+            </a:r>
+            <a:r>
+              <a:rPr lang="en-US" altLang="ko-KR" sz="1100" dirty="0"/>
+              <a:t>)</a:t>
+            </a:r>
+          </a:p>
+          <a:p>
+            <a:pPr algn="ctr"/>
+            <a:endParaRPr lang="ko-KR" altLang="en-US" sz="1100" dirty="0"/>
+          </a:p>
+        </p:txBody>
+      </p:sp>
     </p:spTree>
     <p:extLst>
       <p:ext uri="{BB962C8B-B14F-4D97-AF65-F5344CB8AC3E}">
-        <p14:creationId xmlns:p14="http://schemas.microsoft.com/office/powerpoint/2010/main" val="134506519"/>
+        <p14:creationId xmlns:p14="http://schemas.microsoft.com/office/powerpoint/2010/main" val="3844840759"/>
       </p:ext>
     </p:extLst>
   </p:cSld>
@@ -6391,7 +7450,7 @@
 </p:sld>
 </file>
 
-<file path=ppt/slides/slide7.xml><?xml version="1.0" encoding="utf-8"?>
+<file path=ppt/slides/slide8.xml><?xml version="1.0" encoding="utf-8"?>
 <p:sld xmlns:a="http://schemas.openxmlformats.org/drawingml/2006/main" xmlns:r="http://schemas.openxmlformats.org/officeDocument/2006/relationships" xmlns:p="http://schemas.openxmlformats.org/presentationml/2006/main">
   <p:cSld>
     <p:spTree>

</xml_diff>

<commit_message>
[u] : 디자인 수정 | fix design
</commit_message>
<xml_diff>
--- a/bookmark.pptx
+++ b/bookmark.pptx
@@ -13,6 +13,7 @@
     <p:sldId id="263" r:id="rId7"/>
     <p:sldId id="265" r:id="rId8"/>
     <p:sldId id="262" r:id="rId9"/>
+    <p:sldId id="266" r:id="rId10"/>
   </p:sldIdLst>
   <p:sldSz cx="12192000" cy="6858000"/>
   <p:notesSz cx="6858000" cy="9144000"/>
@@ -262,7 +263,7 @@
           <a:p>
             <a:fld id="{9A0CBB99-4DF1-49E3-ACA0-C007A6485E48}" type="datetimeFigureOut">
               <a:rPr lang="ko-KR" altLang="en-US" smtClean="0"/>
-              <a:t>2024-04-23</a:t>
+              <a:t>2024-04-24</a:t>
             </a:fld>
             <a:endParaRPr lang="ko-KR" altLang="en-US"/>
           </a:p>
@@ -432,7 +433,7 @@
           <a:p>
             <a:fld id="{9A0CBB99-4DF1-49E3-ACA0-C007A6485E48}" type="datetimeFigureOut">
               <a:rPr lang="ko-KR" altLang="en-US" smtClean="0"/>
-              <a:t>2024-04-23</a:t>
+              <a:t>2024-04-24</a:t>
             </a:fld>
             <a:endParaRPr lang="ko-KR" altLang="en-US"/>
           </a:p>
@@ -612,7 +613,7 @@
           <a:p>
             <a:fld id="{9A0CBB99-4DF1-49E3-ACA0-C007A6485E48}" type="datetimeFigureOut">
               <a:rPr lang="ko-KR" altLang="en-US" smtClean="0"/>
-              <a:t>2024-04-23</a:t>
+              <a:t>2024-04-24</a:t>
             </a:fld>
             <a:endParaRPr lang="ko-KR" altLang="en-US"/>
           </a:p>
@@ -782,7 +783,7 @@
           <a:p>
             <a:fld id="{9A0CBB99-4DF1-49E3-ACA0-C007A6485E48}" type="datetimeFigureOut">
               <a:rPr lang="ko-KR" altLang="en-US" smtClean="0"/>
-              <a:t>2024-04-23</a:t>
+              <a:t>2024-04-24</a:t>
             </a:fld>
             <a:endParaRPr lang="ko-KR" altLang="en-US"/>
           </a:p>
@@ -1028,7 +1029,7 @@
           <a:p>
             <a:fld id="{9A0CBB99-4DF1-49E3-ACA0-C007A6485E48}" type="datetimeFigureOut">
               <a:rPr lang="ko-KR" altLang="en-US" smtClean="0"/>
-              <a:t>2024-04-23</a:t>
+              <a:t>2024-04-24</a:t>
             </a:fld>
             <a:endParaRPr lang="ko-KR" altLang="en-US"/>
           </a:p>
@@ -1260,7 +1261,7 @@
           <a:p>
             <a:fld id="{9A0CBB99-4DF1-49E3-ACA0-C007A6485E48}" type="datetimeFigureOut">
               <a:rPr lang="ko-KR" altLang="en-US" smtClean="0"/>
-              <a:t>2024-04-23</a:t>
+              <a:t>2024-04-24</a:t>
             </a:fld>
             <a:endParaRPr lang="ko-KR" altLang="en-US"/>
           </a:p>
@@ -1627,7 +1628,7 @@
           <a:p>
             <a:fld id="{9A0CBB99-4DF1-49E3-ACA0-C007A6485E48}" type="datetimeFigureOut">
               <a:rPr lang="ko-KR" altLang="en-US" smtClean="0"/>
-              <a:t>2024-04-23</a:t>
+              <a:t>2024-04-24</a:t>
             </a:fld>
             <a:endParaRPr lang="ko-KR" altLang="en-US"/>
           </a:p>
@@ -1745,7 +1746,7 @@
           <a:p>
             <a:fld id="{9A0CBB99-4DF1-49E3-ACA0-C007A6485E48}" type="datetimeFigureOut">
               <a:rPr lang="ko-KR" altLang="en-US" smtClean="0"/>
-              <a:t>2024-04-23</a:t>
+              <a:t>2024-04-24</a:t>
             </a:fld>
             <a:endParaRPr lang="ko-KR" altLang="en-US"/>
           </a:p>
@@ -1840,7 +1841,7 @@
           <a:p>
             <a:fld id="{9A0CBB99-4DF1-49E3-ACA0-C007A6485E48}" type="datetimeFigureOut">
               <a:rPr lang="ko-KR" altLang="en-US" smtClean="0"/>
-              <a:t>2024-04-23</a:t>
+              <a:t>2024-04-24</a:t>
             </a:fld>
             <a:endParaRPr lang="ko-KR" altLang="en-US"/>
           </a:p>
@@ -2117,7 +2118,7 @@
           <a:p>
             <a:fld id="{9A0CBB99-4DF1-49E3-ACA0-C007A6485E48}" type="datetimeFigureOut">
               <a:rPr lang="ko-KR" altLang="en-US" smtClean="0"/>
-              <a:t>2024-04-23</a:t>
+              <a:t>2024-04-24</a:t>
             </a:fld>
             <a:endParaRPr lang="ko-KR" altLang="en-US"/>
           </a:p>
@@ -2370,7 +2371,7 @@
           <a:p>
             <a:fld id="{9A0CBB99-4DF1-49E3-ACA0-C007A6485E48}" type="datetimeFigureOut">
               <a:rPr lang="ko-KR" altLang="en-US" smtClean="0"/>
-              <a:t>2024-04-23</a:t>
+              <a:t>2024-04-24</a:t>
             </a:fld>
             <a:endParaRPr lang="ko-KR" altLang="en-US"/>
           </a:p>
@@ -2583,7 +2584,7 @@
           <a:p>
             <a:fld id="{9A0CBB99-4DF1-49E3-ACA0-C007A6485E48}" type="datetimeFigureOut">
               <a:rPr lang="ko-KR" altLang="en-US" smtClean="0"/>
-              <a:t>2024-04-23</a:t>
+              <a:t>2024-04-24</a:t>
             </a:fld>
             <a:endParaRPr lang="ko-KR" altLang="en-US"/>
           </a:p>
@@ -7454,7 +7455,7 @@
         </p:nvGrpSpPr>
         <p:grpSpPr>
           <a:xfrm>
-            <a:off x="896587" y="835725"/>
+            <a:off x="896587" y="813442"/>
             <a:ext cx="3034145" cy="1521528"/>
             <a:chOff x="896587" y="835725"/>
             <a:chExt cx="3034145" cy="1521528"/>
@@ -7627,10 +7628,943 @@
           </p:txBody>
         </p:sp>
       </p:grpSp>
+      <p:grpSp>
+        <p:nvGrpSpPr>
+          <p:cNvPr id="12" name="그룹 11"/>
+          <p:cNvGrpSpPr/>
+          <p:nvPr/>
+        </p:nvGrpSpPr>
+        <p:grpSpPr>
+          <a:xfrm>
+            <a:off x="6221444" y="1365081"/>
+            <a:ext cx="530904" cy="543468"/>
+            <a:chOff x="6221444" y="1365081"/>
+            <a:chExt cx="530904" cy="543468"/>
+          </a:xfrm>
+        </p:grpSpPr>
+        <p:cxnSp>
+          <p:nvCxnSpPr>
+            <p:cNvPr id="3" name="직선 연결선 2"/>
+            <p:cNvCxnSpPr/>
+            <p:nvPr/>
+          </p:nvCxnSpPr>
+          <p:spPr>
+            <a:xfrm>
+              <a:off x="6293795" y="1490354"/>
+              <a:ext cx="386203" cy="0"/>
+            </a:xfrm>
+            <a:prstGeom prst="line">
+              <a:avLst/>
+            </a:prstGeom>
+            <a:ln w="38100">
+              <a:solidFill>
+                <a:schemeClr val="tx1"/>
+              </a:solidFill>
+            </a:ln>
+          </p:spPr>
+          <p:style>
+            <a:lnRef idx="1">
+              <a:schemeClr val="accent1"/>
+            </a:lnRef>
+            <a:fillRef idx="0">
+              <a:schemeClr val="accent1"/>
+            </a:fillRef>
+            <a:effectRef idx="0">
+              <a:schemeClr val="accent1"/>
+            </a:effectRef>
+            <a:fontRef idx="minor">
+              <a:schemeClr val="tx1"/>
+            </a:fontRef>
+          </p:style>
+        </p:cxnSp>
+        <p:cxnSp>
+          <p:nvCxnSpPr>
+            <p:cNvPr id="8" name="직선 연결선 7"/>
+            <p:cNvCxnSpPr/>
+            <p:nvPr/>
+          </p:nvCxnSpPr>
+          <p:spPr>
+            <a:xfrm>
+              <a:off x="6293795" y="1636816"/>
+              <a:ext cx="386203" cy="0"/>
+            </a:xfrm>
+            <a:prstGeom prst="line">
+              <a:avLst/>
+            </a:prstGeom>
+            <a:ln w="38100">
+              <a:solidFill>
+                <a:schemeClr val="tx1"/>
+              </a:solidFill>
+            </a:ln>
+          </p:spPr>
+          <p:style>
+            <a:lnRef idx="1">
+              <a:schemeClr val="accent1"/>
+            </a:lnRef>
+            <a:fillRef idx="0">
+              <a:schemeClr val="accent1"/>
+            </a:fillRef>
+            <a:effectRef idx="0">
+              <a:schemeClr val="accent1"/>
+            </a:effectRef>
+            <a:fontRef idx="minor">
+              <a:schemeClr val="tx1"/>
+            </a:fontRef>
+          </p:style>
+        </p:cxnSp>
+        <p:cxnSp>
+          <p:nvCxnSpPr>
+            <p:cNvPr id="9" name="직선 연결선 8"/>
+            <p:cNvCxnSpPr/>
+            <p:nvPr/>
+          </p:nvCxnSpPr>
+          <p:spPr>
+            <a:xfrm>
+              <a:off x="6293795" y="1795154"/>
+              <a:ext cx="386203" cy="0"/>
+            </a:xfrm>
+            <a:prstGeom prst="line">
+              <a:avLst/>
+            </a:prstGeom>
+            <a:ln w="38100">
+              <a:solidFill>
+                <a:schemeClr val="tx1"/>
+              </a:solidFill>
+            </a:ln>
+          </p:spPr>
+          <p:style>
+            <a:lnRef idx="1">
+              <a:schemeClr val="accent1"/>
+            </a:lnRef>
+            <a:fillRef idx="0">
+              <a:schemeClr val="accent1"/>
+            </a:fillRef>
+            <a:effectRef idx="0">
+              <a:schemeClr val="accent1"/>
+            </a:effectRef>
+            <a:fontRef idx="minor">
+              <a:schemeClr val="tx1"/>
+            </a:fontRef>
+          </p:style>
+        </p:cxnSp>
+        <p:sp>
+          <p:nvSpPr>
+            <p:cNvPr id="11" name="직사각형 10"/>
+            <p:cNvSpPr/>
+            <p:nvPr/>
+          </p:nvSpPr>
+          <p:spPr>
+            <a:xfrm>
+              <a:off x="6221444" y="1365081"/>
+              <a:ext cx="530904" cy="543468"/>
+            </a:xfrm>
+            <a:prstGeom prst="rect">
+              <a:avLst/>
+            </a:prstGeom>
+            <a:noFill/>
+            <a:ln>
+              <a:noFill/>
+            </a:ln>
+          </p:spPr>
+          <p:style>
+            <a:lnRef idx="2">
+              <a:schemeClr val="accent1">
+                <a:shade val="50000"/>
+              </a:schemeClr>
+            </a:lnRef>
+            <a:fillRef idx="1">
+              <a:schemeClr val="accent1"/>
+            </a:fillRef>
+            <a:effectRef idx="0">
+              <a:schemeClr val="accent1"/>
+            </a:effectRef>
+            <a:fontRef idx="minor">
+              <a:schemeClr val="lt1"/>
+            </a:fontRef>
+          </p:style>
+          <p:txBody>
+            <a:bodyPr rtlCol="0" anchor="ctr"/>
+            <a:lstStyle/>
+            <a:p>
+              <a:pPr algn="ctr"/>
+              <a:endParaRPr lang="ko-KR" altLang="en-US"/>
+            </a:p>
+          </p:txBody>
+        </p:sp>
+      </p:grpSp>
+      <p:grpSp>
+        <p:nvGrpSpPr>
+          <p:cNvPr id="17" name="그룹 16"/>
+          <p:cNvGrpSpPr/>
+          <p:nvPr/>
+        </p:nvGrpSpPr>
+        <p:grpSpPr>
+          <a:xfrm>
+            <a:off x="896587" y="3150649"/>
+            <a:ext cx="3034145" cy="1496563"/>
+            <a:chOff x="896587" y="3150649"/>
+            <a:chExt cx="3034145" cy="1496563"/>
+          </a:xfrm>
+        </p:grpSpPr>
+        <p:sp>
+          <p:nvSpPr>
+            <p:cNvPr id="14" name="직사각형 13"/>
+            <p:cNvSpPr/>
+            <p:nvPr/>
+          </p:nvSpPr>
+          <p:spPr>
+            <a:xfrm>
+              <a:off x="1252846" y="3400302"/>
+              <a:ext cx="2677886" cy="1246910"/>
+            </a:xfrm>
+            <a:prstGeom prst="rect">
+              <a:avLst/>
+            </a:prstGeom>
+            <a:noFill/>
+            <a:ln w="19050">
+              <a:solidFill>
+                <a:schemeClr val="tx1"/>
+              </a:solidFill>
+            </a:ln>
+          </p:spPr>
+          <p:style>
+            <a:lnRef idx="2">
+              <a:schemeClr val="accent1">
+                <a:shade val="50000"/>
+              </a:schemeClr>
+            </a:lnRef>
+            <a:fillRef idx="1">
+              <a:schemeClr val="accent1"/>
+            </a:fillRef>
+            <a:effectRef idx="0">
+              <a:schemeClr val="accent1"/>
+            </a:effectRef>
+            <a:fontRef idx="minor">
+              <a:schemeClr val="lt1"/>
+            </a:fontRef>
+          </p:style>
+          <p:txBody>
+            <a:bodyPr rtlCol="0" anchor="ctr"/>
+            <a:lstStyle/>
+            <a:p>
+              <a:pPr algn="ctr"/>
+              <a:endParaRPr lang="ko-KR" altLang="en-US"/>
+            </a:p>
+          </p:txBody>
+        </p:sp>
+        <p:sp>
+          <p:nvSpPr>
+            <p:cNvPr id="15" name="직사각형 14"/>
+            <p:cNvSpPr/>
+            <p:nvPr/>
+          </p:nvSpPr>
+          <p:spPr>
+            <a:xfrm>
+              <a:off x="1429986" y="3780313"/>
+              <a:ext cx="2328288" cy="612177"/>
+            </a:xfrm>
+            <a:prstGeom prst="rect">
+              <a:avLst/>
+            </a:prstGeom>
+            <a:solidFill>
+              <a:schemeClr val="tx1"/>
+            </a:solidFill>
+            <a:ln w="19050">
+              <a:noFill/>
+            </a:ln>
+          </p:spPr>
+          <p:style>
+            <a:lnRef idx="2">
+              <a:schemeClr val="accent1">
+                <a:shade val="50000"/>
+              </a:schemeClr>
+            </a:lnRef>
+            <a:fillRef idx="1">
+              <a:schemeClr val="accent1"/>
+            </a:fillRef>
+            <a:effectRef idx="0">
+              <a:schemeClr val="accent1"/>
+            </a:effectRef>
+            <a:fontRef idx="minor">
+              <a:schemeClr val="lt1"/>
+            </a:fontRef>
+          </p:style>
+          <p:txBody>
+            <a:bodyPr rtlCol="0" anchor="ctr"/>
+            <a:lstStyle/>
+            <a:p>
+              <a:pPr algn="ctr"/>
+              <a:r>
+                <a:rPr lang="en-US" altLang="ko-KR" sz="2000" b="1" dirty="0" smtClean="0">
+                  <a:solidFill>
+                    <a:schemeClr val="bg1"/>
+                  </a:solidFill>
+                </a:rPr>
+                <a:t>BOOKMARK</a:t>
+              </a:r>
+              <a:endParaRPr lang="ko-KR" altLang="en-US" sz="2000" b="1" dirty="0">
+                <a:solidFill>
+                  <a:schemeClr val="bg1"/>
+                </a:solidFill>
+              </a:endParaRPr>
+            </a:p>
+          </p:txBody>
+        </p:sp>
+        <p:sp>
+          <p:nvSpPr>
+            <p:cNvPr id="16" name="직사각형 15"/>
+            <p:cNvSpPr/>
+            <p:nvPr/>
+          </p:nvSpPr>
+          <p:spPr>
+            <a:xfrm>
+              <a:off x="896587" y="3150649"/>
+              <a:ext cx="1618012" cy="499304"/>
+            </a:xfrm>
+            <a:prstGeom prst="rect">
+              <a:avLst/>
+            </a:prstGeom>
+            <a:solidFill>
+              <a:schemeClr val="bg1"/>
+            </a:solidFill>
+            <a:ln>
+              <a:noFill/>
+            </a:ln>
+          </p:spPr>
+          <p:style>
+            <a:lnRef idx="2">
+              <a:schemeClr val="accent1">
+                <a:shade val="50000"/>
+              </a:schemeClr>
+            </a:lnRef>
+            <a:fillRef idx="1">
+              <a:schemeClr val="accent1"/>
+            </a:fillRef>
+            <a:effectRef idx="0">
+              <a:schemeClr val="accent1"/>
+            </a:effectRef>
+            <a:fontRef idx="minor">
+              <a:schemeClr val="lt1"/>
+            </a:fontRef>
+          </p:style>
+          <p:txBody>
+            <a:bodyPr rtlCol="0" anchor="ctr"/>
+            <a:lstStyle/>
+            <a:p>
+              <a:pPr algn="ctr"/>
+              <a:r>
+                <a:rPr lang="en-US" altLang="ko-KR" sz="3200" dirty="0" smtClean="0">
+                  <a:solidFill>
+                    <a:schemeClr val="tx1"/>
+                  </a:solidFill>
+                  <a:latin typeface="HY견고딕" panose="02030600000101010101" pitchFamily="18" charset="-127"/>
+                  <a:ea typeface="HY견고딕" panose="02030600000101010101" pitchFamily="18" charset="-127"/>
+                </a:rPr>
+                <a:t>MY</a:t>
+              </a:r>
+              <a:endParaRPr lang="ko-KR" altLang="en-US" sz="3200" dirty="0">
+                <a:solidFill>
+                  <a:schemeClr val="tx1"/>
+                </a:solidFill>
+                <a:latin typeface="HY견고딕" panose="02030600000101010101" pitchFamily="18" charset="-127"/>
+                <a:ea typeface="HY견고딕" panose="02030600000101010101" pitchFamily="18" charset="-127"/>
+              </a:endParaRPr>
+            </a:p>
+          </p:txBody>
+        </p:sp>
+      </p:grpSp>
     </p:spTree>
     <p:extLst>
       <p:ext uri="{BB962C8B-B14F-4D97-AF65-F5344CB8AC3E}">
         <p14:creationId xmlns:p14="http://schemas.microsoft.com/office/powerpoint/2010/main" val="2565186976"/>
+      </p:ext>
+    </p:extLst>
+  </p:cSld>
+  <p:clrMapOvr>
+    <a:masterClrMapping/>
+  </p:clrMapOvr>
+</p:sld>
+</file>
+
+<file path=ppt/slides/slide9.xml><?xml version="1.0" encoding="utf-8"?>
+<p:sld xmlns:a="http://schemas.openxmlformats.org/drawingml/2006/main" xmlns:r="http://schemas.openxmlformats.org/officeDocument/2006/relationships" xmlns:p="http://schemas.openxmlformats.org/presentationml/2006/main">
+  <p:cSld>
+    <p:spTree>
+      <p:nvGrpSpPr>
+        <p:cNvPr id="1" name=""/>
+        <p:cNvGrpSpPr/>
+        <p:nvPr/>
+      </p:nvGrpSpPr>
+      <p:grpSpPr>
+        <a:xfrm>
+          <a:off x="0" y="0"/>
+          <a:ext cx="0" cy="0"/>
+          <a:chOff x="0" y="0"/>
+          <a:chExt cx="0" cy="0"/>
+        </a:xfrm>
+      </p:grpSpPr>
+      <p:sp>
+        <p:nvSpPr>
+          <p:cNvPr id="5" name="직사각형 4"/>
+          <p:cNvSpPr/>
+          <p:nvPr/>
+        </p:nvSpPr>
+        <p:spPr>
+          <a:xfrm>
+            <a:off x="7887948" y="1908549"/>
+            <a:ext cx="2455460" cy="841459"/>
+          </a:xfrm>
+          <a:prstGeom prst="rect">
+            <a:avLst/>
+          </a:prstGeom>
+        </p:spPr>
+        <p:style>
+          <a:lnRef idx="2">
+            <a:schemeClr val="accent1">
+              <a:shade val="50000"/>
+            </a:schemeClr>
+          </a:lnRef>
+          <a:fillRef idx="1">
+            <a:schemeClr val="accent1"/>
+          </a:fillRef>
+          <a:effectRef idx="0">
+            <a:schemeClr val="accent1"/>
+          </a:effectRef>
+          <a:fontRef idx="minor">
+            <a:schemeClr val="lt1"/>
+          </a:fontRef>
+        </p:style>
+        <p:txBody>
+          <a:bodyPr rtlCol="0" anchor="ctr"/>
+          <a:lstStyle/>
+          <a:p>
+            <a:pPr algn="ctr"/>
+            <a:r>
+              <a:rPr lang="en-US" altLang="ko-KR" dirty="0" smtClean="0"/>
+              <a:t>1 : 2.14 </a:t>
+            </a:r>
+            <a:r>
+              <a:rPr lang="ko-KR" altLang="en-US" dirty="0" smtClean="0"/>
+              <a:t>비율</a:t>
+            </a:r>
+            <a:endParaRPr lang="en-US" altLang="ko-KR" dirty="0" smtClean="0"/>
+          </a:p>
+          <a:p>
+            <a:pPr algn="ctr"/>
+            <a:r>
+              <a:rPr lang="ko-KR" altLang="en-US" dirty="0" smtClean="0"/>
+              <a:t>너비 </a:t>
+            </a:r>
+            <a:r>
+              <a:rPr lang="en-US" altLang="ko-KR" dirty="0" smtClean="0"/>
+              <a:t>640 </a:t>
+            </a:r>
+            <a:r>
+              <a:rPr lang="ko-KR" altLang="en-US" dirty="0" smtClean="0"/>
+              <a:t>높이 </a:t>
+            </a:r>
+            <a:r>
+              <a:rPr lang="en-US" altLang="ko-KR" dirty="0" smtClean="0"/>
+              <a:t>300</a:t>
+            </a:r>
+            <a:endParaRPr lang="ko-KR" altLang="en-US" dirty="0"/>
+          </a:p>
+        </p:txBody>
+      </p:sp>
+      <p:grpSp>
+        <p:nvGrpSpPr>
+          <p:cNvPr id="25" name="그룹 24"/>
+          <p:cNvGrpSpPr/>
+          <p:nvPr/>
+        </p:nvGrpSpPr>
+        <p:grpSpPr>
+          <a:xfrm>
+            <a:off x="523731" y="423166"/>
+            <a:ext cx="7200000" cy="3364486"/>
+            <a:chOff x="523731" y="423166"/>
+            <a:chExt cx="7200000" cy="3364486"/>
+          </a:xfrm>
+        </p:grpSpPr>
+        <p:sp>
+          <p:nvSpPr>
+            <p:cNvPr id="4" name="직사각형 3"/>
+            <p:cNvSpPr>
+              <a:spLocks noChangeAspect="1"/>
+            </p:cNvSpPr>
+            <p:nvPr/>
+          </p:nvSpPr>
+          <p:spPr>
+            <a:xfrm>
+              <a:off x="523731" y="423166"/>
+              <a:ext cx="7200000" cy="3364486"/>
+            </a:xfrm>
+            <a:prstGeom prst="rect">
+              <a:avLst/>
+            </a:prstGeom>
+            <a:solidFill>
+              <a:schemeClr val="bg1">
+                <a:lumMod val="85000"/>
+              </a:schemeClr>
+            </a:solidFill>
+            <a:ln>
+              <a:noFill/>
+            </a:ln>
+          </p:spPr>
+          <p:style>
+            <a:lnRef idx="2">
+              <a:schemeClr val="accent1">
+                <a:shade val="50000"/>
+              </a:schemeClr>
+            </a:lnRef>
+            <a:fillRef idx="1">
+              <a:schemeClr val="accent1"/>
+            </a:fillRef>
+            <a:effectRef idx="0">
+              <a:schemeClr val="accent1"/>
+            </a:effectRef>
+            <a:fontRef idx="minor">
+              <a:schemeClr val="lt1"/>
+            </a:fontRef>
+          </p:style>
+          <p:txBody>
+            <a:bodyPr rtlCol="0" anchor="ctr"/>
+            <a:lstStyle/>
+            <a:p>
+              <a:pPr algn="ctr"/>
+              <a:endParaRPr lang="ko-KR" altLang="en-US"/>
+            </a:p>
+          </p:txBody>
+        </p:sp>
+        <p:grpSp>
+          <p:nvGrpSpPr>
+            <p:cNvPr id="6" name="그룹 5"/>
+            <p:cNvGrpSpPr/>
+            <p:nvPr/>
+          </p:nvGrpSpPr>
+          <p:grpSpPr>
+            <a:xfrm>
+              <a:off x="848819" y="656347"/>
+              <a:ext cx="3034145" cy="1496563"/>
+              <a:chOff x="896587" y="3150649"/>
+              <a:chExt cx="3034145" cy="1496563"/>
+            </a:xfrm>
+          </p:grpSpPr>
+          <p:sp>
+            <p:nvSpPr>
+              <p:cNvPr id="7" name="직사각형 6"/>
+              <p:cNvSpPr/>
+              <p:nvPr/>
+            </p:nvSpPr>
+            <p:spPr>
+              <a:xfrm>
+                <a:off x="1252846" y="3400302"/>
+                <a:ext cx="2677886" cy="1246910"/>
+              </a:xfrm>
+              <a:prstGeom prst="rect">
+                <a:avLst/>
+              </a:prstGeom>
+              <a:noFill/>
+              <a:ln w="19050">
+                <a:solidFill>
+                  <a:schemeClr val="tx1"/>
+                </a:solidFill>
+              </a:ln>
+            </p:spPr>
+            <p:style>
+              <a:lnRef idx="2">
+                <a:schemeClr val="accent1">
+                  <a:shade val="50000"/>
+                </a:schemeClr>
+              </a:lnRef>
+              <a:fillRef idx="1">
+                <a:schemeClr val="accent1"/>
+              </a:fillRef>
+              <a:effectRef idx="0">
+                <a:schemeClr val="accent1"/>
+              </a:effectRef>
+              <a:fontRef idx="minor">
+                <a:schemeClr val="lt1"/>
+              </a:fontRef>
+            </p:style>
+            <p:txBody>
+              <a:bodyPr rtlCol="0" anchor="ctr"/>
+              <a:lstStyle/>
+              <a:p>
+                <a:pPr algn="ctr"/>
+                <a:endParaRPr lang="ko-KR" altLang="en-US"/>
+              </a:p>
+            </p:txBody>
+          </p:sp>
+          <p:sp>
+            <p:nvSpPr>
+              <p:cNvPr id="8" name="직사각형 7"/>
+              <p:cNvSpPr/>
+              <p:nvPr/>
+            </p:nvSpPr>
+            <p:spPr>
+              <a:xfrm>
+                <a:off x="1429986" y="3780313"/>
+                <a:ext cx="2328288" cy="612177"/>
+              </a:xfrm>
+              <a:prstGeom prst="rect">
+                <a:avLst/>
+              </a:prstGeom>
+              <a:solidFill>
+                <a:schemeClr val="tx1"/>
+              </a:solidFill>
+              <a:ln w="19050">
+                <a:noFill/>
+              </a:ln>
+            </p:spPr>
+            <p:style>
+              <a:lnRef idx="2">
+                <a:schemeClr val="accent1">
+                  <a:shade val="50000"/>
+                </a:schemeClr>
+              </a:lnRef>
+              <a:fillRef idx="1">
+                <a:schemeClr val="accent1"/>
+              </a:fillRef>
+              <a:effectRef idx="0">
+                <a:schemeClr val="accent1"/>
+              </a:effectRef>
+              <a:fontRef idx="minor">
+                <a:schemeClr val="lt1"/>
+              </a:fontRef>
+            </p:style>
+            <p:txBody>
+              <a:bodyPr rtlCol="0" anchor="ctr"/>
+              <a:lstStyle/>
+              <a:p>
+                <a:pPr algn="ctr"/>
+                <a:r>
+                  <a:rPr lang="en-US" altLang="ko-KR" sz="2000" b="1" dirty="0" smtClean="0">
+                    <a:solidFill>
+                      <a:schemeClr val="bg1"/>
+                    </a:solidFill>
+                  </a:rPr>
+                  <a:t>BOOKMARK</a:t>
+                </a:r>
+                <a:endParaRPr lang="ko-KR" altLang="en-US" sz="2000" b="1" dirty="0">
+                  <a:solidFill>
+                    <a:schemeClr val="bg1"/>
+                  </a:solidFill>
+                </a:endParaRPr>
+              </a:p>
+            </p:txBody>
+          </p:sp>
+          <p:sp>
+            <p:nvSpPr>
+              <p:cNvPr id="9" name="직사각형 8"/>
+              <p:cNvSpPr/>
+              <p:nvPr/>
+            </p:nvSpPr>
+            <p:spPr>
+              <a:xfrm>
+                <a:off x="896587" y="3150649"/>
+                <a:ext cx="1618012" cy="499304"/>
+              </a:xfrm>
+              <a:prstGeom prst="rect">
+                <a:avLst/>
+              </a:prstGeom>
+              <a:solidFill>
+                <a:schemeClr val="bg1"/>
+              </a:solidFill>
+              <a:ln>
+                <a:noFill/>
+              </a:ln>
+            </p:spPr>
+            <p:style>
+              <a:lnRef idx="2">
+                <a:schemeClr val="accent1">
+                  <a:shade val="50000"/>
+                </a:schemeClr>
+              </a:lnRef>
+              <a:fillRef idx="1">
+                <a:schemeClr val="accent1"/>
+              </a:fillRef>
+              <a:effectRef idx="0">
+                <a:schemeClr val="accent1"/>
+              </a:effectRef>
+              <a:fontRef idx="minor">
+                <a:schemeClr val="lt1"/>
+              </a:fontRef>
+            </p:style>
+            <p:txBody>
+              <a:bodyPr rtlCol="0" anchor="ctr"/>
+              <a:lstStyle/>
+              <a:p>
+                <a:pPr algn="ctr"/>
+                <a:r>
+                  <a:rPr lang="en-US" altLang="ko-KR" sz="3200" dirty="0" smtClean="0">
+                    <a:solidFill>
+                      <a:schemeClr val="tx1"/>
+                    </a:solidFill>
+                    <a:latin typeface="HY견고딕" panose="02030600000101010101" pitchFamily="18" charset="-127"/>
+                    <a:ea typeface="HY견고딕" panose="02030600000101010101" pitchFamily="18" charset="-127"/>
+                  </a:rPr>
+                  <a:t>MY</a:t>
+                </a:r>
+                <a:endParaRPr lang="ko-KR" altLang="en-US" sz="3200" dirty="0">
+                  <a:solidFill>
+                    <a:schemeClr val="tx1"/>
+                  </a:solidFill>
+                  <a:latin typeface="HY견고딕" panose="02030600000101010101" pitchFamily="18" charset="-127"/>
+                  <a:ea typeface="HY견고딕" panose="02030600000101010101" pitchFamily="18" charset="-127"/>
+                </a:endParaRPr>
+              </a:p>
+            </p:txBody>
+          </p:sp>
+        </p:grpSp>
+        <p:sp>
+          <p:nvSpPr>
+            <p:cNvPr id="10" name="직사각형 9"/>
+            <p:cNvSpPr/>
+            <p:nvPr/>
+          </p:nvSpPr>
+          <p:spPr>
+            <a:xfrm>
+              <a:off x="4123731" y="1279636"/>
+              <a:ext cx="3066765" cy="499638"/>
+            </a:xfrm>
+            <a:prstGeom prst="rect">
+              <a:avLst/>
+            </a:prstGeom>
+            <a:noFill/>
+            <a:ln>
+              <a:noFill/>
+            </a:ln>
+          </p:spPr>
+          <p:style>
+            <a:lnRef idx="2">
+              <a:schemeClr val="accent1">
+                <a:shade val="50000"/>
+              </a:schemeClr>
+            </a:lnRef>
+            <a:fillRef idx="1">
+              <a:schemeClr val="accent1"/>
+            </a:fillRef>
+            <a:effectRef idx="0">
+              <a:schemeClr val="accent1"/>
+            </a:effectRef>
+            <a:fontRef idx="minor">
+              <a:schemeClr val="lt1"/>
+            </a:fontRef>
+          </p:style>
+          <p:txBody>
+            <a:bodyPr rtlCol="0" anchor="ctr"/>
+            <a:lstStyle/>
+            <a:p>
+              <a:pPr algn="ctr"/>
+              <a:r>
+                <a:rPr lang="en-US" altLang="ko-KR" dirty="0" smtClean="0">
+                  <a:solidFill>
+                    <a:srgbClr val="7030A0"/>
+                  </a:solidFill>
+                </a:rPr>
+                <a:t>www.mybookmark.com</a:t>
+              </a:r>
+              <a:endParaRPr lang="ko-KR" altLang="en-US" dirty="0">
+                <a:solidFill>
+                  <a:srgbClr val="7030A0"/>
+                </a:solidFill>
+              </a:endParaRPr>
+            </a:p>
+          </p:txBody>
+        </p:sp>
+        <p:sp>
+          <p:nvSpPr>
+            <p:cNvPr id="11" name="직사각형 10"/>
+            <p:cNvSpPr/>
+            <p:nvPr/>
+          </p:nvSpPr>
+          <p:spPr>
+            <a:xfrm>
+              <a:off x="816199" y="2308087"/>
+              <a:ext cx="4581136" cy="499638"/>
+            </a:xfrm>
+            <a:prstGeom prst="rect">
+              <a:avLst/>
+            </a:prstGeom>
+            <a:noFill/>
+            <a:ln>
+              <a:noFill/>
+            </a:ln>
+          </p:spPr>
+          <p:style>
+            <a:lnRef idx="2">
+              <a:schemeClr val="accent1">
+                <a:shade val="50000"/>
+              </a:schemeClr>
+            </a:lnRef>
+            <a:fillRef idx="1">
+              <a:schemeClr val="accent1"/>
+            </a:fillRef>
+            <a:effectRef idx="0">
+              <a:schemeClr val="accent1"/>
+            </a:effectRef>
+            <a:fontRef idx="minor">
+              <a:schemeClr val="lt1"/>
+            </a:fontRef>
+          </p:style>
+          <p:txBody>
+            <a:bodyPr rtlCol="0" anchor="ctr"/>
+            <a:lstStyle/>
+            <a:p>
+              <a:pPr algn="ctr"/>
+              <a:r>
+                <a:rPr lang="ko-KR" altLang="en-US" b="1" i="1" dirty="0" smtClean="0">
+                  <a:solidFill>
+                    <a:schemeClr val="accent1">
+                      <a:lumMod val="50000"/>
+                    </a:schemeClr>
+                  </a:solidFill>
+                </a:rPr>
+                <a:t>여러분이 원하는 찾는 모든 웹사이트</a:t>
+              </a:r>
+              <a:endParaRPr lang="ko-KR" altLang="en-US" b="1" i="1" dirty="0">
+                <a:solidFill>
+                  <a:schemeClr val="accent1">
+                    <a:lumMod val="50000"/>
+                  </a:schemeClr>
+                </a:solidFill>
+              </a:endParaRPr>
+            </a:p>
+          </p:txBody>
+        </p:sp>
+        <p:sp>
+          <p:nvSpPr>
+            <p:cNvPr id="12" name="직사각형 11"/>
+            <p:cNvSpPr/>
+            <p:nvPr/>
+          </p:nvSpPr>
+          <p:spPr>
+            <a:xfrm>
+              <a:off x="2910214" y="2755954"/>
+              <a:ext cx="4581136" cy="499638"/>
+            </a:xfrm>
+            <a:prstGeom prst="rect">
+              <a:avLst/>
+            </a:prstGeom>
+            <a:noFill/>
+            <a:ln>
+              <a:noFill/>
+            </a:ln>
+          </p:spPr>
+          <p:style>
+            <a:lnRef idx="2">
+              <a:schemeClr val="accent1">
+                <a:shade val="50000"/>
+              </a:schemeClr>
+            </a:lnRef>
+            <a:fillRef idx="1">
+              <a:schemeClr val="accent1"/>
+            </a:fillRef>
+            <a:effectRef idx="0">
+              <a:schemeClr val="accent1"/>
+            </a:effectRef>
+            <a:fontRef idx="minor">
+              <a:schemeClr val="lt1"/>
+            </a:fontRef>
+          </p:style>
+          <p:txBody>
+            <a:bodyPr rtlCol="0" anchor="ctr"/>
+            <a:lstStyle/>
+            <a:p>
+              <a:pPr algn="ctr"/>
+              <a:r>
+                <a:rPr lang="ko-KR" altLang="en-US" b="1" i="1" dirty="0" smtClean="0">
+                  <a:solidFill>
+                    <a:srgbClr val="00B050"/>
+                  </a:solidFill>
+                </a:rPr>
+                <a:t>어디서나 공유되는 나만의 </a:t>
+              </a:r>
+              <a:r>
+                <a:rPr lang="ko-KR" altLang="en-US" b="1" i="1" dirty="0" err="1" smtClean="0">
+                  <a:solidFill>
+                    <a:srgbClr val="00B050"/>
+                  </a:solidFill>
+                </a:rPr>
+                <a:t>즐겨찾기</a:t>
+              </a:r>
+              <a:endParaRPr lang="ko-KR" altLang="en-US" b="1" i="1" dirty="0">
+                <a:solidFill>
+                  <a:srgbClr val="00B050"/>
+                </a:solidFill>
+              </a:endParaRPr>
+            </a:p>
+          </p:txBody>
+        </p:sp>
+        <p:sp>
+          <p:nvSpPr>
+            <p:cNvPr id="13" name="직사각형 12"/>
+            <p:cNvSpPr/>
+            <p:nvPr/>
+          </p:nvSpPr>
+          <p:spPr>
+            <a:xfrm>
+              <a:off x="1592396" y="3164557"/>
+              <a:ext cx="4581136" cy="499638"/>
+            </a:xfrm>
+            <a:prstGeom prst="rect">
+              <a:avLst/>
+            </a:prstGeom>
+            <a:noFill/>
+            <a:ln>
+              <a:noFill/>
+            </a:ln>
+          </p:spPr>
+          <p:style>
+            <a:lnRef idx="2">
+              <a:schemeClr val="accent1">
+                <a:shade val="50000"/>
+              </a:schemeClr>
+            </a:lnRef>
+            <a:fillRef idx="1">
+              <a:schemeClr val="accent1"/>
+            </a:fillRef>
+            <a:effectRef idx="0">
+              <a:schemeClr val="accent1"/>
+            </a:effectRef>
+            <a:fontRef idx="minor">
+              <a:schemeClr val="lt1"/>
+            </a:fontRef>
+          </p:style>
+          <p:txBody>
+            <a:bodyPr rtlCol="0" anchor="ctr"/>
+            <a:lstStyle/>
+            <a:p>
+              <a:pPr algn="ctr"/>
+              <a:r>
+                <a:rPr lang="ko-KR" altLang="en-US" sz="2000" b="1" dirty="0" smtClean="0">
+                  <a:solidFill>
+                    <a:srgbClr val="961A8A"/>
+                  </a:solidFill>
+                </a:rPr>
+                <a:t>여러분의 사이트를 공유해보세요</a:t>
+              </a:r>
+              <a:r>
+                <a:rPr lang="en-US" altLang="ko-KR" sz="2000" b="1" dirty="0" smtClean="0">
+                  <a:solidFill>
+                    <a:srgbClr val="961A8A"/>
+                  </a:solidFill>
+                </a:rPr>
+                <a:t>!</a:t>
+              </a:r>
+              <a:endParaRPr lang="ko-KR" altLang="en-US" sz="2000" b="1" dirty="0">
+                <a:solidFill>
+                  <a:srgbClr val="961A8A"/>
+                </a:solidFill>
+              </a:endParaRPr>
+            </a:p>
+          </p:txBody>
+        </p:sp>
+      </p:grpSp>
+    </p:spTree>
+    <p:extLst>
+      <p:ext uri="{BB962C8B-B14F-4D97-AF65-F5344CB8AC3E}">
+        <p14:creationId xmlns:p14="http://schemas.microsoft.com/office/powerpoint/2010/main" val="3628988493"/>
       </p:ext>
     </p:extLst>
   </p:cSld>

</xml_diff>

<commit_message>
[c, u] : 파일 세분화, 디자인 및 레이아웃 구성 수정 file fragmentation, edit design and layaou composition
</commit_message>
<xml_diff>
--- a/bookmark.pptx
+++ b/bookmark.pptx
@@ -12,8 +12,9 @@
     <p:sldId id="259" r:id="rId6"/>
     <p:sldId id="263" r:id="rId7"/>
     <p:sldId id="265" r:id="rId8"/>
-    <p:sldId id="262" r:id="rId9"/>
-    <p:sldId id="266" r:id="rId10"/>
+    <p:sldId id="267" r:id="rId9"/>
+    <p:sldId id="262" r:id="rId10"/>
+    <p:sldId id="266" r:id="rId11"/>
   </p:sldIdLst>
   <p:sldSz cx="12192000" cy="6858000"/>
   <p:notesSz cx="6858000" cy="9144000"/>
@@ -263,7 +264,7 @@
           <a:p>
             <a:fld id="{9A0CBB99-4DF1-49E3-ACA0-C007A6485E48}" type="datetimeFigureOut">
               <a:rPr lang="ko-KR" altLang="en-US" smtClean="0"/>
-              <a:t>2024-04-24</a:t>
+              <a:t>2024-05-08</a:t>
             </a:fld>
             <a:endParaRPr lang="ko-KR" altLang="en-US"/>
           </a:p>
@@ -433,7 +434,7 @@
           <a:p>
             <a:fld id="{9A0CBB99-4DF1-49E3-ACA0-C007A6485E48}" type="datetimeFigureOut">
               <a:rPr lang="ko-KR" altLang="en-US" smtClean="0"/>
-              <a:t>2024-04-24</a:t>
+              <a:t>2024-05-08</a:t>
             </a:fld>
             <a:endParaRPr lang="ko-KR" altLang="en-US"/>
           </a:p>
@@ -613,7 +614,7 @@
           <a:p>
             <a:fld id="{9A0CBB99-4DF1-49E3-ACA0-C007A6485E48}" type="datetimeFigureOut">
               <a:rPr lang="ko-KR" altLang="en-US" smtClean="0"/>
-              <a:t>2024-04-24</a:t>
+              <a:t>2024-05-08</a:t>
             </a:fld>
             <a:endParaRPr lang="ko-KR" altLang="en-US"/>
           </a:p>
@@ -783,7 +784,7 @@
           <a:p>
             <a:fld id="{9A0CBB99-4DF1-49E3-ACA0-C007A6485E48}" type="datetimeFigureOut">
               <a:rPr lang="ko-KR" altLang="en-US" smtClean="0"/>
-              <a:t>2024-04-24</a:t>
+              <a:t>2024-05-08</a:t>
             </a:fld>
             <a:endParaRPr lang="ko-KR" altLang="en-US"/>
           </a:p>
@@ -1029,7 +1030,7 @@
           <a:p>
             <a:fld id="{9A0CBB99-4DF1-49E3-ACA0-C007A6485E48}" type="datetimeFigureOut">
               <a:rPr lang="ko-KR" altLang="en-US" smtClean="0"/>
-              <a:t>2024-04-24</a:t>
+              <a:t>2024-05-08</a:t>
             </a:fld>
             <a:endParaRPr lang="ko-KR" altLang="en-US"/>
           </a:p>
@@ -1261,7 +1262,7 @@
           <a:p>
             <a:fld id="{9A0CBB99-4DF1-49E3-ACA0-C007A6485E48}" type="datetimeFigureOut">
               <a:rPr lang="ko-KR" altLang="en-US" smtClean="0"/>
-              <a:t>2024-04-24</a:t>
+              <a:t>2024-05-08</a:t>
             </a:fld>
             <a:endParaRPr lang="ko-KR" altLang="en-US"/>
           </a:p>
@@ -1628,7 +1629,7 @@
           <a:p>
             <a:fld id="{9A0CBB99-4DF1-49E3-ACA0-C007A6485E48}" type="datetimeFigureOut">
               <a:rPr lang="ko-KR" altLang="en-US" smtClean="0"/>
-              <a:t>2024-04-24</a:t>
+              <a:t>2024-05-08</a:t>
             </a:fld>
             <a:endParaRPr lang="ko-KR" altLang="en-US"/>
           </a:p>
@@ -1746,7 +1747,7 @@
           <a:p>
             <a:fld id="{9A0CBB99-4DF1-49E3-ACA0-C007A6485E48}" type="datetimeFigureOut">
               <a:rPr lang="ko-KR" altLang="en-US" smtClean="0"/>
-              <a:t>2024-04-24</a:t>
+              <a:t>2024-05-08</a:t>
             </a:fld>
             <a:endParaRPr lang="ko-KR" altLang="en-US"/>
           </a:p>
@@ -1841,7 +1842,7 @@
           <a:p>
             <a:fld id="{9A0CBB99-4DF1-49E3-ACA0-C007A6485E48}" type="datetimeFigureOut">
               <a:rPr lang="ko-KR" altLang="en-US" smtClean="0"/>
-              <a:t>2024-04-24</a:t>
+              <a:t>2024-05-08</a:t>
             </a:fld>
             <a:endParaRPr lang="ko-KR" altLang="en-US"/>
           </a:p>
@@ -2118,7 +2119,7 @@
           <a:p>
             <a:fld id="{9A0CBB99-4DF1-49E3-ACA0-C007A6485E48}" type="datetimeFigureOut">
               <a:rPr lang="ko-KR" altLang="en-US" smtClean="0"/>
-              <a:t>2024-04-24</a:t>
+              <a:t>2024-05-08</a:t>
             </a:fld>
             <a:endParaRPr lang="ko-KR" altLang="en-US"/>
           </a:p>
@@ -2371,7 +2372,7 @@
           <a:p>
             <a:fld id="{9A0CBB99-4DF1-49E3-ACA0-C007A6485E48}" type="datetimeFigureOut">
               <a:rPr lang="ko-KR" altLang="en-US" smtClean="0"/>
-              <a:t>2024-04-24</a:t>
+              <a:t>2024-05-08</a:t>
             </a:fld>
             <a:endParaRPr lang="ko-KR" altLang="en-US"/>
           </a:p>
@@ -2584,7 +2585,7 @@
           <a:p>
             <a:fld id="{9A0CBB99-4DF1-49E3-ACA0-C007A6485E48}" type="datetimeFigureOut">
               <a:rPr lang="ko-KR" altLang="en-US" smtClean="0"/>
-              <a:t>2024-04-24</a:t>
+              <a:t>2024-05-08</a:t>
             </a:fld>
             <a:endParaRPr lang="ko-KR" altLang="en-US"/>
           </a:p>
@@ -3020,6 +3021,594 @@
     <p:extLst>
       <p:ext uri="{BB962C8B-B14F-4D97-AF65-F5344CB8AC3E}">
         <p14:creationId xmlns:p14="http://schemas.microsoft.com/office/powerpoint/2010/main" val="347675111"/>
+      </p:ext>
+    </p:extLst>
+  </p:cSld>
+  <p:clrMapOvr>
+    <a:masterClrMapping/>
+  </p:clrMapOvr>
+</p:sld>
+</file>
+
+<file path=ppt/slides/slide10.xml><?xml version="1.0" encoding="utf-8"?>
+<p:sld xmlns:a="http://schemas.openxmlformats.org/drawingml/2006/main" xmlns:r="http://schemas.openxmlformats.org/officeDocument/2006/relationships" xmlns:p="http://schemas.openxmlformats.org/presentationml/2006/main">
+  <p:cSld>
+    <p:spTree>
+      <p:nvGrpSpPr>
+        <p:cNvPr id="1" name=""/>
+        <p:cNvGrpSpPr/>
+        <p:nvPr/>
+      </p:nvGrpSpPr>
+      <p:grpSpPr>
+        <a:xfrm>
+          <a:off x="0" y="0"/>
+          <a:ext cx="0" cy="0"/>
+          <a:chOff x="0" y="0"/>
+          <a:chExt cx="0" cy="0"/>
+        </a:xfrm>
+      </p:grpSpPr>
+      <p:sp>
+        <p:nvSpPr>
+          <p:cNvPr id="5" name="직사각형 4"/>
+          <p:cNvSpPr/>
+          <p:nvPr/>
+        </p:nvSpPr>
+        <p:spPr>
+          <a:xfrm>
+            <a:off x="7887948" y="1908549"/>
+            <a:ext cx="2455460" cy="841459"/>
+          </a:xfrm>
+          <a:prstGeom prst="rect">
+            <a:avLst/>
+          </a:prstGeom>
+        </p:spPr>
+        <p:style>
+          <a:lnRef idx="2">
+            <a:schemeClr val="accent1">
+              <a:shade val="50000"/>
+            </a:schemeClr>
+          </a:lnRef>
+          <a:fillRef idx="1">
+            <a:schemeClr val="accent1"/>
+          </a:fillRef>
+          <a:effectRef idx="0">
+            <a:schemeClr val="accent1"/>
+          </a:effectRef>
+          <a:fontRef idx="minor">
+            <a:schemeClr val="lt1"/>
+          </a:fontRef>
+        </p:style>
+        <p:txBody>
+          <a:bodyPr rtlCol="0" anchor="ctr"/>
+          <a:lstStyle/>
+          <a:p>
+            <a:pPr algn="ctr"/>
+            <a:r>
+              <a:rPr lang="en-US" altLang="ko-KR" dirty="0" smtClean="0"/>
+              <a:t>1 : 2.14 </a:t>
+            </a:r>
+            <a:r>
+              <a:rPr lang="ko-KR" altLang="en-US" dirty="0" smtClean="0"/>
+              <a:t>비율</a:t>
+            </a:r>
+            <a:endParaRPr lang="en-US" altLang="ko-KR" dirty="0" smtClean="0"/>
+          </a:p>
+          <a:p>
+            <a:pPr algn="ctr"/>
+            <a:r>
+              <a:rPr lang="ko-KR" altLang="en-US" dirty="0" smtClean="0"/>
+              <a:t>너비 </a:t>
+            </a:r>
+            <a:r>
+              <a:rPr lang="en-US" altLang="ko-KR" dirty="0" smtClean="0"/>
+              <a:t>640 </a:t>
+            </a:r>
+            <a:r>
+              <a:rPr lang="ko-KR" altLang="en-US" dirty="0" smtClean="0"/>
+              <a:t>높이 </a:t>
+            </a:r>
+            <a:r>
+              <a:rPr lang="en-US" altLang="ko-KR" dirty="0" smtClean="0"/>
+              <a:t>300</a:t>
+            </a:r>
+            <a:endParaRPr lang="ko-KR" altLang="en-US" dirty="0"/>
+          </a:p>
+        </p:txBody>
+      </p:sp>
+      <p:grpSp>
+        <p:nvGrpSpPr>
+          <p:cNvPr id="25" name="그룹 24"/>
+          <p:cNvGrpSpPr/>
+          <p:nvPr/>
+        </p:nvGrpSpPr>
+        <p:grpSpPr>
+          <a:xfrm>
+            <a:off x="523731" y="423166"/>
+            <a:ext cx="7200000" cy="3364486"/>
+            <a:chOff x="523731" y="423166"/>
+            <a:chExt cx="7200000" cy="3364486"/>
+          </a:xfrm>
+        </p:grpSpPr>
+        <p:sp>
+          <p:nvSpPr>
+            <p:cNvPr id="4" name="직사각형 3"/>
+            <p:cNvSpPr>
+              <a:spLocks noChangeAspect="1"/>
+            </p:cNvSpPr>
+            <p:nvPr/>
+          </p:nvSpPr>
+          <p:spPr>
+            <a:xfrm>
+              <a:off x="523731" y="423166"/>
+              <a:ext cx="7200000" cy="3364486"/>
+            </a:xfrm>
+            <a:prstGeom prst="rect">
+              <a:avLst/>
+            </a:prstGeom>
+            <a:solidFill>
+              <a:schemeClr val="bg1">
+                <a:lumMod val="85000"/>
+              </a:schemeClr>
+            </a:solidFill>
+            <a:ln>
+              <a:noFill/>
+            </a:ln>
+          </p:spPr>
+          <p:style>
+            <a:lnRef idx="2">
+              <a:schemeClr val="accent1">
+                <a:shade val="50000"/>
+              </a:schemeClr>
+            </a:lnRef>
+            <a:fillRef idx="1">
+              <a:schemeClr val="accent1"/>
+            </a:fillRef>
+            <a:effectRef idx="0">
+              <a:schemeClr val="accent1"/>
+            </a:effectRef>
+            <a:fontRef idx="minor">
+              <a:schemeClr val="lt1"/>
+            </a:fontRef>
+          </p:style>
+          <p:txBody>
+            <a:bodyPr rtlCol="0" anchor="ctr"/>
+            <a:lstStyle/>
+            <a:p>
+              <a:pPr algn="ctr"/>
+              <a:endParaRPr lang="ko-KR" altLang="en-US"/>
+            </a:p>
+          </p:txBody>
+        </p:sp>
+        <p:grpSp>
+          <p:nvGrpSpPr>
+            <p:cNvPr id="6" name="그룹 5"/>
+            <p:cNvGrpSpPr/>
+            <p:nvPr/>
+          </p:nvGrpSpPr>
+          <p:grpSpPr>
+            <a:xfrm>
+              <a:off x="848819" y="656347"/>
+              <a:ext cx="3034145" cy="1496563"/>
+              <a:chOff x="896587" y="3150649"/>
+              <a:chExt cx="3034145" cy="1496563"/>
+            </a:xfrm>
+          </p:grpSpPr>
+          <p:sp>
+            <p:nvSpPr>
+              <p:cNvPr id="7" name="직사각형 6"/>
+              <p:cNvSpPr/>
+              <p:nvPr/>
+            </p:nvSpPr>
+            <p:spPr>
+              <a:xfrm>
+                <a:off x="1252846" y="3400302"/>
+                <a:ext cx="2677886" cy="1246910"/>
+              </a:xfrm>
+              <a:prstGeom prst="rect">
+                <a:avLst/>
+              </a:prstGeom>
+              <a:noFill/>
+              <a:ln w="19050">
+                <a:solidFill>
+                  <a:schemeClr val="tx1"/>
+                </a:solidFill>
+              </a:ln>
+            </p:spPr>
+            <p:style>
+              <a:lnRef idx="2">
+                <a:schemeClr val="accent1">
+                  <a:shade val="50000"/>
+                </a:schemeClr>
+              </a:lnRef>
+              <a:fillRef idx="1">
+                <a:schemeClr val="accent1"/>
+              </a:fillRef>
+              <a:effectRef idx="0">
+                <a:schemeClr val="accent1"/>
+              </a:effectRef>
+              <a:fontRef idx="minor">
+                <a:schemeClr val="lt1"/>
+              </a:fontRef>
+            </p:style>
+            <p:txBody>
+              <a:bodyPr rtlCol="0" anchor="ctr"/>
+              <a:lstStyle/>
+              <a:p>
+                <a:pPr algn="ctr"/>
+                <a:endParaRPr lang="ko-KR" altLang="en-US"/>
+              </a:p>
+            </p:txBody>
+          </p:sp>
+          <p:sp>
+            <p:nvSpPr>
+              <p:cNvPr id="8" name="직사각형 7"/>
+              <p:cNvSpPr/>
+              <p:nvPr/>
+            </p:nvSpPr>
+            <p:spPr>
+              <a:xfrm>
+                <a:off x="1429986" y="3780313"/>
+                <a:ext cx="2328288" cy="612177"/>
+              </a:xfrm>
+              <a:prstGeom prst="rect">
+                <a:avLst/>
+              </a:prstGeom>
+              <a:solidFill>
+                <a:schemeClr val="tx1"/>
+              </a:solidFill>
+              <a:ln w="19050">
+                <a:noFill/>
+              </a:ln>
+            </p:spPr>
+            <p:style>
+              <a:lnRef idx="2">
+                <a:schemeClr val="accent1">
+                  <a:shade val="50000"/>
+                </a:schemeClr>
+              </a:lnRef>
+              <a:fillRef idx="1">
+                <a:schemeClr val="accent1"/>
+              </a:fillRef>
+              <a:effectRef idx="0">
+                <a:schemeClr val="accent1"/>
+              </a:effectRef>
+              <a:fontRef idx="minor">
+                <a:schemeClr val="lt1"/>
+              </a:fontRef>
+            </p:style>
+            <p:txBody>
+              <a:bodyPr rtlCol="0" anchor="ctr"/>
+              <a:lstStyle/>
+              <a:p>
+                <a:pPr algn="ctr"/>
+                <a:r>
+                  <a:rPr lang="en-US" altLang="ko-KR" sz="2000" b="1" dirty="0" smtClean="0">
+                    <a:solidFill>
+                      <a:schemeClr val="bg1"/>
+                    </a:solidFill>
+                  </a:rPr>
+                  <a:t>BOOKMARK</a:t>
+                </a:r>
+                <a:endParaRPr lang="ko-KR" altLang="en-US" sz="2000" b="1" dirty="0">
+                  <a:solidFill>
+                    <a:schemeClr val="bg1"/>
+                  </a:solidFill>
+                </a:endParaRPr>
+              </a:p>
+            </p:txBody>
+          </p:sp>
+          <p:sp>
+            <p:nvSpPr>
+              <p:cNvPr id="9" name="직사각형 8"/>
+              <p:cNvSpPr/>
+              <p:nvPr/>
+            </p:nvSpPr>
+            <p:spPr>
+              <a:xfrm>
+                <a:off x="896587" y="3150649"/>
+                <a:ext cx="1618012" cy="499304"/>
+              </a:xfrm>
+              <a:prstGeom prst="rect">
+                <a:avLst/>
+              </a:prstGeom>
+              <a:solidFill>
+                <a:schemeClr val="bg1"/>
+              </a:solidFill>
+              <a:ln>
+                <a:noFill/>
+              </a:ln>
+            </p:spPr>
+            <p:style>
+              <a:lnRef idx="2">
+                <a:schemeClr val="accent1">
+                  <a:shade val="50000"/>
+                </a:schemeClr>
+              </a:lnRef>
+              <a:fillRef idx="1">
+                <a:schemeClr val="accent1"/>
+              </a:fillRef>
+              <a:effectRef idx="0">
+                <a:schemeClr val="accent1"/>
+              </a:effectRef>
+              <a:fontRef idx="minor">
+                <a:schemeClr val="lt1"/>
+              </a:fontRef>
+            </p:style>
+            <p:txBody>
+              <a:bodyPr rtlCol="0" anchor="ctr"/>
+              <a:lstStyle/>
+              <a:p>
+                <a:pPr algn="ctr"/>
+                <a:r>
+                  <a:rPr lang="en-US" altLang="ko-KR" sz="3200" dirty="0" smtClean="0">
+                    <a:solidFill>
+                      <a:schemeClr val="tx1"/>
+                    </a:solidFill>
+                    <a:latin typeface="HY견고딕" panose="02030600000101010101" pitchFamily="18" charset="-127"/>
+                    <a:ea typeface="HY견고딕" panose="02030600000101010101" pitchFamily="18" charset="-127"/>
+                  </a:rPr>
+                  <a:t>MY</a:t>
+                </a:r>
+                <a:endParaRPr lang="ko-KR" altLang="en-US" sz="3200" dirty="0">
+                  <a:solidFill>
+                    <a:schemeClr val="tx1"/>
+                  </a:solidFill>
+                  <a:latin typeface="HY견고딕" panose="02030600000101010101" pitchFamily="18" charset="-127"/>
+                  <a:ea typeface="HY견고딕" panose="02030600000101010101" pitchFamily="18" charset="-127"/>
+                </a:endParaRPr>
+              </a:p>
+            </p:txBody>
+          </p:sp>
+        </p:grpSp>
+        <p:sp>
+          <p:nvSpPr>
+            <p:cNvPr id="10" name="직사각형 9"/>
+            <p:cNvSpPr/>
+            <p:nvPr/>
+          </p:nvSpPr>
+          <p:spPr>
+            <a:xfrm>
+              <a:off x="4123731" y="1279636"/>
+              <a:ext cx="3066765" cy="499638"/>
+            </a:xfrm>
+            <a:prstGeom prst="rect">
+              <a:avLst/>
+            </a:prstGeom>
+            <a:noFill/>
+            <a:ln>
+              <a:noFill/>
+            </a:ln>
+          </p:spPr>
+          <p:style>
+            <a:lnRef idx="2">
+              <a:schemeClr val="accent1">
+                <a:shade val="50000"/>
+              </a:schemeClr>
+            </a:lnRef>
+            <a:fillRef idx="1">
+              <a:schemeClr val="accent1"/>
+            </a:fillRef>
+            <a:effectRef idx="0">
+              <a:schemeClr val="accent1"/>
+            </a:effectRef>
+            <a:fontRef idx="minor">
+              <a:schemeClr val="lt1"/>
+            </a:fontRef>
+          </p:style>
+          <p:txBody>
+            <a:bodyPr rtlCol="0" anchor="ctr"/>
+            <a:lstStyle/>
+            <a:p>
+              <a:pPr algn="ctr"/>
+              <a:r>
+                <a:rPr lang="en-US" altLang="ko-KR" dirty="0" smtClean="0">
+                  <a:solidFill>
+                    <a:srgbClr val="7030A0"/>
+                  </a:solidFill>
+                </a:rPr>
+                <a:t>www.mybookmark.com</a:t>
+              </a:r>
+              <a:endParaRPr lang="ko-KR" altLang="en-US" dirty="0">
+                <a:solidFill>
+                  <a:srgbClr val="7030A0"/>
+                </a:solidFill>
+              </a:endParaRPr>
+            </a:p>
+          </p:txBody>
+        </p:sp>
+        <p:sp>
+          <p:nvSpPr>
+            <p:cNvPr id="11" name="직사각형 10"/>
+            <p:cNvSpPr/>
+            <p:nvPr/>
+          </p:nvSpPr>
+          <p:spPr>
+            <a:xfrm>
+              <a:off x="816199" y="2308087"/>
+              <a:ext cx="4581136" cy="499638"/>
+            </a:xfrm>
+            <a:prstGeom prst="rect">
+              <a:avLst/>
+            </a:prstGeom>
+            <a:noFill/>
+            <a:ln>
+              <a:noFill/>
+            </a:ln>
+          </p:spPr>
+          <p:style>
+            <a:lnRef idx="2">
+              <a:schemeClr val="accent1">
+                <a:shade val="50000"/>
+              </a:schemeClr>
+            </a:lnRef>
+            <a:fillRef idx="1">
+              <a:schemeClr val="accent1"/>
+            </a:fillRef>
+            <a:effectRef idx="0">
+              <a:schemeClr val="accent1"/>
+            </a:effectRef>
+            <a:fontRef idx="minor">
+              <a:schemeClr val="lt1"/>
+            </a:fontRef>
+          </p:style>
+          <p:txBody>
+            <a:bodyPr rtlCol="0" anchor="ctr"/>
+            <a:lstStyle/>
+            <a:p>
+              <a:pPr algn="ctr"/>
+              <a:r>
+                <a:rPr lang="ko-KR" altLang="en-US" b="1" i="1" dirty="0" smtClean="0">
+                  <a:solidFill>
+                    <a:schemeClr val="accent1">
+                      <a:lumMod val="50000"/>
+                    </a:schemeClr>
+                  </a:solidFill>
+                </a:rPr>
+                <a:t>여러분이 원하는 찾는 모든 웹사이트</a:t>
+              </a:r>
+              <a:endParaRPr lang="ko-KR" altLang="en-US" b="1" i="1" dirty="0">
+                <a:solidFill>
+                  <a:schemeClr val="accent1">
+                    <a:lumMod val="50000"/>
+                  </a:schemeClr>
+                </a:solidFill>
+              </a:endParaRPr>
+            </a:p>
+          </p:txBody>
+        </p:sp>
+        <p:sp>
+          <p:nvSpPr>
+            <p:cNvPr id="12" name="직사각형 11"/>
+            <p:cNvSpPr/>
+            <p:nvPr/>
+          </p:nvSpPr>
+          <p:spPr>
+            <a:xfrm>
+              <a:off x="2910214" y="2755954"/>
+              <a:ext cx="4581136" cy="499638"/>
+            </a:xfrm>
+            <a:prstGeom prst="rect">
+              <a:avLst/>
+            </a:prstGeom>
+            <a:noFill/>
+            <a:ln>
+              <a:noFill/>
+            </a:ln>
+          </p:spPr>
+          <p:style>
+            <a:lnRef idx="2">
+              <a:schemeClr val="accent1">
+                <a:shade val="50000"/>
+              </a:schemeClr>
+            </a:lnRef>
+            <a:fillRef idx="1">
+              <a:schemeClr val="accent1"/>
+            </a:fillRef>
+            <a:effectRef idx="0">
+              <a:schemeClr val="accent1"/>
+            </a:effectRef>
+            <a:fontRef idx="minor">
+              <a:schemeClr val="lt1"/>
+            </a:fontRef>
+          </p:style>
+          <p:txBody>
+            <a:bodyPr rtlCol="0" anchor="ctr"/>
+            <a:lstStyle/>
+            <a:p>
+              <a:pPr algn="ctr"/>
+              <a:r>
+                <a:rPr lang="ko-KR" altLang="en-US" b="1" i="1" dirty="0" smtClean="0">
+                  <a:solidFill>
+                    <a:srgbClr val="00B050"/>
+                  </a:solidFill>
+                </a:rPr>
+                <a:t>어디서나 공유되는 나만의 </a:t>
+              </a:r>
+              <a:r>
+                <a:rPr lang="ko-KR" altLang="en-US" b="1" i="1" dirty="0" err="1" smtClean="0">
+                  <a:solidFill>
+                    <a:srgbClr val="00B050"/>
+                  </a:solidFill>
+                </a:rPr>
+                <a:t>즐겨찾기</a:t>
+              </a:r>
+              <a:endParaRPr lang="ko-KR" altLang="en-US" b="1" i="1" dirty="0">
+                <a:solidFill>
+                  <a:srgbClr val="00B050"/>
+                </a:solidFill>
+              </a:endParaRPr>
+            </a:p>
+          </p:txBody>
+        </p:sp>
+        <p:sp>
+          <p:nvSpPr>
+            <p:cNvPr id="13" name="직사각형 12"/>
+            <p:cNvSpPr/>
+            <p:nvPr/>
+          </p:nvSpPr>
+          <p:spPr>
+            <a:xfrm>
+              <a:off x="1592396" y="3164557"/>
+              <a:ext cx="4581136" cy="499638"/>
+            </a:xfrm>
+            <a:prstGeom prst="rect">
+              <a:avLst/>
+            </a:prstGeom>
+            <a:noFill/>
+            <a:ln>
+              <a:noFill/>
+            </a:ln>
+          </p:spPr>
+          <p:style>
+            <a:lnRef idx="2">
+              <a:schemeClr val="accent1">
+                <a:shade val="50000"/>
+              </a:schemeClr>
+            </a:lnRef>
+            <a:fillRef idx="1">
+              <a:schemeClr val="accent1"/>
+            </a:fillRef>
+            <a:effectRef idx="0">
+              <a:schemeClr val="accent1"/>
+            </a:effectRef>
+            <a:fontRef idx="minor">
+              <a:schemeClr val="lt1"/>
+            </a:fontRef>
+          </p:style>
+          <p:txBody>
+            <a:bodyPr rtlCol="0" anchor="ctr"/>
+            <a:lstStyle/>
+            <a:p>
+              <a:pPr algn="ctr"/>
+              <a:r>
+                <a:rPr lang="ko-KR" altLang="en-US" sz="2000" b="1" dirty="0" smtClean="0">
+                  <a:solidFill>
+                    <a:srgbClr val="961A8A"/>
+                  </a:solidFill>
+                </a:rPr>
+                <a:t>여러분의 사이트를 공유해보세요</a:t>
+              </a:r>
+              <a:r>
+                <a:rPr lang="en-US" altLang="ko-KR" sz="2000" b="1" dirty="0" smtClean="0">
+                  <a:solidFill>
+                    <a:srgbClr val="961A8A"/>
+                  </a:solidFill>
+                </a:rPr>
+                <a:t>!</a:t>
+              </a:r>
+              <a:endParaRPr lang="ko-KR" altLang="en-US" sz="2000" b="1" dirty="0">
+                <a:solidFill>
+                  <a:srgbClr val="961A8A"/>
+                </a:solidFill>
+              </a:endParaRPr>
+            </a:p>
+          </p:txBody>
+        </p:sp>
+      </p:grpSp>
+    </p:spTree>
+    <p:extLst>
+      <p:ext uri="{BB962C8B-B14F-4D97-AF65-F5344CB8AC3E}">
+        <p14:creationId xmlns:p14="http://schemas.microsoft.com/office/powerpoint/2010/main" val="3628988493"/>
       </p:ext>
     </p:extLst>
   </p:cSld>
@@ -5698,7 +6287,37 @@
                   <a:schemeClr val="tx1"/>
                 </a:solidFill>
               </a:rPr>
-              <a:t>주요 기능</a:t>
+              <a:t>주요 </a:t>
+            </a:r>
+            <a:r>
+              <a:rPr lang="ko-KR" altLang="en-US" sz="1400" dirty="0" smtClean="0">
+                <a:solidFill>
+                  <a:schemeClr val="tx1"/>
+                </a:solidFill>
+              </a:rPr>
+              <a:t>기능</a:t>
+            </a:r>
+            <a:endParaRPr lang="en-US" altLang="ko-KR" sz="1400" dirty="0" smtClean="0">
+              <a:solidFill>
+                <a:schemeClr val="tx1"/>
+              </a:solidFill>
+            </a:endParaRPr>
+          </a:p>
+          <a:p>
+            <a:endParaRPr lang="en-US" altLang="ko-KR" sz="1400" dirty="0">
+              <a:solidFill>
+                <a:schemeClr val="tx1"/>
+              </a:solidFill>
+            </a:endParaRPr>
+          </a:p>
+          <a:p>
+            <a:r>
+              <a:rPr lang="ko-KR" altLang="en-US" sz="1400" dirty="0" smtClean="0">
+                <a:solidFill>
+                  <a:schemeClr val="tx1"/>
+                </a:solidFill>
+              </a:rPr>
+              <a:t>페이지</a:t>
             </a:r>
             <a:endParaRPr lang="en-US" altLang="ko-KR" sz="1400" dirty="0" smtClean="0">
               <a:solidFill>
@@ -6100,7 +6719,19 @@
             <a:pPr algn="ctr"/>
             <a:r>
               <a:rPr lang="ko-KR" altLang="en-US" sz="1600" dirty="0" smtClean="0"/>
-              <a:t>카테고리 내에 사이트 정렬해서 보여주자 카드 반복</a:t>
+              <a:t>카테고리 내에 사이트 정렬해서 보여주자 카드 </a:t>
+            </a:r>
+            <a:r>
+              <a:rPr lang="ko-KR" altLang="en-US" sz="1600" dirty="0" smtClean="0"/>
+              <a:t>반복</a:t>
+            </a:r>
+            <a:endParaRPr lang="en-US" altLang="ko-KR" sz="1600" dirty="0" smtClean="0"/>
+          </a:p>
+          <a:p>
+            <a:pPr algn="ctr"/>
+            <a:r>
+              <a:rPr lang="ko-KR" altLang="en-US" sz="1600" dirty="0" smtClean="0"/>
+              <a:t>나중에 페이지도 추가 하기</a:t>
             </a:r>
             <a:endParaRPr lang="en-US" altLang="ko-KR" sz="1600" dirty="0" smtClean="0"/>
           </a:p>
@@ -7449,6 +8080,795 @@
       </p:grpSpPr>
       <p:grpSp>
         <p:nvGrpSpPr>
+          <p:cNvPr id="16" name="그룹 15"/>
+          <p:cNvGrpSpPr/>
+          <p:nvPr/>
+        </p:nvGrpSpPr>
+        <p:grpSpPr>
+          <a:xfrm>
+            <a:off x="53440" y="47501"/>
+            <a:ext cx="4441370" cy="469076"/>
+            <a:chOff x="53440" y="47501"/>
+            <a:chExt cx="2820390" cy="469076"/>
+          </a:xfrm>
+        </p:grpSpPr>
+        <p:sp>
+          <p:nvSpPr>
+            <p:cNvPr id="5" name="직사각형 4"/>
+            <p:cNvSpPr/>
+            <p:nvPr/>
+          </p:nvSpPr>
+          <p:spPr>
+            <a:xfrm>
+              <a:off x="53440" y="47501"/>
+              <a:ext cx="2820390" cy="469076"/>
+            </a:xfrm>
+            <a:prstGeom prst="rect">
+              <a:avLst/>
+            </a:prstGeom>
+            <a:noFill/>
+            <a:ln>
+              <a:noFill/>
+            </a:ln>
+          </p:spPr>
+          <p:style>
+            <a:lnRef idx="2">
+              <a:schemeClr val="accent1">
+                <a:shade val="50000"/>
+              </a:schemeClr>
+            </a:lnRef>
+            <a:fillRef idx="1">
+              <a:schemeClr val="accent1"/>
+            </a:fillRef>
+            <a:effectRef idx="0">
+              <a:schemeClr val="accent1"/>
+            </a:effectRef>
+            <a:fontRef idx="minor">
+              <a:schemeClr val="lt1"/>
+            </a:fontRef>
+          </p:style>
+          <p:txBody>
+            <a:bodyPr rtlCol="0" anchor="ctr"/>
+            <a:lstStyle/>
+            <a:p>
+              <a:pPr algn="ctr"/>
+              <a:r>
+                <a:rPr lang="ko-KR" altLang="en-US" sz="2000" b="1" dirty="0" smtClean="0">
+                  <a:solidFill>
+                    <a:schemeClr val="tx1"/>
+                  </a:solidFill>
+                </a:rPr>
+                <a:t>선택 카드</a:t>
+              </a:r>
+              <a:endParaRPr lang="en-US" altLang="ko-KR" sz="2000" b="1" dirty="0" smtClean="0">
+                <a:solidFill>
+                  <a:schemeClr val="tx1"/>
+                </a:solidFill>
+              </a:endParaRPr>
+            </a:p>
+          </p:txBody>
+        </p:sp>
+        <p:cxnSp>
+          <p:nvCxnSpPr>
+            <p:cNvPr id="7" name="직선 연결선 6"/>
+            <p:cNvCxnSpPr/>
+            <p:nvPr/>
+          </p:nvCxnSpPr>
+          <p:spPr>
+            <a:xfrm>
+              <a:off x="53440" y="516577"/>
+              <a:ext cx="2820390" cy="0"/>
+            </a:xfrm>
+            <a:prstGeom prst="line">
+              <a:avLst/>
+            </a:prstGeom>
+            <a:ln w="28575"/>
+          </p:spPr>
+          <p:style>
+            <a:lnRef idx="1">
+              <a:schemeClr val="accent1"/>
+            </a:lnRef>
+            <a:fillRef idx="0">
+              <a:schemeClr val="accent1"/>
+            </a:fillRef>
+            <a:effectRef idx="0">
+              <a:schemeClr val="accent1"/>
+            </a:effectRef>
+            <a:fontRef idx="minor">
+              <a:schemeClr val="tx1"/>
+            </a:fontRef>
+          </p:style>
+        </p:cxnSp>
+      </p:grpSp>
+      <p:sp>
+        <p:nvSpPr>
+          <p:cNvPr id="8" name="직사각형 7"/>
+          <p:cNvSpPr/>
+          <p:nvPr/>
+        </p:nvSpPr>
+        <p:spPr>
+          <a:xfrm>
+            <a:off x="119578" y="951756"/>
+            <a:ext cx="1920638" cy="5810994"/>
+          </a:xfrm>
+          <a:prstGeom prst="rect">
+            <a:avLst/>
+          </a:prstGeom>
+          <a:solidFill>
+            <a:schemeClr val="bg1">
+              <a:lumMod val="95000"/>
+            </a:schemeClr>
+          </a:solidFill>
+          <a:ln>
+            <a:noFill/>
+          </a:ln>
+        </p:spPr>
+        <p:style>
+          <a:lnRef idx="2">
+            <a:schemeClr val="accent1">
+              <a:shade val="50000"/>
+            </a:schemeClr>
+          </a:lnRef>
+          <a:fillRef idx="1">
+            <a:schemeClr val="accent1"/>
+          </a:fillRef>
+          <a:effectRef idx="0">
+            <a:schemeClr val="accent1"/>
+          </a:effectRef>
+          <a:fontRef idx="minor">
+            <a:schemeClr val="lt1"/>
+          </a:fontRef>
+        </p:style>
+        <p:txBody>
+          <a:bodyPr rtlCol="0" anchor="t"/>
+          <a:lstStyle/>
+          <a:p>
+            <a:r>
+              <a:rPr lang="ko-KR" altLang="en-US" sz="1400" dirty="0" smtClean="0">
+                <a:solidFill>
+                  <a:schemeClr val="tx1"/>
+                </a:solidFill>
+              </a:rPr>
+              <a:t>주요 기능</a:t>
+            </a:r>
+            <a:endParaRPr lang="en-US" altLang="ko-KR" sz="1400" dirty="0" smtClean="0">
+              <a:solidFill>
+                <a:schemeClr val="tx1"/>
+              </a:solidFill>
+            </a:endParaRPr>
+          </a:p>
+          <a:p>
+            <a:r>
+              <a:rPr lang="ko-KR" altLang="en-US" sz="1400" dirty="0" err="1" smtClean="0">
+                <a:solidFill>
+                  <a:schemeClr val="tx1"/>
+                </a:solidFill>
+              </a:rPr>
+              <a:t>클릭시</a:t>
+            </a:r>
+            <a:r>
+              <a:rPr lang="ko-KR" altLang="en-US" sz="1400" dirty="0" smtClean="0">
+                <a:solidFill>
+                  <a:schemeClr val="tx1"/>
+                </a:solidFill>
+              </a:rPr>
+              <a:t> 해당 </a:t>
+            </a:r>
+            <a:r>
+              <a:rPr lang="en-US" altLang="ko-KR" sz="1400" dirty="0" err="1" smtClean="0">
+                <a:solidFill>
+                  <a:schemeClr val="tx1"/>
+                </a:solidFill>
+              </a:rPr>
+              <a:t>url</a:t>
+            </a:r>
+            <a:r>
+              <a:rPr lang="en-US" altLang="ko-KR" sz="1400" dirty="0" smtClean="0">
+                <a:solidFill>
+                  <a:schemeClr val="tx1"/>
+                </a:solidFill>
+              </a:rPr>
+              <a:t> </a:t>
+            </a:r>
+            <a:r>
+              <a:rPr lang="ko-KR" altLang="en-US" sz="1400" dirty="0" smtClean="0">
+                <a:solidFill>
+                  <a:schemeClr val="tx1"/>
+                </a:solidFill>
+              </a:rPr>
+              <a:t>연결</a:t>
+            </a:r>
+            <a:endParaRPr lang="en-US" altLang="ko-KR" sz="1400" dirty="0" smtClean="0">
+              <a:solidFill>
+                <a:schemeClr val="tx1"/>
+              </a:solidFill>
+            </a:endParaRPr>
+          </a:p>
+          <a:p>
+            <a:r>
+              <a:rPr lang="ko-KR" altLang="en-US" sz="1400" dirty="0" err="1" smtClean="0">
+                <a:solidFill>
+                  <a:schemeClr val="tx1"/>
+                </a:solidFill>
+              </a:rPr>
+              <a:t>새탭으로</a:t>
+            </a:r>
+            <a:r>
+              <a:rPr lang="ko-KR" altLang="en-US" sz="1400" dirty="0" smtClean="0">
+                <a:solidFill>
+                  <a:schemeClr val="tx1"/>
+                </a:solidFill>
+              </a:rPr>
+              <a:t> 여는게 좋을 듯</a:t>
+            </a:r>
+            <a:endParaRPr lang="en-US" altLang="ko-KR" sz="1400" dirty="0" smtClean="0">
+              <a:solidFill>
+                <a:schemeClr val="tx1"/>
+              </a:solidFill>
+            </a:endParaRPr>
+          </a:p>
+          <a:p>
+            <a:endParaRPr lang="ko-KR" altLang="en-US" sz="1400" dirty="0">
+              <a:solidFill>
+                <a:schemeClr val="tx1"/>
+              </a:solidFill>
+            </a:endParaRPr>
+          </a:p>
+        </p:txBody>
+      </p:sp>
+      <p:sp>
+        <p:nvSpPr>
+          <p:cNvPr id="4" name="직사각형 3"/>
+          <p:cNvSpPr>
+            <a:spLocks noChangeAspect="1"/>
+          </p:cNvSpPr>
+          <p:nvPr/>
+        </p:nvSpPr>
+        <p:spPr>
+          <a:xfrm>
+            <a:off x="2241319" y="1260742"/>
+            <a:ext cx="9950681" cy="5597258"/>
+          </a:xfrm>
+          <a:prstGeom prst="rect">
+            <a:avLst/>
+          </a:prstGeom>
+          <a:noFill/>
+          <a:ln w="19050"/>
+        </p:spPr>
+        <p:style>
+          <a:lnRef idx="2">
+            <a:schemeClr val="accent1">
+              <a:shade val="50000"/>
+            </a:schemeClr>
+          </a:lnRef>
+          <a:fillRef idx="1">
+            <a:schemeClr val="accent1"/>
+          </a:fillRef>
+          <a:effectRef idx="0">
+            <a:schemeClr val="accent1"/>
+          </a:effectRef>
+          <a:fontRef idx="minor">
+            <a:schemeClr val="lt1"/>
+          </a:fontRef>
+        </p:style>
+        <p:txBody>
+          <a:bodyPr rtlCol="0" anchor="ctr"/>
+          <a:lstStyle/>
+          <a:p>
+            <a:pPr algn="ctr"/>
+            <a:endParaRPr lang="ko-KR" altLang="en-US"/>
+          </a:p>
+        </p:txBody>
+      </p:sp>
+      <p:sp>
+        <p:nvSpPr>
+          <p:cNvPr id="17" name="직사각형 16"/>
+          <p:cNvSpPr/>
+          <p:nvPr/>
+        </p:nvSpPr>
+        <p:spPr>
+          <a:xfrm>
+            <a:off x="4566062" y="47502"/>
+            <a:ext cx="7543388" cy="1113008"/>
+          </a:xfrm>
+          <a:prstGeom prst="rect">
+            <a:avLst/>
+          </a:prstGeom>
+          <a:solidFill>
+            <a:schemeClr val="bg1">
+              <a:lumMod val="95000"/>
+            </a:schemeClr>
+          </a:solidFill>
+          <a:ln>
+            <a:noFill/>
+          </a:ln>
+        </p:spPr>
+        <p:style>
+          <a:lnRef idx="2">
+            <a:schemeClr val="accent1">
+              <a:shade val="50000"/>
+            </a:schemeClr>
+          </a:lnRef>
+          <a:fillRef idx="1">
+            <a:schemeClr val="accent1"/>
+          </a:fillRef>
+          <a:effectRef idx="0">
+            <a:schemeClr val="accent1"/>
+          </a:effectRef>
+          <a:fontRef idx="minor">
+            <a:schemeClr val="lt1"/>
+          </a:fontRef>
+        </p:style>
+        <p:txBody>
+          <a:bodyPr rtlCol="0" anchor="t"/>
+          <a:lstStyle/>
+          <a:p>
+            <a:pPr marL="285750" indent="-285750">
+              <a:buFontTx/>
+              <a:buChar char="-"/>
+            </a:pPr>
+            <a:endParaRPr lang="ko-KR" altLang="en-US" sz="1400" dirty="0">
+              <a:solidFill>
+                <a:schemeClr val="tx1"/>
+              </a:solidFill>
+            </a:endParaRPr>
+          </a:p>
+        </p:txBody>
+      </p:sp>
+      <p:sp>
+        <p:nvSpPr>
+          <p:cNvPr id="2" name="직사각형 1"/>
+          <p:cNvSpPr/>
+          <p:nvPr/>
+        </p:nvSpPr>
+        <p:spPr>
+          <a:xfrm>
+            <a:off x="2241319" y="1283176"/>
+            <a:ext cx="9950681" cy="5533260"/>
+          </a:xfrm>
+          <a:prstGeom prst="rect">
+            <a:avLst/>
+          </a:prstGeom>
+          <a:solidFill>
+            <a:schemeClr val="bg1">
+              <a:lumMod val="75000"/>
+            </a:schemeClr>
+          </a:solidFill>
+        </p:spPr>
+        <p:style>
+          <a:lnRef idx="2">
+            <a:schemeClr val="accent1">
+              <a:shade val="50000"/>
+            </a:schemeClr>
+          </a:lnRef>
+          <a:fillRef idx="1">
+            <a:schemeClr val="accent1"/>
+          </a:fillRef>
+          <a:effectRef idx="0">
+            <a:schemeClr val="accent1"/>
+          </a:effectRef>
+          <a:fontRef idx="minor">
+            <a:schemeClr val="lt1"/>
+          </a:fontRef>
+        </p:style>
+        <p:txBody>
+          <a:bodyPr rtlCol="0" anchor="ctr"/>
+          <a:lstStyle/>
+          <a:p>
+            <a:pPr algn="ctr"/>
+            <a:endParaRPr lang="en-US" altLang="ko-KR" dirty="0" smtClean="0"/>
+          </a:p>
+          <a:p>
+            <a:pPr algn="ctr"/>
+            <a:endParaRPr lang="en-US" altLang="ko-KR" dirty="0"/>
+          </a:p>
+          <a:p>
+            <a:pPr algn="ctr"/>
+            <a:r>
+              <a:rPr lang="ko-KR" altLang="en-US" dirty="0" smtClean="0"/>
+              <a:t>메인 페이지</a:t>
+            </a:r>
+            <a:endParaRPr lang="en-US" altLang="ko-KR" dirty="0" smtClean="0"/>
+          </a:p>
+          <a:p>
+            <a:pPr algn="ctr"/>
+            <a:r>
+              <a:rPr lang="ko-KR" altLang="en-US" dirty="0"/>
+              <a:t>카테고리 내에 사이트 정렬해서 보여주자 카드 반복</a:t>
+            </a:r>
+            <a:endParaRPr lang="en-US" altLang="ko-KR" dirty="0"/>
+          </a:p>
+          <a:p>
+            <a:pPr algn="ctr"/>
+            <a:endParaRPr lang="en-US" altLang="ko-KR" dirty="0"/>
+          </a:p>
+        </p:txBody>
+      </p:sp>
+      <p:grpSp>
+        <p:nvGrpSpPr>
+          <p:cNvPr id="15" name="그룹 14"/>
+          <p:cNvGrpSpPr/>
+          <p:nvPr/>
+        </p:nvGrpSpPr>
+        <p:grpSpPr>
+          <a:xfrm>
+            <a:off x="3001488" y="1904674"/>
+            <a:ext cx="3461657" cy="2714827"/>
+            <a:chOff x="2375065" y="1793174"/>
+            <a:chExt cx="3610099" cy="2826327"/>
+          </a:xfrm>
+        </p:grpSpPr>
+        <p:sp>
+          <p:nvSpPr>
+            <p:cNvPr id="3" name="직사각형 2"/>
+            <p:cNvSpPr/>
+            <p:nvPr/>
+          </p:nvSpPr>
+          <p:spPr>
+            <a:xfrm>
+              <a:off x="2375065" y="1793174"/>
+              <a:ext cx="3610099" cy="2826327"/>
+            </a:xfrm>
+            <a:prstGeom prst="rect">
+              <a:avLst/>
+            </a:prstGeom>
+          </p:spPr>
+          <p:style>
+            <a:lnRef idx="2">
+              <a:schemeClr val="accent1">
+                <a:shade val="50000"/>
+              </a:schemeClr>
+            </a:lnRef>
+            <a:fillRef idx="1">
+              <a:schemeClr val="accent1"/>
+            </a:fillRef>
+            <a:effectRef idx="0">
+              <a:schemeClr val="accent1"/>
+            </a:effectRef>
+            <a:fontRef idx="minor">
+              <a:schemeClr val="lt1"/>
+            </a:fontRef>
+          </p:style>
+          <p:txBody>
+            <a:bodyPr rtlCol="0" anchor="t"/>
+            <a:lstStyle/>
+            <a:p>
+              <a:pPr algn="ctr"/>
+              <a:endParaRPr lang="ko-KR" altLang="en-US" sz="1600" dirty="0"/>
+            </a:p>
+          </p:txBody>
+        </p:sp>
+        <p:sp>
+          <p:nvSpPr>
+            <p:cNvPr id="6" name="직사각형 5"/>
+            <p:cNvSpPr/>
+            <p:nvPr/>
+          </p:nvSpPr>
+          <p:spPr>
+            <a:xfrm>
+              <a:off x="2447828" y="4173619"/>
+              <a:ext cx="1393841" cy="352674"/>
+            </a:xfrm>
+            <a:prstGeom prst="rect">
+              <a:avLst/>
+            </a:prstGeom>
+          </p:spPr>
+          <p:style>
+            <a:lnRef idx="2">
+              <a:schemeClr val="accent1">
+                <a:shade val="50000"/>
+              </a:schemeClr>
+            </a:lnRef>
+            <a:fillRef idx="1">
+              <a:schemeClr val="accent1"/>
+            </a:fillRef>
+            <a:effectRef idx="0">
+              <a:schemeClr val="accent1"/>
+            </a:effectRef>
+            <a:fontRef idx="minor">
+              <a:schemeClr val="lt1"/>
+            </a:fontRef>
+          </p:style>
+          <p:txBody>
+            <a:bodyPr rtlCol="0" anchor="ctr"/>
+            <a:lstStyle/>
+            <a:p>
+              <a:pPr algn="ctr"/>
+              <a:r>
+                <a:rPr lang="ko-KR" altLang="en-US" sz="1600" dirty="0" smtClean="0"/>
+                <a:t>평가하기</a:t>
+              </a:r>
+              <a:endParaRPr lang="ko-KR" altLang="en-US" sz="1600" dirty="0"/>
+            </a:p>
+          </p:txBody>
+        </p:sp>
+        <p:sp>
+          <p:nvSpPr>
+            <p:cNvPr id="18" name="직사각형 17"/>
+            <p:cNvSpPr/>
+            <p:nvPr/>
+          </p:nvSpPr>
+          <p:spPr>
+            <a:xfrm>
+              <a:off x="3914432" y="4173619"/>
+              <a:ext cx="2011356" cy="352674"/>
+            </a:xfrm>
+            <a:prstGeom prst="rect">
+              <a:avLst/>
+            </a:prstGeom>
+          </p:spPr>
+          <p:style>
+            <a:lnRef idx="2">
+              <a:schemeClr val="accent1">
+                <a:shade val="50000"/>
+              </a:schemeClr>
+            </a:lnRef>
+            <a:fillRef idx="1">
+              <a:schemeClr val="accent1"/>
+            </a:fillRef>
+            <a:effectRef idx="0">
+              <a:schemeClr val="accent1"/>
+            </a:effectRef>
+            <a:fontRef idx="minor">
+              <a:schemeClr val="lt1"/>
+            </a:fontRef>
+          </p:style>
+          <p:txBody>
+            <a:bodyPr rtlCol="0" anchor="ctr"/>
+            <a:lstStyle/>
+            <a:p>
+              <a:pPr algn="ctr"/>
+              <a:r>
+                <a:rPr lang="ko-KR" altLang="en-US" sz="1600" dirty="0" smtClean="0"/>
+                <a:t>내 </a:t>
+              </a:r>
+              <a:r>
+                <a:rPr lang="ko-KR" altLang="en-US" sz="1600" dirty="0" err="1" smtClean="0"/>
+                <a:t>즐겨찾기</a:t>
+              </a:r>
+              <a:r>
+                <a:rPr lang="ko-KR" altLang="en-US" sz="1600" dirty="0" smtClean="0"/>
+                <a:t> 등록</a:t>
+              </a:r>
+              <a:endParaRPr lang="ko-KR" altLang="en-US" sz="1600" dirty="0"/>
+            </a:p>
+          </p:txBody>
+        </p:sp>
+      </p:grpSp>
+      <p:sp>
+        <p:nvSpPr>
+          <p:cNvPr id="25" name="직사각형 24"/>
+          <p:cNvSpPr/>
+          <p:nvPr/>
+        </p:nvSpPr>
+        <p:spPr>
+          <a:xfrm>
+            <a:off x="3071085" y="1962205"/>
+            <a:ext cx="1227784" cy="917561"/>
+          </a:xfrm>
+          <a:prstGeom prst="rect">
+            <a:avLst/>
+          </a:prstGeom>
+        </p:spPr>
+        <p:style>
+          <a:lnRef idx="2">
+            <a:schemeClr val="accent1">
+              <a:shade val="50000"/>
+            </a:schemeClr>
+          </a:lnRef>
+          <a:fillRef idx="1">
+            <a:schemeClr val="accent1"/>
+          </a:fillRef>
+          <a:effectRef idx="0">
+            <a:schemeClr val="accent1"/>
+          </a:effectRef>
+          <a:fontRef idx="minor">
+            <a:schemeClr val="lt1"/>
+          </a:fontRef>
+        </p:style>
+        <p:txBody>
+          <a:bodyPr rtlCol="0" anchor="ctr"/>
+          <a:lstStyle/>
+          <a:p>
+            <a:pPr algn="ctr"/>
+            <a:r>
+              <a:rPr lang="ko-KR" altLang="en-US" sz="1600" smtClean="0"/>
+              <a:t>이미지</a:t>
+            </a:r>
+            <a:endParaRPr lang="ko-KR" altLang="en-US" sz="1600" dirty="0"/>
+          </a:p>
+        </p:txBody>
+      </p:sp>
+      <p:sp>
+        <p:nvSpPr>
+          <p:cNvPr id="26" name="직사각형 25"/>
+          <p:cNvSpPr/>
+          <p:nvPr/>
+        </p:nvSpPr>
+        <p:spPr>
+          <a:xfrm>
+            <a:off x="4368467" y="1962205"/>
+            <a:ext cx="2037744" cy="917561"/>
+          </a:xfrm>
+          <a:prstGeom prst="rect">
+            <a:avLst/>
+          </a:prstGeom>
+        </p:spPr>
+        <p:style>
+          <a:lnRef idx="2">
+            <a:schemeClr val="accent1">
+              <a:shade val="50000"/>
+            </a:schemeClr>
+          </a:lnRef>
+          <a:fillRef idx="1">
+            <a:schemeClr val="accent1"/>
+          </a:fillRef>
+          <a:effectRef idx="0">
+            <a:schemeClr val="accent1"/>
+          </a:effectRef>
+          <a:fontRef idx="minor">
+            <a:schemeClr val="lt1"/>
+          </a:fontRef>
+        </p:style>
+        <p:txBody>
+          <a:bodyPr rtlCol="0" anchor="ctr"/>
+          <a:lstStyle/>
+          <a:p>
+            <a:pPr algn="ctr"/>
+            <a:r>
+              <a:rPr lang="ko-KR" altLang="en-US" sz="1600" dirty="0" smtClean="0"/>
+              <a:t>이름</a:t>
+            </a:r>
+            <a:endParaRPr lang="en-US" altLang="ko-KR" sz="1600" dirty="0" smtClean="0"/>
+          </a:p>
+          <a:p>
+            <a:pPr algn="ctr"/>
+            <a:r>
+              <a:rPr lang="en-US" altLang="ko-KR" sz="1600" dirty="0" smtClean="0"/>
+              <a:t>URL…</a:t>
+            </a:r>
+            <a:endParaRPr lang="ko-KR" altLang="en-US" sz="1600" dirty="0"/>
+          </a:p>
+        </p:txBody>
+      </p:sp>
+      <p:sp>
+        <p:nvSpPr>
+          <p:cNvPr id="27" name="직사각형 26"/>
+          <p:cNvSpPr/>
+          <p:nvPr/>
+        </p:nvSpPr>
+        <p:spPr>
+          <a:xfrm>
+            <a:off x="3073419" y="2935339"/>
+            <a:ext cx="3326855" cy="563966"/>
+          </a:xfrm>
+          <a:prstGeom prst="rect">
+            <a:avLst/>
+          </a:prstGeom>
+        </p:spPr>
+        <p:style>
+          <a:lnRef idx="2">
+            <a:schemeClr val="accent1">
+              <a:shade val="50000"/>
+            </a:schemeClr>
+          </a:lnRef>
+          <a:fillRef idx="1">
+            <a:schemeClr val="accent1"/>
+          </a:fillRef>
+          <a:effectRef idx="0">
+            <a:schemeClr val="accent1"/>
+          </a:effectRef>
+          <a:fontRef idx="minor">
+            <a:schemeClr val="lt1"/>
+          </a:fontRef>
+        </p:style>
+        <p:txBody>
+          <a:bodyPr rtlCol="0" anchor="ctr"/>
+          <a:lstStyle/>
+          <a:p>
+            <a:r>
+              <a:rPr lang="ko-KR" altLang="ko-KR" sz="1200" dirty="0" smtClean="0"/>
+              <a:t>클릭 수</a:t>
+            </a:r>
+            <a:r>
+              <a:rPr lang="en-US" altLang="ko-KR" sz="1200" dirty="0" smtClean="0"/>
+              <a:t>   </a:t>
+            </a:r>
+            <a:r>
+              <a:rPr lang="ko-KR" altLang="ko-KR" sz="1200" dirty="0" smtClean="0"/>
+              <a:t>좋아요</a:t>
+            </a:r>
+            <a:r>
+              <a:rPr lang="en-US" altLang="ko-KR" sz="1200" dirty="0" smtClean="0"/>
+              <a:t>     </a:t>
+            </a:r>
+            <a:r>
+              <a:rPr lang="ko-KR" altLang="ko-KR" sz="1200" dirty="0" smtClean="0"/>
+              <a:t>싫어요</a:t>
+            </a:r>
+            <a:endParaRPr lang="ko-KR" altLang="en-US" sz="1100" dirty="0"/>
+          </a:p>
+        </p:txBody>
+      </p:sp>
+      <p:sp>
+        <p:nvSpPr>
+          <p:cNvPr id="28" name="직사각형 27"/>
+          <p:cNvSpPr/>
+          <p:nvPr/>
+        </p:nvSpPr>
+        <p:spPr>
+          <a:xfrm>
+            <a:off x="3073419" y="3546859"/>
+            <a:ext cx="3326855" cy="563966"/>
+          </a:xfrm>
+          <a:prstGeom prst="rect">
+            <a:avLst/>
+          </a:prstGeom>
+        </p:spPr>
+        <p:style>
+          <a:lnRef idx="2">
+            <a:schemeClr val="accent1">
+              <a:shade val="50000"/>
+            </a:schemeClr>
+          </a:lnRef>
+          <a:fillRef idx="1">
+            <a:schemeClr val="accent1"/>
+          </a:fillRef>
+          <a:effectRef idx="0">
+            <a:schemeClr val="accent1"/>
+          </a:effectRef>
+          <a:fontRef idx="minor">
+            <a:schemeClr val="lt1"/>
+          </a:fontRef>
+        </p:style>
+        <p:txBody>
+          <a:bodyPr rtlCol="0" anchor="ctr"/>
+          <a:lstStyle/>
+          <a:p>
+            <a:pPr algn="ctr"/>
+            <a:endParaRPr lang="ko-KR" altLang="ko-KR" sz="1100" dirty="0"/>
+          </a:p>
+          <a:p>
+            <a:r>
+              <a:rPr lang="ko-KR" altLang="ko-KR" sz="1200" dirty="0" smtClean="0"/>
+              <a:t>설명</a:t>
+            </a:r>
+            <a:endParaRPr lang="ko-KR" altLang="en-US" sz="1100" dirty="0"/>
+          </a:p>
+        </p:txBody>
+      </p:sp>
+    </p:spTree>
+    <p:extLst>
+      <p:ext uri="{BB962C8B-B14F-4D97-AF65-F5344CB8AC3E}">
+        <p14:creationId xmlns:p14="http://schemas.microsoft.com/office/powerpoint/2010/main" val="170966883"/>
+      </p:ext>
+    </p:extLst>
+  </p:cSld>
+  <p:clrMapOvr>
+    <a:masterClrMapping/>
+  </p:clrMapOvr>
+</p:sld>
+</file>
+
+<file path=ppt/slides/slide9.xml><?xml version="1.0" encoding="utf-8"?>
+<p:sld xmlns:a="http://schemas.openxmlformats.org/drawingml/2006/main" xmlns:r="http://schemas.openxmlformats.org/officeDocument/2006/relationships" xmlns:p="http://schemas.openxmlformats.org/presentationml/2006/main">
+  <p:cSld>
+    <p:spTree>
+      <p:nvGrpSpPr>
+        <p:cNvPr id="1" name=""/>
+        <p:cNvGrpSpPr/>
+        <p:nvPr/>
+      </p:nvGrpSpPr>
+      <p:grpSpPr>
+        <a:xfrm>
+          <a:off x="0" y="0"/>
+          <a:ext cx="0" cy="0"/>
+          <a:chOff x="0" y="0"/>
+          <a:chExt cx="0" cy="0"/>
+        </a:xfrm>
+      </p:grpSpPr>
+      <p:grpSp>
+        <p:nvGrpSpPr>
           <p:cNvPr id="7" name="그룹 6"/>
           <p:cNvGrpSpPr/>
           <p:nvPr/>
@@ -7977,594 +9397,6 @@
     <p:extLst>
       <p:ext uri="{BB962C8B-B14F-4D97-AF65-F5344CB8AC3E}">
         <p14:creationId xmlns:p14="http://schemas.microsoft.com/office/powerpoint/2010/main" val="2565186976"/>
-      </p:ext>
-    </p:extLst>
-  </p:cSld>
-  <p:clrMapOvr>
-    <a:masterClrMapping/>
-  </p:clrMapOvr>
-</p:sld>
-</file>
-
-<file path=ppt/slides/slide9.xml><?xml version="1.0" encoding="utf-8"?>
-<p:sld xmlns:a="http://schemas.openxmlformats.org/drawingml/2006/main" xmlns:r="http://schemas.openxmlformats.org/officeDocument/2006/relationships" xmlns:p="http://schemas.openxmlformats.org/presentationml/2006/main">
-  <p:cSld>
-    <p:spTree>
-      <p:nvGrpSpPr>
-        <p:cNvPr id="1" name=""/>
-        <p:cNvGrpSpPr/>
-        <p:nvPr/>
-      </p:nvGrpSpPr>
-      <p:grpSpPr>
-        <a:xfrm>
-          <a:off x="0" y="0"/>
-          <a:ext cx="0" cy="0"/>
-          <a:chOff x="0" y="0"/>
-          <a:chExt cx="0" cy="0"/>
-        </a:xfrm>
-      </p:grpSpPr>
-      <p:sp>
-        <p:nvSpPr>
-          <p:cNvPr id="5" name="직사각형 4"/>
-          <p:cNvSpPr/>
-          <p:nvPr/>
-        </p:nvSpPr>
-        <p:spPr>
-          <a:xfrm>
-            <a:off x="7887948" y="1908549"/>
-            <a:ext cx="2455460" cy="841459"/>
-          </a:xfrm>
-          <a:prstGeom prst="rect">
-            <a:avLst/>
-          </a:prstGeom>
-        </p:spPr>
-        <p:style>
-          <a:lnRef idx="2">
-            <a:schemeClr val="accent1">
-              <a:shade val="50000"/>
-            </a:schemeClr>
-          </a:lnRef>
-          <a:fillRef idx="1">
-            <a:schemeClr val="accent1"/>
-          </a:fillRef>
-          <a:effectRef idx="0">
-            <a:schemeClr val="accent1"/>
-          </a:effectRef>
-          <a:fontRef idx="minor">
-            <a:schemeClr val="lt1"/>
-          </a:fontRef>
-        </p:style>
-        <p:txBody>
-          <a:bodyPr rtlCol="0" anchor="ctr"/>
-          <a:lstStyle/>
-          <a:p>
-            <a:pPr algn="ctr"/>
-            <a:r>
-              <a:rPr lang="en-US" altLang="ko-KR" dirty="0" smtClean="0"/>
-              <a:t>1 : 2.14 </a:t>
-            </a:r>
-            <a:r>
-              <a:rPr lang="ko-KR" altLang="en-US" dirty="0" smtClean="0"/>
-              <a:t>비율</a:t>
-            </a:r>
-            <a:endParaRPr lang="en-US" altLang="ko-KR" dirty="0" smtClean="0"/>
-          </a:p>
-          <a:p>
-            <a:pPr algn="ctr"/>
-            <a:r>
-              <a:rPr lang="ko-KR" altLang="en-US" dirty="0" smtClean="0"/>
-              <a:t>너비 </a:t>
-            </a:r>
-            <a:r>
-              <a:rPr lang="en-US" altLang="ko-KR" dirty="0" smtClean="0"/>
-              <a:t>640 </a:t>
-            </a:r>
-            <a:r>
-              <a:rPr lang="ko-KR" altLang="en-US" dirty="0" smtClean="0"/>
-              <a:t>높이 </a:t>
-            </a:r>
-            <a:r>
-              <a:rPr lang="en-US" altLang="ko-KR" dirty="0" smtClean="0"/>
-              <a:t>300</a:t>
-            </a:r>
-            <a:endParaRPr lang="ko-KR" altLang="en-US" dirty="0"/>
-          </a:p>
-        </p:txBody>
-      </p:sp>
-      <p:grpSp>
-        <p:nvGrpSpPr>
-          <p:cNvPr id="25" name="그룹 24"/>
-          <p:cNvGrpSpPr/>
-          <p:nvPr/>
-        </p:nvGrpSpPr>
-        <p:grpSpPr>
-          <a:xfrm>
-            <a:off x="523731" y="423166"/>
-            <a:ext cx="7200000" cy="3364486"/>
-            <a:chOff x="523731" y="423166"/>
-            <a:chExt cx="7200000" cy="3364486"/>
-          </a:xfrm>
-        </p:grpSpPr>
-        <p:sp>
-          <p:nvSpPr>
-            <p:cNvPr id="4" name="직사각형 3"/>
-            <p:cNvSpPr>
-              <a:spLocks noChangeAspect="1"/>
-            </p:cNvSpPr>
-            <p:nvPr/>
-          </p:nvSpPr>
-          <p:spPr>
-            <a:xfrm>
-              <a:off x="523731" y="423166"/>
-              <a:ext cx="7200000" cy="3364486"/>
-            </a:xfrm>
-            <a:prstGeom prst="rect">
-              <a:avLst/>
-            </a:prstGeom>
-            <a:solidFill>
-              <a:schemeClr val="bg1">
-                <a:lumMod val="85000"/>
-              </a:schemeClr>
-            </a:solidFill>
-            <a:ln>
-              <a:noFill/>
-            </a:ln>
-          </p:spPr>
-          <p:style>
-            <a:lnRef idx="2">
-              <a:schemeClr val="accent1">
-                <a:shade val="50000"/>
-              </a:schemeClr>
-            </a:lnRef>
-            <a:fillRef idx="1">
-              <a:schemeClr val="accent1"/>
-            </a:fillRef>
-            <a:effectRef idx="0">
-              <a:schemeClr val="accent1"/>
-            </a:effectRef>
-            <a:fontRef idx="minor">
-              <a:schemeClr val="lt1"/>
-            </a:fontRef>
-          </p:style>
-          <p:txBody>
-            <a:bodyPr rtlCol="0" anchor="ctr"/>
-            <a:lstStyle/>
-            <a:p>
-              <a:pPr algn="ctr"/>
-              <a:endParaRPr lang="ko-KR" altLang="en-US"/>
-            </a:p>
-          </p:txBody>
-        </p:sp>
-        <p:grpSp>
-          <p:nvGrpSpPr>
-            <p:cNvPr id="6" name="그룹 5"/>
-            <p:cNvGrpSpPr/>
-            <p:nvPr/>
-          </p:nvGrpSpPr>
-          <p:grpSpPr>
-            <a:xfrm>
-              <a:off x="848819" y="656347"/>
-              <a:ext cx="3034145" cy="1496563"/>
-              <a:chOff x="896587" y="3150649"/>
-              <a:chExt cx="3034145" cy="1496563"/>
-            </a:xfrm>
-          </p:grpSpPr>
-          <p:sp>
-            <p:nvSpPr>
-              <p:cNvPr id="7" name="직사각형 6"/>
-              <p:cNvSpPr/>
-              <p:nvPr/>
-            </p:nvSpPr>
-            <p:spPr>
-              <a:xfrm>
-                <a:off x="1252846" y="3400302"/>
-                <a:ext cx="2677886" cy="1246910"/>
-              </a:xfrm>
-              <a:prstGeom prst="rect">
-                <a:avLst/>
-              </a:prstGeom>
-              <a:noFill/>
-              <a:ln w="19050">
-                <a:solidFill>
-                  <a:schemeClr val="tx1"/>
-                </a:solidFill>
-              </a:ln>
-            </p:spPr>
-            <p:style>
-              <a:lnRef idx="2">
-                <a:schemeClr val="accent1">
-                  <a:shade val="50000"/>
-                </a:schemeClr>
-              </a:lnRef>
-              <a:fillRef idx="1">
-                <a:schemeClr val="accent1"/>
-              </a:fillRef>
-              <a:effectRef idx="0">
-                <a:schemeClr val="accent1"/>
-              </a:effectRef>
-              <a:fontRef idx="minor">
-                <a:schemeClr val="lt1"/>
-              </a:fontRef>
-            </p:style>
-            <p:txBody>
-              <a:bodyPr rtlCol="0" anchor="ctr"/>
-              <a:lstStyle/>
-              <a:p>
-                <a:pPr algn="ctr"/>
-                <a:endParaRPr lang="ko-KR" altLang="en-US"/>
-              </a:p>
-            </p:txBody>
-          </p:sp>
-          <p:sp>
-            <p:nvSpPr>
-              <p:cNvPr id="8" name="직사각형 7"/>
-              <p:cNvSpPr/>
-              <p:nvPr/>
-            </p:nvSpPr>
-            <p:spPr>
-              <a:xfrm>
-                <a:off x="1429986" y="3780313"/>
-                <a:ext cx="2328288" cy="612177"/>
-              </a:xfrm>
-              <a:prstGeom prst="rect">
-                <a:avLst/>
-              </a:prstGeom>
-              <a:solidFill>
-                <a:schemeClr val="tx1"/>
-              </a:solidFill>
-              <a:ln w="19050">
-                <a:noFill/>
-              </a:ln>
-            </p:spPr>
-            <p:style>
-              <a:lnRef idx="2">
-                <a:schemeClr val="accent1">
-                  <a:shade val="50000"/>
-                </a:schemeClr>
-              </a:lnRef>
-              <a:fillRef idx="1">
-                <a:schemeClr val="accent1"/>
-              </a:fillRef>
-              <a:effectRef idx="0">
-                <a:schemeClr val="accent1"/>
-              </a:effectRef>
-              <a:fontRef idx="minor">
-                <a:schemeClr val="lt1"/>
-              </a:fontRef>
-            </p:style>
-            <p:txBody>
-              <a:bodyPr rtlCol="0" anchor="ctr"/>
-              <a:lstStyle/>
-              <a:p>
-                <a:pPr algn="ctr"/>
-                <a:r>
-                  <a:rPr lang="en-US" altLang="ko-KR" sz="2000" b="1" dirty="0" smtClean="0">
-                    <a:solidFill>
-                      <a:schemeClr val="bg1"/>
-                    </a:solidFill>
-                  </a:rPr>
-                  <a:t>BOOKMARK</a:t>
-                </a:r>
-                <a:endParaRPr lang="ko-KR" altLang="en-US" sz="2000" b="1" dirty="0">
-                  <a:solidFill>
-                    <a:schemeClr val="bg1"/>
-                  </a:solidFill>
-                </a:endParaRPr>
-              </a:p>
-            </p:txBody>
-          </p:sp>
-          <p:sp>
-            <p:nvSpPr>
-              <p:cNvPr id="9" name="직사각형 8"/>
-              <p:cNvSpPr/>
-              <p:nvPr/>
-            </p:nvSpPr>
-            <p:spPr>
-              <a:xfrm>
-                <a:off x="896587" y="3150649"/>
-                <a:ext cx="1618012" cy="499304"/>
-              </a:xfrm>
-              <a:prstGeom prst="rect">
-                <a:avLst/>
-              </a:prstGeom>
-              <a:solidFill>
-                <a:schemeClr val="bg1"/>
-              </a:solidFill>
-              <a:ln>
-                <a:noFill/>
-              </a:ln>
-            </p:spPr>
-            <p:style>
-              <a:lnRef idx="2">
-                <a:schemeClr val="accent1">
-                  <a:shade val="50000"/>
-                </a:schemeClr>
-              </a:lnRef>
-              <a:fillRef idx="1">
-                <a:schemeClr val="accent1"/>
-              </a:fillRef>
-              <a:effectRef idx="0">
-                <a:schemeClr val="accent1"/>
-              </a:effectRef>
-              <a:fontRef idx="minor">
-                <a:schemeClr val="lt1"/>
-              </a:fontRef>
-            </p:style>
-            <p:txBody>
-              <a:bodyPr rtlCol="0" anchor="ctr"/>
-              <a:lstStyle/>
-              <a:p>
-                <a:pPr algn="ctr"/>
-                <a:r>
-                  <a:rPr lang="en-US" altLang="ko-KR" sz="3200" dirty="0" smtClean="0">
-                    <a:solidFill>
-                      <a:schemeClr val="tx1"/>
-                    </a:solidFill>
-                    <a:latin typeface="HY견고딕" panose="02030600000101010101" pitchFamily="18" charset="-127"/>
-                    <a:ea typeface="HY견고딕" panose="02030600000101010101" pitchFamily="18" charset="-127"/>
-                  </a:rPr>
-                  <a:t>MY</a:t>
-                </a:r>
-                <a:endParaRPr lang="ko-KR" altLang="en-US" sz="3200" dirty="0">
-                  <a:solidFill>
-                    <a:schemeClr val="tx1"/>
-                  </a:solidFill>
-                  <a:latin typeface="HY견고딕" panose="02030600000101010101" pitchFamily="18" charset="-127"/>
-                  <a:ea typeface="HY견고딕" panose="02030600000101010101" pitchFamily="18" charset="-127"/>
-                </a:endParaRPr>
-              </a:p>
-            </p:txBody>
-          </p:sp>
-        </p:grpSp>
-        <p:sp>
-          <p:nvSpPr>
-            <p:cNvPr id="10" name="직사각형 9"/>
-            <p:cNvSpPr/>
-            <p:nvPr/>
-          </p:nvSpPr>
-          <p:spPr>
-            <a:xfrm>
-              <a:off x="4123731" y="1279636"/>
-              <a:ext cx="3066765" cy="499638"/>
-            </a:xfrm>
-            <a:prstGeom prst="rect">
-              <a:avLst/>
-            </a:prstGeom>
-            <a:noFill/>
-            <a:ln>
-              <a:noFill/>
-            </a:ln>
-          </p:spPr>
-          <p:style>
-            <a:lnRef idx="2">
-              <a:schemeClr val="accent1">
-                <a:shade val="50000"/>
-              </a:schemeClr>
-            </a:lnRef>
-            <a:fillRef idx="1">
-              <a:schemeClr val="accent1"/>
-            </a:fillRef>
-            <a:effectRef idx="0">
-              <a:schemeClr val="accent1"/>
-            </a:effectRef>
-            <a:fontRef idx="minor">
-              <a:schemeClr val="lt1"/>
-            </a:fontRef>
-          </p:style>
-          <p:txBody>
-            <a:bodyPr rtlCol="0" anchor="ctr"/>
-            <a:lstStyle/>
-            <a:p>
-              <a:pPr algn="ctr"/>
-              <a:r>
-                <a:rPr lang="en-US" altLang="ko-KR" dirty="0" smtClean="0">
-                  <a:solidFill>
-                    <a:srgbClr val="7030A0"/>
-                  </a:solidFill>
-                </a:rPr>
-                <a:t>www.mybookmark.com</a:t>
-              </a:r>
-              <a:endParaRPr lang="ko-KR" altLang="en-US" dirty="0">
-                <a:solidFill>
-                  <a:srgbClr val="7030A0"/>
-                </a:solidFill>
-              </a:endParaRPr>
-            </a:p>
-          </p:txBody>
-        </p:sp>
-        <p:sp>
-          <p:nvSpPr>
-            <p:cNvPr id="11" name="직사각형 10"/>
-            <p:cNvSpPr/>
-            <p:nvPr/>
-          </p:nvSpPr>
-          <p:spPr>
-            <a:xfrm>
-              <a:off x="816199" y="2308087"/>
-              <a:ext cx="4581136" cy="499638"/>
-            </a:xfrm>
-            <a:prstGeom prst="rect">
-              <a:avLst/>
-            </a:prstGeom>
-            <a:noFill/>
-            <a:ln>
-              <a:noFill/>
-            </a:ln>
-          </p:spPr>
-          <p:style>
-            <a:lnRef idx="2">
-              <a:schemeClr val="accent1">
-                <a:shade val="50000"/>
-              </a:schemeClr>
-            </a:lnRef>
-            <a:fillRef idx="1">
-              <a:schemeClr val="accent1"/>
-            </a:fillRef>
-            <a:effectRef idx="0">
-              <a:schemeClr val="accent1"/>
-            </a:effectRef>
-            <a:fontRef idx="minor">
-              <a:schemeClr val="lt1"/>
-            </a:fontRef>
-          </p:style>
-          <p:txBody>
-            <a:bodyPr rtlCol="0" anchor="ctr"/>
-            <a:lstStyle/>
-            <a:p>
-              <a:pPr algn="ctr"/>
-              <a:r>
-                <a:rPr lang="ko-KR" altLang="en-US" b="1" i="1" dirty="0" smtClean="0">
-                  <a:solidFill>
-                    <a:schemeClr val="accent1">
-                      <a:lumMod val="50000"/>
-                    </a:schemeClr>
-                  </a:solidFill>
-                </a:rPr>
-                <a:t>여러분이 원하는 찾는 모든 웹사이트</a:t>
-              </a:r>
-              <a:endParaRPr lang="ko-KR" altLang="en-US" b="1" i="1" dirty="0">
-                <a:solidFill>
-                  <a:schemeClr val="accent1">
-                    <a:lumMod val="50000"/>
-                  </a:schemeClr>
-                </a:solidFill>
-              </a:endParaRPr>
-            </a:p>
-          </p:txBody>
-        </p:sp>
-        <p:sp>
-          <p:nvSpPr>
-            <p:cNvPr id="12" name="직사각형 11"/>
-            <p:cNvSpPr/>
-            <p:nvPr/>
-          </p:nvSpPr>
-          <p:spPr>
-            <a:xfrm>
-              <a:off x="2910214" y="2755954"/>
-              <a:ext cx="4581136" cy="499638"/>
-            </a:xfrm>
-            <a:prstGeom prst="rect">
-              <a:avLst/>
-            </a:prstGeom>
-            <a:noFill/>
-            <a:ln>
-              <a:noFill/>
-            </a:ln>
-          </p:spPr>
-          <p:style>
-            <a:lnRef idx="2">
-              <a:schemeClr val="accent1">
-                <a:shade val="50000"/>
-              </a:schemeClr>
-            </a:lnRef>
-            <a:fillRef idx="1">
-              <a:schemeClr val="accent1"/>
-            </a:fillRef>
-            <a:effectRef idx="0">
-              <a:schemeClr val="accent1"/>
-            </a:effectRef>
-            <a:fontRef idx="minor">
-              <a:schemeClr val="lt1"/>
-            </a:fontRef>
-          </p:style>
-          <p:txBody>
-            <a:bodyPr rtlCol="0" anchor="ctr"/>
-            <a:lstStyle/>
-            <a:p>
-              <a:pPr algn="ctr"/>
-              <a:r>
-                <a:rPr lang="ko-KR" altLang="en-US" b="1" i="1" dirty="0" smtClean="0">
-                  <a:solidFill>
-                    <a:srgbClr val="00B050"/>
-                  </a:solidFill>
-                </a:rPr>
-                <a:t>어디서나 공유되는 나만의 </a:t>
-              </a:r>
-              <a:r>
-                <a:rPr lang="ko-KR" altLang="en-US" b="1" i="1" dirty="0" err="1" smtClean="0">
-                  <a:solidFill>
-                    <a:srgbClr val="00B050"/>
-                  </a:solidFill>
-                </a:rPr>
-                <a:t>즐겨찾기</a:t>
-              </a:r>
-              <a:endParaRPr lang="ko-KR" altLang="en-US" b="1" i="1" dirty="0">
-                <a:solidFill>
-                  <a:srgbClr val="00B050"/>
-                </a:solidFill>
-              </a:endParaRPr>
-            </a:p>
-          </p:txBody>
-        </p:sp>
-        <p:sp>
-          <p:nvSpPr>
-            <p:cNvPr id="13" name="직사각형 12"/>
-            <p:cNvSpPr/>
-            <p:nvPr/>
-          </p:nvSpPr>
-          <p:spPr>
-            <a:xfrm>
-              <a:off x="1592396" y="3164557"/>
-              <a:ext cx="4581136" cy="499638"/>
-            </a:xfrm>
-            <a:prstGeom prst="rect">
-              <a:avLst/>
-            </a:prstGeom>
-            <a:noFill/>
-            <a:ln>
-              <a:noFill/>
-            </a:ln>
-          </p:spPr>
-          <p:style>
-            <a:lnRef idx="2">
-              <a:schemeClr val="accent1">
-                <a:shade val="50000"/>
-              </a:schemeClr>
-            </a:lnRef>
-            <a:fillRef idx="1">
-              <a:schemeClr val="accent1"/>
-            </a:fillRef>
-            <a:effectRef idx="0">
-              <a:schemeClr val="accent1"/>
-            </a:effectRef>
-            <a:fontRef idx="minor">
-              <a:schemeClr val="lt1"/>
-            </a:fontRef>
-          </p:style>
-          <p:txBody>
-            <a:bodyPr rtlCol="0" anchor="ctr"/>
-            <a:lstStyle/>
-            <a:p>
-              <a:pPr algn="ctr"/>
-              <a:r>
-                <a:rPr lang="ko-KR" altLang="en-US" sz="2000" b="1" dirty="0" smtClean="0">
-                  <a:solidFill>
-                    <a:srgbClr val="961A8A"/>
-                  </a:solidFill>
-                </a:rPr>
-                <a:t>여러분의 사이트를 공유해보세요</a:t>
-              </a:r>
-              <a:r>
-                <a:rPr lang="en-US" altLang="ko-KR" sz="2000" b="1" dirty="0" smtClean="0">
-                  <a:solidFill>
-                    <a:srgbClr val="961A8A"/>
-                  </a:solidFill>
-                </a:rPr>
-                <a:t>!</a:t>
-              </a:r>
-              <a:endParaRPr lang="ko-KR" altLang="en-US" sz="2000" b="1" dirty="0">
-                <a:solidFill>
-                  <a:srgbClr val="961A8A"/>
-                </a:solidFill>
-              </a:endParaRPr>
-            </a:p>
-          </p:txBody>
-        </p:sp>
-      </p:grpSp>
-    </p:spTree>
-    <p:extLst>
-      <p:ext uri="{BB962C8B-B14F-4D97-AF65-F5344CB8AC3E}">
-        <p14:creationId xmlns:p14="http://schemas.microsoft.com/office/powerpoint/2010/main" val="3628988493"/>
       </p:ext>
     </p:extLst>
   </p:cSld>

</xml_diff>

<commit_message>
[u] Front : change logo img
</commit_message>
<xml_diff>
--- a/bookmark.pptx
+++ b/bookmark.pptx
@@ -264,7 +264,7 @@
           <a:p>
             <a:fld id="{9A0CBB99-4DF1-49E3-ACA0-C007A6485E48}" type="datetimeFigureOut">
               <a:rPr lang="ko-KR" altLang="en-US" smtClean="0"/>
-              <a:t>2024-05-20</a:t>
+              <a:t>2024-09-12</a:t>
             </a:fld>
             <a:endParaRPr lang="ko-KR" altLang="en-US"/>
           </a:p>
@@ -434,7 +434,7 @@
           <a:p>
             <a:fld id="{9A0CBB99-4DF1-49E3-ACA0-C007A6485E48}" type="datetimeFigureOut">
               <a:rPr lang="ko-KR" altLang="en-US" smtClean="0"/>
-              <a:t>2024-05-20</a:t>
+              <a:t>2024-09-12</a:t>
             </a:fld>
             <a:endParaRPr lang="ko-KR" altLang="en-US"/>
           </a:p>
@@ -614,7 +614,7 @@
           <a:p>
             <a:fld id="{9A0CBB99-4DF1-49E3-ACA0-C007A6485E48}" type="datetimeFigureOut">
               <a:rPr lang="ko-KR" altLang="en-US" smtClean="0"/>
-              <a:t>2024-05-20</a:t>
+              <a:t>2024-09-12</a:t>
             </a:fld>
             <a:endParaRPr lang="ko-KR" altLang="en-US"/>
           </a:p>
@@ -784,7 +784,7 @@
           <a:p>
             <a:fld id="{9A0CBB99-4DF1-49E3-ACA0-C007A6485E48}" type="datetimeFigureOut">
               <a:rPr lang="ko-KR" altLang="en-US" smtClean="0"/>
-              <a:t>2024-05-20</a:t>
+              <a:t>2024-09-12</a:t>
             </a:fld>
             <a:endParaRPr lang="ko-KR" altLang="en-US"/>
           </a:p>
@@ -1030,7 +1030,7 @@
           <a:p>
             <a:fld id="{9A0CBB99-4DF1-49E3-ACA0-C007A6485E48}" type="datetimeFigureOut">
               <a:rPr lang="ko-KR" altLang="en-US" smtClean="0"/>
-              <a:t>2024-05-20</a:t>
+              <a:t>2024-09-12</a:t>
             </a:fld>
             <a:endParaRPr lang="ko-KR" altLang="en-US"/>
           </a:p>
@@ -1262,7 +1262,7 @@
           <a:p>
             <a:fld id="{9A0CBB99-4DF1-49E3-ACA0-C007A6485E48}" type="datetimeFigureOut">
               <a:rPr lang="ko-KR" altLang="en-US" smtClean="0"/>
-              <a:t>2024-05-20</a:t>
+              <a:t>2024-09-12</a:t>
             </a:fld>
             <a:endParaRPr lang="ko-KR" altLang="en-US"/>
           </a:p>
@@ -1629,7 +1629,7 @@
           <a:p>
             <a:fld id="{9A0CBB99-4DF1-49E3-ACA0-C007A6485E48}" type="datetimeFigureOut">
               <a:rPr lang="ko-KR" altLang="en-US" smtClean="0"/>
-              <a:t>2024-05-20</a:t>
+              <a:t>2024-09-12</a:t>
             </a:fld>
             <a:endParaRPr lang="ko-KR" altLang="en-US"/>
           </a:p>
@@ -1747,7 +1747,7 @@
           <a:p>
             <a:fld id="{9A0CBB99-4DF1-49E3-ACA0-C007A6485E48}" type="datetimeFigureOut">
               <a:rPr lang="ko-KR" altLang="en-US" smtClean="0"/>
-              <a:t>2024-05-20</a:t>
+              <a:t>2024-09-12</a:t>
             </a:fld>
             <a:endParaRPr lang="ko-KR" altLang="en-US"/>
           </a:p>
@@ -1842,7 +1842,7 @@
           <a:p>
             <a:fld id="{9A0CBB99-4DF1-49E3-ACA0-C007A6485E48}" type="datetimeFigureOut">
               <a:rPr lang="ko-KR" altLang="en-US" smtClean="0"/>
-              <a:t>2024-05-20</a:t>
+              <a:t>2024-09-12</a:t>
             </a:fld>
             <a:endParaRPr lang="ko-KR" altLang="en-US"/>
           </a:p>
@@ -2119,7 +2119,7 @@
           <a:p>
             <a:fld id="{9A0CBB99-4DF1-49E3-ACA0-C007A6485E48}" type="datetimeFigureOut">
               <a:rPr lang="ko-KR" altLang="en-US" smtClean="0"/>
-              <a:t>2024-05-20</a:t>
+              <a:t>2024-09-12</a:t>
             </a:fld>
             <a:endParaRPr lang="ko-KR" altLang="en-US"/>
           </a:p>
@@ -2372,7 +2372,7 @@
           <a:p>
             <a:fld id="{9A0CBB99-4DF1-49E3-ACA0-C007A6485E48}" type="datetimeFigureOut">
               <a:rPr lang="ko-KR" altLang="en-US" smtClean="0"/>
-              <a:t>2024-05-20</a:t>
+              <a:t>2024-09-12</a:t>
             </a:fld>
             <a:endParaRPr lang="ko-KR" altLang="en-US"/>
           </a:p>
@@ -2585,7 +2585,7 @@
           <a:p>
             <a:fld id="{9A0CBB99-4DF1-49E3-ACA0-C007A6485E48}" type="datetimeFigureOut">
               <a:rPr lang="ko-KR" altLang="en-US" smtClean="0"/>
-              <a:t>2024-05-20</a:t>
+              <a:t>2024-09-12</a:t>
             </a:fld>
             <a:endParaRPr lang="ko-KR" altLang="en-US"/>
           </a:p>
@@ -8287,15 +8287,7 @@
                   <a:schemeClr val="tx1"/>
                 </a:solidFill>
               </a:rPr>
-              <a:t> 여는게 좋을 </a:t>
-            </a:r>
-            <a:r>
-              <a:rPr lang="ko-KR" altLang="en-US" sz="1400" dirty="0" smtClean="0">
-                <a:solidFill>
-                  <a:schemeClr val="tx1"/>
-                </a:solidFill>
-              </a:rPr>
-              <a:t>듯</a:t>
+              <a:t> 여는게 좋을 듯</a:t>
             </a:r>
             <a:endParaRPr lang="en-US" altLang="ko-KR" sz="1400" dirty="0" smtClean="0">
               <a:solidFill>
@@ -9770,6 +9762,400 @@
                 <a:t>MY</a:t>
               </a:r>
               <a:endParaRPr lang="ko-KR" altLang="en-US" sz="3200" dirty="0">
+                <a:solidFill>
+                  <a:schemeClr val="tx1"/>
+                </a:solidFill>
+                <a:latin typeface="HY견고딕" panose="02030600000101010101" pitchFamily="18" charset="-127"/>
+                <a:ea typeface="HY견고딕" panose="02030600000101010101" pitchFamily="18" charset="-127"/>
+              </a:endParaRPr>
+            </a:p>
+          </p:txBody>
+        </p:sp>
+      </p:grpSp>
+      <p:grpSp>
+        <p:nvGrpSpPr>
+          <p:cNvPr id="10" name="그룹 9"/>
+          <p:cNvGrpSpPr/>
+          <p:nvPr/>
+        </p:nvGrpSpPr>
+        <p:grpSpPr>
+          <a:xfrm>
+            <a:off x="4514793" y="2814307"/>
+            <a:ext cx="3558004" cy="1832905"/>
+            <a:chOff x="5485984" y="3174864"/>
+            <a:chExt cx="2875571" cy="1393556"/>
+          </a:xfrm>
+        </p:grpSpPr>
+        <p:sp>
+          <p:nvSpPr>
+            <p:cNvPr id="19" name="순서도: 대체 처리 18"/>
+            <p:cNvSpPr/>
+            <p:nvPr/>
+          </p:nvSpPr>
+          <p:spPr>
+            <a:xfrm>
+              <a:off x="5736434" y="3479095"/>
+              <a:ext cx="2625121" cy="1089325"/>
+            </a:xfrm>
+            <a:prstGeom prst="flowChartAlternateProcess">
+              <a:avLst/>
+            </a:prstGeom>
+            <a:ln/>
+            <a:effectLst>
+              <a:softEdge rad="0"/>
+            </a:effectLst>
+          </p:spPr>
+          <p:style>
+            <a:lnRef idx="2">
+              <a:schemeClr val="dk1"/>
+            </a:lnRef>
+            <a:fillRef idx="1">
+              <a:schemeClr val="lt1"/>
+            </a:fillRef>
+            <a:effectRef idx="0">
+              <a:schemeClr val="dk1"/>
+            </a:effectRef>
+            <a:fontRef idx="minor">
+              <a:schemeClr val="dk1"/>
+            </a:fontRef>
+          </p:style>
+          <p:txBody>
+            <a:bodyPr rtlCol="0" anchor="ctr"/>
+            <a:lstStyle/>
+            <a:p>
+              <a:pPr algn="ctr"/>
+              <a:endParaRPr lang="ko-KR" altLang="en-US"/>
+            </a:p>
+          </p:txBody>
+        </p:sp>
+        <p:sp>
+          <p:nvSpPr>
+            <p:cNvPr id="20" name="오각형 19"/>
+            <p:cNvSpPr/>
+            <p:nvPr/>
+          </p:nvSpPr>
+          <p:spPr>
+            <a:xfrm>
+              <a:off x="5887191" y="3780313"/>
+              <a:ext cx="2328288" cy="612177"/>
+            </a:xfrm>
+            <a:prstGeom prst="homePlate">
+              <a:avLst/>
+            </a:prstGeom>
+            <a:solidFill>
+              <a:schemeClr val="tx1"/>
+            </a:solidFill>
+            <a:ln w="19050">
+              <a:noFill/>
+            </a:ln>
+          </p:spPr>
+          <p:style>
+            <a:lnRef idx="2">
+              <a:schemeClr val="accent1">
+                <a:shade val="50000"/>
+              </a:schemeClr>
+            </a:lnRef>
+            <a:fillRef idx="1">
+              <a:schemeClr val="accent1"/>
+            </a:fillRef>
+            <a:effectRef idx="0">
+              <a:schemeClr val="accent1"/>
+            </a:effectRef>
+            <a:fontRef idx="minor">
+              <a:schemeClr val="lt1"/>
+            </a:fontRef>
+          </p:style>
+          <p:txBody>
+            <a:bodyPr rtlCol="0" anchor="ctr"/>
+            <a:lstStyle/>
+            <a:p>
+              <a:pPr algn="ctr"/>
+              <a:r>
+                <a:rPr lang="en-US" altLang="ko-KR" sz="2400" b="1" dirty="0" smtClean="0">
+                  <a:solidFill>
+                    <a:schemeClr val="bg1"/>
+                  </a:solidFill>
+                </a:rPr>
+                <a:t>BOOKMARK</a:t>
+              </a:r>
+              <a:endParaRPr lang="ko-KR" altLang="en-US" sz="2400" b="1" dirty="0">
+                <a:solidFill>
+                  <a:schemeClr val="bg1"/>
+                </a:solidFill>
+              </a:endParaRPr>
+            </a:p>
+          </p:txBody>
+        </p:sp>
+        <p:sp>
+          <p:nvSpPr>
+            <p:cNvPr id="21" name="직사각형 20"/>
+            <p:cNvSpPr/>
+            <p:nvPr/>
+          </p:nvSpPr>
+          <p:spPr>
+            <a:xfrm>
+              <a:off x="5485984" y="3174864"/>
+              <a:ext cx="1470920" cy="453913"/>
+            </a:xfrm>
+            <a:prstGeom prst="rect">
+              <a:avLst/>
+            </a:prstGeom>
+            <a:solidFill>
+              <a:schemeClr val="bg1"/>
+            </a:solidFill>
+            <a:ln>
+              <a:noFill/>
+            </a:ln>
+          </p:spPr>
+          <p:style>
+            <a:lnRef idx="2">
+              <a:schemeClr val="accent1">
+                <a:shade val="50000"/>
+              </a:schemeClr>
+            </a:lnRef>
+            <a:fillRef idx="1">
+              <a:schemeClr val="accent1"/>
+            </a:fillRef>
+            <a:effectRef idx="0">
+              <a:schemeClr val="accent1"/>
+            </a:effectRef>
+            <a:fontRef idx="minor">
+              <a:schemeClr val="lt1"/>
+            </a:fontRef>
+          </p:style>
+          <p:txBody>
+            <a:bodyPr rtlCol="0" anchor="ctr"/>
+            <a:lstStyle/>
+            <a:p>
+              <a:pPr algn="ctr"/>
+              <a:r>
+                <a:rPr lang="en-US" altLang="ko-KR" sz="2800" dirty="0" smtClean="0">
+                  <a:solidFill>
+                    <a:schemeClr val="tx1"/>
+                  </a:solidFill>
+                  <a:latin typeface="HY견고딕" panose="02030600000101010101" pitchFamily="18" charset="-127"/>
+                  <a:ea typeface="HY견고딕" panose="02030600000101010101" pitchFamily="18" charset="-127"/>
+                </a:rPr>
+                <a:t>MY</a:t>
+              </a:r>
+              <a:endParaRPr lang="ko-KR" altLang="en-US" sz="2800" dirty="0">
+                <a:solidFill>
+                  <a:schemeClr val="tx1"/>
+                </a:solidFill>
+                <a:latin typeface="HY견고딕" panose="02030600000101010101" pitchFamily="18" charset="-127"/>
+                <a:ea typeface="HY견고딕" panose="02030600000101010101" pitchFamily="18" charset="-127"/>
+              </a:endParaRPr>
+            </a:p>
+          </p:txBody>
+        </p:sp>
+      </p:grpSp>
+      <p:sp>
+        <p:nvSpPr>
+          <p:cNvPr id="2" name="모서리가 둥근 직사각형 1"/>
+          <p:cNvSpPr/>
+          <p:nvPr/>
+        </p:nvSpPr>
+        <p:spPr>
+          <a:xfrm>
+            <a:off x="8834946" y="3400301"/>
+            <a:ext cx="2664619" cy="1246911"/>
+          </a:xfrm>
+          <a:prstGeom prst="roundRect">
+            <a:avLst/>
+          </a:prstGeom>
+        </p:spPr>
+        <p:style>
+          <a:lnRef idx="2">
+            <a:schemeClr val="accent1">
+              <a:shade val="50000"/>
+            </a:schemeClr>
+          </a:lnRef>
+          <a:fillRef idx="1">
+            <a:schemeClr val="accent1"/>
+          </a:fillRef>
+          <a:effectRef idx="0">
+            <a:schemeClr val="accent1"/>
+          </a:effectRef>
+          <a:fontRef idx="minor">
+            <a:schemeClr val="lt1"/>
+          </a:fontRef>
+        </p:style>
+        <p:txBody>
+          <a:bodyPr rtlCol="0" anchor="ctr"/>
+          <a:lstStyle/>
+          <a:p>
+            <a:pPr algn="ctr"/>
+            <a:endParaRPr lang="ko-KR" altLang="en-US"/>
+          </a:p>
+        </p:txBody>
+      </p:sp>
+      <p:grpSp>
+        <p:nvGrpSpPr>
+          <p:cNvPr id="13" name="그룹 12"/>
+          <p:cNvGrpSpPr/>
+          <p:nvPr/>
+        </p:nvGrpSpPr>
+        <p:grpSpPr>
+          <a:xfrm>
+            <a:off x="7948880" y="560144"/>
+            <a:ext cx="3248117" cy="1774826"/>
+            <a:chOff x="7948880" y="560144"/>
+            <a:chExt cx="3248117" cy="1774826"/>
+          </a:xfrm>
+        </p:grpSpPr>
+        <p:sp>
+          <p:nvSpPr>
+            <p:cNvPr id="23" name="순서도: 대체 처리 22"/>
+            <p:cNvSpPr/>
+            <p:nvPr/>
+          </p:nvSpPr>
+          <p:spPr>
+            <a:xfrm>
+              <a:off x="7948880" y="902211"/>
+              <a:ext cx="3248117" cy="1432759"/>
+            </a:xfrm>
+            <a:prstGeom prst="flowChartAlternateProcess">
+              <a:avLst/>
+            </a:prstGeom>
+            <a:ln/>
+            <a:effectLst>
+              <a:softEdge rad="0"/>
+            </a:effectLst>
+          </p:spPr>
+          <p:style>
+            <a:lnRef idx="2">
+              <a:schemeClr val="dk1"/>
+            </a:lnRef>
+            <a:fillRef idx="1">
+              <a:schemeClr val="lt1"/>
+            </a:fillRef>
+            <a:effectRef idx="0">
+              <a:schemeClr val="dk1"/>
+            </a:effectRef>
+            <a:fontRef idx="minor">
+              <a:schemeClr val="dk1"/>
+            </a:fontRef>
+          </p:style>
+          <p:txBody>
+            <a:bodyPr rtlCol="0" anchor="ctr"/>
+            <a:lstStyle/>
+            <a:p>
+              <a:pPr algn="ctr"/>
+              <a:endParaRPr lang="ko-KR" altLang="en-US"/>
+            </a:p>
+          </p:txBody>
+        </p:sp>
+        <p:sp>
+          <p:nvSpPr>
+            <p:cNvPr id="24" name="모서리가 둥근 직사각형 23"/>
+            <p:cNvSpPr/>
+            <p:nvPr/>
+          </p:nvSpPr>
+          <p:spPr>
+            <a:xfrm>
+              <a:off x="8135415" y="1298395"/>
+              <a:ext cx="2880839" cy="805179"/>
+            </a:xfrm>
+            <a:prstGeom prst="roundRect">
+              <a:avLst/>
+            </a:prstGeom>
+            <a:solidFill>
+              <a:schemeClr val="tx1"/>
+            </a:solidFill>
+            <a:ln w="19050">
+              <a:noFill/>
+            </a:ln>
+          </p:spPr>
+          <p:style>
+            <a:lnRef idx="2">
+              <a:schemeClr val="accent1">
+                <a:shade val="50000"/>
+              </a:schemeClr>
+            </a:lnRef>
+            <a:fillRef idx="1">
+              <a:schemeClr val="accent1"/>
+            </a:fillRef>
+            <a:effectRef idx="0">
+              <a:schemeClr val="accent1"/>
+            </a:effectRef>
+            <a:fontRef idx="minor">
+              <a:schemeClr val="lt1"/>
+            </a:fontRef>
+          </p:style>
+          <p:txBody>
+            <a:bodyPr rtlCol="0" anchor="ctr"/>
+            <a:lstStyle/>
+            <a:p>
+              <a:pPr algn="ctr"/>
+              <a:r>
+                <a:rPr lang="en-US" altLang="ko-KR" sz="2400" b="1" dirty="0" smtClean="0">
+                  <a:solidFill>
+                    <a:schemeClr val="bg1"/>
+                  </a:solidFill>
+                </a:rPr>
+                <a:t>BOOKMARK</a:t>
+              </a:r>
+              <a:endParaRPr lang="ko-KR" altLang="en-US" sz="2400" b="1" dirty="0">
+                <a:solidFill>
+                  <a:schemeClr val="bg1"/>
+                </a:solidFill>
+              </a:endParaRPr>
+            </a:p>
+          </p:txBody>
+        </p:sp>
+        <p:sp>
+          <p:nvSpPr>
+            <p:cNvPr id="25" name="직사각형 24"/>
+            <p:cNvSpPr/>
+            <p:nvPr/>
+          </p:nvSpPr>
+          <p:spPr>
+            <a:xfrm>
+              <a:off x="8072797" y="560144"/>
+              <a:ext cx="1229598" cy="597019"/>
+            </a:xfrm>
+            <a:prstGeom prst="rect">
+              <a:avLst/>
+            </a:prstGeom>
+            <a:solidFill>
+              <a:schemeClr val="bg1"/>
+            </a:solidFill>
+            <a:ln>
+              <a:noFill/>
+            </a:ln>
+          </p:spPr>
+          <p:style>
+            <a:lnRef idx="2">
+              <a:schemeClr val="accent1">
+                <a:shade val="50000"/>
+              </a:schemeClr>
+            </a:lnRef>
+            <a:fillRef idx="1">
+              <a:schemeClr val="accent1"/>
+            </a:fillRef>
+            <a:effectRef idx="0">
+              <a:schemeClr val="accent1"/>
+            </a:effectRef>
+            <a:fontRef idx="minor">
+              <a:schemeClr val="lt1"/>
+            </a:fontRef>
+          </p:style>
+          <p:txBody>
+            <a:bodyPr rtlCol="0" anchor="ctr"/>
+            <a:lstStyle/>
+            <a:p>
+              <a:pPr algn="ctr"/>
+              <a:r>
+                <a:rPr lang="en-US" altLang="ko-KR" sz="2800" dirty="0" smtClean="0">
+                  <a:solidFill>
+                    <a:schemeClr val="tx1"/>
+                  </a:solidFill>
+                  <a:latin typeface="HY견고딕" panose="02030600000101010101" pitchFamily="18" charset="-127"/>
+                  <a:ea typeface="HY견고딕" panose="02030600000101010101" pitchFamily="18" charset="-127"/>
+                </a:rPr>
+                <a:t>MY</a:t>
+              </a:r>
+              <a:endParaRPr lang="ko-KR" altLang="en-US" sz="2800" dirty="0">
                 <a:solidFill>
                   <a:schemeClr val="tx1"/>
                 </a:solidFill>

</xml_diff>